<commit_message>
Commit atualizaça do slide
</commit_message>
<xml_diff>
--- a/Requisitos/Plano de Projeto 1.pptx
+++ b/Requisitos/Plano de Projeto 1.pptx
@@ -5,10 +5,10 @@
     <p:sldMasterId id="2147483648" r:id="rId2"/>
   </p:sldMasterIdLst>
   <p:notesMasterIdLst>
-    <p:notesMasterId r:id="rId17"/>
+    <p:notesMasterId r:id="rId19"/>
   </p:notesMasterIdLst>
   <p:handoutMasterIdLst>
-    <p:handoutMasterId r:id="rId18"/>
+    <p:handoutMasterId r:id="rId20"/>
   </p:handoutMasterIdLst>
   <p:sldIdLst>
     <p:sldId id="265" r:id="rId3"/>
@@ -22,9 +22,11 @@
     <p:sldId id="294" r:id="rId11"/>
     <p:sldId id="280" r:id="rId12"/>
     <p:sldId id="301" r:id="rId13"/>
-    <p:sldId id="300" r:id="rId14"/>
-    <p:sldId id="284" r:id="rId15"/>
-    <p:sldId id="295" r:id="rId16"/>
+    <p:sldId id="302" r:id="rId14"/>
+    <p:sldId id="303" r:id="rId15"/>
+    <p:sldId id="300" r:id="rId16"/>
+    <p:sldId id="284" r:id="rId17"/>
+    <p:sldId id="295" r:id="rId18"/>
   </p:sldIdLst>
   <p:sldSz cx="12192000" cy="6858000"/>
   <p:notesSz cx="6858000" cy="9144000"/>
@@ -125,7 +127,7 @@
   </p:defaultTextStyle>
   <p:extLst>
     <p:ext uri="{EFAFB233-063F-42B5-8137-9DF3F51BA10A}">
-      <p15:sldGuideLst xmlns:p15="http://schemas.microsoft.com/office/powerpoint/2012/main" xmlns="">
+      <p15:sldGuideLst xmlns="" xmlns:p15="http://schemas.microsoft.com/office/powerpoint/2012/main">
         <p15:guide id="1" pos="3840" userDrawn="1">
           <p15:clr>
             <a:srgbClr val="A4A3A4"/>
@@ -149,7 +151,7 @@
       </p15:sldGuideLst>
     </p:ext>
     <p:ext uri="{2D200454-40CA-4A62-9FC3-DE9A4176ACB9}">
-      <p15:notesGuideLst xmlns:p15="http://schemas.microsoft.com/office/powerpoint/2012/main" xmlns=""/>
+      <p15:notesGuideLst xmlns="" xmlns:p15="http://schemas.microsoft.com/office/powerpoint/2012/main"/>
     </p:ext>
   </p:extLst>
 </p:presentation>
@@ -2553,35 +2555,35 @@
     </dgm:pt>
   </dgm:ptLst>
   <dgm:cxnLst>
+    <dgm:cxn modelId="{918FC998-3E81-4E2A-A8E0-FB3EB04E2705}" srcId="{0F9F144E-5A69-4079-9CFE-833FB141B5B7}" destId="{A766E2ED-C2E8-4E07-AF18-7EC57476A5C8}" srcOrd="1" destOrd="0" parTransId="{A1530F03-6C5E-45D7-8222-AD175A7090BD}" sibTransId="{05B31AC5-A983-4FEC-B0BE-EB0462CF6128}"/>
+    <dgm:cxn modelId="{41BAC73D-C909-4828-81D3-F16502305163}" type="presOf" srcId="{8665C39E-B30E-4258-BEA9-83E0F7084606}" destId="{85B657F5-5C9C-42F8-A245-10BA7A824404}" srcOrd="0" destOrd="0" presId="urn:microsoft.com/office/officeart/2005/8/layout/lProcess2"/>
+    <dgm:cxn modelId="{8D6B5497-475C-46A9-805D-510F815F9B98}" srcId="{7592B694-086D-4180-B053-CE7AD13C9858}" destId="{8665C39E-B30E-4258-BEA9-83E0F7084606}" srcOrd="0" destOrd="0" parTransId="{8211EBE3-1C93-4CFB-BBEE-7A708996ED07}" sibTransId="{6779ED75-3327-4C98-9C89-1343058D49BC}"/>
+    <dgm:cxn modelId="{BA343F65-7063-4A06-9692-19E81201F0CA}" type="presOf" srcId="{7DCD12F6-9D96-4CEE-B77D-0059BD9F172C}" destId="{60B6E648-ADB0-4695-B9EA-290DF28C1E3A}" srcOrd="0" destOrd="0" presId="urn:microsoft.com/office/officeart/2005/8/layout/lProcess2"/>
+    <dgm:cxn modelId="{696FC290-58F8-4B0A-B325-8A4CDCEFC93C}" srcId="{DF4857E7-5C40-4E4D-8F9E-0F40BE240B2F}" destId="{0F9F144E-5A69-4079-9CFE-833FB141B5B7}" srcOrd="0" destOrd="0" parTransId="{5295059C-89BD-48FC-9FB0-63BD38C2AF52}" sibTransId="{FAB8FA54-A1F3-488D-B823-07CCB71E4D44}"/>
+    <dgm:cxn modelId="{8AD144FB-65EB-4E0A-BBFB-81923B833C5B}" type="presOf" srcId="{F5E45C32-85BB-467F-80E6-A808871E72F3}" destId="{E7B9CF75-AF6A-4290-854A-077BB9A2D77C}" srcOrd="0" destOrd="0" presId="urn:microsoft.com/office/officeart/2005/8/layout/lProcess2"/>
+    <dgm:cxn modelId="{337C532E-FA4C-4DE5-902B-AF62654DE2CD}" type="presOf" srcId="{0F9F144E-5A69-4079-9CFE-833FB141B5B7}" destId="{F032D9DC-6E96-4533-82F7-966FA94900AA}" srcOrd="1" destOrd="0" presId="urn:microsoft.com/office/officeart/2005/8/layout/lProcess2"/>
+    <dgm:cxn modelId="{EAD02916-CE0D-4F3F-A82E-33F10B159D8E}" type="presOf" srcId="{512A4932-71C2-4AF1-A35F-4F4632F17C02}" destId="{51239DC3-E9A2-43DA-8F69-23A0808C5F7B}" srcOrd="0" destOrd="0" presId="urn:microsoft.com/office/officeart/2005/8/layout/lProcess2"/>
+    <dgm:cxn modelId="{42032CCC-41F9-4B3F-A503-E38701F4AC02}" srcId="{7592B694-086D-4180-B053-CE7AD13C9858}" destId="{512A4932-71C2-4AF1-A35F-4F4632F17C02}" srcOrd="1" destOrd="0" parTransId="{47E31259-60CB-40FB-B391-CCAEC2189164}" sibTransId="{4C7C1C5B-4033-4A4C-87E1-4A3C60B720B7}"/>
+    <dgm:cxn modelId="{4F69C728-D27E-4664-B39F-E552BD0B15C4}" type="presOf" srcId="{68DE1B8C-EBBC-4ACF-AD69-E108E4A8C85C}" destId="{A9276CF6-D6BB-4D87-85EE-C74A56417B50}" srcOrd="1" destOrd="0" presId="urn:microsoft.com/office/officeart/2005/8/layout/lProcess2"/>
+    <dgm:cxn modelId="{3BB736BE-339A-4657-B981-F9F1F8D52FDC}" type="presOf" srcId="{A766E2ED-C2E8-4E07-AF18-7EC57476A5C8}" destId="{D88EF221-1E19-407F-A109-45D126E6B0AD}" srcOrd="0" destOrd="0" presId="urn:microsoft.com/office/officeart/2005/8/layout/lProcess2"/>
+    <dgm:cxn modelId="{ECB29E32-DF3F-494F-B7BB-9C8BD137B048}" type="presOf" srcId="{FA9C7340-018E-4F73-A402-B7FF8C34CDC0}" destId="{BD436606-D1DD-4535-A521-C5E4F9743128}" srcOrd="0" destOrd="0" presId="urn:microsoft.com/office/officeart/2005/8/layout/lProcess2"/>
+    <dgm:cxn modelId="{8BF652A8-B747-4011-8997-2C8E587087B9}" srcId="{68DE1B8C-EBBC-4ACF-AD69-E108E4A8C85C}" destId="{7DCD12F6-9D96-4CEE-B77D-0059BD9F172C}" srcOrd="1" destOrd="0" parTransId="{05220267-9773-4777-8E6B-2437F9979F0B}" sibTransId="{89843E98-8750-44A8-9562-C70EE7FD83F4}"/>
+    <dgm:cxn modelId="{E3AEEE63-0D70-4A65-B4AD-DC3DBA17985A}" type="presOf" srcId="{7592B694-086D-4180-B053-CE7AD13C9858}" destId="{B6E9B2AA-8010-4FAB-90D2-72717C05AE96}" srcOrd="1" destOrd="0" presId="urn:microsoft.com/office/officeart/2005/8/layout/lProcess2"/>
+    <dgm:cxn modelId="{82ECE00E-C99F-43DA-83F9-38CFC3F7A2FA}" type="presOf" srcId="{DF4857E7-5C40-4E4D-8F9E-0F40BE240B2F}" destId="{4514D2E9-87FF-454C-A554-FD761A8568C7}" srcOrd="0" destOrd="0" presId="urn:microsoft.com/office/officeart/2005/8/layout/lProcess2"/>
+    <dgm:cxn modelId="{58D7B72C-6638-4F5D-945E-9420F8FE7097}" type="presOf" srcId="{7592B694-086D-4180-B053-CE7AD13C9858}" destId="{6E5A89BC-14D8-4DAA-BBC1-B070DD5BD626}" srcOrd="0" destOrd="0" presId="urn:microsoft.com/office/officeart/2005/8/layout/lProcess2"/>
+    <dgm:cxn modelId="{583CC615-DAE7-4276-AD9F-C578D26FEDFC}" srcId="{DF4857E7-5C40-4E4D-8F9E-0F40BE240B2F}" destId="{7592B694-086D-4180-B053-CE7AD13C9858}" srcOrd="2" destOrd="0" parTransId="{C8FADD59-ED12-44D1-A076-7A13B0AC344E}" sibTransId="{34A6F1FD-1787-4988-A7E6-472B7C66BD09}"/>
+    <dgm:cxn modelId="{C3F684FE-A0E7-411B-A303-2C8155B38D48}" srcId="{DF4857E7-5C40-4E4D-8F9E-0F40BE240B2F}" destId="{F5E45C32-85BB-467F-80E6-A808871E72F3}" srcOrd="1" destOrd="0" parTransId="{FAB096C4-43F1-4FB0-A740-B5A33490B558}" sibTransId="{F29CEF7E-7A2A-457D-9BE3-75C08A423C81}"/>
+    <dgm:cxn modelId="{7C9C3A38-6D50-4AFF-AA73-365DE43285E1}" type="presOf" srcId="{32074760-1CE6-4EA9-A667-33C7E19C2D94}" destId="{A8FD0D76-AFC6-4802-9090-E980FDBECC91}" srcOrd="0" destOrd="0" presId="urn:microsoft.com/office/officeart/2005/8/layout/lProcess2"/>
+    <dgm:cxn modelId="{6F5081CF-24CF-4E2C-8683-D130E3B3E5C7}" type="presOf" srcId="{F5E45C32-85BB-467F-80E6-A808871E72F3}" destId="{2487EB6F-DE81-4509-80D3-3047844600F3}" srcOrd="1" destOrd="0" presId="urn:microsoft.com/office/officeart/2005/8/layout/lProcess2"/>
+    <dgm:cxn modelId="{C664844B-280E-4BFE-9C14-BBB1B2BC2C91}" type="presOf" srcId="{6193ECAA-3925-487F-ADF8-CE1362754FFF}" destId="{5CE69C38-1462-4F71-A252-F397C9008295}" srcOrd="0" destOrd="0" presId="urn:microsoft.com/office/officeart/2005/8/layout/lProcess2"/>
+    <dgm:cxn modelId="{DEF1C201-34B1-4882-8DBF-B07106CA401E}" type="presOf" srcId="{8C9EF0B8-B348-4F26-938D-6A3D8F1D01C9}" destId="{EF50A355-5315-401C-A8B8-05A2B4F30FE3}" srcOrd="0" destOrd="0" presId="urn:microsoft.com/office/officeart/2005/8/layout/lProcess2"/>
+    <dgm:cxn modelId="{FA16C23C-5596-42A1-981A-487742CF3BBD}" srcId="{F5E45C32-85BB-467F-80E6-A808871E72F3}" destId="{6193ECAA-3925-487F-ADF8-CE1362754FFF}" srcOrd="0" destOrd="0" parTransId="{CA95F830-F096-4B8A-8E76-097EF46A4F44}" sibTransId="{4C2F44CE-5AB4-4FFE-B037-FFB0E3B4A7EB}"/>
+    <dgm:cxn modelId="{792FB76A-389C-45B7-8308-227DADB5CF70}" srcId="{0F9F144E-5A69-4079-9CFE-833FB141B5B7}" destId="{32074760-1CE6-4EA9-A667-33C7E19C2D94}" srcOrd="0" destOrd="0" parTransId="{41FFA3F1-CAF6-4B0C-90FB-AAF097D8C840}" sibTransId="{66E711EC-17A3-40E0-B60B-5A2F466C9D11}"/>
+    <dgm:cxn modelId="{7A675828-0E86-4177-A02F-94B30E827A0C}" type="presOf" srcId="{0F9F144E-5A69-4079-9CFE-833FB141B5B7}" destId="{9046789A-6150-4534-817A-88A1F11F0BDA}" srcOrd="0" destOrd="0" presId="urn:microsoft.com/office/officeart/2005/8/layout/lProcess2"/>
+    <dgm:cxn modelId="{92E0E4AC-AA4F-4221-B4F5-BC44ADD50226}" srcId="{F5E45C32-85BB-467F-80E6-A808871E72F3}" destId="{FA9C7340-018E-4F73-A402-B7FF8C34CDC0}" srcOrd="1" destOrd="0" parTransId="{1805A85A-B92E-48E0-886D-23F094607276}" sibTransId="{44F9A519-DD68-4648-B8E0-DFC7EF2120B7}"/>
+    <dgm:cxn modelId="{F53C5B60-EE78-46AA-90FC-BDF2F3396876}" srcId="{DF4857E7-5C40-4E4D-8F9E-0F40BE240B2F}" destId="{68DE1B8C-EBBC-4ACF-AD69-E108E4A8C85C}" srcOrd="3" destOrd="0" parTransId="{94D73433-720A-40B7-8E81-899280B4DD52}" sibTransId="{10D11475-433C-4D63-8B5E-9E928E6DD9A1}"/>
     <dgm:cxn modelId="{E3FD7D9B-7A36-4D12-B188-0A0D1AF9C129}" type="presOf" srcId="{68DE1B8C-EBBC-4ACF-AD69-E108E4A8C85C}" destId="{DFC8EC82-A76D-41CD-A597-E02C5F5CBEEE}" srcOrd="0" destOrd="0" presId="urn:microsoft.com/office/officeart/2005/8/layout/lProcess2"/>
-    <dgm:cxn modelId="{82ECE00E-C99F-43DA-83F9-38CFC3F7A2FA}" type="presOf" srcId="{DF4857E7-5C40-4E4D-8F9E-0F40BE240B2F}" destId="{4514D2E9-87FF-454C-A554-FD761A8568C7}" srcOrd="0" destOrd="0" presId="urn:microsoft.com/office/officeart/2005/8/layout/lProcess2"/>
-    <dgm:cxn modelId="{DEF1C201-34B1-4882-8DBF-B07106CA401E}" type="presOf" srcId="{8C9EF0B8-B348-4F26-938D-6A3D8F1D01C9}" destId="{EF50A355-5315-401C-A8B8-05A2B4F30FE3}" srcOrd="0" destOrd="0" presId="urn:microsoft.com/office/officeart/2005/8/layout/lProcess2"/>
-    <dgm:cxn modelId="{4F69C728-D27E-4664-B39F-E552BD0B15C4}" type="presOf" srcId="{68DE1B8C-EBBC-4ACF-AD69-E108E4A8C85C}" destId="{A9276CF6-D6BB-4D87-85EE-C74A56417B50}" srcOrd="1" destOrd="0" presId="urn:microsoft.com/office/officeart/2005/8/layout/lProcess2"/>
-    <dgm:cxn modelId="{EAD02916-CE0D-4F3F-A82E-33F10B159D8E}" type="presOf" srcId="{512A4932-71C2-4AF1-A35F-4F4632F17C02}" destId="{51239DC3-E9A2-43DA-8F69-23A0808C5F7B}" srcOrd="0" destOrd="0" presId="urn:microsoft.com/office/officeart/2005/8/layout/lProcess2"/>
-    <dgm:cxn modelId="{6F5081CF-24CF-4E2C-8683-D130E3B3E5C7}" type="presOf" srcId="{F5E45C32-85BB-467F-80E6-A808871E72F3}" destId="{2487EB6F-DE81-4509-80D3-3047844600F3}" srcOrd="1" destOrd="0" presId="urn:microsoft.com/office/officeart/2005/8/layout/lProcess2"/>
-    <dgm:cxn modelId="{F53C5B60-EE78-46AA-90FC-BDF2F3396876}" srcId="{DF4857E7-5C40-4E4D-8F9E-0F40BE240B2F}" destId="{68DE1B8C-EBBC-4ACF-AD69-E108E4A8C85C}" srcOrd="3" destOrd="0" parTransId="{94D73433-720A-40B7-8E81-899280B4DD52}" sibTransId="{10D11475-433C-4D63-8B5E-9E928E6DD9A1}"/>
-    <dgm:cxn modelId="{792FB76A-389C-45B7-8308-227DADB5CF70}" srcId="{0F9F144E-5A69-4079-9CFE-833FB141B5B7}" destId="{32074760-1CE6-4EA9-A667-33C7E19C2D94}" srcOrd="0" destOrd="0" parTransId="{41FFA3F1-CAF6-4B0C-90FB-AAF097D8C840}" sibTransId="{66E711EC-17A3-40E0-B60B-5A2F466C9D11}"/>
-    <dgm:cxn modelId="{C3F684FE-A0E7-411B-A303-2C8155B38D48}" srcId="{DF4857E7-5C40-4E4D-8F9E-0F40BE240B2F}" destId="{F5E45C32-85BB-467F-80E6-A808871E72F3}" srcOrd="1" destOrd="0" parTransId="{FAB096C4-43F1-4FB0-A740-B5A33490B558}" sibTransId="{F29CEF7E-7A2A-457D-9BE3-75C08A423C81}"/>
-    <dgm:cxn modelId="{92E0E4AC-AA4F-4221-B4F5-BC44ADD50226}" srcId="{F5E45C32-85BB-467F-80E6-A808871E72F3}" destId="{FA9C7340-018E-4F73-A402-B7FF8C34CDC0}" srcOrd="1" destOrd="0" parTransId="{1805A85A-B92E-48E0-886D-23F094607276}" sibTransId="{44F9A519-DD68-4648-B8E0-DFC7EF2120B7}"/>
-    <dgm:cxn modelId="{8AD144FB-65EB-4E0A-BBFB-81923B833C5B}" type="presOf" srcId="{F5E45C32-85BB-467F-80E6-A808871E72F3}" destId="{E7B9CF75-AF6A-4290-854A-077BB9A2D77C}" srcOrd="0" destOrd="0" presId="urn:microsoft.com/office/officeart/2005/8/layout/lProcess2"/>
-    <dgm:cxn modelId="{3BB736BE-339A-4657-B981-F9F1F8D52FDC}" type="presOf" srcId="{A766E2ED-C2E8-4E07-AF18-7EC57476A5C8}" destId="{D88EF221-1E19-407F-A109-45D126E6B0AD}" srcOrd="0" destOrd="0" presId="urn:microsoft.com/office/officeart/2005/8/layout/lProcess2"/>
-    <dgm:cxn modelId="{E3AEEE63-0D70-4A65-B4AD-DC3DBA17985A}" type="presOf" srcId="{7592B694-086D-4180-B053-CE7AD13C9858}" destId="{B6E9B2AA-8010-4FAB-90D2-72717C05AE96}" srcOrd="1" destOrd="0" presId="urn:microsoft.com/office/officeart/2005/8/layout/lProcess2"/>
-    <dgm:cxn modelId="{41BAC73D-C909-4828-81D3-F16502305163}" type="presOf" srcId="{8665C39E-B30E-4258-BEA9-83E0F7084606}" destId="{85B657F5-5C9C-42F8-A245-10BA7A824404}" srcOrd="0" destOrd="0" presId="urn:microsoft.com/office/officeart/2005/8/layout/lProcess2"/>
-    <dgm:cxn modelId="{918FC998-3E81-4E2A-A8E0-FB3EB04E2705}" srcId="{0F9F144E-5A69-4079-9CFE-833FB141B5B7}" destId="{A766E2ED-C2E8-4E07-AF18-7EC57476A5C8}" srcOrd="1" destOrd="0" parTransId="{A1530F03-6C5E-45D7-8222-AD175A7090BD}" sibTransId="{05B31AC5-A983-4FEC-B0BE-EB0462CF6128}"/>
-    <dgm:cxn modelId="{58D7B72C-6638-4F5D-945E-9420F8FE7097}" type="presOf" srcId="{7592B694-086D-4180-B053-CE7AD13C9858}" destId="{6E5A89BC-14D8-4DAA-BBC1-B070DD5BD626}" srcOrd="0" destOrd="0" presId="urn:microsoft.com/office/officeart/2005/8/layout/lProcess2"/>
-    <dgm:cxn modelId="{FA16C23C-5596-42A1-981A-487742CF3BBD}" srcId="{F5E45C32-85BB-467F-80E6-A808871E72F3}" destId="{6193ECAA-3925-487F-ADF8-CE1362754FFF}" srcOrd="0" destOrd="0" parTransId="{CA95F830-F096-4B8A-8E76-097EF46A4F44}" sibTransId="{4C2F44CE-5AB4-4FFE-B037-FFB0E3B4A7EB}"/>
-    <dgm:cxn modelId="{42032CCC-41F9-4B3F-A503-E38701F4AC02}" srcId="{7592B694-086D-4180-B053-CE7AD13C9858}" destId="{512A4932-71C2-4AF1-A35F-4F4632F17C02}" srcOrd="1" destOrd="0" parTransId="{47E31259-60CB-40FB-B391-CCAEC2189164}" sibTransId="{4C7C1C5B-4033-4A4C-87E1-4A3C60B720B7}"/>
-    <dgm:cxn modelId="{583CC615-DAE7-4276-AD9F-C578D26FEDFC}" srcId="{DF4857E7-5C40-4E4D-8F9E-0F40BE240B2F}" destId="{7592B694-086D-4180-B053-CE7AD13C9858}" srcOrd="2" destOrd="0" parTransId="{C8FADD59-ED12-44D1-A076-7A13B0AC344E}" sibTransId="{34A6F1FD-1787-4988-A7E6-472B7C66BD09}"/>
-    <dgm:cxn modelId="{8D6B5497-475C-46A9-805D-510F815F9B98}" srcId="{7592B694-086D-4180-B053-CE7AD13C9858}" destId="{8665C39E-B30E-4258-BEA9-83E0F7084606}" srcOrd="0" destOrd="0" parTransId="{8211EBE3-1C93-4CFB-BBEE-7A708996ED07}" sibTransId="{6779ED75-3327-4C98-9C89-1343058D49BC}"/>
-    <dgm:cxn modelId="{ECB29E32-DF3F-494F-B7BB-9C8BD137B048}" type="presOf" srcId="{FA9C7340-018E-4F73-A402-B7FF8C34CDC0}" destId="{BD436606-D1DD-4535-A521-C5E4F9743128}" srcOrd="0" destOrd="0" presId="urn:microsoft.com/office/officeart/2005/8/layout/lProcess2"/>
-    <dgm:cxn modelId="{BA343F65-7063-4A06-9692-19E81201F0CA}" type="presOf" srcId="{7DCD12F6-9D96-4CEE-B77D-0059BD9F172C}" destId="{60B6E648-ADB0-4695-B9EA-290DF28C1E3A}" srcOrd="0" destOrd="0" presId="urn:microsoft.com/office/officeart/2005/8/layout/lProcess2"/>
-    <dgm:cxn modelId="{7C9C3A38-6D50-4AFF-AA73-365DE43285E1}" type="presOf" srcId="{32074760-1CE6-4EA9-A667-33C7E19C2D94}" destId="{A8FD0D76-AFC6-4802-9090-E980FDBECC91}" srcOrd="0" destOrd="0" presId="urn:microsoft.com/office/officeart/2005/8/layout/lProcess2"/>
-    <dgm:cxn modelId="{337C532E-FA4C-4DE5-902B-AF62654DE2CD}" type="presOf" srcId="{0F9F144E-5A69-4079-9CFE-833FB141B5B7}" destId="{F032D9DC-6E96-4533-82F7-966FA94900AA}" srcOrd="1" destOrd="0" presId="urn:microsoft.com/office/officeart/2005/8/layout/lProcess2"/>
     <dgm:cxn modelId="{B4186457-1219-426F-922C-5AECDCC53AC0}" srcId="{68DE1B8C-EBBC-4ACF-AD69-E108E4A8C85C}" destId="{8C9EF0B8-B348-4F26-938D-6A3D8F1D01C9}" srcOrd="0" destOrd="0" parTransId="{317FEE05-7414-4035-9841-8DABE546206E}" sibTransId="{5DAD05BE-4905-4E9C-9DE0-125B4DBFBE33}"/>
-    <dgm:cxn modelId="{7A675828-0E86-4177-A02F-94B30E827A0C}" type="presOf" srcId="{0F9F144E-5A69-4079-9CFE-833FB141B5B7}" destId="{9046789A-6150-4534-817A-88A1F11F0BDA}" srcOrd="0" destOrd="0" presId="urn:microsoft.com/office/officeart/2005/8/layout/lProcess2"/>
-    <dgm:cxn modelId="{C664844B-280E-4BFE-9C14-BBB1B2BC2C91}" type="presOf" srcId="{6193ECAA-3925-487F-ADF8-CE1362754FFF}" destId="{5CE69C38-1462-4F71-A252-F397C9008295}" srcOrd="0" destOrd="0" presId="urn:microsoft.com/office/officeart/2005/8/layout/lProcess2"/>
-    <dgm:cxn modelId="{8BF652A8-B747-4011-8997-2C8E587087B9}" srcId="{68DE1B8C-EBBC-4ACF-AD69-E108E4A8C85C}" destId="{7DCD12F6-9D96-4CEE-B77D-0059BD9F172C}" srcOrd="1" destOrd="0" parTransId="{05220267-9773-4777-8E6B-2437F9979F0B}" sibTransId="{89843E98-8750-44A8-9562-C70EE7FD83F4}"/>
-    <dgm:cxn modelId="{696FC290-58F8-4B0A-B325-8A4CDCEFC93C}" srcId="{DF4857E7-5C40-4E4D-8F9E-0F40BE240B2F}" destId="{0F9F144E-5A69-4079-9CFE-833FB141B5B7}" srcOrd="0" destOrd="0" parTransId="{5295059C-89BD-48FC-9FB0-63BD38C2AF52}" sibTransId="{FAB8FA54-A1F3-488D-B823-07CCB71E4D44}"/>
     <dgm:cxn modelId="{E45813B2-B87D-4638-B83F-E35E092B0951}" type="presParOf" srcId="{4514D2E9-87FF-454C-A554-FD761A8568C7}" destId="{D7F4306A-6D29-4C14-BF5D-EE8CBCC47C9B}" srcOrd="0" destOrd="0" presId="urn:microsoft.com/office/officeart/2005/8/layout/lProcess2"/>
     <dgm:cxn modelId="{B70D7543-B290-431E-8E27-81EE23763ABD}" type="presParOf" srcId="{D7F4306A-6D29-4C14-BF5D-EE8CBCC47C9B}" destId="{9046789A-6150-4534-817A-88A1F11F0BDA}" srcOrd="0" destOrd="0" presId="urn:microsoft.com/office/officeart/2005/8/layout/lProcess2"/>
     <dgm:cxn modelId="{EBC5D71A-D089-4FA3-8176-B37E02AAD50D}" type="presParOf" srcId="{D7F4306A-6D29-4C14-BF5D-EE8CBCC47C9B}" destId="{F032D9DC-6E96-4533-82F7-966FA94900AA}" srcOrd="1" destOrd="0" presId="urn:microsoft.com/office/officeart/2005/8/layout/lProcess2"/>
@@ -5764,7 +5766,7 @@
           <a:p>
             <a:fld id="{20EA5F0D-C1DC-412F-A146-DDB3A74B588F}" type="datetimeFigureOut">
               <a:rPr lang="pt-BR" smtClean="0"/>
-              <a:t>21/11/2013</a:t>
+              <a:t>22/11/2013</a:t>
             </a:fld>
             <a:endParaRPr lang="pt-BR" dirty="0"/>
           </a:p>
@@ -5929,7 +5931,7 @@
           <a:p>
             <a:fld id="{A8CDE508-72C8-4AB5-AA9C-1584D31690E0}" type="datetimeFigureOut">
               <a:rPr lang="pt-BR" smtClean="0"/>
-              <a:t>21/11/2013</a:t>
+              <a:t>22/11/2013</a:t>
             </a:fld>
             <a:endParaRPr lang="pt-BR" dirty="0"/>
           </a:p>
@@ -6704,7 +6706,7 @@
                 <a:ea typeface="+mn-ea"/>
                 <a:cs typeface="+mn-cs"/>
               </a:rPr>
-              <a:t>13</a:t>
+              <a:t>15</a:t>
             </a:fld>
             <a:endParaRPr lang="en-US" sz="1200" b="0" i="0">
               <a:latin typeface="Corbel"/>
@@ -7346,7 +7348,7 @@
             <a:fld id="{9E583DDF-CA54-461A-A486-592D2374C532}" type="datetimeFigureOut">
               <a:rPr lang="pt-BR" smtClean="0"/>
               <a:pPr/>
-              <a:t>21/11/2013</a:t>
+              <a:t>22/11/2013</a:t>
             </a:fld>
             <a:endParaRPr lang="pt-BR" dirty="0"/>
           </a:p>
@@ -7722,7 +7724,7 @@
           <a:p>
             <a:fld id="{9E583DDF-CA54-461A-A486-592D2374C532}" type="datetimeFigureOut">
               <a:rPr lang="pt-BR" smtClean="0"/>
-              <a:t>21/11/2013</a:t>
+              <a:t>22/11/2013</a:t>
             </a:fld>
             <a:endParaRPr lang="pt-BR" dirty="0"/>
           </a:p>
@@ -7904,7 +7906,7 @@
           <a:p>
             <a:fld id="{9E583DDF-CA54-461A-A486-592D2374C532}" type="datetimeFigureOut">
               <a:rPr lang="pt-BR" smtClean="0"/>
-              <a:t>21/11/2013</a:t>
+              <a:t>22/11/2013</a:t>
             </a:fld>
             <a:endParaRPr lang="pt-BR" dirty="0"/>
           </a:p>
@@ -8096,7 +8098,7 @@
           <a:p>
             <a:fld id="{9E583DDF-CA54-461A-A486-592D2374C532}" type="datetimeFigureOut">
               <a:rPr lang="pt-BR" smtClean="0"/>
-              <a:t>21/11/2013</a:t>
+              <a:t>22/11/2013</a:t>
             </a:fld>
             <a:endParaRPr lang="pt-BR" dirty="0"/>
           </a:p>
@@ -8282,7 +8284,7 @@
           <a:p>
             <a:fld id="{9E583DDF-CA54-461A-A486-592D2374C532}" type="datetimeFigureOut">
               <a:rPr lang="pt-BR" smtClean="0"/>
-              <a:t>21/11/2013</a:t>
+              <a:t>22/11/2013</a:t>
             </a:fld>
             <a:endParaRPr lang="pt-BR" dirty="0"/>
           </a:p>
@@ -8666,7 +8668,7 @@
           <a:p>
             <a:fld id="{9E583DDF-CA54-461A-A486-592D2374C532}" type="datetimeFigureOut">
               <a:rPr lang="pt-BR" smtClean="0"/>
-              <a:t>21/11/2013</a:t>
+              <a:t>22/11/2013</a:t>
             </a:fld>
             <a:endParaRPr lang="pt-BR" dirty="0"/>
           </a:p>
@@ -8947,7 +8949,7 @@
             <a:fld id="{9E583DDF-CA54-461A-A486-592D2374C532}" type="datetimeFigureOut">
               <a:rPr lang="pt-BR" smtClean="0"/>
               <a:pPr/>
-              <a:t>21/11/2013</a:t>
+              <a:t>22/11/2013</a:t>
             </a:fld>
             <a:endParaRPr lang="pt-BR" dirty="0"/>
           </a:p>
@@ -9268,7 +9270,7 @@
           <a:p>
             <a:fld id="{9DD7D43D-6574-4C7B-808D-C6C12215A4D4}" type="datetimeFigureOut">
               <a:rPr lang="pt-BR" smtClean="0"/>
-              <a:t>21/11/2013</a:t>
+              <a:t>22/11/2013</a:t>
             </a:fld>
             <a:endParaRPr lang="pt-BR" dirty="0"/>
           </a:p>
@@ -9717,7 +9719,7 @@
           <a:p>
             <a:fld id="{9E583DDF-CA54-461A-A486-592D2374C532}" type="datetimeFigureOut">
               <a:rPr lang="pt-BR" smtClean="0"/>
-              <a:t>21/11/2013</a:t>
+              <a:t>22/11/2013</a:t>
             </a:fld>
             <a:endParaRPr lang="pt-BR" dirty="0"/>
           </a:p>
@@ -9847,7 +9849,7 @@
           <a:p>
             <a:fld id="{9E583DDF-CA54-461A-A486-592D2374C532}" type="datetimeFigureOut">
               <a:rPr lang="pt-BR" smtClean="0"/>
-              <a:t>21/11/2013</a:t>
+              <a:t>22/11/2013</a:t>
             </a:fld>
             <a:endParaRPr lang="pt-BR" dirty="0"/>
           </a:p>
@@ -9963,7 +9965,7 @@
             <a:fld id="{9E583DDF-CA54-461A-A486-592D2374C532}" type="datetimeFigureOut">
               <a:rPr lang="pt-BR" smtClean="0"/>
               <a:pPr/>
-              <a:t>21/11/2013</a:t>
+              <a:t>22/11/2013</a:t>
             </a:fld>
             <a:endParaRPr lang="pt-BR" dirty="0"/>
           </a:p>
@@ -10278,7 +10280,7 @@
           <a:p>
             <a:fld id="{9E583DDF-CA54-461A-A486-592D2374C532}" type="datetimeFigureOut">
               <a:rPr lang="pt-BR" smtClean="0"/>
-              <a:t>21/11/2013</a:t>
+              <a:t>22/11/2013</a:t>
             </a:fld>
             <a:endParaRPr lang="pt-BR" dirty="0"/>
           </a:p>
@@ -10646,7 +10648,7 @@
             <a:fld id="{9E583DDF-CA54-461A-A486-592D2374C532}" type="datetimeFigureOut">
               <a:rPr lang="pt-BR" smtClean="0"/>
               <a:pPr/>
-              <a:t>21/11/2013</a:t>
+              <a:t>22/11/2013</a:t>
             </a:fld>
             <a:endParaRPr lang="pt-BR" dirty="0"/>
           </a:p>
@@ -11071,7 +11073,7 @@
   </p:txStyles>
   <p:extLst mod="1">
     <p:ext uri="{27BBF7A9-308A-43DC-89C8-2F10F3537804}">
-      <p15:sldGuideLst xmlns:p15="http://schemas.microsoft.com/office/powerpoint/2012/main" xmlns="">
+      <p15:sldGuideLst xmlns="" xmlns:p15="http://schemas.microsoft.com/office/powerpoint/2012/main">
         <p15:guide id="1" orient="horz" pos="2360">
           <p15:clr>
             <a:srgbClr val="F26B43"/>
@@ -11279,7 +11281,6 @@
               <a:rPr lang="pt-BR" dirty="0"/>
               <a:t>como executar os casos de teste.</a:t>
             </a:r>
-            <a:endParaRPr lang="pt-BR" dirty="0"/>
           </a:p>
         </p:txBody>
       </p:sp>
@@ -11442,7 +11443,6 @@
               <a:rPr lang="pt-BR" dirty="0"/>
               <a:t>Projetar componentes</a:t>
             </a:r>
-            <a:endParaRPr lang="pt-BR" dirty="0"/>
           </a:p>
         </p:txBody>
       </p:sp>
@@ -11472,6 +11472,196 @@
 </file>
 
 <file path=ppt/slides/slide12.xml><?xml version="1.0" encoding="utf-8"?>
+<p:sld xmlns:a="http://schemas.openxmlformats.org/drawingml/2006/main" xmlns:r="http://schemas.openxmlformats.org/officeDocument/2006/relationships" xmlns:p="http://schemas.openxmlformats.org/presentationml/2006/main">
+  <p:cSld>
+    <p:spTree>
+      <p:nvGrpSpPr>
+        <p:cNvPr id="1" name=""/>
+        <p:cNvGrpSpPr/>
+        <p:nvPr/>
+      </p:nvGrpSpPr>
+      <p:grpSpPr>
+        <a:xfrm>
+          <a:off x="0" y="0"/>
+          <a:ext cx="0" cy="0"/>
+          <a:chOff x="0" y="0"/>
+          <a:chExt cx="0" cy="0"/>
+        </a:xfrm>
+      </p:grpSpPr>
+      <p:sp>
+        <p:nvSpPr>
+          <p:cNvPr id="3" name="Título 2"/>
+          <p:cNvSpPr>
+            <a:spLocks noGrp="1"/>
+          </p:cNvSpPr>
+          <p:nvPr>
+            <p:ph type="title"/>
+          </p:nvPr>
+        </p:nvSpPr>
+        <p:spPr>
+          <a:xfrm>
+            <a:off x="983432" y="467360"/>
+            <a:ext cx="9867448" cy="1233424"/>
+          </a:xfrm>
+        </p:spPr>
+        <p:txBody>
+          <a:bodyPr/>
+          <a:lstStyle/>
+          <a:p>
+            <a:r>
+              <a:rPr lang="pt-BR" dirty="0"/>
+              <a:t>Identificar e descrever casos de teste:</a:t>
+            </a:r>
+            <a:endParaRPr lang="pt-BR" dirty="0"/>
+          </a:p>
+        </p:txBody>
+      </p:sp>
+      <p:sp>
+        <p:nvSpPr>
+          <p:cNvPr id="4" name="Retângulo 3"/>
+          <p:cNvSpPr/>
+          <p:nvPr/>
+        </p:nvSpPr>
+        <p:spPr>
+          <a:xfrm>
+            <a:off x="1205397" y="2420888"/>
+            <a:ext cx="8016552" cy="2677656"/>
+          </a:xfrm>
+          <a:prstGeom prst="rect">
+            <a:avLst/>
+          </a:prstGeom>
+        </p:spPr>
+        <p:txBody>
+          <a:bodyPr wrap="square">
+            <a:spAutoFit/>
+          </a:bodyPr>
+          <a:lstStyle/>
+          <a:p>
+            <a:r>
+              <a:rPr lang="pt-BR" sz="2800" dirty="0"/>
+              <a:t>Texto associado a um requisito a ser testado, que</a:t>
+            </a:r>
+          </a:p>
+          <a:p>
+            <a:r>
+              <a:rPr lang="pt-BR" sz="2800" dirty="0"/>
+              <a:t>descreve:</a:t>
+            </a:r>
+          </a:p>
+          <a:p>
+            <a:r>
+              <a:rPr lang="pt-BR" sz="2800" dirty="0"/>
+              <a:t>• Pré-condições de execução</a:t>
+            </a:r>
+          </a:p>
+          <a:p>
+            <a:r>
+              <a:rPr lang="pt-BR" sz="2800" dirty="0"/>
+              <a:t>• Entradas</a:t>
+            </a:r>
+          </a:p>
+          <a:p>
+            <a:r>
+              <a:rPr lang="pt-BR" sz="2800" dirty="0"/>
+              <a:t>• Passos específicos do teste a ser executado</a:t>
+            </a:r>
+          </a:p>
+          <a:p>
+            <a:r>
+              <a:rPr lang="pt-BR" sz="2800" dirty="0"/>
+              <a:t>• Resultados esperados</a:t>
+            </a:r>
+            <a:endParaRPr lang="pt-BR" sz="2800" dirty="0"/>
+          </a:p>
+        </p:txBody>
+      </p:sp>
+    </p:spTree>
+    <p:extLst>
+      <p:ext uri="{BB962C8B-B14F-4D97-AF65-F5344CB8AC3E}">
+        <p14:creationId xmlns:p14="http://schemas.microsoft.com/office/powerpoint/2010/main" val="3161096069"/>
+      </p:ext>
+    </p:extLst>
+  </p:cSld>
+  <p:clrMapOvr>
+    <a:masterClrMapping/>
+  </p:clrMapOvr>
+  <mc:AlternateContent xmlns:mc="http://schemas.openxmlformats.org/markup-compatibility/2006" xmlns:p14="http://schemas.microsoft.com/office/powerpoint/2010/main">
+    <mc:Choice Requires="p14">
+      <p:transition spd="med" p14:dur="700">
+        <p:fade/>
+      </p:transition>
+    </mc:Choice>
+    <mc:Fallback xmlns="">
+      <p:transition spd="med">
+        <p:fade/>
+      </p:transition>
+    </mc:Fallback>
+  </mc:AlternateContent>
+</p:sld>
+</file>
+
+<file path=ppt/slides/slide13.xml><?xml version="1.0" encoding="utf-8"?>
+<p:sld xmlns:a="http://schemas.openxmlformats.org/drawingml/2006/main" xmlns:r="http://schemas.openxmlformats.org/officeDocument/2006/relationships" xmlns:p="http://schemas.openxmlformats.org/presentationml/2006/main">
+  <p:cSld>
+    <p:spTree>
+      <p:nvGrpSpPr>
+        <p:cNvPr id="1" name=""/>
+        <p:cNvGrpSpPr/>
+        <p:nvPr/>
+      </p:nvGrpSpPr>
+      <p:grpSpPr>
+        <a:xfrm>
+          <a:off x="0" y="0"/>
+          <a:ext cx="0" cy="0"/>
+          <a:chOff x="0" y="0"/>
+          <a:chExt cx="0" cy="0"/>
+        </a:xfrm>
+      </p:grpSpPr>
+      <p:sp>
+        <p:nvSpPr>
+          <p:cNvPr id="2" name="Título 1"/>
+          <p:cNvSpPr>
+            <a:spLocks noGrp="1"/>
+          </p:cNvSpPr>
+          <p:nvPr>
+            <p:ph type="title"/>
+          </p:nvPr>
+        </p:nvSpPr>
+        <p:spPr/>
+        <p:txBody>
+          <a:bodyPr/>
+          <a:lstStyle/>
+          <a:p>
+            <a:endParaRPr lang="pt-BR"/>
+          </a:p>
+        </p:txBody>
+      </p:sp>
+    </p:spTree>
+    <p:extLst>
+      <p:ext uri="{BB962C8B-B14F-4D97-AF65-F5344CB8AC3E}">
+        <p14:creationId xmlns:p14="http://schemas.microsoft.com/office/powerpoint/2010/main" val="1299491657"/>
+      </p:ext>
+    </p:extLst>
+  </p:cSld>
+  <p:clrMapOvr>
+    <a:masterClrMapping/>
+  </p:clrMapOvr>
+  <mc:AlternateContent xmlns:mc="http://schemas.openxmlformats.org/markup-compatibility/2006" xmlns:p14="http://schemas.microsoft.com/office/powerpoint/2010/main">
+    <mc:Choice Requires="p14">
+      <p:transition spd="med" p14:dur="700">
+        <p:fade/>
+      </p:transition>
+    </mc:Choice>
+    <mc:Fallback xmlns="">
+      <p:transition spd="med">
+        <p:fade/>
+      </p:transition>
+    </mc:Fallback>
+  </mc:AlternateContent>
+</p:sld>
+</file>
+
+<file path=ppt/slides/slide14.xml><?xml version="1.0" encoding="utf-8"?>
 <p:sld xmlns:a="http://schemas.openxmlformats.org/drawingml/2006/main" xmlns:r="http://schemas.openxmlformats.org/officeDocument/2006/relationships" xmlns:p="http://schemas.openxmlformats.org/presentationml/2006/main">
   <p:cSld>
     <p:spTree>
@@ -12060,7 +12250,7 @@
 </p:sld>
 </file>
 
-<file path=ppt/slides/slide13.xml><?xml version="1.0" encoding="utf-8"?>
+<file path=ppt/slides/slide15.xml><?xml version="1.0" encoding="utf-8"?>
 <p:sld xmlns:a="http://schemas.openxmlformats.org/drawingml/2006/main" xmlns:r="http://schemas.openxmlformats.org/officeDocument/2006/relationships" xmlns:p="http://schemas.openxmlformats.org/presentationml/2006/main">
   <p:cSld>
     <p:spTree>
@@ -12257,7 +12447,7 @@
 </p:sld>
 </file>
 
-<file path=ppt/slides/slide14.xml><?xml version="1.0" encoding="utf-8"?>
+<file path=ppt/slides/slide16.xml><?xml version="1.0" encoding="utf-8"?>
 <p:sld xmlns:a="http://schemas.openxmlformats.org/drawingml/2006/main" xmlns:r="http://schemas.openxmlformats.org/officeDocument/2006/relationships" xmlns:p="http://schemas.openxmlformats.org/presentationml/2006/main">
   <p:cSld>
     <p:spTree>
@@ -16130,7 +16320,7 @@
   <a:extraClrSchemeLst/>
   <a:extLst>
     <a:ext uri="{05A4C25C-085E-4340-85A3-A5531E510DB2}">
-      <thm15:themeFamily xmlns:thm15="http://schemas.microsoft.com/office/thememl/2012/main" xmlns="" name="BusinessProjectPlan_TP103417270.potx" id="{1770548D-EDF1-4703-9217-6F75A83FD301}" vid="{47CC73D5-D979-407C-BDE1-1377C0466D55}"/>
+      <thm15:themeFamily xmlns="" xmlns:thm15="http://schemas.microsoft.com/office/thememl/2012/main" name="BusinessProjectPlan_TP103417270.potx" id="{1770548D-EDF1-4703-9217-6F75A83FD301}" vid="{47CC73D5-D979-407C-BDE1-1377C0466D55}"/>
     </a:ext>
   </a:extLst>
 </a:theme>

</xml_diff>

<commit_message>
atualizaçao final do slides
</commit_message>
<xml_diff>
--- a/Requisitos/Plano de Projeto 1.pptx
+++ b/Requisitos/Plano de Projeto 1.pptx
@@ -130,7 +130,7 @@
   </p:defaultTextStyle>
   <p:extLst>
     <p:ext uri="{EFAFB233-063F-42B5-8137-9DF3F51BA10A}">
-      <p15:sldGuideLst xmlns="" xmlns:p15="http://schemas.microsoft.com/office/powerpoint/2012/main">
+      <p15:sldGuideLst xmlns:p15="http://schemas.microsoft.com/office/powerpoint/2012/main" xmlns="">
         <p15:guide id="1" pos="3840" userDrawn="1">
           <p15:clr>
             <a:srgbClr val="A4A3A4"/>
@@ -154,7 +154,7 @@
       </p15:sldGuideLst>
     </p:ext>
     <p:ext uri="{2D200454-40CA-4A62-9FC3-DE9A4176ACB9}">
-      <p15:notesGuideLst xmlns="" xmlns:p15="http://schemas.microsoft.com/office/powerpoint/2012/main"/>
+      <p15:notesGuideLst xmlns:p15="http://schemas.microsoft.com/office/powerpoint/2012/main" xmlns=""/>
     </p:ext>
   </p:extLst>
 </p:presentation>
@@ -2558,35 +2558,35 @@
     </dgm:pt>
   </dgm:ptLst>
   <dgm:cxnLst>
+    <dgm:cxn modelId="{E3FD7D9B-7A36-4D12-B188-0A0D1AF9C129}" type="presOf" srcId="{68DE1B8C-EBBC-4ACF-AD69-E108E4A8C85C}" destId="{DFC8EC82-A76D-41CD-A597-E02C5F5CBEEE}" srcOrd="0" destOrd="0" presId="urn:microsoft.com/office/officeart/2005/8/layout/lProcess2"/>
+    <dgm:cxn modelId="{82ECE00E-C99F-43DA-83F9-38CFC3F7A2FA}" type="presOf" srcId="{DF4857E7-5C40-4E4D-8F9E-0F40BE240B2F}" destId="{4514D2E9-87FF-454C-A554-FD761A8568C7}" srcOrd="0" destOrd="0" presId="urn:microsoft.com/office/officeart/2005/8/layout/lProcess2"/>
+    <dgm:cxn modelId="{DEF1C201-34B1-4882-8DBF-B07106CA401E}" type="presOf" srcId="{8C9EF0B8-B348-4F26-938D-6A3D8F1D01C9}" destId="{EF50A355-5315-401C-A8B8-05A2B4F30FE3}" srcOrd="0" destOrd="0" presId="urn:microsoft.com/office/officeart/2005/8/layout/lProcess2"/>
+    <dgm:cxn modelId="{4F69C728-D27E-4664-B39F-E552BD0B15C4}" type="presOf" srcId="{68DE1B8C-EBBC-4ACF-AD69-E108E4A8C85C}" destId="{A9276CF6-D6BB-4D87-85EE-C74A56417B50}" srcOrd="1" destOrd="0" presId="urn:microsoft.com/office/officeart/2005/8/layout/lProcess2"/>
+    <dgm:cxn modelId="{EAD02916-CE0D-4F3F-A82E-33F10B159D8E}" type="presOf" srcId="{512A4932-71C2-4AF1-A35F-4F4632F17C02}" destId="{51239DC3-E9A2-43DA-8F69-23A0808C5F7B}" srcOrd="0" destOrd="0" presId="urn:microsoft.com/office/officeart/2005/8/layout/lProcess2"/>
+    <dgm:cxn modelId="{6F5081CF-24CF-4E2C-8683-D130E3B3E5C7}" type="presOf" srcId="{F5E45C32-85BB-467F-80E6-A808871E72F3}" destId="{2487EB6F-DE81-4509-80D3-3047844600F3}" srcOrd="1" destOrd="0" presId="urn:microsoft.com/office/officeart/2005/8/layout/lProcess2"/>
+    <dgm:cxn modelId="{F53C5B60-EE78-46AA-90FC-BDF2F3396876}" srcId="{DF4857E7-5C40-4E4D-8F9E-0F40BE240B2F}" destId="{68DE1B8C-EBBC-4ACF-AD69-E108E4A8C85C}" srcOrd="3" destOrd="0" parTransId="{94D73433-720A-40B7-8E81-899280B4DD52}" sibTransId="{10D11475-433C-4D63-8B5E-9E928E6DD9A1}"/>
+    <dgm:cxn modelId="{792FB76A-389C-45B7-8308-227DADB5CF70}" srcId="{0F9F144E-5A69-4079-9CFE-833FB141B5B7}" destId="{32074760-1CE6-4EA9-A667-33C7E19C2D94}" srcOrd="0" destOrd="0" parTransId="{41FFA3F1-CAF6-4B0C-90FB-AAF097D8C840}" sibTransId="{66E711EC-17A3-40E0-B60B-5A2F466C9D11}"/>
+    <dgm:cxn modelId="{C3F684FE-A0E7-411B-A303-2C8155B38D48}" srcId="{DF4857E7-5C40-4E4D-8F9E-0F40BE240B2F}" destId="{F5E45C32-85BB-467F-80E6-A808871E72F3}" srcOrd="1" destOrd="0" parTransId="{FAB096C4-43F1-4FB0-A740-B5A33490B558}" sibTransId="{F29CEF7E-7A2A-457D-9BE3-75C08A423C81}"/>
+    <dgm:cxn modelId="{92E0E4AC-AA4F-4221-B4F5-BC44ADD50226}" srcId="{F5E45C32-85BB-467F-80E6-A808871E72F3}" destId="{FA9C7340-018E-4F73-A402-B7FF8C34CDC0}" srcOrd="1" destOrd="0" parTransId="{1805A85A-B92E-48E0-886D-23F094607276}" sibTransId="{44F9A519-DD68-4648-B8E0-DFC7EF2120B7}"/>
+    <dgm:cxn modelId="{8AD144FB-65EB-4E0A-BBFB-81923B833C5B}" type="presOf" srcId="{F5E45C32-85BB-467F-80E6-A808871E72F3}" destId="{E7B9CF75-AF6A-4290-854A-077BB9A2D77C}" srcOrd="0" destOrd="0" presId="urn:microsoft.com/office/officeart/2005/8/layout/lProcess2"/>
+    <dgm:cxn modelId="{3BB736BE-339A-4657-B981-F9F1F8D52FDC}" type="presOf" srcId="{A766E2ED-C2E8-4E07-AF18-7EC57476A5C8}" destId="{D88EF221-1E19-407F-A109-45D126E6B0AD}" srcOrd="0" destOrd="0" presId="urn:microsoft.com/office/officeart/2005/8/layout/lProcess2"/>
+    <dgm:cxn modelId="{E3AEEE63-0D70-4A65-B4AD-DC3DBA17985A}" type="presOf" srcId="{7592B694-086D-4180-B053-CE7AD13C9858}" destId="{B6E9B2AA-8010-4FAB-90D2-72717C05AE96}" srcOrd="1" destOrd="0" presId="urn:microsoft.com/office/officeart/2005/8/layout/lProcess2"/>
+    <dgm:cxn modelId="{41BAC73D-C909-4828-81D3-F16502305163}" type="presOf" srcId="{8665C39E-B30E-4258-BEA9-83E0F7084606}" destId="{85B657F5-5C9C-42F8-A245-10BA7A824404}" srcOrd="0" destOrd="0" presId="urn:microsoft.com/office/officeart/2005/8/layout/lProcess2"/>
     <dgm:cxn modelId="{918FC998-3E81-4E2A-A8E0-FB3EB04E2705}" srcId="{0F9F144E-5A69-4079-9CFE-833FB141B5B7}" destId="{A766E2ED-C2E8-4E07-AF18-7EC57476A5C8}" srcOrd="1" destOrd="0" parTransId="{A1530F03-6C5E-45D7-8222-AD175A7090BD}" sibTransId="{05B31AC5-A983-4FEC-B0BE-EB0462CF6128}"/>
-    <dgm:cxn modelId="{41BAC73D-C909-4828-81D3-F16502305163}" type="presOf" srcId="{8665C39E-B30E-4258-BEA9-83E0F7084606}" destId="{85B657F5-5C9C-42F8-A245-10BA7A824404}" srcOrd="0" destOrd="0" presId="urn:microsoft.com/office/officeart/2005/8/layout/lProcess2"/>
+    <dgm:cxn modelId="{58D7B72C-6638-4F5D-945E-9420F8FE7097}" type="presOf" srcId="{7592B694-086D-4180-B053-CE7AD13C9858}" destId="{6E5A89BC-14D8-4DAA-BBC1-B070DD5BD626}" srcOrd="0" destOrd="0" presId="urn:microsoft.com/office/officeart/2005/8/layout/lProcess2"/>
+    <dgm:cxn modelId="{FA16C23C-5596-42A1-981A-487742CF3BBD}" srcId="{F5E45C32-85BB-467F-80E6-A808871E72F3}" destId="{6193ECAA-3925-487F-ADF8-CE1362754FFF}" srcOrd="0" destOrd="0" parTransId="{CA95F830-F096-4B8A-8E76-097EF46A4F44}" sibTransId="{4C2F44CE-5AB4-4FFE-B037-FFB0E3B4A7EB}"/>
+    <dgm:cxn modelId="{42032CCC-41F9-4B3F-A503-E38701F4AC02}" srcId="{7592B694-086D-4180-B053-CE7AD13C9858}" destId="{512A4932-71C2-4AF1-A35F-4F4632F17C02}" srcOrd="1" destOrd="0" parTransId="{47E31259-60CB-40FB-B391-CCAEC2189164}" sibTransId="{4C7C1C5B-4033-4A4C-87E1-4A3C60B720B7}"/>
+    <dgm:cxn modelId="{583CC615-DAE7-4276-AD9F-C578D26FEDFC}" srcId="{DF4857E7-5C40-4E4D-8F9E-0F40BE240B2F}" destId="{7592B694-086D-4180-B053-CE7AD13C9858}" srcOrd="2" destOrd="0" parTransId="{C8FADD59-ED12-44D1-A076-7A13B0AC344E}" sibTransId="{34A6F1FD-1787-4988-A7E6-472B7C66BD09}"/>
     <dgm:cxn modelId="{8D6B5497-475C-46A9-805D-510F815F9B98}" srcId="{7592B694-086D-4180-B053-CE7AD13C9858}" destId="{8665C39E-B30E-4258-BEA9-83E0F7084606}" srcOrd="0" destOrd="0" parTransId="{8211EBE3-1C93-4CFB-BBEE-7A708996ED07}" sibTransId="{6779ED75-3327-4C98-9C89-1343058D49BC}"/>
+    <dgm:cxn modelId="{ECB29E32-DF3F-494F-B7BB-9C8BD137B048}" type="presOf" srcId="{FA9C7340-018E-4F73-A402-B7FF8C34CDC0}" destId="{BD436606-D1DD-4535-A521-C5E4F9743128}" srcOrd="0" destOrd="0" presId="urn:microsoft.com/office/officeart/2005/8/layout/lProcess2"/>
     <dgm:cxn modelId="{BA343F65-7063-4A06-9692-19E81201F0CA}" type="presOf" srcId="{7DCD12F6-9D96-4CEE-B77D-0059BD9F172C}" destId="{60B6E648-ADB0-4695-B9EA-290DF28C1E3A}" srcOrd="0" destOrd="0" presId="urn:microsoft.com/office/officeart/2005/8/layout/lProcess2"/>
+    <dgm:cxn modelId="{7C9C3A38-6D50-4AFF-AA73-365DE43285E1}" type="presOf" srcId="{32074760-1CE6-4EA9-A667-33C7E19C2D94}" destId="{A8FD0D76-AFC6-4802-9090-E980FDBECC91}" srcOrd="0" destOrd="0" presId="urn:microsoft.com/office/officeart/2005/8/layout/lProcess2"/>
+    <dgm:cxn modelId="{337C532E-FA4C-4DE5-902B-AF62654DE2CD}" type="presOf" srcId="{0F9F144E-5A69-4079-9CFE-833FB141B5B7}" destId="{F032D9DC-6E96-4533-82F7-966FA94900AA}" srcOrd="1" destOrd="0" presId="urn:microsoft.com/office/officeart/2005/8/layout/lProcess2"/>
+    <dgm:cxn modelId="{B4186457-1219-426F-922C-5AECDCC53AC0}" srcId="{68DE1B8C-EBBC-4ACF-AD69-E108E4A8C85C}" destId="{8C9EF0B8-B348-4F26-938D-6A3D8F1D01C9}" srcOrd="0" destOrd="0" parTransId="{317FEE05-7414-4035-9841-8DABE546206E}" sibTransId="{5DAD05BE-4905-4E9C-9DE0-125B4DBFBE33}"/>
+    <dgm:cxn modelId="{7A675828-0E86-4177-A02F-94B30E827A0C}" type="presOf" srcId="{0F9F144E-5A69-4079-9CFE-833FB141B5B7}" destId="{9046789A-6150-4534-817A-88A1F11F0BDA}" srcOrd="0" destOrd="0" presId="urn:microsoft.com/office/officeart/2005/8/layout/lProcess2"/>
+    <dgm:cxn modelId="{C664844B-280E-4BFE-9C14-BBB1B2BC2C91}" type="presOf" srcId="{6193ECAA-3925-487F-ADF8-CE1362754FFF}" destId="{5CE69C38-1462-4F71-A252-F397C9008295}" srcOrd="0" destOrd="0" presId="urn:microsoft.com/office/officeart/2005/8/layout/lProcess2"/>
+    <dgm:cxn modelId="{8BF652A8-B747-4011-8997-2C8E587087B9}" srcId="{68DE1B8C-EBBC-4ACF-AD69-E108E4A8C85C}" destId="{7DCD12F6-9D96-4CEE-B77D-0059BD9F172C}" srcOrd="1" destOrd="0" parTransId="{05220267-9773-4777-8E6B-2437F9979F0B}" sibTransId="{89843E98-8750-44A8-9562-C70EE7FD83F4}"/>
     <dgm:cxn modelId="{696FC290-58F8-4B0A-B325-8A4CDCEFC93C}" srcId="{DF4857E7-5C40-4E4D-8F9E-0F40BE240B2F}" destId="{0F9F144E-5A69-4079-9CFE-833FB141B5B7}" srcOrd="0" destOrd="0" parTransId="{5295059C-89BD-48FC-9FB0-63BD38C2AF52}" sibTransId="{FAB8FA54-A1F3-488D-B823-07CCB71E4D44}"/>
-    <dgm:cxn modelId="{8AD144FB-65EB-4E0A-BBFB-81923B833C5B}" type="presOf" srcId="{F5E45C32-85BB-467F-80E6-A808871E72F3}" destId="{E7B9CF75-AF6A-4290-854A-077BB9A2D77C}" srcOrd="0" destOrd="0" presId="urn:microsoft.com/office/officeart/2005/8/layout/lProcess2"/>
-    <dgm:cxn modelId="{337C532E-FA4C-4DE5-902B-AF62654DE2CD}" type="presOf" srcId="{0F9F144E-5A69-4079-9CFE-833FB141B5B7}" destId="{F032D9DC-6E96-4533-82F7-966FA94900AA}" srcOrd="1" destOrd="0" presId="urn:microsoft.com/office/officeart/2005/8/layout/lProcess2"/>
-    <dgm:cxn modelId="{EAD02916-CE0D-4F3F-A82E-33F10B159D8E}" type="presOf" srcId="{512A4932-71C2-4AF1-A35F-4F4632F17C02}" destId="{51239DC3-E9A2-43DA-8F69-23A0808C5F7B}" srcOrd="0" destOrd="0" presId="urn:microsoft.com/office/officeart/2005/8/layout/lProcess2"/>
-    <dgm:cxn modelId="{42032CCC-41F9-4B3F-A503-E38701F4AC02}" srcId="{7592B694-086D-4180-B053-CE7AD13C9858}" destId="{512A4932-71C2-4AF1-A35F-4F4632F17C02}" srcOrd="1" destOrd="0" parTransId="{47E31259-60CB-40FB-B391-CCAEC2189164}" sibTransId="{4C7C1C5B-4033-4A4C-87E1-4A3C60B720B7}"/>
-    <dgm:cxn modelId="{4F69C728-D27E-4664-B39F-E552BD0B15C4}" type="presOf" srcId="{68DE1B8C-EBBC-4ACF-AD69-E108E4A8C85C}" destId="{A9276CF6-D6BB-4D87-85EE-C74A56417B50}" srcOrd="1" destOrd="0" presId="urn:microsoft.com/office/officeart/2005/8/layout/lProcess2"/>
-    <dgm:cxn modelId="{3BB736BE-339A-4657-B981-F9F1F8D52FDC}" type="presOf" srcId="{A766E2ED-C2E8-4E07-AF18-7EC57476A5C8}" destId="{D88EF221-1E19-407F-A109-45D126E6B0AD}" srcOrd="0" destOrd="0" presId="urn:microsoft.com/office/officeart/2005/8/layout/lProcess2"/>
-    <dgm:cxn modelId="{ECB29E32-DF3F-494F-B7BB-9C8BD137B048}" type="presOf" srcId="{FA9C7340-018E-4F73-A402-B7FF8C34CDC0}" destId="{BD436606-D1DD-4535-A521-C5E4F9743128}" srcOrd="0" destOrd="0" presId="urn:microsoft.com/office/officeart/2005/8/layout/lProcess2"/>
-    <dgm:cxn modelId="{8BF652A8-B747-4011-8997-2C8E587087B9}" srcId="{68DE1B8C-EBBC-4ACF-AD69-E108E4A8C85C}" destId="{7DCD12F6-9D96-4CEE-B77D-0059BD9F172C}" srcOrd="1" destOrd="0" parTransId="{05220267-9773-4777-8E6B-2437F9979F0B}" sibTransId="{89843E98-8750-44A8-9562-C70EE7FD83F4}"/>
-    <dgm:cxn modelId="{E3AEEE63-0D70-4A65-B4AD-DC3DBA17985A}" type="presOf" srcId="{7592B694-086D-4180-B053-CE7AD13C9858}" destId="{B6E9B2AA-8010-4FAB-90D2-72717C05AE96}" srcOrd="1" destOrd="0" presId="urn:microsoft.com/office/officeart/2005/8/layout/lProcess2"/>
-    <dgm:cxn modelId="{82ECE00E-C99F-43DA-83F9-38CFC3F7A2FA}" type="presOf" srcId="{DF4857E7-5C40-4E4D-8F9E-0F40BE240B2F}" destId="{4514D2E9-87FF-454C-A554-FD761A8568C7}" srcOrd="0" destOrd="0" presId="urn:microsoft.com/office/officeart/2005/8/layout/lProcess2"/>
-    <dgm:cxn modelId="{58D7B72C-6638-4F5D-945E-9420F8FE7097}" type="presOf" srcId="{7592B694-086D-4180-B053-CE7AD13C9858}" destId="{6E5A89BC-14D8-4DAA-BBC1-B070DD5BD626}" srcOrd="0" destOrd="0" presId="urn:microsoft.com/office/officeart/2005/8/layout/lProcess2"/>
-    <dgm:cxn modelId="{583CC615-DAE7-4276-AD9F-C578D26FEDFC}" srcId="{DF4857E7-5C40-4E4D-8F9E-0F40BE240B2F}" destId="{7592B694-086D-4180-B053-CE7AD13C9858}" srcOrd="2" destOrd="0" parTransId="{C8FADD59-ED12-44D1-A076-7A13B0AC344E}" sibTransId="{34A6F1FD-1787-4988-A7E6-472B7C66BD09}"/>
-    <dgm:cxn modelId="{C3F684FE-A0E7-411B-A303-2C8155B38D48}" srcId="{DF4857E7-5C40-4E4D-8F9E-0F40BE240B2F}" destId="{F5E45C32-85BB-467F-80E6-A808871E72F3}" srcOrd="1" destOrd="0" parTransId="{FAB096C4-43F1-4FB0-A740-B5A33490B558}" sibTransId="{F29CEF7E-7A2A-457D-9BE3-75C08A423C81}"/>
-    <dgm:cxn modelId="{7C9C3A38-6D50-4AFF-AA73-365DE43285E1}" type="presOf" srcId="{32074760-1CE6-4EA9-A667-33C7E19C2D94}" destId="{A8FD0D76-AFC6-4802-9090-E980FDBECC91}" srcOrd="0" destOrd="0" presId="urn:microsoft.com/office/officeart/2005/8/layout/lProcess2"/>
-    <dgm:cxn modelId="{6F5081CF-24CF-4E2C-8683-D130E3B3E5C7}" type="presOf" srcId="{F5E45C32-85BB-467F-80E6-A808871E72F3}" destId="{2487EB6F-DE81-4509-80D3-3047844600F3}" srcOrd="1" destOrd="0" presId="urn:microsoft.com/office/officeart/2005/8/layout/lProcess2"/>
-    <dgm:cxn modelId="{C664844B-280E-4BFE-9C14-BBB1B2BC2C91}" type="presOf" srcId="{6193ECAA-3925-487F-ADF8-CE1362754FFF}" destId="{5CE69C38-1462-4F71-A252-F397C9008295}" srcOrd="0" destOrd="0" presId="urn:microsoft.com/office/officeart/2005/8/layout/lProcess2"/>
-    <dgm:cxn modelId="{DEF1C201-34B1-4882-8DBF-B07106CA401E}" type="presOf" srcId="{8C9EF0B8-B348-4F26-938D-6A3D8F1D01C9}" destId="{EF50A355-5315-401C-A8B8-05A2B4F30FE3}" srcOrd="0" destOrd="0" presId="urn:microsoft.com/office/officeart/2005/8/layout/lProcess2"/>
-    <dgm:cxn modelId="{FA16C23C-5596-42A1-981A-487742CF3BBD}" srcId="{F5E45C32-85BB-467F-80E6-A808871E72F3}" destId="{6193ECAA-3925-487F-ADF8-CE1362754FFF}" srcOrd="0" destOrd="0" parTransId="{CA95F830-F096-4B8A-8E76-097EF46A4F44}" sibTransId="{4C2F44CE-5AB4-4FFE-B037-FFB0E3B4A7EB}"/>
-    <dgm:cxn modelId="{792FB76A-389C-45B7-8308-227DADB5CF70}" srcId="{0F9F144E-5A69-4079-9CFE-833FB141B5B7}" destId="{32074760-1CE6-4EA9-A667-33C7E19C2D94}" srcOrd="0" destOrd="0" parTransId="{41FFA3F1-CAF6-4B0C-90FB-AAF097D8C840}" sibTransId="{66E711EC-17A3-40E0-B60B-5A2F466C9D11}"/>
-    <dgm:cxn modelId="{7A675828-0E86-4177-A02F-94B30E827A0C}" type="presOf" srcId="{0F9F144E-5A69-4079-9CFE-833FB141B5B7}" destId="{9046789A-6150-4534-817A-88A1F11F0BDA}" srcOrd="0" destOrd="0" presId="urn:microsoft.com/office/officeart/2005/8/layout/lProcess2"/>
-    <dgm:cxn modelId="{92E0E4AC-AA4F-4221-B4F5-BC44ADD50226}" srcId="{F5E45C32-85BB-467F-80E6-A808871E72F3}" destId="{FA9C7340-018E-4F73-A402-B7FF8C34CDC0}" srcOrd="1" destOrd="0" parTransId="{1805A85A-B92E-48E0-886D-23F094607276}" sibTransId="{44F9A519-DD68-4648-B8E0-DFC7EF2120B7}"/>
-    <dgm:cxn modelId="{F53C5B60-EE78-46AA-90FC-BDF2F3396876}" srcId="{DF4857E7-5C40-4E4D-8F9E-0F40BE240B2F}" destId="{68DE1B8C-EBBC-4ACF-AD69-E108E4A8C85C}" srcOrd="3" destOrd="0" parTransId="{94D73433-720A-40B7-8E81-899280B4DD52}" sibTransId="{10D11475-433C-4D63-8B5E-9E928E6DD9A1}"/>
-    <dgm:cxn modelId="{E3FD7D9B-7A36-4D12-B188-0A0D1AF9C129}" type="presOf" srcId="{68DE1B8C-EBBC-4ACF-AD69-E108E4A8C85C}" destId="{DFC8EC82-A76D-41CD-A597-E02C5F5CBEEE}" srcOrd="0" destOrd="0" presId="urn:microsoft.com/office/officeart/2005/8/layout/lProcess2"/>
-    <dgm:cxn modelId="{B4186457-1219-426F-922C-5AECDCC53AC0}" srcId="{68DE1B8C-EBBC-4ACF-AD69-E108E4A8C85C}" destId="{8C9EF0B8-B348-4F26-938D-6A3D8F1D01C9}" srcOrd="0" destOrd="0" parTransId="{317FEE05-7414-4035-9841-8DABE546206E}" sibTransId="{5DAD05BE-4905-4E9C-9DE0-125B4DBFBE33}"/>
     <dgm:cxn modelId="{E45813B2-B87D-4638-B83F-E35E092B0951}" type="presParOf" srcId="{4514D2E9-87FF-454C-A554-FD761A8568C7}" destId="{D7F4306A-6D29-4C14-BF5D-EE8CBCC47C9B}" srcOrd="0" destOrd="0" presId="urn:microsoft.com/office/officeart/2005/8/layout/lProcess2"/>
     <dgm:cxn modelId="{B70D7543-B290-431E-8E27-81EE23763ABD}" type="presParOf" srcId="{D7F4306A-6D29-4C14-BF5D-EE8CBCC47C9B}" destId="{9046789A-6150-4534-817A-88A1F11F0BDA}" srcOrd="0" destOrd="0" presId="urn:microsoft.com/office/officeart/2005/8/layout/lProcess2"/>
     <dgm:cxn modelId="{EBC5D71A-D089-4FA3-8176-B37E02AAD50D}" type="presParOf" srcId="{D7F4306A-6D29-4C14-BF5D-EE8CBCC47C9B}" destId="{F032D9DC-6E96-4533-82F7-966FA94900AA}" srcOrd="1" destOrd="0" presId="urn:microsoft.com/office/officeart/2005/8/layout/lProcess2"/>
@@ -5769,7 +5769,7 @@
           <a:p>
             <a:fld id="{20EA5F0D-C1DC-412F-A146-DDB3A74B588F}" type="datetimeFigureOut">
               <a:rPr lang="pt-BR" smtClean="0"/>
-              <a:t>24/11/2013</a:t>
+              <a:t>25/11/2013</a:t>
             </a:fld>
             <a:endParaRPr lang="pt-BR" dirty="0"/>
           </a:p>
@@ -5934,7 +5934,7 @@
           <a:p>
             <a:fld id="{A8CDE508-72C8-4AB5-AA9C-1584D31690E0}" type="datetimeFigureOut">
               <a:rPr lang="pt-BR" smtClean="0"/>
-              <a:t>24/11/2013</a:t>
+              <a:t>25/11/2013</a:t>
             </a:fld>
             <a:endParaRPr lang="pt-BR" dirty="0"/>
           </a:p>
@@ -7243,7 +7243,7 @@
             <a:fld id="{9E583DDF-CA54-461A-A486-592D2374C532}" type="datetimeFigureOut">
               <a:rPr lang="pt-BR" smtClean="0"/>
               <a:pPr/>
-              <a:t>24/11/2013</a:t>
+              <a:t>25/11/2013</a:t>
             </a:fld>
             <a:endParaRPr lang="pt-BR" dirty="0"/>
           </a:p>
@@ -7619,7 +7619,7 @@
           <a:p>
             <a:fld id="{9E583DDF-CA54-461A-A486-592D2374C532}" type="datetimeFigureOut">
               <a:rPr lang="pt-BR" smtClean="0"/>
-              <a:t>24/11/2013</a:t>
+              <a:t>25/11/2013</a:t>
             </a:fld>
             <a:endParaRPr lang="pt-BR" dirty="0"/>
           </a:p>
@@ -7801,7 +7801,7 @@
           <a:p>
             <a:fld id="{9E583DDF-CA54-461A-A486-592D2374C532}" type="datetimeFigureOut">
               <a:rPr lang="pt-BR" smtClean="0"/>
-              <a:t>24/11/2013</a:t>
+              <a:t>25/11/2013</a:t>
             </a:fld>
             <a:endParaRPr lang="pt-BR" dirty="0"/>
           </a:p>
@@ -7993,7 +7993,7 @@
           <a:p>
             <a:fld id="{9E583DDF-CA54-461A-A486-592D2374C532}" type="datetimeFigureOut">
               <a:rPr lang="pt-BR" smtClean="0"/>
-              <a:t>24/11/2013</a:t>
+              <a:t>25/11/2013</a:t>
             </a:fld>
             <a:endParaRPr lang="pt-BR" dirty="0"/>
           </a:p>
@@ -8179,7 +8179,7 @@
           <a:p>
             <a:fld id="{9E583DDF-CA54-461A-A486-592D2374C532}" type="datetimeFigureOut">
               <a:rPr lang="pt-BR" smtClean="0"/>
-              <a:t>24/11/2013</a:t>
+              <a:t>25/11/2013</a:t>
             </a:fld>
             <a:endParaRPr lang="pt-BR" dirty="0"/>
           </a:p>
@@ -8563,7 +8563,7 @@
           <a:p>
             <a:fld id="{9E583DDF-CA54-461A-A486-592D2374C532}" type="datetimeFigureOut">
               <a:rPr lang="pt-BR" smtClean="0"/>
-              <a:t>24/11/2013</a:t>
+              <a:t>25/11/2013</a:t>
             </a:fld>
             <a:endParaRPr lang="pt-BR" dirty="0"/>
           </a:p>
@@ -8844,7 +8844,7 @@
             <a:fld id="{9E583DDF-CA54-461A-A486-592D2374C532}" type="datetimeFigureOut">
               <a:rPr lang="pt-BR" smtClean="0"/>
               <a:pPr/>
-              <a:t>24/11/2013</a:t>
+              <a:t>25/11/2013</a:t>
             </a:fld>
             <a:endParaRPr lang="pt-BR" dirty="0"/>
           </a:p>
@@ -9165,7 +9165,7 @@
           <a:p>
             <a:fld id="{9DD7D43D-6574-4C7B-808D-C6C12215A4D4}" type="datetimeFigureOut">
               <a:rPr lang="pt-BR" smtClean="0"/>
-              <a:t>24/11/2013</a:t>
+              <a:t>25/11/2013</a:t>
             </a:fld>
             <a:endParaRPr lang="pt-BR" dirty="0"/>
           </a:p>
@@ -9614,7 +9614,7 @@
           <a:p>
             <a:fld id="{9E583DDF-CA54-461A-A486-592D2374C532}" type="datetimeFigureOut">
               <a:rPr lang="pt-BR" smtClean="0"/>
-              <a:t>24/11/2013</a:t>
+              <a:t>25/11/2013</a:t>
             </a:fld>
             <a:endParaRPr lang="pt-BR" dirty="0"/>
           </a:p>
@@ -9744,7 +9744,7 @@
           <a:p>
             <a:fld id="{9E583DDF-CA54-461A-A486-592D2374C532}" type="datetimeFigureOut">
               <a:rPr lang="pt-BR" smtClean="0"/>
-              <a:t>24/11/2013</a:t>
+              <a:t>25/11/2013</a:t>
             </a:fld>
             <a:endParaRPr lang="pt-BR" dirty="0"/>
           </a:p>
@@ -9860,7 +9860,7 @@
             <a:fld id="{9E583DDF-CA54-461A-A486-592D2374C532}" type="datetimeFigureOut">
               <a:rPr lang="pt-BR" smtClean="0"/>
               <a:pPr/>
-              <a:t>24/11/2013</a:t>
+              <a:t>25/11/2013</a:t>
             </a:fld>
             <a:endParaRPr lang="pt-BR" dirty="0"/>
           </a:p>
@@ -10175,7 +10175,7 @@
           <a:p>
             <a:fld id="{9E583DDF-CA54-461A-A486-592D2374C532}" type="datetimeFigureOut">
               <a:rPr lang="pt-BR" smtClean="0"/>
-              <a:t>24/11/2013</a:t>
+              <a:t>25/11/2013</a:t>
             </a:fld>
             <a:endParaRPr lang="pt-BR" dirty="0"/>
           </a:p>
@@ -10543,7 +10543,7 @@
             <a:fld id="{9E583DDF-CA54-461A-A486-592D2374C532}" type="datetimeFigureOut">
               <a:rPr lang="pt-BR" smtClean="0"/>
               <a:pPr/>
-              <a:t>24/11/2013</a:t>
+              <a:t>25/11/2013</a:t>
             </a:fld>
             <a:endParaRPr lang="pt-BR" dirty="0"/>
           </a:p>
@@ -10968,7 +10968,7 @@
   </p:txStyles>
   <p:extLst mod="1">
     <p:ext uri="{27BBF7A9-308A-43DC-89C8-2F10F3537804}">
-      <p15:sldGuideLst xmlns="" xmlns:p15="http://schemas.microsoft.com/office/powerpoint/2012/main">
+      <p15:sldGuideLst xmlns:p15="http://schemas.microsoft.com/office/powerpoint/2012/main" xmlns="">
         <p15:guide id="1" orient="horz" pos="2360">
           <p15:clr>
             <a:srgbClr val="F26B43"/>
@@ -11523,7 +11523,6 @@
               <a:rPr lang="pt-BR" dirty="0"/>
               <a:t>Identificar e descrever casos de teste:</a:t>
             </a:r>
-            <a:endParaRPr lang="pt-BR" dirty="0"/>
           </a:p>
         </p:txBody>
       </p:sp>
@@ -11679,7 +11678,6 @@
               <a:rPr lang="pt-BR" dirty="0"/>
               <a:t>– São mais difíceis de projetar, criar e manter.</a:t>
             </a:r>
-            <a:endParaRPr lang="pt-BR" dirty="0"/>
           </a:p>
         </p:txBody>
       </p:sp>
@@ -11862,7 +11860,6 @@
               <a:rPr lang="pt-BR" dirty="0"/>
               <a:t>– O volume de dados é suficiente?</a:t>
             </a:r>
-            <a:endParaRPr lang="pt-BR" dirty="0"/>
           </a:p>
         </p:txBody>
       </p:sp>
@@ -12014,7 +12011,6 @@
               <a:rPr lang="pt-BR" dirty="0"/>
               <a:t>• Casos de testes planejados</a:t>
             </a:r>
-            <a:endParaRPr lang="pt-BR" dirty="0"/>
           </a:p>
         </p:txBody>
       </p:sp>
@@ -12288,7 +12284,6 @@
               <a:rPr lang="pt-BR" sz="2000" dirty="0"/>
               <a:t>)</a:t>
             </a:r>
-            <a:endParaRPr lang="pt-BR" sz="2000" dirty="0"/>
           </a:p>
         </p:txBody>
       </p:sp>
@@ -13416,7 +13411,7 @@
         <p:spPr/>
         <p:txBody>
           <a:bodyPr>
-            <a:normAutofit fontScale="92500" lnSpcReduction="20000"/>
+            <a:noAutofit/>
           </a:bodyPr>
           <a:lstStyle/>
           <a:p>
@@ -13430,15 +13425,13 @@
               <a:buNone/>
             </a:pPr>
             <a:r>
-              <a:rPr lang="pt-BR" dirty="0" smtClean="0">
+              <a:rPr lang="pt-BR" sz="2300" dirty="0" smtClean="0">
                 <a:latin typeface="Corbel"/>
               </a:rPr>
               <a:t>O sistema Internet Bank (SIB) é um sistema bancário acessado via internet que oferece aos clientes maior comodidade para realização de consultas, transferências, aplicações e outras operações que o cliente pode realizar sem sair de casa </a:t>
             </a:r>
-            <a:endParaRPr lang="pt-BR" sz="2400" b="0" i="0" baseline="0" dirty="0">
-              <a:latin typeface="Corbel"/>
-              <a:ea typeface="+mn-ea"/>
-              <a:cs typeface="+mn-cs"/>
+            <a:endParaRPr lang="pt-BR" sz="2300" b="0" i="0" baseline="0" dirty="0">
+              <a:latin typeface="Corbel"/>
             </a:endParaRPr>
           </a:p>
         </p:txBody>
@@ -16840,7 +16833,7 @@
   <a:extraClrSchemeLst/>
   <a:extLst>
     <a:ext uri="{05A4C25C-085E-4340-85A3-A5531E510DB2}">
-      <thm15:themeFamily xmlns="" xmlns:thm15="http://schemas.microsoft.com/office/thememl/2012/main" name="BusinessProjectPlan_TP103417270.potx" id="{1770548D-EDF1-4703-9217-6F75A83FD301}" vid="{47CC73D5-D979-407C-BDE1-1377C0466D55}"/>
+      <thm15:themeFamily xmlns:thm15="http://schemas.microsoft.com/office/thememl/2012/main" xmlns="" name="BusinessProjectPlan_TP103417270.potx" id="{1770548D-EDF1-4703-9217-6F75A83FD301}" vid="{47CC73D5-D979-407C-BDE1-1377C0466D55}"/>
     </a:ext>
   </a:extLst>
 </a:theme>

</xml_diff>

<commit_message>
organizando as paltas da apresentação
</commit_message>
<xml_diff>
--- a/Requisitos/Plano de Projeto 1.pptx
+++ b/Requisitos/Plano de Projeto 1.pptx
@@ -16,18 +16,18 @@
     <p:sldId id="299" r:id="rId5"/>
     <p:sldId id="289" r:id="rId6"/>
     <p:sldId id="290" r:id="rId7"/>
-    <p:sldId id="291" r:id="rId8"/>
-    <p:sldId id="292" r:id="rId9"/>
-    <p:sldId id="293" r:id="rId10"/>
-    <p:sldId id="294" r:id="rId11"/>
-    <p:sldId id="280" r:id="rId12"/>
-    <p:sldId id="301" r:id="rId13"/>
-    <p:sldId id="302" r:id="rId14"/>
-    <p:sldId id="303" r:id="rId15"/>
-    <p:sldId id="304" r:id="rId16"/>
-    <p:sldId id="305" r:id="rId17"/>
-    <p:sldId id="306" r:id="rId18"/>
-    <p:sldId id="307" r:id="rId19"/>
+    <p:sldId id="308" r:id="rId8"/>
+    <p:sldId id="291" r:id="rId9"/>
+    <p:sldId id="292" r:id="rId10"/>
+    <p:sldId id="293" r:id="rId11"/>
+    <p:sldId id="294" r:id="rId12"/>
+    <p:sldId id="280" r:id="rId13"/>
+    <p:sldId id="301" r:id="rId14"/>
+    <p:sldId id="302" r:id="rId15"/>
+    <p:sldId id="303" r:id="rId16"/>
+    <p:sldId id="304" r:id="rId17"/>
+    <p:sldId id="305" r:id="rId18"/>
+    <p:sldId id="306" r:id="rId19"/>
     <p:sldId id="300" r:id="rId20"/>
     <p:sldId id="295" r:id="rId21"/>
   </p:sldIdLst>
@@ -130,7 +130,7 @@
   </p:defaultTextStyle>
   <p:extLst>
     <p:ext uri="{EFAFB233-063F-42B5-8137-9DF3F51BA10A}">
-      <p15:sldGuideLst xmlns:p15="http://schemas.microsoft.com/office/powerpoint/2012/main" xmlns="">
+      <p15:sldGuideLst xmlns="" xmlns:p15="http://schemas.microsoft.com/office/powerpoint/2012/main">
         <p15:guide id="1" pos="3840" userDrawn="1">
           <p15:clr>
             <a:srgbClr val="A4A3A4"/>
@@ -154,7 +154,7 @@
       </p15:sldGuideLst>
     </p:ext>
     <p:ext uri="{2D200454-40CA-4A62-9FC3-DE9A4176ACB9}">
-      <p15:notesGuideLst xmlns:p15="http://schemas.microsoft.com/office/powerpoint/2012/main" xmlns=""/>
+      <p15:notesGuideLst xmlns="" xmlns:p15="http://schemas.microsoft.com/office/powerpoint/2012/main"/>
     </p:ext>
   </p:extLst>
 </p:presentation>
@@ -2558,35 +2558,35 @@
     </dgm:pt>
   </dgm:ptLst>
   <dgm:cxnLst>
+    <dgm:cxn modelId="{918FC998-3E81-4E2A-A8E0-FB3EB04E2705}" srcId="{0F9F144E-5A69-4079-9CFE-833FB141B5B7}" destId="{A766E2ED-C2E8-4E07-AF18-7EC57476A5C8}" srcOrd="1" destOrd="0" parTransId="{A1530F03-6C5E-45D7-8222-AD175A7090BD}" sibTransId="{05B31AC5-A983-4FEC-B0BE-EB0462CF6128}"/>
+    <dgm:cxn modelId="{41BAC73D-C909-4828-81D3-F16502305163}" type="presOf" srcId="{8665C39E-B30E-4258-BEA9-83E0F7084606}" destId="{85B657F5-5C9C-42F8-A245-10BA7A824404}" srcOrd="0" destOrd="0" presId="urn:microsoft.com/office/officeart/2005/8/layout/lProcess2"/>
+    <dgm:cxn modelId="{8D6B5497-475C-46A9-805D-510F815F9B98}" srcId="{7592B694-086D-4180-B053-CE7AD13C9858}" destId="{8665C39E-B30E-4258-BEA9-83E0F7084606}" srcOrd="0" destOrd="0" parTransId="{8211EBE3-1C93-4CFB-BBEE-7A708996ED07}" sibTransId="{6779ED75-3327-4C98-9C89-1343058D49BC}"/>
+    <dgm:cxn modelId="{BA343F65-7063-4A06-9692-19E81201F0CA}" type="presOf" srcId="{7DCD12F6-9D96-4CEE-B77D-0059BD9F172C}" destId="{60B6E648-ADB0-4695-B9EA-290DF28C1E3A}" srcOrd="0" destOrd="0" presId="urn:microsoft.com/office/officeart/2005/8/layout/lProcess2"/>
+    <dgm:cxn modelId="{696FC290-58F8-4B0A-B325-8A4CDCEFC93C}" srcId="{DF4857E7-5C40-4E4D-8F9E-0F40BE240B2F}" destId="{0F9F144E-5A69-4079-9CFE-833FB141B5B7}" srcOrd="0" destOrd="0" parTransId="{5295059C-89BD-48FC-9FB0-63BD38C2AF52}" sibTransId="{FAB8FA54-A1F3-488D-B823-07CCB71E4D44}"/>
+    <dgm:cxn modelId="{8AD144FB-65EB-4E0A-BBFB-81923B833C5B}" type="presOf" srcId="{F5E45C32-85BB-467F-80E6-A808871E72F3}" destId="{E7B9CF75-AF6A-4290-854A-077BB9A2D77C}" srcOrd="0" destOrd="0" presId="urn:microsoft.com/office/officeart/2005/8/layout/lProcess2"/>
+    <dgm:cxn modelId="{337C532E-FA4C-4DE5-902B-AF62654DE2CD}" type="presOf" srcId="{0F9F144E-5A69-4079-9CFE-833FB141B5B7}" destId="{F032D9DC-6E96-4533-82F7-966FA94900AA}" srcOrd="1" destOrd="0" presId="urn:microsoft.com/office/officeart/2005/8/layout/lProcess2"/>
+    <dgm:cxn modelId="{EAD02916-CE0D-4F3F-A82E-33F10B159D8E}" type="presOf" srcId="{512A4932-71C2-4AF1-A35F-4F4632F17C02}" destId="{51239DC3-E9A2-43DA-8F69-23A0808C5F7B}" srcOrd="0" destOrd="0" presId="urn:microsoft.com/office/officeart/2005/8/layout/lProcess2"/>
+    <dgm:cxn modelId="{42032CCC-41F9-4B3F-A503-E38701F4AC02}" srcId="{7592B694-086D-4180-B053-CE7AD13C9858}" destId="{512A4932-71C2-4AF1-A35F-4F4632F17C02}" srcOrd="1" destOrd="0" parTransId="{47E31259-60CB-40FB-B391-CCAEC2189164}" sibTransId="{4C7C1C5B-4033-4A4C-87E1-4A3C60B720B7}"/>
+    <dgm:cxn modelId="{4F69C728-D27E-4664-B39F-E552BD0B15C4}" type="presOf" srcId="{68DE1B8C-EBBC-4ACF-AD69-E108E4A8C85C}" destId="{A9276CF6-D6BB-4D87-85EE-C74A56417B50}" srcOrd="1" destOrd="0" presId="urn:microsoft.com/office/officeart/2005/8/layout/lProcess2"/>
+    <dgm:cxn modelId="{3BB736BE-339A-4657-B981-F9F1F8D52FDC}" type="presOf" srcId="{A766E2ED-C2E8-4E07-AF18-7EC57476A5C8}" destId="{D88EF221-1E19-407F-A109-45D126E6B0AD}" srcOrd="0" destOrd="0" presId="urn:microsoft.com/office/officeart/2005/8/layout/lProcess2"/>
+    <dgm:cxn modelId="{ECB29E32-DF3F-494F-B7BB-9C8BD137B048}" type="presOf" srcId="{FA9C7340-018E-4F73-A402-B7FF8C34CDC0}" destId="{BD436606-D1DD-4535-A521-C5E4F9743128}" srcOrd="0" destOrd="0" presId="urn:microsoft.com/office/officeart/2005/8/layout/lProcess2"/>
+    <dgm:cxn modelId="{8BF652A8-B747-4011-8997-2C8E587087B9}" srcId="{68DE1B8C-EBBC-4ACF-AD69-E108E4A8C85C}" destId="{7DCD12F6-9D96-4CEE-B77D-0059BD9F172C}" srcOrd="1" destOrd="0" parTransId="{05220267-9773-4777-8E6B-2437F9979F0B}" sibTransId="{89843E98-8750-44A8-9562-C70EE7FD83F4}"/>
+    <dgm:cxn modelId="{E3AEEE63-0D70-4A65-B4AD-DC3DBA17985A}" type="presOf" srcId="{7592B694-086D-4180-B053-CE7AD13C9858}" destId="{B6E9B2AA-8010-4FAB-90D2-72717C05AE96}" srcOrd="1" destOrd="0" presId="urn:microsoft.com/office/officeart/2005/8/layout/lProcess2"/>
+    <dgm:cxn modelId="{82ECE00E-C99F-43DA-83F9-38CFC3F7A2FA}" type="presOf" srcId="{DF4857E7-5C40-4E4D-8F9E-0F40BE240B2F}" destId="{4514D2E9-87FF-454C-A554-FD761A8568C7}" srcOrd="0" destOrd="0" presId="urn:microsoft.com/office/officeart/2005/8/layout/lProcess2"/>
+    <dgm:cxn modelId="{58D7B72C-6638-4F5D-945E-9420F8FE7097}" type="presOf" srcId="{7592B694-086D-4180-B053-CE7AD13C9858}" destId="{6E5A89BC-14D8-4DAA-BBC1-B070DD5BD626}" srcOrd="0" destOrd="0" presId="urn:microsoft.com/office/officeart/2005/8/layout/lProcess2"/>
+    <dgm:cxn modelId="{583CC615-DAE7-4276-AD9F-C578D26FEDFC}" srcId="{DF4857E7-5C40-4E4D-8F9E-0F40BE240B2F}" destId="{7592B694-086D-4180-B053-CE7AD13C9858}" srcOrd="2" destOrd="0" parTransId="{C8FADD59-ED12-44D1-A076-7A13B0AC344E}" sibTransId="{34A6F1FD-1787-4988-A7E6-472B7C66BD09}"/>
+    <dgm:cxn modelId="{C3F684FE-A0E7-411B-A303-2C8155B38D48}" srcId="{DF4857E7-5C40-4E4D-8F9E-0F40BE240B2F}" destId="{F5E45C32-85BB-467F-80E6-A808871E72F3}" srcOrd="1" destOrd="0" parTransId="{FAB096C4-43F1-4FB0-A740-B5A33490B558}" sibTransId="{F29CEF7E-7A2A-457D-9BE3-75C08A423C81}"/>
+    <dgm:cxn modelId="{7C9C3A38-6D50-4AFF-AA73-365DE43285E1}" type="presOf" srcId="{32074760-1CE6-4EA9-A667-33C7E19C2D94}" destId="{A8FD0D76-AFC6-4802-9090-E980FDBECC91}" srcOrd="0" destOrd="0" presId="urn:microsoft.com/office/officeart/2005/8/layout/lProcess2"/>
+    <dgm:cxn modelId="{6F5081CF-24CF-4E2C-8683-D130E3B3E5C7}" type="presOf" srcId="{F5E45C32-85BB-467F-80E6-A808871E72F3}" destId="{2487EB6F-DE81-4509-80D3-3047844600F3}" srcOrd="1" destOrd="0" presId="urn:microsoft.com/office/officeart/2005/8/layout/lProcess2"/>
+    <dgm:cxn modelId="{C664844B-280E-4BFE-9C14-BBB1B2BC2C91}" type="presOf" srcId="{6193ECAA-3925-487F-ADF8-CE1362754FFF}" destId="{5CE69C38-1462-4F71-A252-F397C9008295}" srcOrd="0" destOrd="0" presId="urn:microsoft.com/office/officeart/2005/8/layout/lProcess2"/>
+    <dgm:cxn modelId="{DEF1C201-34B1-4882-8DBF-B07106CA401E}" type="presOf" srcId="{8C9EF0B8-B348-4F26-938D-6A3D8F1D01C9}" destId="{EF50A355-5315-401C-A8B8-05A2B4F30FE3}" srcOrd="0" destOrd="0" presId="urn:microsoft.com/office/officeart/2005/8/layout/lProcess2"/>
+    <dgm:cxn modelId="{FA16C23C-5596-42A1-981A-487742CF3BBD}" srcId="{F5E45C32-85BB-467F-80E6-A808871E72F3}" destId="{6193ECAA-3925-487F-ADF8-CE1362754FFF}" srcOrd="0" destOrd="0" parTransId="{CA95F830-F096-4B8A-8E76-097EF46A4F44}" sibTransId="{4C2F44CE-5AB4-4FFE-B037-FFB0E3B4A7EB}"/>
+    <dgm:cxn modelId="{792FB76A-389C-45B7-8308-227DADB5CF70}" srcId="{0F9F144E-5A69-4079-9CFE-833FB141B5B7}" destId="{32074760-1CE6-4EA9-A667-33C7E19C2D94}" srcOrd="0" destOrd="0" parTransId="{41FFA3F1-CAF6-4B0C-90FB-AAF097D8C840}" sibTransId="{66E711EC-17A3-40E0-B60B-5A2F466C9D11}"/>
+    <dgm:cxn modelId="{7A675828-0E86-4177-A02F-94B30E827A0C}" type="presOf" srcId="{0F9F144E-5A69-4079-9CFE-833FB141B5B7}" destId="{9046789A-6150-4534-817A-88A1F11F0BDA}" srcOrd="0" destOrd="0" presId="urn:microsoft.com/office/officeart/2005/8/layout/lProcess2"/>
+    <dgm:cxn modelId="{92E0E4AC-AA4F-4221-B4F5-BC44ADD50226}" srcId="{F5E45C32-85BB-467F-80E6-A808871E72F3}" destId="{FA9C7340-018E-4F73-A402-B7FF8C34CDC0}" srcOrd="1" destOrd="0" parTransId="{1805A85A-B92E-48E0-886D-23F094607276}" sibTransId="{44F9A519-DD68-4648-B8E0-DFC7EF2120B7}"/>
+    <dgm:cxn modelId="{F53C5B60-EE78-46AA-90FC-BDF2F3396876}" srcId="{DF4857E7-5C40-4E4D-8F9E-0F40BE240B2F}" destId="{68DE1B8C-EBBC-4ACF-AD69-E108E4A8C85C}" srcOrd="3" destOrd="0" parTransId="{94D73433-720A-40B7-8E81-899280B4DD52}" sibTransId="{10D11475-433C-4D63-8B5E-9E928E6DD9A1}"/>
     <dgm:cxn modelId="{E3FD7D9B-7A36-4D12-B188-0A0D1AF9C129}" type="presOf" srcId="{68DE1B8C-EBBC-4ACF-AD69-E108E4A8C85C}" destId="{DFC8EC82-A76D-41CD-A597-E02C5F5CBEEE}" srcOrd="0" destOrd="0" presId="urn:microsoft.com/office/officeart/2005/8/layout/lProcess2"/>
-    <dgm:cxn modelId="{82ECE00E-C99F-43DA-83F9-38CFC3F7A2FA}" type="presOf" srcId="{DF4857E7-5C40-4E4D-8F9E-0F40BE240B2F}" destId="{4514D2E9-87FF-454C-A554-FD761A8568C7}" srcOrd="0" destOrd="0" presId="urn:microsoft.com/office/officeart/2005/8/layout/lProcess2"/>
-    <dgm:cxn modelId="{DEF1C201-34B1-4882-8DBF-B07106CA401E}" type="presOf" srcId="{8C9EF0B8-B348-4F26-938D-6A3D8F1D01C9}" destId="{EF50A355-5315-401C-A8B8-05A2B4F30FE3}" srcOrd="0" destOrd="0" presId="urn:microsoft.com/office/officeart/2005/8/layout/lProcess2"/>
-    <dgm:cxn modelId="{4F69C728-D27E-4664-B39F-E552BD0B15C4}" type="presOf" srcId="{68DE1B8C-EBBC-4ACF-AD69-E108E4A8C85C}" destId="{A9276CF6-D6BB-4D87-85EE-C74A56417B50}" srcOrd="1" destOrd="0" presId="urn:microsoft.com/office/officeart/2005/8/layout/lProcess2"/>
-    <dgm:cxn modelId="{EAD02916-CE0D-4F3F-A82E-33F10B159D8E}" type="presOf" srcId="{512A4932-71C2-4AF1-A35F-4F4632F17C02}" destId="{51239DC3-E9A2-43DA-8F69-23A0808C5F7B}" srcOrd="0" destOrd="0" presId="urn:microsoft.com/office/officeart/2005/8/layout/lProcess2"/>
-    <dgm:cxn modelId="{6F5081CF-24CF-4E2C-8683-D130E3B3E5C7}" type="presOf" srcId="{F5E45C32-85BB-467F-80E6-A808871E72F3}" destId="{2487EB6F-DE81-4509-80D3-3047844600F3}" srcOrd="1" destOrd="0" presId="urn:microsoft.com/office/officeart/2005/8/layout/lProcess2"/>
-    <dgm:cxn modelId="{F53C5B60-EE78-46AA-90FC-BDF2F3396876}" srcId="{DF4857E7-5C40-4E4D-8F9E-0F40BE240B2F}" destId="{68DE1B8C-EBBC-4ACF-AD69-E108E4A8C85C}" srcOrd="3" destOrd="0" parTransId="{94D73433-720A-40B7-8E81-899280B4DD52}" sibTransId="{10D11475-433C-4D63-8B5E-9E928E6DD9A1}"/>
-    <dgm:cxn modelId="{792FB76A-389C-45B7-8308-227DADB5CF70}" srcId="{0F9F144E-5A69-4079-9CFE-833FB141B5B7}" destId="{32074760-1CE6-4EA9-A667-33C7E19C2D94}" srcOrd="0" destOrd="0" parTransId="{41FFA3F1-CAF6-4B0C-90FB-AAF097D8C840}" sibTransId="{66E711EC-17A3-40E0-B60B-5A2F466C9D11}"/>
-    <dgm:cxn modelId="{C3F684FE-A0E7-411B-A303-2C8155B38D48}" srcId="{DF4857E7-5C40-4E4D-8F9E-0F40BE240B2F}" destId="{F5E45C32-85BB-467F-80E6-A808871E72F3}" srcOrd="1" destOrd="0" parTransId="{FAB096C4-43F1-4FB0-A740-B5A33490B558}" sibTransId="{F29CEF7E-7A2A-457D-9BE3-75C08A423C81}"/>
-    <dgm:cxn modelId="{92E0E4AC-AA4F-4221-B4F5-BC44ADD50226}" srcId="{F5E45C32-85BB-467F-80E6-A808871E72F3}" destId="{FA9C7340-018E-4F73-A402-B7FF8C34CDC0}" srcOrd="1" destOrd="0" parTransId="{1805A85A-B92E-48E0-886D-23F094607276}" sibTransId="{44F9A519-DD68-4648-B8E0-DFC7EF2120B7}"/>
-    <dgm:cxn modelId="{8AD144FB-65EB-4E0A-BBFB-81923B833C5B}" type="presOf" srcId="{F5E45C32-85BB-467F-80E6-A808871E72F3}" destId="{E7B9CF75-AF6A-4290-854A-077BB9A2D77C}" srcOrd="0" destOrd="0" presId="urn:microsoft.com/office/officeart/2005/8/layout/lProcess2"/>
-    <dgm:cxn modelId="{3BB736BE-339A-4657-B981-F9F1F8D52FDC}" type="presOf" srcId="{A766E2ED-C2E8-4E07-AF18-7EC57476A5C8}" destId="{D88EF221-1E19-407F-A109-45D126E6B0AD}" srcOrd="0" destOrd="0" presId="urn:microsoft.com/office/officeart/2005/8/layout/lProcess2"/>
-    <dgm:cxn modelId="{E3AEEE63-0D70-4A65-B4AD-DC3DBA17985A}" type="presOf" srcId="{7592B694-086D-4180-B053-CE7AD13C9858}" destId="{B6E9B2AA-8010-4FAB-90D2-72717C05AE96}" srcOrd="1" destOrd="0" presId="urn:microsoft.com/office/officeart/2005/8/layout/lProcess2"/>
-    <dgm:cxn modelId="{41BAC73D-C909-4828-81D3-F16502305163}" type="presOf" srcId="{8665C39E-B30E-4258-BEA9-83E0F7084606}" destId="{85B657F5-5C9C-42F8-A245-10BA7A824404}" srcOrd="0" destOrd="0" presId="urn:microsoft.com/office/officeart/2005/8/layout/lProcess2"/>
-    <dgm:cxn modelId="{918FC998-3E81-4E2A-A8E0-FB3EB04E2705}" srcId="{0F9F144E-5A69-4079-9CFE-833FB141B5B7}" destId="{A766E2ED-C2E8-4E07-AF18-7EC57476A5C8}" srcOrd="1" destOrd="0" parTransId="{A1530F03-6C5E-45D7-8222-AD175A7090BD}" sibTransId="{05B31AC5-A983-4FEC-B0BE-EB0462CF6128}"/>
-    <dgm:cxn modelId="{58D7B72C-6638-4F5D-945E-9420F8FE7097}" type="presOf" srcId="{7592B694-086D-4180-B053-CE7AD13C9858}" destId="{6E5A89BC-14D8-4DAA-BBC1-B070DD5BD626}" srcOrd="0" destOrd="0" presId="urn:microsoft.com/office/officeart/2005/8/layout/lProcess2"/>
-    <dgm:cxn modelId="{FA16C23C-5596-42A1-981A-487742CF3BBD}" srcId="{F5E45C32-85BB-467F-80E6-A808871E72F3}" destId="{6193ECAA-3925-487F-ADF8-CE1362754FFF}" srcOrd="0" destOrd="0" parTransId="{CA95F830-F096-4B8A-8E76-097EF46A4F44}" sibTransId="{4C2F44CE-5AB4-4FFE-B037-FFB0E3B4A7EB}"/>
-    <dgm:cxn modelId="{42032CCC-41F9-4B3F-A503-E38701F4AC02}" srcId="{7592B694-086D-4180-B053-CE7AD13C9858}" destId="{512A4932-71C2-4AF1-A35F-4F4632F17C02}" srcOrd="1" destOrd="0" parTransId="{47E31259-60CB-40FB-B391-CCAEC2189164}" sibTransId="{4C7C1C5B-4033-4A4C-87E1-4A3C60B720B7}"/>
-    <dgm:cxn modelId="{583CC615-DAE7-4276-AD9F-C578D26FEDFC}" srcId="{DF4857E7-5C40-4E4D-8F9E-0F40BE240B2F}" destId="{7592B694-086D-4180-B053-CE7AD13C9858}" srcOrd="2" destOrd="0" parTransId="{C8FADD59-ED12-44D1-A076-7A13B0AC344E}" sibTransId="{34A6F1FD-1787-4988-A7E6-472B7C66BD09}"/>
-    <dgm:cxn modelId="{8D6B5497-475C-46A9-805D-510F815F9B98}" srcId="{7592B694-086D-4180-B053-CE7AD13C9858}" destId="{8665C39E-B30E-4258-BEA9-83E0F7084606}" srcOrd="0" destOrd="0" parTransId="{8211EBE3-1C93-4CFB-BBEE-7A708996ED07}" sibTransId="{6779ED75-3327-4C98-9C89-1343058D49BC}"/>
-    <dgm:cxn modelId="{ECB29E32-DF3F-494F-B7BB-9C8BD137B048}" type="presOf" srcId="{FA9C7340-018E-4F73-A402-B7FF8C34CDC0}" destId="{BD436606-D1DD-4535-A521-C5E4F9743128}" srcOrd="0" destOrd="0" presId="urn:microsoft.com/office/officeart/2005/8/layout/lProcess2"/>
-    <dgm:cxn modelId="{BA343F65-7063-4A06-9692-19E81201F0CA}" type="presOf" srcId="{7DCD12F6-9D96-4CEE-B77D-0059BD9F172C}" destId="{60B6E648-ADB0-4695-B9EA-290DF28C1E3A}" srcOrd="0" destOrd="0" presId="urn:microsoft.com/office/officeart/2005/8/layout/lProcess2"/>
-    <dgm:cxn modelId="{7C9C3A38-6D50-4AFF-AA73-365DE43285E1}" type="presOf" srcId="{32074760-1CE6-4EA9-A667-33C7E19C2D94}" destId="{A8FD0D76-AFC6-4802-9090-E980FDBECC91}" srcOrd="0" destOrd="0" presId="urn:microsoft.com/office/officeart/2005/8/layout/lProcess2"/>
-    <dgm:cxn modelId="{337C532E-FA4C-4DE5-902B-AF62654DE2CD}" type="presOf" srcId="{0F9F144E-5A69-4079-9CFE-833FB141B5B7}" destId="{F032D9DC-6E96-4533-82F7-966FA94900AA}" srcOrd="1" destOrd="0" presId="urn:microsoft.com/office/officeart/2005/8/layout/lProcess2"/>
     <dgm:cxn modelId="{B4186457-1219-426F-922C-5AECDCC53AC0}" srcId="{68DE1B8C-EBBC-4ACF-AD69-E108E4A8C85C}" destId="{8C9EF0B8-B348-4F26-938D-6A3D8F1D01C9}" srcOrd="0" destOrd="0" parTransId="{317FEE05-7414-4035-9841-8DABE546206E}" sibTransId="{5DAD05BE-4905-4E9C-9DE0-125B4DBFBE33}"/>
-    <dgm:cxn modelId="{7A675828-0E86-4177-A02F-94B30E827A0C}" type="presOf" srcId="{0F9F144E-5A69-4079-9CFE-833FB141B5B7}" destId="{9046789A-6150-4534-817A-88A1F11F0BDA}" srcOrd="0" destOrd="0" presId="urn:microsoft.com/office/officeart/2005/8/layout/lProcess2"/>
-    <dgm:cxn modelId="{C664844B-280E-4BFE-9C14-BBB1B2BC2C91}" type="presOf" srcId="{6193ECAA-3925-487F-ADF8-CE1362754FFF}" destId="{5CE69C38-1462-4F71-A252-F397C9008295}" srcOrd="0" destOrd="0" presId="urn:microsoft.com/office/officeart/2005/8/layout/lProcess2"/>
-    <dgm:cxn modelId="{8BF652A8-B747-4011-8997-2C8E587087B9}" srcId="{68DE1B8C-EBBC-4ACF-AD69-E108E4A8C85C}" destId="{7DCD12F6-9D96-4CEE-B77D-0059BD9F172C}" srcOrd="1" destOrd="0" parTransId="{05220267-9773-4777-8E6B-2437F9979F0B}" sibTransId="{89843E98-8750-44A8-9562-C70EE7FD83F4}"/>
-    <dgm:cxn modelId="{696FC290-58F8-4B0A-B325-8A4CDCEFC93C}" srcId="{DF4857E7-5C40-4E4D-8F9E-0F40BE240B2F}" destId="{0F9F144E-5A69-4079-9CFE-833FB141B5B7}" srcOrd="0" destOrd="0" parTransId="{5295059C-89BD-48FC-9FB0-63BD38C2AF52}" sibTransId="{FAB8FA54-A1F3-488D-B823-07CCB71E4D44}"/>
     <dgm:cxn modelId="{E45813B2-B87D-4638-B83F-E35E092B0951}" type="presParOf" srcId="{4514D2E9-87FF-454C-A554-FD761A8568C7}" destId="{D7F4306A-6D29-4C14-BF5D-EE8CBCC47C9B}" srcOrd="0" destOrd="0" presId="urn:microsoft.com/office/officeart/2005/8/layout/lProcess2"/>
     <dgm:cxn modelId="{B70D7543-B290-431E-8E27-81EE23763ABD}" type="presParOf" srcId="{D7F4306A-6D29-4C14-BF5D-EE8CBCC47C9B}" destId="{9046789A-6150-4534-817A-88A1F11F0BDA}" srcOrd="0" destOrd="0" presId="urn:microsoft.com/office/officeart/2005/8/layout/lProcess2"/>
     <dgm:cxn modelId="{EBC5D71A-D089-4FA3-8176-B37E02AAD50D}" type="presParOf" srcId="{D7F4306A-6D29-4C14-BF5D-EE8CBCC47C9B}" destId="{F032D9DC-6E96-4533-82F7-966FA94900AA}" srcOrd="1" destOrd="0" presId="urn:microsoft.com/office/officeart/2005/8/layout/lProcess2"/>
@@ -5769,7 +5769,7 @@
           <a:p>
             <a:fld id="{20EA5F0D-C1DC-412F-A146-DDB3A74B588F}" type="datetimeFigureOut">
               <a:rPr lang="pt-BR" smtClean="0"/>
-              <a:t>25/11/2013</a:t>
+              <a:t>26/11/2013</a:t>
             </a:fld>
             <a:endParaRPr lang="pt-BR" dirty="0"/>
           </a:p>
@@ -5934,7 +5934,7 @@
           <a:p>
             <a:fld id="{A8CDE508-72C8-4AB5-AA9C-1584D31690E0}" type="datetimeFigureOut">
               <a:rPr lang="pt-BR" smtClean="0"/>
-              <a:t>25/11/2013</a:t>
+              <a:t>26/11/2013</a:t>
             </a:fld>
             <a:endParaRPr lang="pt-BR" dirty="0"/>
           </a:p>
@@ -6601,7 +6601,7 @@
                 <a:ea typeface="+mn-ea"/>
                 <a:cs typeface="+mn-cs"/>
               </a:rPr>
-              <a:t>9</a:t>
+              <a:t>10</a:t>
             </a:fld>
             <a:endParaRPr lang="en-US" sz="1200" b="0" i="0">
               <a:latin typeface="Corbel"/>
@@ -7243,7 +7243,7 @@
             <a:fld id="{9E583DDF-CA54-461A-A486-592D2374C532}" type="datetimeFigureOut">
               <a:rPr lang="pt-BR" smtClean="0"/>
               <a:pPr/>
-              <a:t>25/11/2013</a:t>
+              <a:t>26/11/2013</a:t>
             </a:fld>
             <a:endParaRPr lang="pt-BR" dirty="0"/>
           </a:p>
@@ -7619,7 +7619,7 @@
           <a:p>
             <a:fld id="{9E583DDF-CA54-461A-A486-592D2374C532}" type="datetimeFigureOut">
               <a:rPr lang="pt-BR" smtClean="0"/>
-              <a:t>25/11/2013</a:t>
+              <a:t>26/11/2013</a:t>
             </a:fld>
             <a:endParaRPr lang="pt-BR" dirty="0"/>
           </a:p>
@@ -7801,7 +7801,7 @@
           <a:p>
             <a:fld id="{9E583DDF-CA54-461A-A486-592D2374C532}" type="datetimeFigureOut">
               <a:rPr lang="pt-BR" smtClean="0"/>
-              <a:t>25/11/2013</a:t>
+              <a:t>26/11/2013</a:t>
             </a:fld>
             <a:endParaRPr lang="pt-BR" dirty="0"/>
           </a:p>
@@ -7993,7 +7993,7 @@
           <a:p>
             <a:fld id="{9E583DDF-CA54-461A-A486-592D2374C532}" type="datetimeFigureOut">
               <a:rPr lang="pt-BR" smtClean="0"/>
-              <a:t>25/11/2013</a:t>
+              <a:t>26/11/2013</a:t>
             </a:fld>
             <a:endParaRPr lang="pt-BR" dirty="0"/>
           </a:p>
@@ -8179,7 +8179,7 @@
           <a:p>
             <a:fld id="{9E583DDF-CA54-461A-A486-592D2374C532}" type="datetimeFigureOut">
               <a:rPr lang="pt-BR" smtClean="0"/>
-              <a:t>25/11/2013</a:t>
+              <a:t>26/11/2013</a:t>
             </a:fld>
             <a:endParaRPr lang="pt-BR" dirty="0"/>
           </a:p>
@@ -8563,7 +8563,7 @@
           <a:p>
             <a:fld id="{9E583DDF-CA54-461A-A486-592D2374C532}" type="datetimeFigureOut">
               <a:rPr lang="pt-BR" smtClean="0"/>
-              <a:t>25/11/2013</a:t>
+              <a:t>26/11/2013</a:t>
             </a:fld>
             <a:endParaRPr lang="pt-BR" dirty="0"/>
           </a:p>
@@ -8844,7 +8844,7 @@
             <a:fld id="{9E583DDF-CA54-461A-A486-592D2374C532}" type="datetimeFigureOut">
               <a:rPr lang="pt-BR" smtClean="0"/>
               <a:pPr/>
-              <a:t>25/11/2013</a:t>
+              <a:t>26/11/2013</a:t>
             </a:fld>
             <a:endParaRPr lang="pt-BR" dirty="0"/>
           </a:p>
@@ -9165,7 +9165,7 @@
           <a:p>
             <a:fld id="{9DD7D43D-6574-4C7B-808D-C6C12215A4D4}" type="datetimeFigureOut">
               <a:rPr lang="pt-BR" smtClean="0"/>
-              <a:t>25/11/2013</a:t>
+              <a:t>26/11/2013</a:t>
             </a:fld>
             <a:endParaRPr lang="pt-BR" dirty="0"/>
           </a:p>
@@ -9614,7 +9614,7 @@
           <a:p>
             <a:fld id="{9E583DDF-CA54-461A-A486-592D2374C532}" type="datetimeFigureOut">
               <a:rPr lang="pt-BR" smtClean="0"/>
-              <a:t>25/11/2013</a:t>
+              <a:t>26/11/2013</a:t>
             </a:fld>
             <a:endParaRPr lang="pt-BR" dirty="0"/>
           </a:p>
@@ -9744,7 +9744,7 @@
           <a:p>
             <a:fld id="{9E583DDF-CA54-461A-A486-592D2374C532}" type="datetimeFigureOut">
               <a:rPr lang="pt-BR" smtClean="0"/>
-              <a:t>25/11/2013</a:t>
+              <a:t>26/11/2013</a:t>
             </a:fld>
             <a:endParaRPr lang="pt-BR" dirty="0"/>
           </a:p>
@@ -9860,7 +9860,7 @@
             <a:fld id="{9E583DDF-CA54-461A-A486-592D2374C532}" type="datetimeFigureOut">
               <a:rPr lang="pt-BR" smtClean="0"/>
               <a:pPr/>
-              <a:t>25/11/2013</a:t>
+              <a:t>26/11/2013</a:t>
             </a:fld>
             <a:endParaRPr lang="pt-BR" dirty="0"/>
           </a:p>
@@ -10175,7 +10175,7 @@
           <a:p>
             <a:fld id="{9E583DDF-CA54-461A-A486-592D2374C532}" type="datetimeFigureOut">
               <a:rPr lang="pt-BR" smtClean="0"/>
-              <a:t>25/11/2013</a:t>
+              <a:t>26/11/2013</a:t>
             </a:fld>
             <a:endParaRPr lang="pt-BR" dirty="0"/>
           </a:p>
@@ -10543,7 +10543,7 @@
             <a:fld id="{9E583DDF-CA54-461A-A486-592D2374C532}" type="datetimeFigureOut">
               <a:rPr lang="pt-BR" smtClean="0"/>
               <a:pPr/>
-              <a:t>25/11/2013</a:t>
+              <a:t>26/11/2013</a:t>
             </a:fld>
             <a:endParaRPr lang="pt-BR" dirty="0"/>
           </a:p>
@@ -10968,7 +10968,7 @@
   </p:txStyles>
   <p:extLst mod="1">
     <p:ext uri="{27BBF7A9-308A-43DC-89C8-2F10F3537804}">
-      <p15:sldGuideLst xmlns:p15="http://schemas.microsoft.com/office/powerpoint/2012/main" xmlns="">
+      <p15:sldGuideLst xmlns="" xmlns:p15="http://schemas.microsoft.com/office/powerpoint/2012/main">
         <p15:guide id="1" orient="horz" pos="2360">
           <p15:clr>
             <a:srgbClr val="F26B43"/>
@@ -11108,7 +11108,7 @@
       </p:grpSpPr>
       <p:sp>
         <p:nvSpPr>
-          <p:cNvPr id="5" name="Título 4"/>
+          <p:cNvPr id="2" name="Título 1"/>
           <p:cNvSpPr>
             <a:spLocks noGrp="1"/>
           </p:cNvSpPr>
@@ -11116,73 +11116,697 @@
             <p:ph type="title"/>
           </p:nvPr>
         </p:nvSpPr>
-        <p:spPr/>
+        <p:spPr>
+          <a:xfrm>
+            <a:off x="1341120" y="467360"/>
+            <a:ext cx="9509760" cy="801400"/>
+          </a:xfrm>
+        </p:spPr>
         <p:txBody>
-          <a:bodyPr/>
+          <a:bodyPr>
+            <a:normAutofit/>
+          </a:bodyPr>
           <a:lstStyle/>
           <a:p>
-            <a:r>
-              <a:rPr lang="pt-BR" sz="3600" dirty="0">
+            <a:pPr marL="0" indent="0" algn="l" defTabSz="914400">
+              <a:lnSpc>
+                <a:spcPct val="90000"/>
+              </a:lnSpc>
+              <a:spcBef>
+                <a:spcPts val="0"/>
+              </a:spcBef>
+              <a:buNone/>
+            </a:pPr>
+            <a:r>
+              <a:rPr lang="pt-BR" dirty="0" smtClean="0">
                 <a:solidFill>
-                  <a:srgbClr val="263050"/>
+                  <a:srgbClr val="263050">
+                    <a:lumMod val="75000"/>
+                  </a:srgbClr>
                 </a:solidFill>
+                <a:latin typeface="Corbel"/>
               </a:rPr>
-              <a:t>Projeto de teste</a:t>
-            </a:r>
-            <a:endParaRPr lang="pt-BR" dirty="0"/>
+              <a:t>Elaboração de Cronograma</a:t>
+            </a:r>
+            <a:endParaRPr lang="pt-BR" sz="3400" b="0" i="0" dirty="0">
+              <a:solidFill>
+                <a:srgbClr val="263050">
+                  <a:lumMod val="75000"/>
+                </a:srgbClr>
+              </a:solidFill>
+              <a:latin typeface="Corbel"/>
+              <a:ea typeface="+mj-ea"/>
+              <a:cs typeface="+mj-cs"/>
+            </a:endParaRPr>
           </a:p>
         </p:txBody>
       </p:sp>
-      <p:sp>
-        <p:nvSpPr>
-          <p:cNvPr id="8" name="Retângulo 7"/>
-          <p:cNvSpPr/>
-          <p:nvPr/>
-        </p:nvSpPr>
-        <p:spPr>
-          <a:xfrm>
-            <a:off x="479376" y="3284984"/>
-            <a:ext cx="10945216" cy="1200329"/>
-          </a:xfrm>
-          <a:prstGeom prst="rect">
-            <a:avLst/>
-          </a:prstGeom>
-        </p:spPr>
-        <p:txBody>
-          <a:bodyPr wrap="square">
-            <a:spAutoFit/>
-          </a:bodyPr>
-          <a:lstStyle/>
-          <a:p>
-            <a:r>
-              <a:rPr lang="pt-BR" dirty="0"/>
-              <a:t>Objetivo:</a:t>
-            </a:r>
-          </a:p>
-          <a:p>
-            <a:r>
-              <a:rPr lang="pt-BR" dirty="0"/>
-              <a:t>– Identificar e descrever os casos de teste para cada build, e</a:t>
-            </a:r>
-          </a:p>
-          <a:p>
-            <a:r>
-              <a:rPr lang="pt-BR" dirty="0"/>
-              <a:t>identificar e estruturar os procedimentos de teste, especificando</a:t>
-            </a:r>
-          </a:p>
-          <a:p>
-            <a:r>
-              <a:rPr lang="pt-BR" dirty="0"/>
-              <a:t>como executar os casos de teste.</a:t>
-            </a:r>
-          </a:p>
-        </p:txBody>
-      </p:sp>
+      <p:graphicFrame>
+        <p:nvGraphicFramePr>
+          <p:cNvPr id="5" name="Espaço Reservado para Conteúdo 4"/>
+          <p:cNvGraphicFramePr>
+            <a:graphicFrameLocks noGrp="1"/>
+          </p:cNvGraphicFramePr>
+          <p:nvPr>
+            <p:ph idx="1"/>
+            <p:extLst>
+              <p:ext uri="{D42A27DB-BD31-4B8C-83A1-F6EECF244321}">
+                <p14:modId xmlns:p14="http://schemas.microsoft.com/office/powerpoint/2010/main" val="3534917820"/>
+              </p:ext>
+            </p:extLst>
+          </p:nvPr>
+        </p:nvGraphicFramePr>
+        <p:xfrm>
+          <a:off x="335360" y="1772819"/>
+          <a:ext cx="11449272" cy="4392486"/>
+        </p:xfrm>
+        <a:graphic>
+          <a:graphicData uri="http://schemas.openxmlformats.org/drawingml/2006/table">
+            <a:tbl>
+              <a:tblPr firstRow="1" firstCol="1" bandRow="1">
+                <a:tableStyleId>{B301B821-A1FF-4177-AEE7-76D212191A09}</a:tableStyleId>
+              </a:tblPr>
+              <a:tblGrid>
+                <a:gridCol w="3815620"/>
+                <a:gridCol w="3816826"/>
+                <a:gridCol w="3816826"/>
+              </a:tblGrid>
+              <a:tr h="627498">
+                <a:tc>
+                  <a:txBody>
+                    <a:bodyPr/>
+                    <a:lstStyle/>
+                    <a:p>
+                      <a:pPr>
+                        <a:lnSpc>
+                          <a:spcPts val="1200"/>
+                        </a:lnSpc>
+                        <a:spcAft>
+                          <a:spcPts val="0"/>
+                        </a:spcAft>
+                      </a:pPr>
+                      <a:r>
+                        <a:rPr lang="pt-BR" sz="1100" dirty="0" err="1">
+                          <a:effectLst/>
+                        </a:rPr>
+                        <a:t>Milestone</a:t>
+                      </a:r>
+                      <a:endParaRPr lang="pt-BR" sz="1000" dirty="0">
+                        <a:effectLst/>
+                        <a:latin typeface="Times New Roman"/>
+                        <a:ea typeface="Times New Roman"/>
+                      </a:endParaRPr>
+                    </a:p>
+                  </a:txBody>
+                  <a:tcPr marL="68580" marR="68580" marT="0" marB="0"/>
+                </a:tc>
+                <a:tc>
+                  <a:txBody>
+                    <a:bodyPr/>
+                    <a:lstStyle/>
+                    <a:p>
+                      <a:pPr>
+                        <a:lnSpc>
+                          <a:spcPts val="1200"/>
+                        </a:lnSpc>
+                        <a:spcAft>
+                          <a:spcPts val="0"/>
+                        </a:spcAft>
+                      </a:pPr>
+                      <a:r>
+                        <a:rPr lang="pt-BR" sz="1100">
+                          <a:effectLst/>
+                        </a:rPr>
+                        <a:t>Data de Início</a:t>
+                      </a:r>
+                      <a:endParaRPr lang="pt-BR" sz="1000">
+                        <a:effectLst/>
+                        <a:latin typeface="Times New Roman"/>
+                        <a:ea typeface="Times New Roman"/>
+                      </a:endParaRPr>
+                    </a:p>
+                  </a:txBody>
+                  <a:tcPr marL="68580" marR="68580" marT="0" marB="0"/>
+                </a:tc>
+                <a:tc>
+                  <a:txBody>
+                    <a:bodyPr/>
+                    <a:lstStyle/>
+                    <a:p>
+                      <a:pPr>
+                        <a:lnSpc>
+                          <a:spcPts val="1200"/>
+                        </a:lnSpc>
+                        <a:spcAft>
+                          <a:spcPts val="0"/>
+                        </a:spcAft>
+                      </a:pPr>
+                      <a:r>
+                        <a:rPr lang="pt-BR" sz="1100">
+                          <a:effectLst/>
+                        </a:rPr>
+                        <a:t>Data de Término</a:t>
+                      </a:r>
+                      <a:endParaRPr lang="pt-BR" sz="1000">
+                        <a:effectLst/>
+                        <a:latin typeface="Times New Roman"/>
+                        <a:ea typeface="Times New Roman"/>
+                      </a:endParaRPr>
+                    </a:p>
+                  </a:txBody>
+                  <a:tcPr marL="68580" marR="68580" marT="0" marB="0"/>
+                </a:tc>
+              </a:tr>
+              <a:tr h="627498">
+                <a:tc>
+                  <a:txBody>
+                    <a:bodyPr/>
+                    <a:lstStyle/>
+                    <a:p>
+                      <a:pPr>
+                        <a:lnSpc>
+                          <a:spcPts val="1200"/>
+                        </a:lnSpc>
+                        <a:spcAft>
+                          <a:spcPts val="0"/>
+                        </a:spcAft>
+                      </a:pPr>
+                      <a:r>
+                        <a:rPr lang="pt-BR" sz="1000">
+                          <a:effectLst/>
+                        </a:rPr>
+                        <a:t>Planejar Teste</a:t>
+                      </a:r>
+                      <a:endParaRPr lang="pt-BR" sz="1000">
+                        <a:effectLst/>
+                        <a:latin typeface="Times New Roman"/>
+                        <a:ea typeface="Times New Roman"/>
+                      </a:endParaRPr>
+                    </a:p>
+                  </a:txBody>
+                  <a:tcPr marL="68580" marR="68580" marT="0" marB="0"/>
+                </a:tc>
+                <a:tc>
+                  <a:txBody>
+                    <a:bodyPr/>
+                    <a:lstStyle/>
+                    <a:p>
+                      <a:pPr>
+                        <a:lnSpc>
+                          <a:spcPts val="1200"/>
+                        </a:lnSpc>
+                        <a:spcAft>
+                          <a:spcPts val="0"/>
+                        </a:spcAft>
+                      </a:pPr>
+                      <a:r>
+                        <a:rPr lang="pt-BR" sz="1000">
+                          <a:effectLst/>
+                        </a:rPr>
+                        <a:t>10/10/2013</a:t>
+                      </a:r>
+                      <a:endParaRPr lang="pt-BR" sz="1000">
+                        <a:effectLst/>
+                        <a:latin typeface="Times New Roman"/>
+                        <a:ea typeface="Times New Roman"/>
+                      </a:endParaRPr>
+                    </a:p>
+                  </a:txBody>
+                  <a:tcPr marL="68580" marR="68580" marT="0" marB="0"/>
+                </a:tc>
+                <a:tc>
+                  <a:txBody>
+                    <a:bodyPr/>
+                    <a:lstStyle/>
+                    <a:p>
+                      <a:pPr>
+                        <a:lnSpc>
+                          <a:spcPts val="1200"/>
+                        </a:lnSpc>
+                        <a:spcAft>
+                          <a:spcPts val="0"/>
+                        </a:spcAft>
+                      </a:pPr>
+                      <a:r>
+                        <a:rPr lang="pt-BR" sz="1000">
+                          <a:effectLst/>
+                        </a:rPr>
+                        <a:t>12/10/2013</a:t>
+                      </a:r>
+                      <a:endParaRPr lang="pt-BR" sz="1000">
+                        <a:effectLst/>
+                        <a:latin typeface="Times New Roman"/>
+                        <a:ea typeface="Times New Roman"/>
+                      </a:endParaRPr>
+                    </a:p>
+                  </a:txBody>
+                  <a:tcPr marL="68580" marR="68580" marT="0" marB="0"/>
+                </a:tc>
+              </a:tr>
+              <a:tr h="627498">
+                <a:tc>
+                  <a:txBody>
+                    <a:bodyPr/>
+                    <a:lstStyle/>
+                    <a:p>
+                      <a:pPr>
+                        <a:lnSpc>
+                          <a:spcPts val="1200"/>
+                        </a:lnSpc>
+                        <a:spcAft>
+                          <a:spcPts val="0"/>
+                        </a:spcAft>
+                      </a:pPr>
+                      <a:r>
+                        <a:rPr lang="pt-BR" sz="1000">
+                          <a:effectLst/>
+                        </a:rPr>
+                        <a:t>Projetar Teste</a:t>
+                      </a:r>
+                      <a:endParaRPr lang="pt-BR" sz="1000">
+                        <a:effectLst/>
+                        <a:latin typeface="Times New Roman"/>
+                        <a:ea typeface="Times New Roman"/>
+                      </a:endParaRPr>
+                    </a:p>
+                  </a:txBody>
+                  <a:tcPr marL="68580" marR="68580" marT="0" marB="0"/>
+                </a:tc>
+                <a:tc>
+                  <a:txBody>
+                    <a:bodyPr/>
+                    <a:lstStyle/>
+                    <a:p>
+                      <a:pPr>
+                        <a:lnSpc>
+                          <a:spcPts val="1200"/>
+                        </a:lnSpc>
+                        <a:spcAft>
+                          <a:spcPts val="0"/>
+                        </a:spcAft>
+                      </a:pPr>
+                      <a:r>
+                        <a:rPr lang="pt-BR" sz="1000">
+                          <a:effectLst/>
+                        </a:rPr>
+                        <a:t>12/10/2013</a:t>
+                      </a:r>
+                      <a:endParaRPr lang="pt-BR" sz="1000">
+                        <a:effectLst/>
+                        <a:latin typeface="Times New Roman"/>
+                        <a:ea typeface="Times New Roman"/>
+                      </a:endParaRPr>
+                    </a:p>
+                  </a:txBody>
+                  <a:tcPr marL="68580" marR="68580" marT="0" marB="0"/>
+                </a:tc>
+                <a:tc>
+                  <a:txBody>
+                    <a:bodyPr/>
+                    <a:lstStyle/>
+                    <a:p>
+                      <a:pPr>
+                        <a:lnSpc>
+                          <a:spcPts val="1200"/>
+                        </a:lnSpc>
+                        <a:spcAft>
+                          <a:spcPts val="0"/>
+                        </a:spcAft>
+                      </a:pPr>
+                      <a:r>
+                        <a:rPr lang="pt-BR" sz="1000">
+                          <a:effectLst/>
+                        </a:rPr>
+                        <a:t>16/10/2013</a:t>
+                      </a:r>
+                      <a:endParaRPr lang="pt-BR" sz="1000">
+                        <a:effectLst/>
+                        <a:latin typeface="Times New Roman"/>
+                        <a:ea typeface="Times New Roman"/>
+                      </a:endParaRPr>
+                    </a:p>
+                  </a:txBody>
+                  <a:tcPr marL="68580" marR="68580" marT="0" marB="0"/>
+                </a:tc>
+              </a:tr>
+              <a:tr h="627498">
+                <a:tc>
+                  <a:txBody>
+                    <a:bodyPr/>
+                    <a:lstStyle/>
+                    <a:p>
+                      <a:pPr>
+                        <a:lnSpc>
+                          <a:spcPts val="1200"/>
+                        </a:lnSpc>
+                        <a:spcAft>
+                          <a:spcPts val="0"/>
+                        </a:spcAft>
+                      </a:pPr>
+                      <a:r>
+                        <a:rPr lang="pt-BR" sz="1000">
+                          <a:effectLst/>
+                        </a:rPr>
+                        <a:t>Implementar Teste</a:t>
+                      </a:r>
+                      <a:endParaRPr lang="pt-BR" sz="1000">
+                        <a:effectLst/>
+                        <a:latin typeface="Times New Roman"/>
+                        <a:ea typeface="Times New Roman"/>
+                      </a:endParaRPr>
+                    </a:p>
+                  </a:txBody>
+                  <a:tcPr marL="68580" marR="68580" marT="0" marB="0"/>
+                </a:tc>
+                <a:tc>
+                  <a:txBody>
+                    <a:bodyPr/>
+                    <a:lstStyle/>
+                    <a:p>
+                      <a:pPr>
+                        <a:lnSpc>
+                          <a:spcPts val="1200"/>
+                        </a:lnSpc>
+                        <a:spcAft>
+                          <a:spcPts val="0"/>
+                        </a:spcAft>
+                      </a:pPr>
+                      <a:r>
+                        <a:rPr lang="pt-BR" sz="1000" dirty="0">
+                          <a:effectLst/>
+                        </a:rPr>
+                        <a:t>Não teremos</a:t>
+                      </a:r>
+                      <a:endParaRPr lang="pt-BR" sz="1000" dirty="0">
+                        <a:effectLst/>
+                        <a:latin typeface="Times New Roman"/>
+                        <a:ea typeface="Times New Roman"/>
+                      </a:endParaRPr>
+                    </a:p>
+                  </a:txBody>
+                  <a:tcPr marL="68580" marR="68580" marT="0" marB="0"/>
+                </a:tc>
+                <a:tc>
+                  <a:txBody>
+                    <a:bodyPr/>
+                    <a:lstStyle/>
+                    <a:p>
+                      <a:pPr>
+                        <a:lnSpc>
+                          <a:spcPts val="1200"/>
+                        </a:lnSpc>
+                        <a:spcAft>
+                          <a:spcPts val="0"/>
+                        </a:spcAft>
+                      </a:pPr>
+                      <a:r>
+                        <a:rPr lang="pt-BR" sz="1000">
+                          <a:effectLst/>
+                        </a:rPr>
+                        <a:t>Não teremos</a:t>
+                      </a:r>
+                      <a:endParaRPr lang="pt-BR" sz="1000">
+                        <a:effectLst/>
+                        <a:latin typeface="Times New Roman"/>
+                        <a:ea typeface="Times New Roman"/>
+                      </a:endParaRPr>
+                    </a:p>
+                  </a:txBody>
+                  <a:tcPr marL="68580" marR="68580" marT="0" marB="0"/>
+                </a:tc>
+              </a:tr>
+              <a:tr h="627498">
+                <a:tc>
+                  <a:txBody>
+                    <a:bodyPr/>
+                    <a:lstStyle/>
+                    <a:p>
+                      <a:pPr>
+                        <a:lnSpc>
+                          <a:spcPts val="1200"/>
+                        </a:lnSpc>
+                        <a:spcAft>
+                          <a:spcPts val="0"/>
+                        </a:spcAft>
+                      </a:pPr>
+                      <a:r>
+                        <a:rPr lang="pt-BR" sz="1000">
+                          <a:effectLst/>
+                        </a:rPr>
+                        <a:t>Executar Teste</a:t>
+                      </a:r>
+                      <a:endParaRPr lang="pt-BR" sz="1000">
+                        <a:effectLst/>
+                        <a:latin typeface="Times New Roman"/>
+                        <a:ea typeface="Times New Roman"/>
+                      </a:endParaRPr>
+                    </a:p>
+                  </a:txBody>
+                  <a:tcPr marL="68580" marR="68580" marT="0" marB="0"/>
+                </a:tc>
+                <a:tc>
+                  <a:txBody>
+                    <a:bodyPr/>
+                    <a:lstStyle/>
+                    <a:p>
+                      <a:pPr>
+                        <a:lnSpc>
+                          <a:spcPts val="1200"/>
+                        </a:lnSpc>
+                        <a:spcAft>
+                          <a:spcPts val="0"/>
+                        </a:spcAft>
+                      </a:pPr>
+                      <a:r>
+                        <a:rPr lang="pt-BR" sz="1000">
+                          <a:effectLst/>
+                        </a:rPr>
+                        <a:t>Não terremos</a:t>
+                      </a:r>
+                      <a:endParaRPr lang="pt-BR" sz="1000">
+                        <a:effectLst/>
+                        <a:latin typeface="Times New Roman"/>
+                        <a:ea typeface="Times New Roman"/>
+                      </a:endParaRPr>
+                    </a:p>
+                  </a:txBody>
+                  <a:tcPr marL="68580" marR="68580" marT="0" marB="0"/>
+                </a:tc>
+                <a:tc>
+                  <a:txBody>
+                    <a:bodyPr/>
+                    <a:lstStyle/>
+                    <a:p>
+                      <a:pPr>
+                        <a:lnSpc>
+                          <a:spcPts val="1200"/>
+                        </a:lnSpc>
+                        <a:spcAft>
+                          <a:spcPts val="0"/>
+                        </a:spcAft>
+                      </a:pPr>
+                      <a:r>
+                        <a:rPr lang="pt-BR" sz="1000">
+                          <a:effectLst/>
+                        </a:rPr>
+                        <a:t>Não terremos</a:t>
+                      </a:r>
+                      <a:endParaRPr lang="pt-BR" sz="1000">
+                        <a:effectLst/>
+                        <a:latin typeface="Times New Roman"/>
+                        <a:ea typeface="Times New Roman"/>
+                      </a:endParaRPr>
+                    </a:p>
+                  </a:txBody>
+                  <a:tcPr marL="68580" marR="68580" marT="0" marB="0"/>
+                </a:tc>
+              </a:tr>
+              <a:tr h="627498">
+                <a:tc>
+                  <a:txBody>
+                    <a:bodyPr/>
+                    <a:lstStyle/>
+                    <a:p>
+                      <a:pPr>
+                        <a:lnSpc>
+                          <a:spcPts val="1200"/>
+                        </a:lnSpc>
+                        <a:spcAft>
+                          <a:spcPts val="0"/>
+                        </a:spcAft>
+                      </a:pPr>
+                      <a:r>
+                        <a:rPr lang="pt-BR" sz="1000">
+                          <a:effectLst/>
+                        </a:rPr>
+                        <a:t>Avaliar Teste</a:t>
+                      </a:r>
+                      <a:endParaRPr lang="pt-BR" sz="1000">
+                        <a:effectLst/>
+                        <a:latin typeface="Times New Roman"/>
+                        <a:ea typeface="Times New Roman"/>
+                      </a:endParaRPr>
+                    </a:p>
+                  </a:txBody>
+                  <a:tcPr marL="68580" marR="68580" marT="0" marB="0"/>
+                </a:tc>
+                <a:tc>
+                  <a:txBody>
+                    <a:bodyPr/>
+                    <a:lstStyle/>
+                    <a:p>
+                      <a:pPr>
+                        <a:lnSpc>
+                          <a:spcPts val="1200"/>
+                        </a:lnSpc>
+                        <a:spcAft>
+                          <a:spcPts val="0"/>
+                        </a:spcAft>
+                      </a:pPr>
+                      <a:r>
+                        <a:rPr lang="pt-BR" sz="1000">
+                          <a:effectLst/>
+                        </a:rPr>
+                        <a:t>17/10/2013</a:t>
+                      </a:r>
+                      <a:endParaRPr lang="pt-BR" sz="1000">
+                        <a:effectLst/>
+                        <a:latin typeface="Times New Roman"/>
+                        <a:ea typeface="Times New Roman"/>
+                      </a:endParaRPr>
+                    </a:p>
+                  </a:txBody>
+                  <a:tcPr marL="68580" marR="68580" marT="0" marB="0"/>
+                </a:tc>
+                <a:tc>
+                  <a:txBody>
+                    <a:bodyPr/>
+                    <a:lstStyle/>
+                    <a:p>
+                      <a:pPr>
+                        <a:lnSpc>
+                          <a:spcPts val="1200"/>
+                        </a:lnSpc>
+                        <a:spcAft>
+                          <a:spcPts val="0"/>
+                        </a:spcAft>
+                      </a:pPr>
+                      <a:r>
+                        <a:rPr lang="pt-BR" sz="1000">
+                          <a:effectLst/>
+                        </a:rPr>
+                        <a:t>06/10/2013</a:t>
+                      </a:r>
+                      <a:endParaRPr lang="pt-BR" sz="1000">
+                        <a:effectLst/>
+                        <a:latin typeface="Times New Roman"/>
+                        <a:ea typeface="Times New Roman"/>
+                      </a:endParaRPr>
+                    </a:p>
+                  </a:txBody>
+                  <a:tcPr marL="68580" marR="68580" marT="0" marB="0"/>
+                </a:tc>
+              </a:tr>
+              <a:tr h="627498">
+                <a:tc>
+                  <a:txBody>
+                    <a:bodyPr/>
+                    <a:lstStyle/>
+                    <a:p>
+                      <a:pPr>
+                        <a:lnSpc>
+                          <a:spcPts val="1200"/>
+                        </a:lnSpc>
+                        <a:spcAft>
+                          <a:spcPts val="0"/>
+                        </a:spcAft>
+                      </a:pPr>
+                      <a:r>
+                        <a:rPr lang="pt-BR" sz="1000" dirty="0">
+                          <a:effectLst/>
+                        </a:rPr>
+                        <a:t>Entrega do Release final</a:t>
+                      </a:r>
+                      <a:endParaRPr lang="pt-BR" sz="1000" dirty="0">
+                        <a:effectLst/>
+                        <a:latin typeface="Times New Roman"/>
+                        <a:ea typeface="Times New Roman"/>
+                      </a:endParaRPr>
+                    </a:p>
+                  </a:txBody>
+                  <a:tcPr marL="68580" marR="68580" marT="0" marB="0"/>
+                </a:tc>
+                <a:tc>
+                  <a:txBody>
+                    <a:bodyPr/>
+                    <a:lstStyle/>
+                    <a:p>
+                      <a:pPr>
+                        <a:lnSpc>
+                          <a:spcPts val="1200"/>
+                        </a:lnSpc>
+                        <a:spcAft>
+                          <a:spcPts val="0"/>
+                        </a:spcAft>
+                      </a:pPr>
+                      <a:r>
+                        <a:rPr lang="pt-BR" sz="1000">
+                          <a:effectLst/>
+                        </a:rPr>
+                        <a:t>07</a:t>
+                      </a:r>
+                      <a:r>
+                        <a:rPr lang="en-US" sz="1000">
+                          <a:effectLst/>
+                        </a:rPr>
+                        <a:t>/11/2013</a:t>
+                      </a:r>
+                      <a:endParaRPr lang="pt-BR" sz="1000">
+                        <a:effectLst/>
+                        <a:latin typeface="Times New Roman"/>
+                        <a:ea typeface="Times New Roman"/>
+                      </a:endParaRPr>
+                    </a:p>
+                  </a:txBody>
+                  <a:tcPr marL="68580" marR="68580" marT="0" marB="0"/>
+                </a:tc>
+                <a:tc>
+                  <a:txBody>
+                    <a:bodyPr/>
+                    <a:lstStyle/>
+                    <a:p>
+                      <a:pPr>
+                        <a:lnSpc>
+                          <a:spcPts val="1200"/>
+                        </a:lnSpc>
+                        <a:spcAft>
+                          <a:spcPts val="0"/>
+                        </a:spcAft>
+                      </a:pPr>
+                      <a:r>
+                        <a:rPr lang="pt-BR" sz="1000" dirty="0">
+                          <a:effectLst/>
+                        </a:rPr>
+                        <a:t>21/11/2013</a:t>
+                      </a:r>
+                      <a:endParaRPr lang="pt-BR" sz="1000" dirty="0">
+                        <a:effectLst/>
+                        <a:latin typeface="Times New Roman"/>
+                        <a:ea typeface="Times New Roman"/>
+                      </a:endParaRPr>
+                    </a:p>
+                  </a:txBody>
+                  <a:tcPr marL="68580" marR="68580" marT="0" marB="0"/>
+                </a:tc>
+              </a:tr>
+            </a:tbl>
+          </a:graphicData>
+        </a:graphic>
+      </p:graphicFrame>
     </p:spTree>
     <p:extLst>
       <p:ext uri="{BB962C8B-B14F-4D97-AF65-F5344CB8AC3E}">
-        <p14:creationId xmlns:p14="http://schemas.microsoft.com/office/powerpoint/2010/main" val="4091845372"/>
+        <p14:creationId xmlns:p14="http://schemas.microsoft.com/office/powerpoint/2010/main" val="3676793758"/>
       </p:ext>
     </p:extLst>
   </p:cSld>
@@ -11201,6 +11825,13 @@
       </p:transition>
     </mc:Fallback>
   </mc:AlternateContent>
+  <p:timing>
+    <p:tnLst>
+      <p:par>
+        <p:cTn id="1" dur="indefinite" restart="never" nodeType="tmRoot"/>
+      </p:par>
+    </p:tnLst>
+  </p:timing>
 </p:sld>
 </file>
 
@@ -11250,6 +11881,128 @@
       </p:sp>
       <p:sp>
         <p:nvSpPr>
+          <p:cNvPr id="8" name="Retângulo 7"/>
+          <p:cNvSpPr/>
+          <p:nvPr/>
+        </p:nvSpPr>
+        <p:spPr>
+          <a:xfrm>
+            <a:off x="479376" y="3284984"/>
+            <a:ext cx="10945216" cy="1200329"/>
+          </a:xfrm>
+          <a:prstGeom prst="rect">
+            <a:avLst/>
+          </a:prstGeom>
+        </p:spPr>
+        <p:txBody>
+          <a:bodyPr wrap="square">
+            <a:spAutoFit/>
+          </a:bodyPr>
+          <a:lstStyle/>
+          <a:p>
+            <a:r>
+              <a:rPr lang="pt-BR" dirty="0"/>
+              <a:t>Objetivo:</a:t>
+            </a:r>
+          </a:p>
+          <a:p>
+            <a:r>
+              <a:rPr lang="pt-BR" dirty="0"/>
+              <a:t>– Identificar e descrever os casos de teste para cada build, e</a:t>
+            </a:r>
+          </a:p>
+          <a:p>
+            <a:r>
+              <a:rPr lang="pt-BR" dirty="0"/>
+              <a:t>identificar e estruturar os procedimentos de teste, especificando</a:t>
+            </a:r>
+          </a:p>
+          <a:p>
+            <a:r>
+              <a:rPr lang="pt-BR" dirty="0"/>
+              <a:t>como executar os casos de teste.</a:t>
+            </a:r>
+          </a:p>
+        </p:txBody>
+      </p:sp>
+    </p:spTree>
+    <p:extLst>
+      <p:ext uri="{BB962C8B-B14F-4D97-AF65-F5344CB8AC3E}">
+        <p14:creationId xmlns:p14="http://schemas.microsoft.com/office/powerpoint/2010/main" val="4091845372"/>
+      </p:ext>
+    </p:extLst>
+  </p:cSld>
+  <p:clrMapOvr>
+    <a:masterClrMapping/>
+  </p:clrMapOvr>
+  <mc:AlternateContent xmlns:mc="http://schemas.openxmlformats.org/markup-compatibility/2006" xmlns:p14="http://schemas.microsoft.com/office/powerpoint/2010/main">
+    <mc:Choice Requires="p14">
+      <p:transition spd="med" p14:dur="700">
+        <p:fade/>
+      </p:transition>
+    </mc:Choice>
+    <mc:Fallback xmlns="">
+      <p:transition spd="med">
+        <p:fade/>
+      </p:transition>
+    </mc:Fallback>
+  </mc:AlternateContent>
+  <p:timing>
+    <p:tnLst>
+      <p:par>
+        <p:cTn id="1" dur="indefinite" restart="never" nodeType="tmRoot"/>
+      </p:par>
+    </p:tnLst>
+  </p:timing>
+</p:sld>
+</file>
+
+<file path=ppt/slides/slide12.xml><?xml version="1.0" encoding="utf-8"?>
+<p:sld xmlns:a="http://schemas.openxmlformats.org/drawingml/2006/main" xmlns:r="http://schemas.openxmlformats.org/officeDocument/2006/relationships" xmlns:p="http://schemas.openxmlformats.org/presentationml/2006/main">
+  <p:cSld>
+    <p:spTree>
+      <p:nvGrpSpPr>
+        <p:cNvPr id="1" name=""/>
+        <p:cNvGrpSpPr/>
+        <p:nvPr/>
+      </p:nvGrpSpPr>
+      <p:grpSpPr>
+        <a:xfrm>
+          <a:off x="0" y="0"/>
+          <a:ext cx="0" cy="0"/>
+          <a:chOff x="0" y="0"/>
+          <a:chExt cx="0" cy="0"/>
+        </a:xfrm>
+      </p:grpSpPr>
+      <p:sp>
+        <p:nvSpPr>
+          <p:cNvPr id="5" name="Título 4"/>
+          <p:cNvSpPr>
+            <a:spLocks noGrp="1"/>
+          </p:cNvSpPr>
+          <p:nvPr>
+            <p:ph type="title"/>
+          </p:nvPr>
+        </p:nvSpPr>
+        <p:spPr/>
+        <p:txBody>
+          <a:bodyPr/>
+          <a:lstStyle/>
+          <a:p>
+            <a:r>
+              <a:rPr lang="pt-BR" sz="3600" dirty="0">
+                <a:solidFill>
+                  <a:srgbClr val="263050"/>
+                </a:solidFill>
+              </a:rPr>
+              <a:t>Projeto de teste</a:t>
+            </a:r>
+            <a:endParaRPr lang="pt-BR" dirty="0"/>
+          </a:p>
+        </p:txBody>
+      </p:sp>
+      <p:sp>
+        <p:nvSpPr>
           <p:cNvPr id="2" name="Retângulo 1"/>
           <p:cNvSpPr/>
           <p:nvPr/>
@@ -11352,10 +12105,17 @@
       </p:transition>
     </mc:Fallback>
   </mc:AlternateContent>
+  <p:timing>
+    <p:tnLst>
+      <p:par>
+        <p:cTn id="1" dur="indefinite" restart="never" nodeType="tmRoot"/>
+      </p:par>
+    </p:tnLst>
+  </p:timing>
 </p:sld>
 </file>
 
-<file path=ppt/slides/slide12.xml><?xml version="1.0" encoding="utf-8"?>
+<file path=ppt/slides/slide13.xml><?xml version="1.0" encoding="utf-8"?>
 <p:sld xmlns:a="http://schemas.openxmlformats.org/drawingml/2006/main" xmlns:r="http://schemas.openxmlformats.org/officeDocument/2006/relationships" xmlns:p="http://schemas.openxmlformats.org/presentationml/2006/main">
   <p:cSld>
     <p:spTree>
@@ -11479,10 +12239,17 @@
       </p:transition>
     </mc:Fallback>
   </mc:AlternateContent>
+  <p:timing>
+    <p:tnLst>
+      <p:par>
+        <p:cTn id="1" dur="indefinite" restart="never" nodeType="tmRoot"/>
+      </p:par>
+    </p:tnLst>
+  </p:timing>
 </p:sld>
 </file>
 
-<file path=ppt/slides/slide13.xml><?xml version="1.0" encoding="utf-8"?>
+<file path=ppt/slides/slide14.xml><?xml version="1.0" encoding="utf-8"?>
 <p:sld xmlns:a="http://schemas.openxmlformats.org/drawingml/2006/main" xmlns:r="http://schemas.openxmlformats.org/officeDocument/2006/relationships" xmlns:p="http://schemas.openxmlformats.org/presentationml/2006/main">
   <p:cSld>
     <p:spTree>
@@ -11703,10 +12470,17 @@
       </p:transition>
     </mc:Fallback>
   </mc:AlternateContent>
+  <p:timing>
+    <p:tnLst>
+      <p:par>
+        <p:cTn id="1" dur="indefinite" restart="never" nodeType="tmRoot"/>
+      </p:par>
+    </p:tnLst>
+  </p:timing>
 </p:sld>
 </file>
 
-<file path=ppt/slides/slide14.xml><?xml version="1.0" encoding="utf-8"?>
+<file path=ppt/slides/slide15.xml><?xml version="1.0" encoding="utf-8"?>
 <p:sld xmlns:a="http://schemas.openxmlformats.org/drawingml/2006/main" xmlns:r="http://schemas.openxmlformats.org/officeDocument/2006/relationships" xmlns:p="http://schemas.openxmlformats.org/presentationml/2006/main">
   <p:cSld>
     <p:spTree>
@@ -11885,157 +12659,13 @@
       </p:transition>
     </mc:Fallback>
   </mc:AlternateContent>
-</p:sld>
-</file>
-
-<file path=ppt/slides/slide15.xml><?xml version="1.0" encoding="utf-8"?>
-<p:sld xmlns:a="http://schemas.openxmlformats.org/drawingml/2006/main" xmlns:r="http://schemas.openxmlformats.org/officeDocument/2006/relationships" xmlns:p="http://schemas.openxmlformats.org/presentationml/2006/main">
-  <p:cSld>
-    <p:spTree>
-      <p:nvGrpSpPr>
-        <p:cNvPr id="1" name=""/>
-        <p:cNvGrpSpPr/>
-        <p:nvPr/>
-      </p:nvGrpSpPr>
-      <p:grpSpPr>
-        <a:xfrm>
-          <a:off x="0" y="0"/>
-          <a:ext cx="0" cy="0"/>
-          <a:chOff x="0" y="0"/>
-          <a:chExt cx="0" cy="0"/>
-        </a:xfrm>
-      </p:grpSpPr>
-      <p:sp>
-        <p:nvSpPr>
-          <p:cNvPr id="2" name="Título 1"/>
-          <p:cNvSpPr>
-            <a:spLocks noGrp="1"/>
-          </p:cNvSpPr>
-          <p:nvPr>
-            <p:ph type="title"/>
-          </p:nvPr>
-        </p:nvSpPr>
-        <p:spPr/>
-        <p:txBody>
-          <a:bodyPr/>
-          <a:lstStyle/>
-          <a:p>
-            <a:r>
-              <a:rPr lang="pt-BR" dirty="0"/>
-              <a:t>Gerar planilha de </a:t>
-            </a:r>
-            <a:r>
-              <a:rPr lang="pt-BR" dirty="0" smtClean="0"/>
-              <a:t>testes</a:t>
-            </a:r>
-            <a:r>
-              <a:rPr lang="pt-BR" dirty="0"/>
-              <a:t/>
-            </a:r>
-            <a:br>
-              <a:rPr lang="pt-BR" dirty="0"/>
-            </a:br>
-            <a:endParaRPr lang="pt-BR" dirty="0"/>
-          </a:p>
-        </p:txBody>
-      </p:sp>
-      <p:sp>
-        <p:nvSpPr>
-          <p:cNvPr id="3" name="Retângulo 2"/>
-          <p:cNvSpPr/>
-          <p:nvPr/>
-        </p:nvSpPr>
-        <p:spPr>
-          <a:xfrm>
-            <a:off x="551384" y="2136339"/>
-            <a:ext cx="8592616" cy="2308324"/>
-          </a:xfrm>
-          <a:prstGeom prst="rect">
-            <a:avLst/>
-          </a:prstGeom>
-        </p:spPr>
-        <p:txBody>
-          <a:bodyPr wrap="square">
-            <a:spAutoFit/>
-          </a:bodyPr>
-          <a:lstStyle/>
-          <a:p>
-            <a:r>
-              <a:rPr lang="pt-BR" dirty="0"/>
-              <a:t>Gerar planilha de testes:</a:t>
-            </a:r>
-          </a:p>
-          <a:p>
-            <a:r>
-              <a:rPr lang="pt-BR" dirty="0"/>
-              <a:t>– Nas planilhas devem estar contidos todos os casos de testes que</a:t>
-            </a:r>
-          </a:p>
-          <a:p>
-            <a:r>
-              <a:rPr lang="pt-BR" dirty="0"/>
-              <a:t>serão </a:t>
-            </a:r>
-            <a:r>
-              <a:rPr lang="pt-BR" dirty="0" smtClean="0"/>
-              <a:t>executados.</a:t>
-            </a:r>
-            <a:endParaRPr lang="pt-BR" dirty="0"/>
-          </a:p>
-          <a:p>
-            <a:r>
-              <a:rPr lang="pt-BR" dirty="0"/>
-              <a:t>– Informações sobre o ciclo de teste são necessários:</a:t>
-            </a:r>
-          </a:p>
-          <a:p>
-            <a:r>
-              <a:rPr lang="pt-BR" dirty="0"/>
-              <a:t>• Versão do Software</a:t>
-            </a:r>
-          </a:p>
-          <a:p>
-            <a:r>
-              <a:rPr lang="pt-BR" dirty="0"/>
-              <a:t>• Data Início e Fim</a:t>
-            </a:r>
-          </a:p>
-          <a:p>
-            <a:r>
-              <a:rPr lang="pt-BR" dirty="0"/>
-              <a:t>• Nome do Testador</a:t>
-            </a:r>
-          </a:p>
-          <a:p>
-            <a:r>
-              <a:rPr lang="pt-BR" dirty="0"/>
-              <a:t>• Casos de testes planejados</a:t>
-            </a:r>
-          </a:p>
-        </p:txBody>
-      </p:sp>
-    </p:spTree>
-    <p:extLst>
-      <p:ext uri="{BB962C8B-B14F-4D97-AF65-F5344CB8AC3E}">
-        <p14:creationId xmlns:p14="http://schemas.microsoft.com/office/powerpoint/2010/main" val="1306253914"/>
-      </p:ext>
-    </p:extLst>
-  </p:cSld>
-  <p:clrMapOvr>
-    <a:masterClrMapping/>
-  </p:clrMapOvr>
-  <mc:AlternateContent xmlns:mc="http://schemas.openxmlformats.org/markup-compatibility/2006" xmlns:p14="http://schemas.microsoft.com/office/powerpoint/2010/main">
-    <mc:Choice Requires="p14">
-      <p:transition spd="med" p14:dur="700">
-        <p:fade/>
-      </p:transition>
-    </mc:Choice>
-    <mc:Fallback xmlns="">
-      <p:transition spd="med">
-        <p:fade/>
-      </p:transition>
-    </mc:Fallback>
-  </mc:AlternateContent>
+  <p:timing>
+    <p:tnLst>
+      <p:par>
+        <p:cTn id="1" dur="indefinite" restart="never" nodeType="tmRoot"/>
+      </p:par>
+    </p:tnLst>
+  </p:timing>
 </p:sld>
 </file>
 
@@ -12072,19 +12702,19 @@
           <a:lstStyle/>
           <a:p>
             <a:r>
-              <a:rPr lang="pt-BR" dirty="0">
-                <a:solidFill>
-                  <a:srgbClr val="263050"/>
-                </a:solidFill>
-              </a:rPr>
-              <a:t>Registro de solicitação de mudanças </a:t>
+              <a:rPr lang="pt-BR" dirty="0"/>
+              <a:t>Gerar planilha de </a:t>
+            </a:r>
+            <a:r>
+              <a:rPr lang="pt-BR" dirty="0" smtClean="0"/>
+              <a:t>testes</a:t>
+            </a:r>
+            <a:r>
+              <a:rPr lang="pt-BR" dirty="0"/>
+              <a:t/>
             </a:r>
             <a:br>
-              <a:rPr lang="pt-BR" dirty="0">
-                <a:solidFill>
-                  <a:srgbClr val="263050"/>
-                </a:solidFill>
-              </a:rPr>
+              <a:rPr lang="pt-BR" dirty="0"/>
             </a:br>
             <a:endParaRPr lang="pt-BR" dirty="0"/>
           </a:p>
@@ -12092,14 +12722,14 @@
       </p:sp>
       <p:sp>
         <p:nvSpPr>
-          <p:cNvPr id="5" name="Retângulo 4"/>
+          <p:cNvPr id="3" name="Retângulo 2"/>
           <p:cNvSpPr/>
           <p:nvPr/>
         </p:nvSpPr>
         <p:spPr>
           <a:xfrm>
-            <a:off x="1199282" y="2132856"/>
-            <a:ext cx="7944544" cy="3170099"/>
+            <a:off x="551384" y="2136339"/>
+            <a:ext cx="8592616" cy="2308324"/>
           </a:xfrm>
           <a:prstGeom prst="rect">
             <a:avLst/>
@@ -12112,177 +12742,55 @@
           <a:lstStyle/>
           <a:p>
             <a:r>
-              <a:rPr lang="pt-BR" sz="2000" dirty="0" smtClean="0"/>
-              <a:t>Algumas informações</a:t>
-            </a:r>
-            <a:r>
-              <a:rPr lang="pt-BR" sz="2000" dirty="0"/>
-              <a:t> </a:t>
-            </a:r>
-            <a:r>
-              <a:rPr lang="pt-BR" sz="2000" dirty="0" smtClean="0"/>
-              <a:t>que</a:t>
-            </a:r>
-            <a:r>
-              <a:rPr lang="pt-BR" sz="2000" dirty="0"/>
-              <a:t> </a:t>
-            </a:r>
-            <a:r>
-              <a:rPr lang="pt-BR" sz="2000" dirty="0" smtClean="0"/>
-              <a:t>podem</a:t>
-            </a:r>
-            <a:r>
-              <a:rPr lang="pt-BR" sz="2000" dirty="0"/>
-              <a:t> </a:t>
-            </a:r>
-            <a:r>
-              <a:rPr lang="pt-BR" sz="2000" dirty="0" smtClean="0"/>
-              <a:t>estar</a:t>
-            </a:r>
-            <a:r>
-              <a:rPr lang="pt-BR" sz="2000" dirty="0"/>
-              <a:t> </a:t>
-            </a:r>
-            <a:r>
-              <a:rPr lang="pt-BR" sz="2000" dirty="0" smtClean="0"/>
-              <a:t>incluídas</a:t>
-            </a:r>
-            <a:r>
-              <a:rPr lang="pt-BR" sz="2000" dirty="0"/>
-              <a:t> </a:t>
-            </a:r>
-            <a:r>
-              <a:rPr lang="pt-BR" sz="2000" dirty="0" smtClean="0"/>
-              <a:t>em</a:t>
-            </a:r>
-            <a:r>
-              <a:rPr lang="pt-BR" sz="2000" dirty="0"/>
-              <a:t> </a:t>
-            </a:r>
-            <a:r>
-              <a:rPr lang="pt-BR" sz="2000" dirty="0" smtClean="0"/>
-              <a:t>uma</a:t>
-            </a:r>
-            <a:endParaRPr lang="pt-BR" sz="2000" dirty="0"/>
-          </a:p>
-          <a:p>
-            <a:r>
-              <a:rPr lang="pt-BR" sz="2000" dirty="0"/>
-              <a:t>SM:</a:t>
-            </a:r>
-          </a:p>
-          <a:p>
-            <a:r>
-              <a:rPr lang="pt-BR" sz="2000" dirty="0"/>
-              <a:t>– </a:t>
-            </a:r>
-            <a:r>
-              <a:rPr lang="pt-BR" sz="2000" dirty="0" err="1" smtClean="0"/>
-              <a:t>Identicação</a:t>
-            </a:r>
-            <a:r>
-              <a:rPr lang="pt-BR" sz="2000" dirty="0" smtClean="0"/>
-              <a:t> única</a:t>
-            </a:r>
-            <a:endParaRPr lang="pt-BR" sz="2000" dirty="0"/>
-          </a:p>
-          <a:p>
-            <a:r>
-              <a:rPr lang="pt-BR" sz="2000" dirty="0"/>
-              <a:t>– Solicitante</a:t>
-            </a:r>
-          </a:p>
-          <a:p>
-            <a:r>
-              <a:rPr lang="pt-BR" sz="2000" dirty="0"/>
-              <a:t>– </a:t>
-            </a:r>
-            <a:r>
-              <a:rPr lang="pt-BR" sz="2000" dirty="0" smtClean="0"/>
-              <a:t>Sistema/Projeto</a:t>
-            </a:r>
-          </a:p>
-          <a:p>
-            <a:r>
-              <a:rPr lang="pt-BR" sz="2000" dirty="0"/>
-              <a:t>– </a:t>
-            </a:r>
-            <a:r>
-              <a:rPr lang="pt-BR" sz="2000" dirty="0" smtClean="0"/>
-              <a:t>Item a</a:t>
-            </a:r>
-            <a:r>
-              <a:rPr lang="pt-BR" sz="2000" dirty="0"/>
-              <a:t> </a:t>
-            </a:r>
-            <a:r>
-              <a:rPr lang="pt-BR" sz="2000" dirty="0" smtClean="0"/>
-              <a:t>ser</a:t>
-            </a:r>
-            <a:r>
-              <a:rPr lang="pt-BR" sz="2000" dirty="0"/>
-              <a:t> </a:t>
-            </a:r>
-            <a:r>
-              <a:rPr lang="pt-BR" sz="2000" dirty="0" smtClean="0"/>
-              <a:t>modificado</a:t>
-            </a:r>
-            <a:endParaRPr lang="pt-BR" sz="2000" dirty="0"/>
-          </a:p>
-          <a:p>
-            <a:r>
-              <a:rPr lang="pt-BR" sz="2000" dirty="0"/>
-              <a:t>– </a:t>
-            </a:r>
-            <a:r>
-              <a:rPr lang="pt-BR" sz="2000" dirty="0" smtClean="0"/>
-              <a:t>Classificação (melhoria, correção</a:t>
-            </a:r>
-            <a:r>
-              <a:rPr lang="pt-BR" sz="2000" dirty="0"/>
-              <a:t> </a:t>
-            </a:r>
-            <a:r>
-              <a:rPr lang="pt-BR" sz="2000" dirty="0" smtClean="0"/>
-              <a:t>de</a:t>
-            </a:r>
-            <a:r>
-              <a:rPr lang="pt-BR" sz="2000" dirty="0"/>
-              <a:t> </a:t>
-            </a:r>
-            <a:r>
-              <a:rPr lang="pt-BR" sz="2000" dirty="0" smtClean="0"/>
-              <a:t>defeito, outra</a:t>
-            </a:r>
-            <a:r>
-              <a:rPr lang="pt-BR" sz="2000" dirty="0"/>
-              <a:t>)</a:t>
-            </a:r>
-          </a:p>
-          <a:p>
-            <a:r>
-              <a:rPr lang="pt-BR" sz="2000" dirty="0"/>
-              <a:t>– Prioridade</a:t>
-            </a:r>
-          </a:p>
-          <a:p>
-            <a:r>
-              <a:rPr lang="pt-BR" sz="2000" dirty="0"/>
-              <a:t>– Descrição</a:t>
-            </a:r>
-          </a:p>
-          <a:p>
-            <a:r>
-              <a:rPr lang="pt-BR" sz="2000" dirty="0"/>
-              <a:t>– </a:t>
-            </a:r>
-            <a:r>
-              <a:rPr lang="pt-BR" sz="2000" dirty="0" smtClean="0"/>
-              <a:t>Situação (nova, atribuída, finalizada, verificada, fechada</a:t>
-            </a:r>
-            <a:r>
-              <a:rPr lang="pt-BR" sz="2000" dirty="0"/>
-              <a:t>)</a:t>
+              <a:rPr lang="pt-BR" dirty="0"/>
+              <a:t>Gerar planilha de testes:</a:t>
+            </a:r>
+          </a:p>
+          <a:p>
+            <a:r>
+              <a:rPr lang="pt-BR" dirty="0"/>
+              <a:t>– Nas planilhas devem estar contidos todos os casos de testes que</a:t>
+            </a:r>
+          </a:p>
+          <a:p>
+            <a:r>
+              <a:rPr lang="pt-BR" dirty="0"/>
+              <a:t>serão </a:t>
+            </a:r>
+            <a:r>
+              <a:rPr lang="pt-BR" dirty="0" smtClean="0"/>
+              <a:t>executados.</a:t>
+            </a:r>
+            <a:endParaRPr lang="pt-BR" dirty="0"/>
+          </a:p>
+          <a:p>
+            <a:r>
+              <a:rPr lang="pt-BR" dirty="0"/>
+              <a:t>– Informações sobre o ciclo de teste são necessários:</a:t>
+            </a:r>
+          </a:p>
+          <a:p>
+            <a:r>
+              <a:rPr lang="pt-BR" dirty="0"/>
+              <a:t>• Versão do Software</a:t>
+            </a:r>
+          </a:p>
+          <a:p>
+            <a:r>
+              <a:rPr lang="pt-BR" dirty="0"/>
+              <a:t>• Data Início e Fim</a:t>
+            </a:r>
+          </a:p>
+          <a:p>
+            <a:r>
+              <a:rPr lang="pt-BR" dirty="0"/>
+              <a:t>• Nome do Testador</a:t>
+            </a:r>
+          </a:p>
+          <a:p>
+            <a:r>
+              <a:rPr lang="pt-BR" dirty="0"/>
+              <a:t>• Casos de testes planejados</a:t>
             </a:r>
           </a:p>
         </p:txBody>
@@ -12290,7 +12798,7 @@
     </p:spTree>
     <p:extLst>
       <p:ext uri="{BB962C8B-B14F-4D97-AF65-F5344CB8AC3E}">
-        <p14:creationId xmlns:p14="http://schemas.microsoft.com/office/powerpoint/2010/main" val="575927025"/>
+        <p14:creationId xmlns:p14="http://schemas.microsoft.com/office/powerpoint/2010/main" val="1306253914"/>
       </p:ext>
     </p:extLst>
   </p:cSld>
@@ -12309,6 +12817,13 @@
       </p:transition>
     </mc:Fallback>
   </mc:AlternateContent>
+  <p:timing>
+    <p:tnLst>
+      <p:par>
+        <p:cTn id="1" dur="indefinite" restart="never" nodeType="tmRoot"/>
+      </p:par>
+    </p:tnLst>
+  </p:timing>
 </p:sld>
 </file>
 
@@ -12344,14 +12859,226 @@
           <a:bodyPr/>
           <a:lstStyle/>
           <a:p>
-            <a:endParaRPr lang="pt-BR"/>
+            <a:r>
+              <a:rPr lang="pt-BR" dirty="0">
+                <a:solidFill>
+                  <a:srgbClr val="263050"/>
+                </a:solidFill>
+              </a:rPr>
+              <a:t>Registro de solicitação de mudanças </a:t>
+            </a:r>
+            <a:br>
+              <a:rPr lang="pt-BR" dirty="0">
+                <a:solidFill>
+                  <a:srgbClr val="263050"/>
+                </a:solidFill>
+              </a:rPr>
+            </a:br>
+            <a:endParaRPr lang="pt-BR" dirty="0"/>
+          </a:p>
+        </p:txBody>
+      </p:sp>
+      <p:sp>
+        <p:nvSpPr>
+          <p:cNvPr id="5" name="Retângulo 4"/>
+          <p:cNvSpPr/>
+          <p:nvPr/>
+        </p:nvSpPr>
+        <p:spPr>
+          <a:xfrm>
+            <a:off x="1199282" y="2132856"/>
+            <a:ext cx="7944544" cy="3170099"/>
+          </a:xfrm>
+          <a:prstGeom prst="rect">
+            <a:avLst/>
+          </a:prstGeom>
+        </p:spPr>
+        <p:txBody>
+          <a:bodyPr wrap="square">
+            <a:spAutoFit/>
+          </a:bodyPr>
+          <a:lstStyle/>
+          <a:p>
+            <a:r>
+              <a:rPr lang="pt-BR" sz="2000" dirty="0" smtClean="0"/>
+              <a:t>Algumas informações</a:t>
+            </a:r>
+            <a:r>
+              <a:rPr lang="pt-BR" sz="2000" dirty="0"/>
+              <a:t> </a:t>
+            </a:r>
+            <a:r>
+              <a:rPr lang="pt-BR" sz="2000" dirty="0" smtClean="0"/>
+              <a:t>que</a:t>
+            </a:r>
+            <a:r>
+              <a:rPr lang="pt-BR" sz="2000" dirty="0"/>
+              <a:t> </a:t>
+            </a:r>
+            <a:r>
+              <a:rPr lang="pt-BR" sz="2000" dirty="0" smtClean="0"/>
+              <a:t>podem</a:t>
+            </a:r>
+            <a:r>
+              <a:rPr lang="pt-BR" sz="2000" dirty="0"/>
+              <a:t> </a:t>
+            </a:r>
+            <a:r>
+              <a:rPr lang="pt-BR" sz="2000" dirty="0" smtClean="0"/>
+              <a:t>estar</a:t>
+            </a:r>
+            <a:r>
+              <a:rPr lang="pt-BR" sz="2000" dirty="0"/>
+              <a:t> </a:t>
+            </a:r>
+            <a:r>
+              <a:rPr lang="pt-BR" sz="2000" dirty="0" smtClean="0"/>
+              <a:t>incluídas</a:t>
+            </a:r>
+            <a:r>
+              <a:rPr lang="pt-BR" sz="2000" dirty="0"/>
+              <a:t> </a:t>
+            </a:r>
+            <a:r>
+              <a:rPr lang="pt-BR" sz="2000" dirty="0" smtClean="0"/>
+              <a:t>em</a:t>
+            </a:r>
+            <a:r>
+              <a:rPr lang="pt-BR" sz="2000" dirty="0"/>
+              <a:t> </a:t>
+            </a:r>
+            <a:r>
+              <a:rPr lang="pt-BR" sz="2000" dirty="0" smtClean="0"/>
+              <a:t>uma</a:t>
+            </a:r>
+            <a:endParaRPr lang="pt-BR" sz="2000" dirty="0"/>
+          </a:p>
+          <a:p>
+            <a:r>
+              <a:rPr lang="pt-BR" sz="2000" dirty="0"/>
+              <a:t>SM:</a:t>
+            </a:r>
+          </a:p>
+          <a:p>
+            <a:r>
+              <a:rPr lang="pt-BR" sz="2000" dirty="0"/>
+              <a:t>– </a:t>
+            </a:r>
+            <a:r>
+              <a:rPr lang="pt-BR" sz="2000" dirty="0" err="1" smtClean="0"/>
+              <a:t>Identicação</a:t>
+            </a:r>
+            <a:r>
+              <a:rPr lang="pt-BR" sz="2000" dirty="0" smtClean="0"/>
+              <a:t> única</a:t>
+            </a:r>
+            <a:endParaRPr lang="pt-BR" sz="2000" dirty="0"/>
+          </a:p>
+          <a:p>
+            <a:r>
+              <a:rPr lang="pt-BR" sz="2000" dirty="0"/>
+              <a:t>– Solicitante</a:t>
+            </a:r>
+          </a:p>
+          <a:p>
+            <a:r>
+              <a:rPr lang="pt-BR" sz="2000" dirty="0"/>
+              <a:t>– </a:t>
+            </a:r>
+            <a:r>
+              <a:rPr lang="pt-BR" sz="2000" dirty="0" smtClean="0"/>
+              <a:t>Sistema/Projeto</a:t>
+            </a:r>
+          </a:p>
+          <a:p>
+            <a:r>
+              <a:rPr lang="pt-BR" sz="2000" dirty="0"/>
+              <a:t>– </a:t>
+            </a:r>
+            <a:r>
+              <a:rPr lang="pt-BR" sz="2000" dirty="0" smtClean="0"/>
+              <a:t>Item a</a:t>
+            </a:r>
+            <a:r>
+              <a:rPr lang="pt-BR" sz="2000" dirty="0"/>
+              <a:t> </a:t>
+            </a:r>
+            <a:r>
+              <a:rPr lang="pt-BR" sz="2000" dirty="0" smtClean="0"/>
+              <a:t>ser</a:t>
+            </a:r>
+            <a:r>
+              <a:rPr lang="pt-BR" sz="2000" dirty="0"/>
+              <a:t> </a:t>
+            </a:r>
+            <a:r>
+              <a:rPr lang="pt-BR" sz="2000" dirty="0" smtClean="0"/>
+              <a:t>modificado</a:t>
+            </a:r>
+            <a:endParaRPr lang="pt-BR" sz="2000" dirty="0"/>
+          </a:p>
+          <a:p>
+            <a:r>
+              <a:rPr lang="pt-BR" sz="2000" dirty="0"/>
+              <a:t>– </a:t>
+            </a:r>
+            <a:r>
+              <a:rPr lang="pt-BR" sz="2000" dirty="0" smtClean="0"/>
+              <a:t>Classificação (melhoria, correção</a:t>
+            </a:r>
+            <a:r>
+              <a:rPr lang="pt-BR" sz="2000" dirty="0"/>
+              <a:t> </a:t>
+            </a:r>
+            <a:r>
+              <a:rPr lang="pt-BR" sz="2000" dirty="0" smtClean="0"/>
+              <a:t>de</a:t>
+            </a:r>
+            <a:r>
+              <a:rPr lang="pt-BR" sz="2000" dirty="0"/>
+              <a:t> </a:t>
+            </a:r>
+            <a:r>
+              <a:rPr lang="pt-BR" sz="2000" dirty="0" smtClean="0"/>
+              <a:t>defeito, outra</a:t>
+            </a:r>
+            <a:r>
+              <a:rPr lang="pt-BR" sz="2000" dirty="0"/>
+              <a:t>)</a:t>
+            </a:r>
+          </a:p>
+          <a:p>
+            <a:r>
+              <a:rPr lang="pt-BR" sz="2000" dirty="0"/>
+              <a:t>– Prioridade</a:t>
+            </a:r>
+          </a:p>
+          <a:p>
+            <a:r>
+              <a:rPr lang="pt-BR" sz="2000" dirty="0"/>
+              <a:t>– Descrição</a:t>
+            </a:r>
+          </a:p>
+          <a:p>
+            <a:r>
+              <a:rPr lang="pt-BR" sz="2000" dirty="0"/>
+              <a:t>– </a:t>
+            </a:r>
+            <a:r>
+              <a:rPr lang="pt-BR" sz="2000" dirty="0" smtClean="0"/>
+              <a:t>Situação (nova, atribuída, finalizada, verificada, fechada</a:t>
+            </a:r>
+            <a:r>
+              <a:rPr lang="pt-BR" sz="2000" dirty="0"/>
+              <a:t>)</a:t>
+            </a:r>
           </a:p>
         </p:txBody>
       </p:sp>
     </p:spTree>
     <p:extLst>
       <p:ext uri="{BB962C8B-B14F-4D97-AF65-F5344CB8AC3E}">
-        <p14:creationId xmlns:p14="http://schemas.microsoft.com/office/powerpoint/2010/main" val="2390380856"/>
+        <p14:creationId xmlns:p14="http://schemas.microsoft.com/office/powerpoint/2010/main" val="575927025"/>
       </p:ext>
     </p:extLst>
   </p:cSld>
@@ -12370,6 +13097,13 @@
       </p:transition>
     </mc:Fallback>
   </mc:AlternateContent>
+  <p:timing>
+    <p:tnLst>
+      <p:par>
+        <p:cTn id="1" dur="indefinite" restart="never" nodeType="tmRoot"/>
+      </p:par>
+    </p:tnLst>
+  </p:timing>
 </p:sld>
 </file>
 
@@ -12959,6 +13693,13 @@
       </p:transition>
     </mc:Fallback>
   </mc:AlternateContent>
+  <p:timing>
+    <p:tnLst>
+      <p:par>
+        <p:cTn id="1" dur="indefinite" restart="never" nodeType="tmRoot"/>
+      </p:par>
+    </p:tnLst>
+  </p:timing>
 </p:sld>
 </file>
 
@@ -13121,6 +13862,13 @@
       </p:transition>
     </mc:Fallback>
   </mc:AlternateContent>
+  <p:timing>
+    <p:tnLst>
+      <p:par>
+        <p:cTn id="1" dur="indefinite" restart="never" nodeType="tmRoot"/>
+      </p:par>
+    </p:tnLst>
+  </p:timing>
 </p:sld>
 </file>
 
@@ -13415,6 +14163,123 @@
           </a:bodyPr>
           <a:lstStyle/>
           <a:p>
+            <a:pPr marL="342900" indent="-342900" algn="l" defTabSz="914400">
+              <a:lnSpc>
+                <a:spcPct val="90000"/>
+              </a:lnSpc>
+              <a:spcBef>
+                <a:spcPts val="1800"/>
+              </a:spcBef>
+              <a:buFont typeface="Arial" pitchFamily="34" charset="0"/>
+              <a:buChar char="•"/>
+            </a:pPr>
+            <a:r>
+              <a:rPr lang="pt-BR" sz="2300" dirty="0" smtClean="0">
+                <a:latin typeface="Corbel"/>
+              </a:rPr>
+              <a:t>O </a:t>
+            </a:r>
+            <a:r>
+              <a:rPr lang="pt-BR" sz="2300" dirty="0" smtClean="0">
+                <a:latin typeface="Corbel"/>
+              </a:rPr>
+              <a:t>Que é o </a:t>
+            </a:r>
+            <a:r>
+              <a:rPr lang="pt-BR" sz="2300" dirty="0" smtClean="0">
+                <a:latin typeface="Corbel"/>
+              </a:rPr>
+              <a:t>sistema </a:t>
+            </a:r>
+            <a:r>
+              <a:rPr lang="pt-BR" sz="2300" dirty="0" smtClean="0">
+                <a:latin typeface="Corbel"/>
+              </a:rPr>
+              <a:t>Internet Bank (SIB</a:t>
+            </a:r>
+            <a:r>
+              <a:rPr lang="pt-BR" sz="2300" dirty="0" smtClean="0">
+                <a:latin typeface="Corbel"/>
+              </a:rPr>
+              <a:t>)</a:t>
+            </a:r>
+            <a:r>
+              <a:rPr lang="en-US" sz="2300" dirty="0" smtClean="0">
+                <a:latin typeface="Corbel"/>
+              </a:rPr>
+              <a:t>?</a:t>
+            </a:r>
+          </a:p>
+          <a:p>
+            <a:pPr marL="342900" indent="-342900" algn="l" defTabSz="914400">
+              <a:lnSpc>
+                <a:spcPct val="90000"/>
+              </a:lnSpc>
+              <a:spcBef>
+                <a:spcPts val="1800"/>
+              </a:spcBef>
+              <a:buFont typeface="Arial" pitchFamily="34" charset="0"/>
+              <a:buChar char="•"/>
+            </a:pPr>
+            <a:r>
+              <a:rPr lang="en-US" sz="2300" dirty="0" smtClean="0">
+                <a:latin typeface="Corbel"/>
+              </a:rPr>
+              <a:t>Para </a:t>
+            </a:r>
+            <a:r>
+              <a:rPr lang="en-US" sz="2300" dirty="0" err="1" smtClean="0">
+                <a:latin typeface="Corbel"/>
+              </a:rPr>
+              <a:t>que</a:t>
+            </a:r>
+            <a:r>
+              <a:rPr lang="en-US" sz="2300" dirty="0" smtClean="0">
+                <a:latin typeface="Corbel"/>
+              </a:rPr>
+              <a:t> </a:t>
+            </a:r>
+            <a:r>
+              <a:rPr lang="en-US" sz="2300" dirty="0" err="1" smtClean="0">
+                <a:latin typeface="Corbel"/>
+              </a:rPr>
+              <a:t>foi</a:t>
+            </a:r>
+            <a:r>
+              <a:rPr lang="en-US" sz="2300" dirty="0" smtClean="0">
+                <a:latin typeface="Corbel"/>
+              </a:rPr>
+              <a:t> </a:t>
+            </a:r>
+            <a:r>
+              <a:rPr lang="pt-BR" sz="2300" dirty="0" smtClean="0">
+                <a:latin typeface="Corbel"/>
+              </a:rPr>
+              <a:t>criado</a:t>
+            </a:r>
+            <a:r>
+              <a:rPr lang="en-US" sz="2300" dirty="0" smtClean="0">
+                <a:latin typeface="Corbel"/>
+              </a:rPr>
+              <a:t> ?</a:t>
+            </a:r>
+          </a:p>
+          <a:p>
+            <a:pPr marL="342900" indent="-342900" algn="l" defTabSz="914400">
+              <a:lnSpc>
+                <a:spcPct val="90000"/>
+              </a:lnSpc>
+              <a:spcBef>
+                <a:spcPts val="1800"/>
+              </a:spcBef>
+              <a:buFont typeface="Arial" pitchFamily="34" charset="0"/>
+              <a:buChar char="•"/>
+            </a:pPr>
+            <a:endParaRPr lang="en-US" sz="2300" dirty="0" smtClean="0">
+              <a:latin typeface="Corbel"/>
+            </a:endParaRPr>
+          </a:p>
+          <a:p>
             <a:pPr marL="0" indent="0" algn="ctr" defTabSz="914400">
               <a:lnSpc>
                 <a:spcPct val="90000"/>
@@ -13424,12 +14289,6 @@
               </a:spcBef>
               <a:buNone/>
             </a:pPr>
-            <a:r>
-              <a:rPr lang="pt-BR" sz="2300" dirty="0" smtClean="0">
-                <a:latin typeface="Corbel"/>
-              </a:rPr>
-              <a:t>O sistema Internet Bank (SIB) é um sistema bancário acessado via internet que oferece aos clientes maior comodidade para realização de consultas, transferências, aplicações e outras operações que o cliente pode realizar sem sair de casa </a:t>
-            </a:r>
             <a:endParaRPr lang="pt-BR" sz="2300" b="0" i="0" baseline="0" dirty="0">
               <a:latin typeface="Corbel"/>
             </a:endParaRPr>
@@ -13576,8 +14435,40 @@
                 </a:solidFill>
                 <a:latin typeface="Corbel"/>
               </a:rPr>
-              <a:t>Plano de teste.</a:t>
-            </a:r>
+              <a:t>Plano de teste</a:t>
+            </a:r>
+            <a:r>
+              <a:rPr lang="pt-BR" dirty="0" smtClean="0">
+                <a:solidFill>
+                  <a:srgbClr val="263050"/>
+                </a:solidFill>
+                <a:latin typeface="Corbel"/>
+              </a:rPr>
+              <a:t>.</a:t>
+            </a:r>
+          </a:p>
+          <a:p>
+            <a:pPr>
+              <a:buClr>
+                <a:srgbClr val="263050"/>
+              </a:buClr>
+              <a:buFont typeface="Wingdings"/>
+              <a:buChar char="§"/>
+            </a:pPr>
+            <a:r>
+              <a:rPr lang="pt-BR" dirty="0"/>
+              <a:t>Estratégia de </a:t>
+            </a:r>
+            <a:r>
+              <a:rPr lang="pt-BR" dirty="0" smtClean="0"/>
+              <a:t>Testes</a:t>
+            </a:r>
+            <a:endParaRPr lang="pt-BR" dirty="0" smtClean="0">
+              <a:solidFill>
+                <a:srgbClr val="263050"/>
+              </a:solidFill>
+              <a:latin typeface="Corbel"/>
+            </a:endParaRPr>
           </a:p>
           <a:p>
             <a:pPr marL="274320" indent="-228600" algn="l" defTabSz="914400">
@@ -13924,6 +14815,135 @@
         </p:nvSpPr>
         <p:spPr>
           <a:xfrm>
+            <a:off x="1341120" y="467360"/>
+            <a:ext cx="9509760" cy="945416"/>
+          </a:xfrm>
+        </p:spPr>
+        <p:txBody>
+          <a:bodyPr/>
+          <a:lstStyle/>
+          <a:p>
+            <a:pPr lvl="1" algn="l" rtl="0">
+              <a:lnSpc>
+                <a:spcPct val="90000"/>
+              </a:lnSpc>
+              <a:spcBef>
+                <a:spcPct val="0"/>
+              </a:spcBef>
+            </a:pPr>
+            <a:r>
+              <a:rPr lang="pt-BR" sz="2800" b="1" dirty="0" err="1"/>
+              <a:t>Macro-Visão</a:t>
+            </a:r>
+            <a:r>
+              <a:rPr lang="pt-BR" sz="2800" b="1" dirty="0"/>
+              <a:t> </a:t>
+            </a:r>
+            <a:r>
+              <a:rPr lang="pt-BR" sz="2800" b="1" dirty="0" smtClean="0"/>
+              <a:t>Funcional do Sistema SIB</a:t>
+            </a:r>
+            <a:r>
+              <a:rPr lang="pt-BR" b="1" dirty="0"/>
+              <a:t/>
+            </a:r>
+            <a:br>
+              <a:rPr lang="pt-BR" b="1" dirty="0"/>
+            </a:br>
+            <a:endParaRPr lang="pt-BR" dirty="0"/>
+          </a:p>
+        </p:txBody>
+      </p:sp>
+      <p:pic>
+        <p:nvPicPr>
+          <p:cNvPr id="5" name="Espaço Reservado para Conteúdo 4"/>
+          <p:cNvPicPr>
+            <a:picLocks noGrp="1" noChangeAspect="1"/>
+          </p:cNvPicPr>
+          <p:nvPr>
+            <p:ph idx="1"/>
+          </p:nvPr>
+        </p:nvPicPr>
+        <p:blipFill>
+          <a:blip r:embed="rId2">
+            <a:extLst>
+              <a:ext uri="{28A0092B-C50C-407E-A947-70E740481C1C}">
+                <a14:useLocalDpi xmlns:a14="http://schemas.microsoft.com/office/drawing/2010/main" val="0"/>
+              </a:ext>
+            </a:extLst>
+          </a:blip>
+          <a:stretch>
+            <a:fillRect/>
+          </a:stretch>
+        </p:blipFill>
+        <p:spPr>
+          <a:xfrm>
+            <a:off x="335360" y="1484784"/>
+            <a:ext cx="11521280" cy="4968552"/>
+          </a:xfrm>
+        </p:spPr>
+      </p:pic>
+    </p:spTree>
+    <p:extLst>
+      <p:ext uri="{BB962C8B-B14F-4D97-AF65-F5344CB8AC3E}">
+        <p14:creationId xmlns:p14="http://schemas.microsoft.com/office/powerpoint/2010/main" val="2026958417"/>
+      </p:ext>
+    </p:extLst>
+  </p:cSld>
+  <p:clrMapOvr>
+    <a:masterClrMapping/>
+  </p:clrMapOvr>
+  <mc:AlternateContent xmlns:mc="http://schemas.openxmlformats.org/markup-compatibility/2006" xmlns:p14="http://schemas.microsoft.com/office/powerpoint/2010/main">
+    <mc:Choice Requires="p14">
+      <p:transition spd="med" p14:dur="700">
+        <p:fade/>
+      </p:transition>
+    </mc:Choice>
+    <mc:Fallback xmlns="">
+      <p:transition spd="med">
+        <p:fade/>
+      </p:transition>
+    </mc:Fallback>
+  </mc:AlternateContent>
+  <p:timing>
+    <p:tnLst>
+      <p:par>
+        <p:cTn id="1" dur="indefinite" restart="never" nodeType="tmRoot"/>
+      </p:par>
+    </p:tnLst>
+  </p:timing>
+</p:sld>
+</file>
+
+<file path=ppt/slides/slide7.xml><?xml version="1.0" encoding="utf-8"?>
+<p:sld xmlns:a="http://schemas.openxmlformats.org/drawingml/2006/main" xmlns:r="http://schemas.openxmlformats.org/officeDocument/2006/relationships" xmlns:p="http://schemas.openxmlformats.org/presentationml/2006/main">
+  <p:cSld>
+    <p:spTree>
+      <p:nvGrpSpPr>
+        <p:cNvPr id="1" name=""/>
+        <p:cNvGrpSpPr/>
+        <p:nvPr/>
+      </p:nvGrpSpPr>
+      <p:grpSpPr>
+        <a:xfrm>
+          <a:off x="0" y="0"/>
+          <a:ext cx="0" cy="0"/>
+          <a:chOff x="0" y="0"/>
+          <a:chExt cx="0" cy="0"/>
+        </a:xfrm>
+      </p:grpSpPr>
+      <p:sp>
+        <p:nvSpPr>
+          <p:cNvPr id="2" name="Título 1"/>
+          <p:cNvSpPr>
+            <a:spLocks noGrp="1"/>
+          </p:cNvSpPr>
+          <p:nvPr>
+            <p:ph type="title"/>
+          </p:nvPr>
+        </p:nvSpPr>
+        <p:spPr>
+          <a:xfrm>
             <a:off x="1341120" y="764704"/>
             <a:ext cx="9509760" cy="936080"/>
           </a:xfrm>
@@ -14236,7 +15256,7 @@
 </p:sld>
 </file>
 
-<file path=ppt/slides/slide7.xml><?xml version="1.0" encoding="utf-8"?>
+<file path=ppt/slides/slide8.xml><?xml version="1.0" encoding="utf-8"?>
 <p:sld xmlns:a="http://schemas.openxmlformats.org/drawingml/2006/main" xmlns:r="http://schemas.openxmlformats.org/officeDocument/2006/relationships" xmlns:p="http://schemas.openxmlformats.org/presentationml/2006/main">
   <p:cSld>
     <p:spTree>
@@ -15723,7 +16743,7 @@
 </p:sld>
 </file>
 
-<file path=ppt/slides/slide8.xml><?xml version="1.0" encoding="utf-8"?>
+<file path=ppt/slides/slide9.xml><?xml version="1.0" encoding="utf-8"?>
 <p:sld xmlns:a="http://schemas.openxmlformats.org/drawingml/2006/main" xmlns:r="http://schemas.openxmlformats.org/officeDocument/2006/relationships" xmlns:p="http://schemas.openxmlformats.org/presentationml/2006/main">
   <p:cSld>
     <p:spTree>
@@ -15819,745 +16839,6 @@
     <p:extLst>
       <p:ext uri="{BB962C8B-B14F-4D97-AF65-F5344CB8AC3E}">
         <p14:creationId xmlns:p14="http://schemas.microsoft.com/office/powerpoint/2010/main" val="3718643091"/>
-      </p:ext>
-    </p:extLst>
-  </p:cSld>
-  <p:clrMapOvr>
-    <a:masterClrMapping/>
-  </p:clrMapOvr>
-  <mc:AlternateContent xmlns:mc="http://schemas.openxmlformats.org/markup-compatibility/2006" xmlns:p14="http://schemas.microsoft.com/office/powerpoint/2010/main">
-    <mc:Choice Requires="p14">
-      <p:transition spd="med" p14:dur="700">
-        <p:fade/>
-      </p:transition>
-    </mc:Choice>
-    <mc:Fallback xmlns="">
-      <p:transition spd="med">
-        <p:fade/>
-      </p:transition>
-    </mc:Fallback>
-  </mc:AlternateContent>
-</p:sld>
-</file>
-
-<file path=ppt/slides/slide9.xml><?xml version="1.0" encoding="utf-8"?>
-<p:sld xmlns:a="http://schemas.openxmlformats.org/drawingml/2006/main" xmlns:r="http://schemas.openxmlformats.org/officeDocument/2006/relationships" xmlns:p="http://schemas.openxmlformats.org/presentationml/2006/main">
-  <p:cSld>
-    <p:spTree>
-      <p:nvGrpSpPr>
-        <p:cNvPr id="1" name=""/>
-        <p:cNvGrpSpPr/>
-        <p:nvPr/>
-      </p:nvGrpSpPr>
-      <p:grpSpPr>
-        <a:xfrm>
-          <a:off x="0" y="0"/>
-          <a:ext cx="0" cy="0"/>
-          <a:chOff x="0" y="0"/>
-          <a:chExt cx="0" cy="0"/>
-        </a:xfrm>
-      </p:grpSpPr>
-      <p:sp>
-        <p:nvSpPr>
-          <p:cNvPr id="2" name="Título 1"/>
-          <p:cNvSpPr>
-            <a:spLocks noGrp="1"/>
-          </p:cNvSpPr>
-          <p:nvPr>
-            <p:ph type="title"/>
-          </p:nvPr>
-        </p:nvSpPr>
-        <p:spPr>
-          <a:xfrm>
-            <a:off x="1341120" y="467360"/>
-            <a:ext cx="9509760" cy="801400"/>
-          </a:xfrm>
-        </p:spPr>
-        <p:txBody>
-          <a:bodyPr>
-            <a:normAutofit/>
-          </a:bodyPr>
-          <a:lstStyle/>
-          <a:p>
-            <a:pPr marL="0" indent="0" algn="l" defTabSz="914400">
-              <a:lnSpc>
-                <a:spcPct val="90000"/>
-              </a:lnSpc>
-              <a:spcBef>
-                <a:spcPts val="0"/>
-              </a:spcBef>
-              <a:buNone/>
-            </a:pPr>
-            <a:r>
-              <a:rPr lang="pt-BR" dirty="0" smtClean="0">
-                <a:solidFill>
-                  <a:srgbClr val="263050">
-                    <a:lumMod val="75000"/>
-                  </a:srgbClr>
-                </a:solidFill>
-                <a:latin typeface="Corbel"/>
-              </a:rPr>
-              <a:t>Elaboração de Cronograma</a:t>
-            </a:r>
-            <a:endParaRPr lang="pt-BR" sz="3400" b="0" i="0" dirty="0">
-              <a:solidFill>
-                <a:srgbClr val="263050">
-                  <a:lumMod val="75000"/>
-                </a:srgbClr>
-              </a:solidFill>
-              <a:latin typeface="Corbel"/>
-              <a:ea typeface="+mj-ea"/>
-              <a:cs typeface="+mj-cs"/>
-            </a:endParaRPr>
-          </a:p>
-        </p:txBody>
-      </p:sp>
-      <p:graphicFrame>
-        <p:nvGraphicFramePr>
-          <p:cNvPr id="5" name="Espaço Reservado para Conteúdo 4"/>
-          <p:cNvGraphicFramePr>
-            <a:graphicFrameLocks noGrp="1"/>
-          </p:cNvGraphicFramePr>
-          <p:nvPr>
-            <p:ph idx="1"/>
-            <p:extLst>
-              <p:ext uri="{D42A27DB-BD31-4B8C-83A1-F6EECF244321}">
-                <p14:modId xmlns:p14="http://schemas.microsoft.com/office/powerpoint/2010/main" val="3534917820"/>
-              </p:ext>
-            </p:extLst>
-          </p:nvPr>
-        </p:nvGraphicFramePr>
-        <p:xfrm>
-          <a:off x="335360" y="1772819"/>
-          <a:ext cx="11449272" cy="4392486"/>
-        </p:xfrm>
-        <a:graphic>
-          <a:graphicData uri="http://schemas.openxmlformats.org/drawingml/2006/table">
-            <a:tbl>
-              <a:tblPr firstRow="1" firstCol="1" bandRow="1">
-                <a:tableStyleId>{B301B821-A1FF-4177-AEE7-76D212191A09}</a:tableStyleId>
-              </a:tblPr>
-              <a:tblGrid>
-                <a:gridCol w="3815620"/>
-                <a:gridCol w="3816826"/>
-                <a:gridCol w="3816826"/>
-              </a:tblGrid>
-              <a:tr h="627498">
-                <a:tc>
-                  <a:txBody>
-                    <a:bodyPr/>
-                    <a:lstStyle/>
-                    <a:p>
-                      <a:pPr>
-                        <a:lnSpc>
-                          <a:spcPts val="1200"/>
-                        </a:lnSpc>
-                        <a:spcAft>
-                          <a:spcPts val="0"/>
-                        </a:spcAft>
-                      </a:pPr>
-                      <a:r>
-                        <a:rPr lang="pt-BR" sz="1100" dirty="0" err="1">
-                          <a:effectLst/>
-                        </a:rPr>
-                        <a:t>Milestone</a:t>
-                      </a:r>
-                      <a:endParaRPr lang="pt-BR" sz="1000" dirty="0">
-                        <a:effectLst/>
-                        <a:latin typeface="Times New Roman"/>
-                        <a:ea typeface="Times New Roman"/>
-                      </a:endParaRPr>
-                    </a:p>
-                  </a:txBody>
-                  <a:tcPr marL="68580" marR="68580" marT="0" marB="0"/>
-                </a:tc>
-                <a:tc>
-                  <a:txBody>
-                    <a:bodyPr/>
-                    <a:lstStyle/>
-                    <a:p>
-                      <a:pPr>
-                        <a:lnSpc>
-                          <a:spcPts val="1200"/>
-                        </a:lnSpc>
-                        <a:spcAft>
-                          <a:spcPts val="0"/>
-                        </a:spcAft>
-                      </a:pPr>
-                      <a:r>
-                        <a:rPr lang="pt-BR" sz="1100">
-                          <a:effectLst/>
-                        </a:rPr>
-                        <a:t>Data de Início</a:t>
-                      </a:r>
-                      <a:endParaRPr lang="pt-BR" sz="1000">
-                        <a:effectLst/>
-                        <a:latin typeface="Times New Roman"/>
-                        <a:ea typeface="Times New Roman"/>
-                      </a:endParaRPr>
-                    </a:p>
-                  </a:txBody>
-                  <a:tcPr marL="68580" marR="68580" marT="0" marB="0"/>
-                </a:tc>
-                <a:tc>
-                  <a:txBody>
-                    <a:bodyPr/>
-                    <a:lstStyle/>
-                    <a:p>
-                      <a:pPr>
-                        <a:lnSpc>
-                          <a:spcPts val="1200"/>
-                        </a:lnSpc>
-                        <a:spcAft>
-                          <a:spcPts val="0"/>
-                        </a:spcAft>
-                      </a:pPr>
-                      <a:r>
-                        <a:rPr lang="pt-BR" sz="1100">
-                          <a:effectLst/>
-                        </a:rPr>
-                        <a:t>Data de Término</a:t>
-                      </a:r>
-                      <a:endParaRPr lang="pt-BR" sz="1000">
-                        <a:effectLst/>
-                        <a:latin typeface="Times New Roman"/>
-                        <a:ea typeface="Times New Roman"/>
-                      </a:endParaRPr>
-                    </a:p>
-                  </a:txBody>
-                  <a:tcPr marL="68580" marR="68580" marT="0" marB="0"/>
-                </a:tc>
-              </a:tr>
-              <a:tr h="627498">
-                <a:tc>
-                  <a:txBody>
-                    <a:bodyPr/>
-                    <a:lstStyle/>
-                    <a:p>
-                      <a:pPr>
-                        <a:lnSpc>
-                          <a:spcPts val="1200"/>
-                        </a:lnSpc>
-                        <a:spcAft>
-                          <a:spcPts val="0"/>
-                        </a:spcAft>
-                      </a:pPr>
-                      <a:r>
-                        <a:rPr lang="pt-BR" sz="1000">
-                          <a:effectLst/>
-                        </a:rPr>
-                        <a:t>Planejar Teste</a:t>
-                      </a:r>
-                      <a:endParaRPr lang="pt-BR" sz="1000">
-                        <a:effectLst/>
-                        <a:latin typeface="Times New Roman"/>
-                        <a:ea typeface="Times New Roman"/>
-                      </a:endParaRPr>
-                    </a:p>
-                  </a:txBody>
-                  <a:tcPr marL="68580" marR="68580" marT="0" marB="0"/>
-                </a:tc>
-                <a:tc>
-                  <a:txBody>
-                    <a:bodyPr/>
-                    <a:lstStyle/>
-                    <a:p>
-                      <a:pPr>
-                        <a:lnSpc>
-                          <a:spcPts val="1200"/>
-                        </a:lnSpc>
-                        <a:spcAft>
-                          <a:spcPts val="0"/>
-                        </a:spcAft>
-                      </a:pPr>
-                      <a:r>
-                        <a:rPr lang="pt-BR" sz="1000">
-                          <a:effectLst/>
-                        </a:rPr>
-                        <a:t>10/10/2013</a:t>
-                      </a:r>
-                      <a:endParaRPr lang="pt-BR" sz="1000">
-                        <a:effectLst/>
-                        <a:latin typeface="Times New Roman"/>
-                        <a:ea typeface="Times New Roman"/>
-                      </a:endParaRPr>
-                    </a:p>
-                  </a:txBody>
-                  <a:tcPr marL="68580" marR="68580" marT="0" marB="0"/>
-                </a:tc>
-                <a:tc>
-                  <a:txBody>
-                    <a:bodyPr/>
-                    <a:lstStyle/>
-                    <a:p>
-                      <a:pPr>
-                        <a:lnSpc>
-                          <a:spcPts val="1200"/>
-                        </a:lnSpc>
-                        <a:spcAft>
-                          <a:spcPts val="0"/>
-                        </a:spcAft>
-                      </a:pPr>
-                      <a:r>
-                        <a:rPr lang="pt-BR" sz="1000">
-                          <a:effectLst/>
-                        </a:rPr>
-                        <a:t>12/10/2013</a:t>
-                      </a:r>
-                      <a:endParaRPr lang="pt-BR" sz="1000">
-                        <a:effectLst/>
-                        <a:latin typeface="Times New Roman"/>
-                        <a:ea typeface="Times New Roman"/>
-                      </a:endParaRPr>
-                    </a:p>
-                  </a:txBody>
-                  <a:tcPr marL="68580" marR="68580" marT="0" marB="0"/>
-                </a:tc>
-              </a:tr>
-              <a:tr h="627498">
-                <a:tc>
-                  <a:txBody>
-                    <a:bodyPr/>
-                    <a:lstStyle/>
-                    <a:p>
-                      <a:pPr>
-                        <a:lnSpc>
-                          <a:spcPts val="1200"/>
-                        </a:lnSpc>
-                        <a:spcAft>
-                          <a:spcPts val="0"/>
-                        </a:spcAft>
-                      </a:pPr>
-                      <a:r>
-                        <a:rPr lang="pt-BR" sz="1000">
-                          <a:effectLst/>
-                        </a:rPr>
-                        <a:t>Projetar Teste</a:t>
-                      </a:r>
-                      <a:endParaRPr lang="pt-BR" sz="1000">
-                        <a:effectLst/>
-                        <a:latin typeface="Times New Roman"/>
-                        <a:ea typeface="Times New Roman"/>
-                      </a:endParaRPr>
-                    </a:p>
-                  </a:txBody>
-                  <a:tcPr marL="68580" marR="68580" marT="0" marB="0"/>
-                </a:tc>
-                <a:tc>
-                  <a:txBody>
-                    <a:bodyPr/>
-                    <a:lstStyle/>
-                    <a:p>
-                      <a:pPr>
-                        <a:lnSpc>
-                          <a:spcPts val="1200"/>
-                        </a:lnSpc>
-                        <a:spcAft>
-                          <a:spcPts val="0"/>
-                        </a:spcAft>
-                      </a:pPr>
-                      <a:r>
-                        <a:rPr lang="pt-BR" sz="1000">
-                          <a:effectLst/>
-                        </a:rPr>
-                        <a:t>12/10/2013</a:t>
-                      </a:r>
-                      <a:endParaRPr lang="pt-BR" sz="1000">
-                        <a:effectLst/>
-                        <a:latin typeface="Times New Roman"/>
-                        <a:ea typeface="Times New Roman"/>
-                      </a:endParaRPr>
-                    </a:p>
-                  </a:txBody>
-                  <a:tcPr marL="68580" marR="68580" marT="0" marB="0"/>
-                </a:tc>
-                <a:tc>
-                  <a:txBody>
-                    <a:bodyPr/>
-                    <a:lstStyle/>
-                    <a:p>
-                      <a:pPr>
-                        <a:lnSpc>
-                          <a:spcPts val="1200"/>
-                        </a:lnSpc>
-                        <a:spcAft>
-                          <a:spcPts val="0"/>
-                        </a:spcAft>
-                      </a:pPr>
-                      <a:r>
-                        <a:rPr lang="pt-BR" sz="1000">
-                          <a:effectLst/>
-                        </a:rPr>
-                        <a:t>16/10/2013</a:t>
-                      </a:r>
-                      <a:endParaRPr lang="pt-BR" sz="1000">
-                        <a:effectLst/>
-                        <a:latin typeface="Times New Roman"/>
-                        <a:ea typeface="Times New Roman"/>
-                      </a:endParaRPr>
-                    </a:p>
-                  </a:txBody>
-                  <a:tcPr marL="68580" marR="68580" marT="0" marB="0"/>
-                </a:tc>
-              </a:tr>
-              <a:tr h="627498">
-                <a:tc>
-                  <a:txBody>
-                    <a:bodyPr/>
-                    <a:lstStyle/>
-                    <a:p>
-                      <a:pPr>
-                        <a:lnSpc>
-                          <a:spcPts val="1200"/>
-                        </a:lnSpc>
-                        <a:spcAft>
-                          <a:spcPts val="0"/>
-                        </a:spcAft>
-                      </a:pPr>
-                      <a:r>
-                        <a:rPr lang="pt-BR" sz="1000">
-                          <a:effectLst/>
-                        </a:rPr>
-                        <a:t>Implementar Teste</a:t>
-                      </a:r>
-                      <a:endParaRPr lang="pt-BR" sz="1000">
-                        <a:effectLst/>
-                        <a:latin typeface="Times New Roman"/>
-                        <a:ea typeface="Times New Roman"/>
-                      </a:endParaRPr>
-                    </a:p>
-                  </a:txBody>
-                  <a:tcPr marL="68580" marR="68580" marT="0" marB="0"/>
-                </a:tc>
-                <a:tc>
-                  <a:txBody>
-                    <a:bodyPr/>
-                    <a:lstStyle/>
-                    <a:p>
-                      <a:pPr>
-                        <a:lnSpc>
-                          <a:spcPts val="1200"/>
-                        </a:lnSpc>
-                        <a:spcAft>
-                          <a:spcPts val="0"/>
-                        </a:spcAft>
-                      </a:pPr>
-                      <a:r>
-                        <a:rPr lang="pt-BR" sz="1000" dirty="0">
-                          <a:effectLst/>
-                        </a:rPr>
-                        <a:t>Não teremos</a:t>
-                      </a:r>
-                      <a:endParaRPr lang="pt-BR" sz="1000" dirty="0">
-                        <a:effectLst/>
-                        <a:latin typeface="Times New Roman"/>
-                        <a:ea typeface="Times New Roman"/>
-                      </a:endParaRPr>
-                    </a:p>
-                  </a:txBody>
-                  <a:tcPr marL="68580" marR="68580" marT="0" marB="0"/>
-                </a:tc>
-                <a:tc>
-                  <a:txBody>
-                    <a:bodyPr/>
-                    <a:lstStyle/>
-                    <a:p>
-                      <a:pPr>
-                        <a:lnSpc>
-                          <a:spcPts val="1200"/>
-                        </a:lnSpc>
-                        <a:spcAft>
-                          <a:spcPts val="0"/>
-                        </a:spcAft>
-                      </a:pPr>
-                      <a:r>
-                        <a:rPr lang="pt-BR" sz="1000">
-                          <a:effectLst/>
-                        </a:rPr>
-                        <a:t>Não teremos</a:t>
-                      </a:r>
-                      <a:endParaRPr lang="pt-BR" sz="1000">
-                        <a:effectLst/>
-                        <a:latin typeface="Times New Roman"/>
-                        <a:ea typeface="Times New Roman"/>
-                      </a:endParaRPr>
-                    </a:p>
-                  </a:txBody>
-                  <a:tcPr marL="68580" marR="68580" marT="0" marB="0"/>
-                </a:tc>
-              </a:tr>
-              <a:tr h="627498">
-                <a:tc>
-                  <a:txBody>
-                    <a:bodyPr/>
-                    <a:lstStyle/>
-                    <a:p>
-                      <a:pPr>
-                        <a:lnSpc>
-                          <a:spcPts val="1200"/>
-                        </a:lnSpc>
-                        <a:spcAft>
-                          <a:spcPts val="0"/>
-                        </a:spcAft>
-                      </a:pPr>
-                      <a:r>
-                        <a:rPr lang="pt-BR" sz="1000">
-                          <a:effectLst/>
-                        </a:rPr>
-                        <a:t>Executar Teste</a:t>
-                      </a:r>
-                      <a:endParaRPr lang="pt-BR" sz="1000">
-                        <a:effectLst/>
-                        <a:latin typeface="Times New Roman"/>
-                        <a:ea typeface="Times New Roman"/>
-                      </a:endParaRPr>
-                    </a:p>
-                  </a:txBody>
-                  <a:tcPr marL="68580" marR="68580" marT="0" marB="0"/>
-                </a:tc>
-                <a:tc>
-                  <a:txBody>
-                    <a:bodyPr/>
-                    <a:lstStyle/>
-                    <a:p>
-                      <a:pPr>
-                        <a:lnSpc>
-                          <a:spcPts val="1200"/>
-                        </a:lnSpc>
-                        <a:spcAft>
-                          <a:spcPts val="0"/>
-                        </a:spcAft>
-                      </a:pPr>
-                      <a:r>
-                        <a:rPr lang="pt-BR" sz="1000">
-                          <a:effectLst/>
-                        </a:rPr>
-                        <a:t>Não terremos</a:t>
-                      </a:r>
-                      <a:endParaRPr lang="pt-BR" sz="1000">
-                        <a:effectLst/>
-                        <a:latin typeface="Times New Roman"/>
-                        <a:ea typeface="Times New Roman"/>
-                      </a:endParaRPr>
-                    </a:p>
-                  </a:txBody>
-                  <a:tcPr marL="68580" marR="68580" marT="0" marB="0"/>
-                </a:tc>
-                <a:tc>
-                  <a:txBody>
-                    <a:bodyPr/>
-                    <a:lstStyle/>
-                    <a:p>
-                      <a:pPr>
-                        <a:lnSpc>
-                          <a:spcPts val="1200"/>
-                        </a:lnSpc>
-                        <a:spcAft>
-                          <a:spcPts val="0"/>
-                        </a:spcAft>
-                      </a:pPr>
-                      <a:r>
-                        <a:rPr lang="pt-BR" sz="1000">
-                          <a:effectLst/>
-                        </a:rPr>
-                        <a:t>Não terremos</a:t>
-                      </a:r>
-                      <a:endParaRPr lang="pt-BR" sz="1000">
-                        <a:effectLst/>
-                        <a:latin typeface="Times New Roman"/>
-                        <a:ea typeface="Times New Roman"/>
-                      </a:endParaRPr>
-                    </a:p>
-                  </a:txBody>
-                  <a:tcPr marL="68580" marR="68580" marT="0" marB="0"/>
-                </a:tc>
-              </a:tr>
-              <a:tr h="627498">
-                <a:tc>
-                  <a:txBody>
-                    <a:bodyPr/>
-                    <a:lstStyle/>
-                    <a:p>
-                      <a:pPr>
-                        <a:lnSpc>
-                          <a:spcPts val="1200"/>
-                        </a:lnSpc>
-                        <a:spcAft>
-                          <a:spcPts val="0"/>
-                        </a:spcAft>
-                      </a:pPr>
-                      <a:r>
-                        <a:rPr lang="pt-BR" sz="1000">
-                          <a:effectLst/>
-                        </a:rPr>
-                        <a:t>Avaliar Teste</a:t>
-                      </a:r>
-                      <a:endParaRPr lang="pt-BR" sz="1000">
-                        <a:effectLst/>
-                        <a:latin typeface="Times New Roman"/>
-                        <a:ea typeface="Times New Roman"/>
-                      </a:endParaRPr>
-                    </a:p>
-                  </a:txBody>
-                  <a:tcPr marL="68580" marR="68580" marT="0" marB="0"/>
-                </a:tc>
-                <a:tc>
-                  <a:txBody>
-                    <a:bodyPr/>
-                    <a:lstStyle/>
-                    <a:p>
-                      <a:pPr>
-                        <a:lnSpc>
-                          <a:spcPts val="1200"/>
-                        </a:lnSpc>
-                        <a:spcAft>
-                          <a:spcPts val="0"/>
-                        </a:spcAft>
-                      </a:pPr>
-                      <a:r>
-                        <a:rPr lang="pt-BR" sz="1000">
-                          <a:effectLst/>
-                        </a:rPr>
-                        <a:t>17/10/2013</a:t>
-                      </a:r>
-                      <a:endParaRPr lang="pt-BR" sz="1000">
-                        <a:effectLst/>
-                        <a:latin typeface="Times New Roman"/>
-                        <a:ea typeface="Times New Roman"/>
-                      </a:endParaRPr>
-                    </a:p>
-                  </a:txBody>
-                  <a:tcPr marL="68580" marR="68580" marT="0" marB="0"/>
-                </a:tc>
-                <a:tc>
-                  <a:txBody>
-                    <a:bodyPr/>
-                    <a:lstStyle/>
-                    <a:p>
-                      <a:pPr>
-                        <a:lnSpc>
-                          <a:spcPts val="1200"/>
-                        </a:lnSpc>
-                        <a:spcAft>
-                          <a:spcPts val="0"/>
-                        </a:spcAft>
-                      </a:pPr>
-                      <a:r>
-                        <a:rPr lang="pt-BR" sz="1000">
-                          <a:effectLst/>
-                        </a:rPr>
-                        <a:t>06/10/2013</a:t>
-                      </a:r>
-                      <a:endParaRPr lang="pt-BR" sz="1000">
-                        <a:effectLst/>
-                        <a:latin typeface="Times New Roman"/>
-                        <a:ea typeface="Times New Roman"/>
-                      </a:endParaRPr>
-                    </a:p>
-                  </a:txBody>
-                  <a:tcPr marL="68580" marR="68580" marT="0" marB="0"/>
-                </a:tc>
-              </a:tr>
-              <a:tr h="627498">
-                <a:tc>
-                  <a:txBody>
-                    <a:bodyPr/>
-                    <a:lstStyle/>
-                    <a:p>
-                      <a:pPr>
-                        <a:lnSpc>
-                          <a:spcPts val="1200"/>
-                        </a:lnSpc>
-                        <a:spcAft>
-                          <a:spcPts val="0"/>
-                        </a:spcAft>
-                      </a:pPr>
-                      <a:r>
-                        <a:rPr lang="pt-BR" sz="1000" dirty="0">
-                          <a:effectLst/>
-                        </a:rPr>
-                        <a:t>Entrega do Release final</a:t>
-                      </a:r>
-                      <a:endParaRPr lang="pt-BR" sz="1000" dirty="0">
-                        <a:effectLst/>
-                        <a:latin typeface="Times New Roman"/>
-                        <a:ea typeface="Times New Roman"/>
-                      </a:endParaRPr>
-                    </a:p>
-                  </a:txBody>
-                  <a:tcPr marL="68580" marR="68580" marT="0" marB="0"/>
-                </a:tc>
-                <a:tc>
-                  <a:txBody>
-                    <a:bodyPr/>
-                    <a:lstStyle/>
-                    <a:p>
-                      <a:pPr>
-                        <a:lnSpc>
-                          <a:spcPts val="1200"/>
-                        </a:lnSpc>
-                        <a:spcAft>
-                          <a:spcPts val="0"/>
-                        </a:spcAft>
-                      </a:pPr>
-                      <a:r>
-                        <a:rPr lang="pt-BR" sz="1000">
-                          <a:effectLst/>
-                        </a:rPr>
-                        <a:t>07</a:t>
-                      </a:r>
-                      <a:r>
-                        <a:rPr lang="en-US" sz="1000">
-                          <a:effectLst/>
-                        </a:rPr>
-                        <a:t>/11/2013</a:t>
-                      </a:r>
-                      <a:endParaRPr lang="pt-BR" sz="1000">
-                        <a:effectLst/>
-                        <a:latin typeface="Times New Roman"/>
-                        <a:ea typeface="Times New Roman"/>
-                      </a:endParaRPr>
-                    </a:p>
-                  </a:txBody>
-                  <a:tcPr marL="68580" marR="68580" marT="0" marB="0"/>
-                </a:tc>
-                <a:tc>
-                  <a:txBody>
-                    <a:bodyPr/>
-                    <a:lstStyle/>
-                    <a:p>
-                      <a:pPr>
-                        <a:lnSpc>
-                          <a:spcPts val="1200"/>
-                        </a:lnSpc>
-                        <a:spcAft>
-                          <a:spcPts val="0"/>
-                        </a:spcAft>
-                      </a:pPr>
-                      <a:r>
-                        <a:rPr lang="pt-BR" sz="1000" dirty="0">
-                          <a:effectLst/>
-                        </a:rPr>
-                        <a:t>21/11/2013</a:t>
-                      </a:r>
-                      <a:endParaRPr lang="pt-BR" sz="1000" dirty="0">
-                        <a:effectLst/>
-                        <a:latin typeface="Times New Roman"/>
-                        <a:ea typeface="Times New Roman"/>
-                      </a:endParaRPr>
-                    </a:p>
-                  </a:txBody>
-                  <a:tcPr marL="68580" marR="68580" marT="0" marB="0"/>
-                </a:tc>
-              </a:tr>
-            </a:tbl>
-          </a:graphicData>
-        </a:graphic>
-      </p:graphicFrame>
-    </p:spTree>
-    <p:extLst>
-      <p:ext uri="{BB962C8B-B14F-4D97-AF65-F5344CB8AC3E}">
-        <p14:creationId xmlns:p14="http://schemas.microsoft.com/office/powerpoint/2010/main" val="3676793758"/>
       </p:ext>
     </p:extLst>
   </p:cSld>
@@ -16833,7 +17114,7 @@
   <a:extraClrSchemeLst/>
   <a:extLst>
     <a:ext uri="{05A4C25C-085E-4340-85A3-A5531E510DB2}">
-      <thm15:themeFamily xmlns:thm15="http://schemas.microsoft.com/office/thememl/2012/main" xmlns="" name="BusinessProjectPlan_TP103417270.potx" id="{1770548D-EDF1-4703-9217-6F75A83FD301}" vid="{47CC73D5-D979-407C-BDE1-1377C0466D55}"/>
+      <thm15:themeFamily xmlns="" xmlns:thm15="http://schemas.microsoft.com/office/thememl/2012/main" name="BusinessProjectPlan_TP103417270.potx" id="{1770548D-EDF1-4703-9217-6F75A83FD301}" vid="{47CC73D5-D979-407C-BDE1-1377C0466D55}"/>
     </a:ext>
   </a:extLst>
 </a:theme>

</xml_diff>

<commit_message>
atualização slides apresentação 1
</commit_message>
<xml_diff>
--- a/Requisitos/Plano de Projeto 1.pptx
+++ b/Requisitos/Plano de Projeto 1.pptx
@@ -5,10 +5,10 @@
     <p:sldMasterId id="2147483648" r:id="rId2"/>
   </p:sldMasterIdLst>
   <p:notesMasterIdLst>
-    <p:notesMasterId r:id="rId22"/>
+    <p:notesMasterId r:id="rId23"/>
   </p:notesMasterIdLst>
   <p:handoutMasterIdLst>
-    <p:handoutMasterId r:id="rId23"/>
+    <p:handoutMasterId r:id="rId24"/>
   </p:handoutMasterIdLst>
   <p:sldIdLst>
     <p:sldId id="265" r:id="rId3"/>
@@ -16,20 +16,21 @@
     <p:sldId id="299" r:id="rId5"/>
     <p:sldId id="289" r:id="rId6"/>
     <p:sldId id="290" r:id="rId7"/>
-    <p:sldId id="291" r:id="rId8"/>
-    <p:sldId id="292" r:id="rId9"/>
-    <p:sldId id="293" r:id="rId10"/>
-    <p:sldId id="294" r:id="rId11"/>
-    <p:sldId id="280" r:id="rId12"/>
-    <p:sldId id="301" r:id="rId13"/>
-    <p:sldId id="302" r:id="rId14"/>
-    <p:sldId id="303" r:id="rId15"/>
-    <p:sldId id="304" r:id="rId16"/>
-    <p:sldId id="305" r:id="rId17"/>
-    <p:sldId id="306" r:id="rId18"/>
-    <p:sldId id="307" r:id="rId19"/>
-    <p:sldId id="300" r:id="rId20"/>
-    <p:sldId id="295" r:id="rId21"/>
+    <p:sldId id="308" r:id="rId8"/>
+    <p:sldId id="291" r:id="rId9"/>
+    <p:sldId id="292" r:id="rId10"/>
+    <p:sldId id="293" r:id="rId11"/>
+    <p:sldId id="294" r:id="rId12"/>
+    <p:sldId id="280" r:id="rId13"/>
+    <p:sldId id="301" r:id="rId14"/>
+    <p:sldId id="302" r:id="rId15"/>
+    <p:sldId id="303" r:id="rId16"/>
+    <p:sldId id="304" r:id="rId17"/>
+    <p:sldId id="305" r:id="rId18"/>
+    <p:sldId id="306" r:id="rId19"/>
+    <p:sldId id="307" r:id="rId20"/>
+    <p:sldId id="300" r:id="rId21"/>
+    <p:sldId id="295" r:id="rId22"/>
   </p:sldIdLst>
   <p:sldSz cx="12192000" cy="6858000"/>
   <p:notesSz cx="6858000" cy="9144000"/>
@@ -2558,35 +2559,35 @@
     </dgm:pt>
   </dgm:ptLst>
   <dgm:cxnLst>
+    <dgm:cxn modelId="{E3FD7D9B-7A36-4D12-B188-0A0D1AF9C129}" type="presOf" srcId="{68DE1B8C-EBBC-4ACF-AD69-E108E4A8C85C}" destId="{DFC8EC82-A76D-41CD-A597-E02C5F5CBEEE}" srcOrd="0" destOrd="0" presId="urn:microsoft.com/office/officeart/2005/8/layout/lProcess2"/>
+    <dgm:cxn modelId="{82ECE00E-C99F-43DA-83F9-38CFC3F7A2FA}" type="presOf" srcId="{DF4857E7-5C40-4E4D-8F9E-0F40BE240B2F}" destId="{4514D2E9-87FF-454C-A554-FD761A8568C7}" srcOrd="0" destOrd="0" presId="urn:microsoft.com/office/officeart/2005/8/layout/lProcess2"/>
+    <dgm:cxn modelId="{DEF1C201-34B1-4882-8DBF-B07106CA401E}" type="presOf" srcId="{8C9EF0B8-B348-4F26-938D-6A3D8F1D01C9}" destId="{EF50A355-5315-401C-A8B8-05A2B4F30FE3}" srcOrd="0" destOrd="0" presId="urn:microsoft.com/office/officeart/2005/8/layout/lProcess2"/>
+    <dgm:cxn modelId="{4F69C728-D27E-4664-B39F-E552BD0B15C4}" type="presOf" srcId="{68DE1B8C-EBBC-4ACF-AD69-E108E4A8C85C}" destId="{A9276CF6-D6BB-4D87-85EE-C74A56417B50}" srcOrd="1" destOrd="0" presId="urn:microsoft.com/office/officeart/2005/8/layout/lProcess2"/>
+    <dgm:cxn modelId="{EAD02916-CE0D-4F3F-A82E-33F10B159D8E}" type="presOf" srcId="{512A4932-71C2-4AF1-A35F-4F4632F17C02}" destId="{51239DC3-E9A2-43DA-8F69-23A0808C5F7B}" srcOrd="0" destOrd="0" presId="urn:microsoft.com/office/officeart/2005/8/layout/lProcess2"/>
+    <dgm:cxn modelId="{6F5081CF-24CF-4E2C-8683-D130E3B3E5C7}" type="presOf" srcId="{F5E45C32-85BB-467F-80E6-A808871E72F3}" destId="{2487EB6F-DE81-4509-80D3-3047844600F3}" srcOrd="1" destOrd="0" presId="urn:microsoft.com/office/officeart/2005/8/layout/lProcess2"/>
+    <dgm:cxn modelId="{F53C5B60-EE78-46AA-90FC-BDF2F3396876}" srcId="{DF4857E7-5C40-4E4D-8F9E-0F40BE240B2F}" destId="{68DE1B8C-EBBC-4ACF-AD69-E108E4A8C85C}" srcOrd="3" destOrd="0" parTransId="{94D73433-720A-40B7-8E81-899280B4DD52}" sibTransId="{10D11475-433C-4D63-8B5E-9E928E6DD9A1}"/>
+    <dgm:cxn modelId="{792FB76A-389C-45B7-8308-227DADB5CF70}" srcId="{0F9F144E-5A69-4079-9CFE-833FB141B5B7}" destId="{32074760-1CE6-4EA9-A667-33C7E19C2D94}" srcOrd="0" destOrd="0" parTransId="{41FFA3F1-CAF6-4B0C-90FB-AAF097D8C840}" sibTransId="{66E711EC-17A3-40E0-B60B-5A2F466C9D11}"/>
+    <dgm:cxn modelId="{C3F684FE-A0E7-411B-A303-2C8155B38D48}" srcId="{DF4857E7-5C40-4E4D-8F9E-0F40BE240B2F}" destId="{F5E45C32-85BB-467F-80E6-A808871E72F3}" srcOrd="1" destOrd="0" parTransId="{FAB096C4-43F1-4FB0-A740-B5A33490B558}" sibTransId="{F29CEF7E-7A2A-457D-9BE3-75C08A423C81}"/>
+    <dgm:cxn modelId="{92E0E4AC-AA4F-4221-B4F5-BC44ADD50226}" srcId="{F5E45C32-85BB-467F-80E6-A808871E72F3}" destId="{FA9C7340-018E-4F73-A402-B7FF8C34CDC0}" srcOrd="1" destOrd="0" parTransId="{1805A85A-B92E-48E0-886D-23F094607276}" sibTransId="{44F9A519-DD68-4648-B8E0-DFC7EF2120B7}"/>
+    <dgm:cxn modelId="{8AD144FB-65EB-4E0A-BBFB-81923B833C5B}" type="presOf" srcId="{F5E45C32-85BB-467F-80E6-A808871E72F3}" destId="{E7B9CF75-AF6A-4290-854A-077BB9A2D77C}" srcOrd="0" destOrd="0" presId="urn:microsoft.com/office/officeart/2005/8/layout/lProcess2"/>
+    <dgm:cxn modelId="{3BB736BE-339A-4657-B981-F9F1F8D52FDC}" type="presOf" srcId="{A766E2ED-C2E8-4E07-AF18-7EC57476A5C8}" destId="{D88EF221-1E19-407F-A109-45D126E6B0AD}" srcOrd="0" destOrd="0" presId="urn:microsoft.com/office/officeart/2005/8/layout/lProcess2"/>
+    <dgm:cxn modelId="{E3AEEE63-0D70-4A65-B4AD-DC3DBA17985A}" type="presOf" srcId="{7592B694-086D-4180-B053-CE7AD13C9858}" destId="{B6E9B2AA-8010-4FAB-90D2-72717C05AE96}" srcOrd="1" destOrd="0" presId="urn:microsoft.com/office/officeart/2005/8/layout/lProcess2"/>
+    <dgm:cxn modelId="{41BAC73D-C909-4828-81D3-F16502305163}" type="presOf" srcId="{8665C39E-B30E-4258-BEA9-83E0F7084606}" destId="{85B657F5-5C9C-42F8-A245-10BA7A824404}" srcOrd="0" destOrd="0" presId="urn:microsoft.com/office/officeart/2005/8/layout/lProcess2"/>
     <dgm:cxn modelId="{918FC998-3E81-4E2A-A8E0-FB3EB04E2705}" srcId="{0F9F144E-5A69-4079-9CFE-833FB141B5B7}" destId="{A766E2ED-C2E8-4E07-AF18-7EC57476A5C8}" srcOrd="1" destOrd="0" parTransId="{A1530F03-6C5E-45D7-8222-AD175A7090BD}" sibTransId="{05B31AC5-A983-4FEC-B0BE-EB0462CF6128}"/>
-    <dgm:cxn modelId="{41BAC73D-C909-4828-81D3-F16502305163}" type="presOf" srcId="{8665C39E-B30E-4258-BEA9-83E0F7084606}" destId="{85B657F5-5C9C-42F8-A245-10BA7A824404}" srcOrd="0" destOrd="0" presId="urn:microsoft.com/office/officeart/2005/8/layout/lProcess2"/>
+    <dgm:cxn modelId="{58D7B72C-6638-4F5D-945E-9420F8FE7097}" type="presOf" srcId="{7592B694-086D-4180-B053-CE7AD13C9858}" destId="{6E5A89BC-14D8-4DAA-BBC1-B070DD5BD626}" srcOrd="0" destOrd="0" presId="urn:microsoft.com/office/officeart/2005/8/layout/lProcess2"/>
+    <dgm:cxn modelId="{FA16C23C-5596-42A1-981A-487742CF3BBD}" srcId="{F5E45C32-85BB-467F-80E6-A808871E72F3}" destId="{6193ECAA-3925-487F-ADF8-CE1362754FFF}" srcOrd="0" destOrd="0" parTransId="{CA95F830-F096-4B8A-8E76-097EF46A4F44}" sibTransId="{4C2F44CE-5AB4-4FFE-B037-FFB0E3B4A7EB}"/>
+    <dgm:cxn modelId="{42032CCC-41F9-4B3F-A503-E38701F4AC02}" srcId="{7592B694-086D-4180-B053-CE7AD13C9858}" destId="{512A4932-71C2-4AF1-A35F-4F4632F17C02}" srcOrd="1" destOrd="0" parTransId="{47E31259-60CB-40FB-B391-CCAEC2189164}" sibTransId="{4C7C1C5B-4033-4A4C-87E1-4A3C60B720B7}"/>
+    <dgm:cxn modelId="{583CC615-DAE7-4276-AD9F-C578D26FEDFC}" srcId="{DF4857E7-5C40-4E4D-8F9E-0F40BE240B2F}" destId="{7592B694-086D-4180-B053-CE7AD13C9858}" srcOrd="2" destOrd="0" parTransId="{C8FADD59-ED12-44D1-A076-7A13B0AC344E}" sibTransId="{34A6F1FD-1787-4988-A7E6-472B7C66BD09}"/>
     <dgm:cxn modelId="{8D6B5497-475C-46A9-805D-510F815F9B98}" srcId="{7592B694-086D-4180-B053-CE7AD13C9858}" destId="{8665C39E-B30E-4258-BEA9-83E0F7084606}" srcOrd="0" destOrd="0" parTransId="{8211EBE3-1C93-4CFB-BBEE-7A708996ED07}" sibTransId="{6779ED75-3327-4C98-9C89-1343058D49BC}"/>
+    <dgm:cxn modelId="{ECB29E32-DF3F-494F-B7BB-9C8BD137B048}" type="presOf" srcId="{FA9C7340-018E-4F73-A402-B7FF8C34CDC0}" destId="{BD436606-D1DD-4535-A521-C5E4F9743128}" srcOrd="0" destOrd="0" presId="urn:microsoft.com/office/officeart/2005/8/layout/lProcess2"/>
     <dgm:cxn modelId="{BA343F65-7063-4A06-9692-19E81201F0CA}" type="presOf" srcId="{7DCD12F6-9D96-4CEE-B77D-0059BD9F172C}" destId="{60B6E648-ADB0-4695-B9EA-290DF28C1E3A}" srcOrd="0" destOrd="0" presId="urn:microsoft.com/office/officeart/2005/8/layout/lProcess2"/>
+    <dgm:cxn modelId="{7C9C3A38-6D50-4AFF-AA73-365DE43285E1}" type="presOf" srcId="{32074760-1CE6-4EA9-A667-33C7E19C2D94}" destId="{A8FD0D76-AFC6-4802-9090-E980FDBECC91}" srcOrd="0" destOrd="0" presId="urn:microsoft.com/office/officeart/2005/8/layout/lProcess2"/>
+    <dgm:cxn modelId="{337C532E-FA4C-4DE5-902B-AF62654DE2CD}" type="presOf" srcId="{0F9F144E-5A69-4079-9CFE-833FB141B5B7}" destId="{F032D9DC-6E96-4533-82F7-966FA94900AA}" srcOrd="1" destOrd="0" presId="urn:microsoft.com/office/officeart/2005/8/layout/lProcess2"/>
+    <dgm:cxn modelId="{B4186457-1219-426F-922C-5AECDCC53AC0}" srcId="{68DE1B8C-EBBC-4ACF-AD69-E108E4A8C85C}" destId="{8C9EF0B8-B348-4F26-938D-6A3D8F1D01C9}" srcOrd="0" destOrd="0" parTransId="{317FEE05-7414-4035-9841-8DABE546206E}" sibTransId="{5DAD05BE-4905-4E9C-9DE0-125B4DBFBE33}"/>
+    <dgm:cxn modelId="{7A675828-0E86-4177-A02F-94B30E827A0C}" type="presOf" srcId="{0F9F144E-5A69-4079-9CFE-833FB141B5B7}" destId="{9046789A-6150-4534-817A-88A1F11F0BDA}" srcOrd="0" destOrd="0" presId="urn:microsoft.com/office/officeart/2005/8/layout/lProcess2"/>
+    <dgm:cxn modelId="{C664844B-280E-4BFE-9C14-BBB1B2BC2C91}" type="presOf" srcId="{6193ECAA-3925-487F-ADF8-CE1362754FFF}" destId="{5CE69C38-1462-4F71-A252-F397C9008295}" srcOrd="0" destOrd="0" presId="urn:microsoft.com/office/officeart/2005/8/layout/lProcess2"/>
+    <dgm:cxn modelId="{8BF652A8-B747-4011-8997-2C8E587087B9}" srcId="{68DE1B8C-EBBC-4ACF-AD69-E108E4A8C85C}" destId="{7DCD12F6-9D96-4CEE-B77D-0059BD9F172C}" srcOrd="1" destOrd="0" parTransId="{05220267-9773-4777-8E6B-2437F9979F0B}" sibTransId="{89843E98-8750-44A8-9562-C70EE7FD83F4}"/>
     <dgm:cxn modelId="{696FC290-58F8-4B0A-B325-8A4CDCEFC93C}" srcId="{DF4857E7-5C40-4E4D-8F9E-0F40BE240B2F}" destId="{0F9F144E-5A69-4079-9CFE-833FB141B5B7}" srcOrd="0" destOrd="0" parTransId="{5295059C-89BD-48FC-9FB0-63BD38C2AF52}" sibTransId="{FAB8FA54-A1F3-488D-B823-07CCB71E4D44}"/>
-    <dgm:cxn modelId="{8AD144FB-65EB-4E0A-BBFB-81923B833C5B}" type="presOf" srcId="{F5E45C32-85BB-467F-80E6-A808871E72F3}" destId="{E7B9CF75-AF6A-4290-854A-077BB9A2D77C}" srcOrd="0" destOrd="0" presId="urn:microsoft.com/office/officeart/2005/8/layout/lProcess2"/>
-    <dgm:cxn modelId="{337C532E-FA4C-4DE5-902B-AF62654DE2CD}" type="presOf" srcId="{0F9F144E-5A69-4079-9CFE-833FB141B5B7}" destId="{F032D9DC-6E96-4533-82F7-966FA94900AA}" srcOrd="1" destOrd="0" presId="urn:microsoft.com/office/officeart/2005/8/layout/lProcess2"/>
-    <dgm:cxn modelId="{EAD02916-CE0D-4F3F-A82E-33F10B159D8E}" type="presOf" srcId="{512A4932-71C2-4AF1-A35F-4F4632F17C02}" destId="{51239DC3-E9A2-43DA-8F69-23A0808C5F7B}" srcOrd="0" destOrd="0" presId="urn:microsoft.com/office/officeart/2005/8/layout/lProcess2"/>
-    <dgm:cxn modelId="{42032CCC-41F9-4B3F-A503-E38701F4AC02}" srcId="{7592B694-086D-4180-B053-CE7AD13C9858}" destId="{512A4932-71C2-4AF1-A35F-4F4632F17C02}" srcOrd="1" destOrd="0" parTransId="{47E31259-60CB-40FB-B391-CCAEC2189164}" sibTransId="{4C7C1C5B-4033-4A4C-87E1-4A3C60B720B7}"/>
-    <dgm:cxn modelId="{4F69C728-D27E-4664-B39F-E552BD0B15C4}" type="presOf" srcId="{68DE1B8C-EBBC-4ACF-AD69-E108E4A8C85C}" destId="{A9276CF6-D6BB-4D87-85EE-C74A56417B50}" srcOrd="1" destOrd="0" presId="urn:microsoft.com/office/officeart/2005/8/layout/lProcess2"/>
-    <dgm:cxn modelId="{3BB736BE-339A-4657-B981-F9F1F8D52FDC}" type="presOf" srcId="{A766E2ED-C2E8-4E07-AF18-7EC57476A5C8}" destId="{D88EF221-1E19-407F-A109-45D126E6B0AD}" srcOrd="0" destOrd="0" presId="urn:microsoft.com/office/officeart/2005/8/layout/lProcess2"/>
-    <dgm:cxn modelId="{ECB29E32-DF3F-494F-B7BB-9C8BD137B048}" type="presOf" srcId="{FA9C7340-018E-4F73-A402-B7FF8C34CDC0}" destId="{BD436606-D1DD-4535-A521-C5E4F9743128}" srcOrd="0" destOrd="0" presId="urn:microsoft.com/office/officeart/2005/8/layout/lProcess2"/>
-    <dgm:cxn modelId="{8BF652A8-B747-4011-8997-2C8E587087B9}" srcId="{68DE1B8C-EBBC-4ACF-AD69-E108E4A8C85C}" destId="{7DCD12F6-9D96-4CEE-B77D-0059BD9F172C}" srcOrd="1" destOrd="0" parTransId="{05220267-9773-4777-8E6B-2437F9979F0B}" sibTransId="{89843E98-8750-44A8-9562-C70EE7FD83F4}"/>
-    <dgm:cxn modelId="{E3AEEE63-0D70-4A65-B4AD-DC3DBA17985A}" type="presOf" srcId="{7592B694-086D-4180-B053-CE7AD13C9858}" destId="{B6E9B2AA-8010-4FAB-90D2-72717C05AE96}" srcOrd="1" destOrd="0" presId="urn:microsoft.com/office/officeart/2005/8/layout/lProcess2"/>
-    <dgm:cxn modelId="{82ECE00E-C99F-43DA-83F9-38CFC3F7A2FA}" type="presOf" srcId="{DF4857E7-5C40-4E4D-8F9E-0F40BE240B2F}" destId="{4514D2E9-87FF-454C-A554-FD761A8568C7}" srcOrd="0" destOrd="0" presId="urn:microsoft.com/office/officeart/2005/8/layout/lProcess2"/>
-    <dgm:cxn modelId="{58D7B72C-6638-4F5D-945E-9420F8FE7097}" type="presOf" srcId="{7592B694-086D-4180-B053-CE7AD13C9858}" destId="{6E5A89BC-14D8-4DAA-BBC1-B070DD5BD626}" srcOrd="0" destOrd="0" presId="urn:microsoft.com/office/officeart/2005/8/layout/lProcess2"/>
-    <dgm:cxn modelId="{583CC615-DAE7-4276-AD9F-C578D26FEDFC}" srcId="{DF4857E7-5C40-4E4D-8F9E-0F40BE240B2F}" destId="{7592B694-086D-4180-B053-CE7AD13C9858}" srcOrd="2" destOrd="0" parTransId="{C8FADD59-ED12-44D1-A076-7A13B0AC344E}" sibTransId="{34A6F1FD-1787-4988-A7E6-472B7C66BD09}"/>
-    <dgm:cxn modelId="{C3F684FE-A0E7-411B-A303-2C8155B38D48}" srcId="{DF4857E7-5C40-4E4D-8F9E-0F40BE240B2F}" destId="{F5E45C32-85BB-467F-80E6-A808871E72F3}" srcOrd="1" destOrd="0" parTransId="{FAB096C4-43F1-4FB0-A740-B5A33490B558}" sibTransId="{F29CEF7E-7A2A-457D-9BE3-75C08A423C81}"/>
-    <dgm:cxn modelId="{7C9C3A38-6D50-4AFF-AA73-365DE43285E1}" type="presOf" srcId="{32074760-1CE6-4EA9-A667-33C7E19C2D94}" destId="{A8FD0D76-AFC6-4802-9090-E980FDBECC91}" srcOrd="0" destOrd="0" presId="urn:microsoft.com/office/officeart/2005/8/layout/lProcess2"/>
-    <dgm:cxn modelId="{6F5081CF-24CF-4E2C-8683-D130E3B3E5C7}" type="presOf" srcId="{F5E45C32-85BB-467F-80E6-A808871E72F3}" destId="{2487EB6F-DE81-4509-80D3-3047844600F3}" srcOrd="1" destOrd="0" presId="urn:microsoft.com/office/officeart/2005/8/layout/lProcess2"/>
-    <dgm:cxn modelId="{C664844B-280E-4BFE-9C14-BBB1B2BC2C91}" type="presOf" srcId="{6193ECAA-3925-487F-ADF8-CE1362754FFF}" destId="{5CE69C38-1462-4F71-A252-F397C9008295}" srcOrd="0" destOrd="0" presId="urn:microsoft.com/office/officeart/2005/8/layout/lProcess2"/>
-    <dgm:cxn modelId="{DEF1C201-34B1-4882-8DBF-B07106CA401E}" type="presOf" srcId="{8C9EF0B8-B348-4F26-938D-6A3D8F1D01C9}" destId="{EF50A355-5315-401C-A8B8-05A2B4F30FE3}" srcOrd="0" destOrd="0" presId="urn:microsoft.com/office/officeart/2005/8/layout/lProcess2"/>
-    <dgm:cxn modelId="{FA16C23C-5596-42A1-981A-487742CF3BBD}" srcId="{F5E45C32-85BB-467F-80E6-A808871E72F3}" destId="{6193ECAA-3925-487F-ADF8-CE1362754FFF}" srcOrd="0" destOrd="0" parTransId="{CA95F830-F096-4B8A-8E76-097EF46A4F44}" sibTransId="{4C2F44CE-5AB4-4FFE-B037-FFB0E3B4A7EB}"/>
-    <dgm:cxn modelId="{792FB76A-389C-45B7-8308-227DADB5CF70}" srcId="{0F9F144E-5A69-4079-9CFE-833FB141B5B7}" destId="{32074760-1CE6-4EA9-A667-33C7E19C2D94}" srcOrd="0" destOrd="0" parTransId="{41FFA3F1-CAF6-4B0C-90FB-AAF097D8C840}" sibTransId="{66E711EC-17A3-40E0-B60B-5A2F466C9D11}"/>
-    <dgm:cxn modelId="{7A675828-0E86-4177-A02F-94B30E827A0C}" type="presOf" srcId="{0F9F144E-5A69-4079-9CFE-833FB141B5B7}" destId="{9046789A-6150-4534-817A-88A1F11F0BDA}" srcOrd="0" destOrd="0" presId="urn:microsoft.com/office/officeart/2005/8/layout/lProcess2"/>
-    <dgm:cxn modelId="{92E0E4AC-AA4F-4221-B4F5-BC44ADD50226}" srcId="{F5E45C32-85BB-467F-80E6-A808871E72F3}" destId="{FA9C7340-018E-4F73-A402-B7FF8C34CDC0}" srcOrd="1" destOrd="0" parTransId="{1805A85A-B92E-48E0-886D-23F094607276}" sibTransId="{44F9A519-DD68-4648-B8E0-DFC7EF2120B7}"/>
-    <dgm:cxn modelId="{F53C5B60-EE78-46AA-90FC-BDF2F3396876}" srcId="{DF4857E7-5C40-4E4D-8F9E-0F40BE240B2F}" destId="{68DE1B8C-EBBC-4ACF-AD69-E108E4A8C85C}" srcOrd="3" destOrd="0" parTransId="{94D73433-720A-40B7-8E81-899280B4DD52}" sibTransId="{10D11475-433C-4D63-8B5E-9E928E6DD9A1}"/>
-    <dgm:cxn modelId="{E3FD7D9B-7A36-4D12-B188-0A0D1AF9C129}" type="presOf" srcId="{68DE1B8C-EBBC-4ACF-AD69-E108E4A8C85C}" destId="{DFC8EC82-A76D-41CD-A597-E02C5F5CBEEE}" srcOrd="0" destOrd="0" presId="urn:microsoft.com/office/officeart/2005/8/layout/lProcess2"/>
-    <dgm:cxn modelId="{B4186457-1219-426F-922C-5AECDCC53AC0}" srcId="{68DE1B8C-EBBC-4ACF-AD69-E108E4A8C85C}" destId="{8C9EF0B8-B348-4F26-938D-6A3D8F1D01C9}" srcOrd="0" destOrd="0" parTransId="{317FEE05-7414-4035-9841-8DABE546206E}" sibTransId="{5DAD05BE-4905-4E9C-9DE0-125B4DBFBE33}"/>
     <dgm:cxn modelId="{E45813B2-B87D-4638-B83F-E35E092B0951}" type="presParOf" srcId="{4514D2E9-87FF-454C-A554-FD761A8568C7}" destId="{D7F4306A-6D29-4C14-BF5D-EE8CBCC47C9B}" srcOrd="0" destOrd="0" presId="urn:microsoft.com/office/officeart/2005/8/layout/lProcess2"/>
     <dgm:cxn modelId="{B70D7543-B290-431E-8E27-81EE23763ABD}" type="presParOf" srcId="{D7F4306A-6D29-4C14-BF5D-EE8CBCC47C9B}" destId="{9046789A-6150-4534-817A-88A1F11F0BDA}" srcOrd="0" destOrd="0" presId="urn:microsoft.com/office/officeart/2005/8/layout/lProcess2"/>
     <dgm:cxn modelId="{EBC5D71A-D089-4FA3-8176-B37E02AAD50D}" type="presParOf" srcId="{D7F4306A-6D29-4C14-BF5D-EE8CBCC47C9B}" destId="{F032D9DC-6E96-4533-82F7-966FA94900AA}" srcOrd="1" destOrd="0" presId="urn:microsoft.com/office/officeart/2005/8/layout/lProcess2"/>
@@ -3988,7 +3989,7 @@
           <a:p>
             <a:fld id="{20EA5F0D-C1DC-412F-A146-DDB3A74B588F}" type="datetimeFigureOut">
               <a:rPr lang="pt-BR" smtClean="0"/>
-              <a:t>26/11/2013</a:t>
+              <a:t>28/11/2013</a:t>
             </a:fld>
             <a:endParaRPr lang="pt-BR" dirty="0"/>
           </a:p>
@@ -4153,7 +4154,7 @@
           <a:p>
             <a:fld id="{A8CDE508-72C8-4AB5-AA9C-1584D31690E0}" type="datetimeFigureOut">
               <a:rPr lang="pt-BR" smtClean="0"/>
-              <a:t>26/11/2013</a:t>
+              <a:t>28/11/2013</a:t>
             </a:fld>
             <a:endParaRPr lang="pt-BR" dirty="0"/>
           </a:p>
@@ -4820,7 +4821,7 @@
                 <a:ea typeface="+mn-ea"/>
                 <a:cs typeface="+mn-cs"/>
               </a:rPr>
-              <a:t>9</a:t>
+              <a:t>10</a:t>
             </a:fld>
             <a:endParaRPr lang="en-US" sz="1200" b="0" i="0">
               <a:latin typeface="Corbel"/>
@@ -5462,7 +5463,7 @@
             <a:fld id="{9E583DDF-CA54-461A-A486-592D2374C532}" type="datetimeFigureOut">
               <a:rPr lang="pt-BR" smtClean="0"/>
               <a:pPr/>
-              <a:t>26/11/2013</a:t>
+              <a:t>28/11/2013</a:t>
             </a:fld>
             <a:endParaRPr lang="pt-BR" dirty="0"/>
           </a:p>
@@ -5838,7 +5839,7 @@
           <a:p>
             <a:fld id="{9E583DDF-CA54-461A-A486-592D2374C532}" type="datetimeFigureOut">
               <a:rPr lang="pt-BR" smtClean="0"/>
-              <a:t>26/11/2013</a:t>
+              <a:t>28/11/2013</a:t>
             </a:fld>
             <a:endParaRPr lang="pt-BR" dirty="0"/>
           </a:p>
@@ -6020,7 +6021,7 @@
           <a:p>
             <a:fld id="{9E583DDF-CA54-461A-A486-592D2374C532}" type="datetimeFigureOut">
               <a:rPr lang="pt-BR" smtClean="0"/>
-              <a:t>26/11/2013</a:t>
+              <a:t>28/11/2013</a:t>
             </a:fld>
             <a:endParaRPr lang="pt-BR" dirty="0"/>
           </a:p>
@@ -6212,7 +6213,7 @@
           <a:p>
             <a:fld id="{9E583DDF-CA54-461A-A486-592D2374C532}" type="datetimeFigureOut">
               <a:rPr lang="pt-BR" smtClean="0"/>
-              <a:t>26/11/2013</a:t>
+              <a:t>28/11/2013</a:t>
             </a:fld>
             <a:endParaRPr lang="pt-BR" dirty="0"/>
           </a:p>
@@ -6398,7 +6399,7 @@
           <a:p>
             <a:fld id="{9E583DDF-CA54-461A-A486-592D2374C532}" type="datetimeFigureOut">
               <a:rPr lang="pt-BR" smtClean="0"/>
-              <a:t>26/11/2013</a:t>
+              <a:t>28/11/2013</a:t>
             </a:fld>
             <a:endParaRPr lang="pt-BR" dirty="0"/>
           </a:p>
@@ -6782,7 +6783,7 @@
           <a:p>
             <a:fld id="{9E583DDF-CA54-461A-A486-592D2374C532}" type="datetimeFigureOut">
               <a:rPr lang="pt-BR" smtClean="0"/>
-              <a:t>26/11/2013</a:t>
+              <a:t>28/11/2013</a:t>
             </a:fld>
             <a:endParaRPr lang="pt-BR" dirty="0"/>
           </a:p>
@@ -7063,7 +7064,7 @@
             <a:fld id="{9E583DDF-CA54-461A-A486-592D2374C532}" type="datetimeFigureOut">
               <a:rPr lang="pt-BR" smtClean="0"/>
               <a:pPr/>
-              <a:t>26/11/2013</a:t>
+              <a:t>28/11/2013</a:t>
             </a:fld>
             <a:endParaRPr lang="pt-BR" dirty="0"/>
           </a:p>
@@ -7384,7 +7385,7 @@
           <a:p>
             <a:fld id="{9DD7D43D-6574-4C7B-808D-C6C12215A4D4}" type="datetimeFigureOut">
               <a:rPr lang="pt-BR" smtClean="0"/>
-              <a:t>26/11/2013</a:t>
+              <a:t>28/11/2013</a:t>
             </a:fld>
             <a:endParaRPr lang="pt-BR" dirty="0"/>
           </a:p>
@@ -7833,7 +7834,7 @@
           <a:p>
             <a:fld id="{9E583DDF-CA54-461A-A486-592D2374C532}" type="datetimeFigureOut">
               <a:rPr lang="pt-BR" smtClean="0"/>
-              <a:t>26/11/2013</a:t>
+              <a:t>28/11/2013</a:t>
             </a:fld>
             <a:endParaRPr lang="pt-BR" dirty="0"/>
           </a:p>
@@ -7963,7 +7964,7 @@
           <a:p>
             <a:fld id="{9E583DDF-CA54-461A-A486-592D2374C532}" type="datetimeFigureOut">
               <a:rPr lang="pt-BR" smtClean="0"/>
-              <a:t>26/11/2013</a:t>
+              <a:t>28/11/2013</a:t>
             </a:fld>
             <a:endParaRPr lang="pt-BR" dirty="0"/>
           </a:p>
@@ -8079,7 +8080,7 @@
             <a:fld id="{9E583DDF-CA54-461A-A486-592D2374C532}" type="datetimeFigureOut">
               <a:rPr lang="pt-BR" smtClean="0"/>
               <a:pPr/>
-              <a:t>26/11/2013</a:t>
+              <a:t>28/11/2013</a:t>
             </a:fld>
             <a:endParaRPr lang="pt-BR" dirty="0"/>
           </a:p>
@@ -8394,7 +8395,7 @@
           <a:p>
             <a:fld id="{9E583DDF-CA54-461A-A486-592D2374C532}" type="datetimeFigureOut">
               <a:rPr lang="pt-BR" smtClean="0"/>
-              <a:t>26/11/2013</a:t>
+              <a:t>28/11/2013</a:t>
             </a:fld>
             <a:endParaRPr lang="pt-BR" dirty="0"/>
           </a:p>
@@ -8762,7 +8763,7 @@
             <a:fld id="{9E583DDF-CA54-461A-A486-592D2374C532}" type="datetimeFigureOut">
               <a:rPr lang="pt-BR" smtClean="0"/>
               <a:pPr/>
-              <a:t>26/11/2013</a:t>
+              <a:t>28/11/2013</a:t>
             </a:fld>
             <a:endParaRPr lang="pt-BR" dirty="0"/>
           </a:p>
@@ -9327,7 +9328,7 @@
       </p:grpSpPr>
       <p:sp>
         <p:nvSpPr>
-          <p:cNvPr id="5" name="Título 4"/>
+          <p:cNvPr id="2" name="Título 1"/>
           <p:cNvSpPr>
             <a:spLocks noGrp="1"/>
           </p:cNvSpPr>
@@ -9335,73 +9336,697 @@
             <p:ph type="title"/>
           </p:nvPr>
         </p:nvSpPr>
-        <p:spPr/>
+        <p:spPr>
+          <a:xfrm>
+            <a:off x="1341120" y="467360"/>
+            <a:ext cx="9509760" cy="801400"/>
+          </a:xfrm>
+        </p:spPr>
         <p:txBody>
-          <a:bodyPr/>
+          <a:bodyPr>
+            <a:normAutofit/>
+          </a:bodyPr>
           <a:lstStyle/>
           <a:p>
-            <a:r>
-              <a:rPr lang="pt-BR" sz="3600" dirty="0">
+            <a:pPr marL="0" indent="0" algn="l" defTabSz="914400">
+              <a:lnSpc>
+                <a:spcPct val="90000"/>
+              </a:lnSpc>
+              <a:spcBef>
+                <a:spcPts val="0"/>
+              </a:spcBef>
+              <a:buNone/>
+            </a:pPr>
+            <a:r>
+              <a:rPr lang="pt-BR" dirty="0" smtClean="0">
                 <a:solidFill>
-                  <a:srgbClr val="263050"/>
+                  <a:srgbClr val="263050">
+                    <a:lumMod val="75000"/>
+                  </a:srgbClr>
                 </a:solidFill>
+                <a:latin typeface="Corbel"/>
               </a:rPr>
-              <a:t>Projeto de teste</a:t>
-            </a:r>
-            <a:endParaRPr lang="pt-BR" dirty="0"/>
+              <a:t>Elaboração de Cronograma</a:t>
+            </a:r>
+            <a:endParaRPr lang="pt-BR" sz="3400" b="0" i="0" dirty="0">
+              <a:solidFill>
+                <a:srgbClr val="263050">
+                  <a:lumMod val="75000"/>
+                </a:srgbClr>
+              </a:solidFill>
+              <a:latin typeface="Corbel"/>
+              <a:ea typeface="+mj-ea"/>
+              <a:cs typeface="+mj-cs"/>
+            </a:endParaRPr>
           </a:p>
         </p:txBody>
       </p:sp>
-      <p:sp>
-        <p:nvSpPr>
-          <p:cNvPr id="8" name="Retângulo 7"/>
-          <p:cNvSpPr/>
-          <p:nvPr/>
-        </p:nvSpPr>
-        <p:spPr>
-          <a:xfrm>
-            <a:off x="479376" y="3284984"/>
-            <a:ext cx="10945216" cy="1200329"/>
-          </a:xfrm>
-          <a:prstGeom prst="rect">
-            <a:avLst/>
-          </a:prstGeom>
-        </p:spPr>
-        <p:txBody>
-          <a:bodyPr wrap="square">
-            <a:spAutoFit/>
-          </a:bodyPr>
-          <a:lstStyle/>
-          <a:p>
-            <a:r>
-              <a:rPr lang="pt-BR" dirty="0"/>
-              <a:t>Objetivo:</a:t>
-            </a:r>
-          </a:p>
-          <a:p>
-            <a:r>
-              <a:rPr lang="pt-BR" dirty="0"/>
-              <a:t>– Identificar e descrever os casos de teste para cada build, e</a:t>
-            </a:r>
-          </a:p>
-          <a:p>
-            <a:r>
-              <a:rPr lang="pt-BR" dirty="0"/>
-              <a:t>identificar e estruturar os procedimentos de teste, especificando</a:t>
-            </a:r>
-          </a:p>
-          <a:p>
-            <a:r>
-              <a:rPr lang="pt-BR" dirty="0"/>
-              <a:t>como executar os casos de teste.</a:t>
-            </a:r>
-          </a:p>
-        </p:txBody>
-      </p:sp>
+      <p:graphicFrame>
+        <p:nvGraphicFramePr>
+          <p:cNvPr id="5" name="Espaço Reservado para Conteúdo 4"/>
+          <p:cNvGraphicFramePr>
+            <a:graphicFrameLocks noGrp="1"/>
+          </p:cNvGraphicFramePr>
+          <p:nvPr>
+            <p:ph idx="1"/>
+            <p:extLst>
+              <p:ext uri="{D42A27DB-BD31-4B8C-83A1-F6EECF244321}">
+                <p14:modId xmlns:p14="http://schemas.microsoft.com/office/powerpoint/2010/main" val="3534917820"/>
+              </p:ext>
+            </p:extLst>
+          </p:nvPr>
+        </p:nvGraphicFramePr>
+        <p:xfrm>
+          <a:off x="335360" y="1772819"/>
+          <a:ext cx="11449272" cy="4392486"/>
+        </p:xfrm>
+        <a:graphic>
+          <a:graphicData uri="http://schemas.openxmlformats.org/drawingml/2006/table">
+            <a:tbl>
+              <a:tblPr firstRow="1" firstCol="1" bandRow="1">
+                <a:tableStyleId>{B301B821-A1FF-4177-AEE7-76D212191A09}</a:tableStyleId>
+              </a:tblPr>
+              <a:tblGrid>
+                <a:gridCol w="3815620"/>
+                <a:gridCol w="3816826"/>
+                <a:gridCol w="3816826"/>
+              </a:tblGrid>
+              <a:tr h="627498">
+                <a:tc>
+                  <a:txBody>
+                    <a:bodyPr/>
+                    <a:lstStyle/>
+                    <a:p>
+                      <a:pPr>
+                        <a:lnSpc>
+                          <a:spcPts val="1200"/>
+                        </a:lnSpc>
+                        <a:spcAft>
+                          <a:spcPts val="0"/>
+                        </a:spcAft>
+                      </a:pPr>
+                      <a:r>
+                        <a:rPr lang="pt-BR" sz="1100" dirty="0" err="1">
+                          <a:effectLst/>
+                        </a:rPr>
+                        <a:t>Milestone</a:t>
+                      </a:r>
+                      <a:endParaRPr lang="pt-BR" sz="1000" dirty="0">
+                        <a:effectLst/>
+                        <a:latin typeface="Times New Roman"/>
+                        <a:ea typeface="Times New Roman"/>
+                      </a:endParaRPr>
+                    </a:p>
+                  </a:txBody>
+                  <a:tcPr marL="68580" marR="68580" marT="0" marB="0"/>
+                </a:tc>
+                <a:tc>
+                  <a:txBody>
+                    <a:bodyPr/>
+                    <a:lstStyle/>
+                    <a:p>
+                      <a:pPr>
+                        <a:lnSpc>
+                          <a:spcPts val="1200"/>
+                        </a:lnSpc>
+                        <a:spcAft>
+                          <a:spcPts val="0"/>
+                        </a:spcAft>
+                      </a:pPr>
+                      <a:r>
+                        <a:rPr lang="pt-BR" sz="1100">
+                          <a:effectLst/>
+                        </a:rPr>
+                        <a:t>Data de Início</a:t>
+                      </a:r>
+                      <a:endParaRPr lang="pt-BR" sz="1000">
+                        <a:effectLst/>
+                        <a:latin typeface="Times New Roman"/>
+                        <a:ea typeface="Times New Roman"/>
+                      </a:endParaRPr>
+                    </a:p>
+                  </a:txBody>
+                  <a:tcPr marL="68580" marR="68580" marT="0" marB="0"/>
+                </a:tc>
+                <a:tc>
+                  <a:txBody>
+                    <a:bodyPr/>
+                    <a:lstStyle/>
+                    <a:p>
+                      <a:pPr>
+                        <a:lnSpc>
+                          <a:spcPts val="1200"/>
+                        </a:lnSpc>
+                        <a:spcAft>
+                          <a:spcPts val="0"/>
+                        </a:spcAft>
+                      </a:pPr>
+                      <a:r>
+                        <a:rPr lang="pt-BR" sz="1100">
+                          <a:effectLst/>
+                        </a:rPr>
+                        <a:t>Data de Término</a:t>
+                      </a:r>
+                      <a:endParaRPr lang="pt-BR" sz="1000">
+                        <a:effectLst/>
+                        <a:latin typeface="Times New Roman"/>
+                        <a:ea typeface="Times New Roman"/>
+                      </a:endParaRPr>
+                    </a:p>
+                  </a:txBody>
+                  <a:tcPr marL="68580" marR="68580" marT="0" marB="0"/>
+                </a:tc>
+              </a:tr>
+              <a:tr h="627498">
+                <a:tc>
+                  <a:txBody>
+                    <a:bodyPr/>
+                    <a:lstStyle/>
+                    <a:p>
+                      <a:pPr>
+                        <a:lnSpc>
+                          <a:spcPts val="1200"/>
+                        </a:lnSpc>
+                        <a:spcAft>
+                          <a:spcPts val="0"/>
+                        </a:spcAft>
+                      </a:pPr>
+                      <a:r>
+                        <a:rPr lang="pt-BR" sz="1000">
+                          <a:effectLst/>
+                        </a:rPr>
+                        <a:t>Planejar Teste</a:t>
+                      </a:r>
+                      <a:endParaRPr lang="pt-BR" sz="1000">
+                        <a:effectLst/>
+                        <a:latin typeface="Times New Roman"/>
+                        <a:ea typeface="Times New Roman"/>
+                      </a:endParaRPr>
+                    </a:p>
+                  </a:txBody>
+                  <a:tcPr marL="68580" marR="68580" marT="0" marB="0"/>
+                </a:tc>
+                <a:tc>
+                  <a:txBody>
+                    <a:bodyPr/>
+                    <a:lstStyle/>
+                    <a:p>
+                      <a:pPr>
+                        <a:lnSpc>
+                          <a:spcPts val="1200"/>
+                        </a:lnSpc>
+                        <a:spcAft>
+                          <a:spcPts val="0"/>
+                        </a:spcAft>
+                      </a:pPr>
+                      <a:r>
+                        <a:rPr lang="pt-BR" sz="1000">
+                          <a:effectLst/>
+                        </a:rPr>
+                        <a:t>10/10/2013</a:t>
+                      </a:r>
+                      <a:endParaRPr lang="pt-BR" sz="1000">
+                        <a:effectLst/>
+                        <a:latin typeface="Times New Roman"/>
+                        <a:ea typeface="Times New Roman"/>
+                      </a:endParaRPr>
+                    </a:p>
+                  </a:txBody>
+                  <a:tcPr marL="68580" marR="68580" marT="0" marB="0"/>
+                </a:tc>
+                <a:tc>
+                  <a:txBody>
+                    <a:bodyPr/>
+                    <a:lstStyle/>
+                    <a:p>
+                      <a:pPr>
+                        <a:lnSpc>
+                          <a:spcPts val="1200"/>
+                        </a:lnSpc>
+                        <a:spcAft>
+                          <a:spcPts val="0"/>
+                        </a:spcAft>
+                      </a:pPr>
+                      <a:r>
+                        <a:rPr lang="pt-BR" sz="1000">
+                          <a:effectLst/>
+                        </a:rPr>
+                        <a:t>12/10/2013</a:t>
+                      </a:r>
+                      <a:endParaRPr lang="pt-BR" sz="1000">
+                        <a:effectLst/>
+                        <a:latin typeface="Times New Roman"/>
+                        <a:ea typeface="Times New Roman"/>
+                      </a:endParaRPr>
+                    </a:p>
+                  </a:txBody>
+                  <a:tcPr marL="68580" marR="68580" marT="0" marB="0"/>
+                </a:tc>
+              </a:tr>
+              <a:tr h="627498">
+                <a:tc>
+                  <a:txBody>
+                    <a:bodyPr/>
+                    <a:lstStyle/>
+                    <a:p>
+                      <a:pPr>
+                        <a:lnSpc>
+                          <a:spcPts val="1200"/>
+                        </a:lnSpc>
+                        <a:spcAft>
+                          <a:spcPts val="0"/>
+                        </a:spcAft>
+                      </a:pPr>
+                      <a:r>
+                        <a:rPr lang="pt-BR" sz="1000">
+                          <a:effectLst/>
+                        </a:rPr>
+                        <a:t>Projetar Teste</a:t>
+                      </a:r>
+                      <a:endParaRPr lang="pt-BR" sz="1000">
+                        <a:effectLst/>
+                        <a:latin typeface="Times New Roman"/>
+                        <a:ea typeface="Times New Roman"/>
+                      </a:endParaRPr>
+                    </a:p>
+                  </a:txBody>
+                  <a:tcPr marL="68580" marR="68580" marT="0" marB="0"/>
+                </a:tc>
+                <a:tc>
+                  <a:txBody>
+                    <a:bodyPr/>
+                    <a:lstStyle/>
+                    <a:p>
+                      <a:pPr>
+                        <a:lnSpc>
+                          <a:spcPts val="1200"/>
+                        </a:lnSpc>
+                        <a:spcAft>
+                          <a:spcPts val="0"/>
+                        </a:spcAft>
+                      </a:pPr>
+                      <a:r>
+                        <a:rPr lang="pt-BR" sz="1000">
+                          <a:effectLst/>
+                        </a:rPr>
+                        <a:t>12/10/2013</a:t>
+                      </a:r>
+                      <a:endParaRPr lang="pt-BR" sz="1000">
+                        <a:effectLst/>
+                        <a:latin typeface="Times New Roman"/>
+                        <a:ea typeface="Times New Roman"/>
+                      </a:endParaRPr>
+                    </a:p>
+                  </a:txBody>
+                  <a:tcPr marL="68580" marR="68580" marT="0" marB="0"/>
+                </a:tc>
+                <a:tc>
+                  <a:txBody>
+                    <a:bodyPr/>
+                    <a:lstStyle/>
+                    <a:p>
+                      <a:pPr>
+                        <a:lnSpc>
+                          <a:spcPts val="1200"/>
+                        </a:lnSpc>
+                        <a:spcAft>
+                          <a:spcPts val="0"/>
+                        </a:spcAft>
+                      </a:pPr>
+                      <a:r>
+                        <a:rPr lang="pt-BR" sz="1000">
+                          <a:effectLst/>
+                        </a:rPr>
+                        <a:t>16/10/2013</a:t>
+                      </a:r>
+                      <a:endParaRPr lang="pt-BR" sz="1000">
+                        <a:effectLst/>
+                        <a:latin typeface="Times New Roman"/>
+                        <a:ea typeface="Times New Roman"/>
+                      </a:endParaRPr>
+                    </a:p>
+                  </a:txBody>
+                  <a:tcPr marL="68580" marR="68580" marT="0" marB="0"/>
+                </a:tc>
+              </a:tr>
+              <a:tr h="627498">
+                <a:tc>
+                  <a:txBody>
+                    <a:bodyPr/>
+                    <a:lstStyle/>
+                    <a:p>
+                      <a:pPr>
+                        <a:lnSpc>
+                          <a:spcPts val="1200"/>
+                        </a:lnSpc>
+                        <a:spcAft>
+                          <a:spcPts val="0"/>
+                        </a:spcAft>
+                      </a:pPr>
+                      <a:r>
+                        <a:rPr lang="pt-BR" sz="1000">
+                          <a:effectLst/>
+                        </a:rPr>
+                        <a:t>Implementar Teste</a:t>
+                      </a:r>
+                      <a:endParaRPr lang="pt-BR" sz="1000">
+                        <a:effectLst/>
+                        <a:latin typeface="Times New Roman"/>
+                        <a:ea typeface="Times New Roman"/>
+                      </a:endParaRPr>
+                    </a:p>
+                  </a:txBody>
+                  <a:tcPr marL="68580" marR="68580" marT="0" marB="0"/>
+                </a:tc>
+                <a:tc>
+                  <a:txBody>
+                    <a:bodyPr/>
+                    <a:lstStyle/>
+                    <a:p>
+                      <a:pPr>
+                        <a:lnSpc>
+                          <a:spcPts val="1200"/>
+                        </a:lnSpc>
+                        <a:spcAft>
+                          <a:spcPts val="0"/>
+                        </a:spcAft>
+                      </a:pPr>
+                      <a:r>
+                        <a:rPr lang="pt-BR" sz="1000" dirty="0">
+                          <a:effectLst/>
+                        </a:rPr>
+                        <a:t>Não teremos</a:t>
+                      </a:r>
+                      <a:endParaRPr lang="pt-BR" sz="1000" dirty="0">
+                        <a:effectLst/>
+                        <a:latin typeface="Times New Roman"/>
+                        <a:ea typeface="Times New Roman"/>
+                      </a:endParaRPr>
+                    </a:p>
+                  </a:txBody>
+                  <a:tcPr marL="68580" marR="68580" marT="0" marB="0"/>
+                </a:tc>
+                <a:tc>
+                  <a:txBody>
+                    <a:bodyPr/>
+                    <a:lstStyle/>
+                    <a:p>
+                      <a:pPr>
+                        <a:lnSpc>
+                          <a:spcPts val="1200"/>
+                        </a:lnSpc>
+                        <a:spcAft>
+                          <a:spcPts val="0"/>
+                        </a:spcAft>
+                      </a:pPr>
+                      <a:r>
+                        <a:rPr lang="pt-BR" sz="1000">
+                          <a:effectLst/>
+                        </a:rPr>
+                        <a:t>Não teremos</a:t>
+                      </a:r>
+                      <a:endParaRPr lang="pt-BR" sz="1000">
+                        <a:effectLst/>
+                        <a:latin typeface="Times New Roman"/>
+                        <a:ea typeface="Times New Roman"/>
+                      </a:endParaRPr>
+                    </a:p>
+                  </a:txBody>
+                  <a:tcPr marL="68580" marR="68580" marT="0" marB="0"/>
+                </a:tc>
+              </a:tr>
+              <a:tr h="627498">
+                <a:tc>
+                  <a:txBody>
+                    <a:bodyPr/>
+                    <a:lstStyle/>
+                    <a:p>
+                      <a:pPr>
+                        <a:lnSpc>
+                          <a:spcPts val="1200"/>
+                        </a:lnSpc>
+                        <a:spcAft>
+                          <a:spcPts val="0"/>
+                        </a:spcAft>
+                      </a:pPr>
+                      <a:r>
+                        <a:rPr lang="pt-BR" sz="1000">
+                          <a:effectLst/>
+                        </a:rPr>
+                        <a:t>Executar Teste</a:t>
+                      </a:r>
+                      <a:endParaRPr lang="pt-BR" sz="1000">
+                        <a:effectLst/>
+                        <a:latin typeface="Times New Roman"/>
+                        <a:ea typeface="Times New Roman"/>
+                      </a:endParaRPr>
+                    </a:p>
+                  </a:txBody>
+                  <a:tcPr marL="68580" marR="68580" marT="0" marB="0"/>
+                </a:tc>
+                <a:tc>
+                  <a:txBody>
+                    <a:bodyPr/>
+                    <a:lstStyle/>
+                    <a:p>
+                      <a:pPr>
+                        <a:lnSpc>
+                          <a:spcPts val="1200"/>
+                        </a:lnSpc>
+                        <a:spcAft>
+                          <a:spcPts val="0"/>
+                        </a:spcAft>
+                      </a:pPr>
+                      <a:r>
+                        <a:rPr lang="pt-BR" sz="1000">
+                          <a:effectLst/>
+                        </a:rPr>
+                        <a:t>Não terremos</a:t>
+                      </a:r>
+                      <a:endParaRPr lang="pt-BR" sz="1000">
+                        <a:effectLst/>
+                        <a:latin typeface="Times New Roman"/>
+                        <a:ea typeface="Times New Roman"/>
+                      </a:endParaRPr>
+                    </a:p>
+                  </a:txBody>
+                  <a:tcPr marL="68580" marR="68580" marT="0" marB="0"/>
+                </a:tc>
+                <a:tc>
+                  <a:txBody>
+                    <a:bodyPr/>
+                    <a:lstStyle/>
+                    <a:p>
+                      <a:pPr>
+                        <a:lnSpc>
+                          <a:spcPts val="1200"/>
+                        </a:lnSpc>
+                        <a:spcAft>
+                          <a:spcPts val="0"/>
+                        </a:spcAft>
+                      </a:pPr>
+                      <a:r>
+                        <a:rPr lang="pt-BR" sz="1000">
+                          <a:effectLst/>
+                        </a:rPr>
+                        <a:t>Não terremos</a:t>
+                      </a:r>
+                      <a:endParaRPr lang="pt-BR" sz="1000">
+                        <a:effectLst/>
+                        <a:latin typeface="Times New Roman"/>
+                        <a:ea typeface="Times New Roman"/>
+                      </a:endParaRPr>
+                    </a:p>
+                  </a:txBody>
+                  <a:tcPr marL="68580" marR="68580" marT="0" marB="0"/>
+                </a:tc>
+              </a:tr>
+              <a:tr h="627498">
+                <a:tc>
+                  <a:txBody>
+                    <a:bodyPr/>
+                    <a:lstStyle/>
+                    <a:p>
+                      <a:pPr>
+                        <a:lnSpc>
+                          <a:spcPts val="1200"/>
+                        </a:lnSpc>
+                        <a:spcAft>
+                          <a:spcPts val="0"/>
+                        </a:spcAft>
+                      </a:pPr>
+                      <a:r>
+                        <a:rPr lang="pt-BR" sz="1000">
+                          <a:effectLst/>
+                        </a:rPr>
+                        <a:t>Avaliar Teste</a:t>
+                      </a:r>
+                      <a:endParaRPr lang="pt-BR" sz="1000">
+                        <a:effectLst/>
+                        <a:latin typeface="Times New Roman"/>
+                        <a:ea typeface="Times New Roman"/>
+                      </a:endParaRPr>
+                    </a:p>
+                  </a:txBody>
+                  <a:tcPr marL="68580" marR="68580" marT="0" marB="0"/>
+                </a:tc>
+                <a:tc>
+                  <a:txBody>
+                    <a:bodyPr/>
+                    <a:lstStyle/>
+                    <a:p>
+                      <a:pPr>
+                        <a:lnSpc>
+                          <a:spcPts val="1200"/>
+                        </a:lnSpc>
+                        <a:spcAft>
+                          <a:spcPts val="0"/>
+                        </a:spcAft>
+                      </a:pPr>
+                      <a:r>
+                        <a:rPr lang="pt-BR" sz="1000">
+                          <a:effectLst/>
+                        </a:rPr>
+                        <a:t>17/10/2013</a:t>
+                      </a:r>
+                      <a:endParaRPr lang="pt-BR" sz="1000">
+                        <a:effectLst/>
+                        <a:latin typeface="Times New Roman"/>
+                        <a:ea typeface="Times New Roman"/>
+                      </a:endParaRPr>
+                    </a:p>
+                  </a:txBody>
+                  <a:tcPr marL="68580" marR="68580" marT="0" marB="0"/>
+                </a:tc>
+                <a:tc>
+                  <a:txBody>
+                    <a:bodyPr/>
+                    <a:lstStyle/>
+                    <a:p>
+                      <a:pPr>
+                        <a:lnSpc>
+                          <a:spcPts val="1200"/>
+                        </a:lnSpc>
+                        <a:spcAft>
+                          <a:spcPts val="0"/>
+                        </a:spcAft>
+                      </a:pPr>
+                      <a:r>
+                        <a:rPr lang="pt-BR" sz="1000">
+                          <a:effectLst/>
+                        </a:rPr>
+                        <a:t>06/10/2013</a:t>
+                      </a:r>
+                      <a:endParaRPr lang="pt-BR" sz="1000">
+                        <a:effectLst/>
+                        <a:latin typeface="Times New Roman"/>
+                        <a:ea typeface="Times New Roman"/>
+                      </a:endParaRPr>
+                    </a:p>
+                  </a:txBody>
+                  <a:tcPr marL="68580" marR="68580" marT="0" marB="0"/>
+                </a:tc>
+              </a:tr>
+              <a:tr h="627498">
+                <a:tc>
+                  <a:txBody>
+                    <a:bodyPr/>
+                    <a:lstStyle/>
+                    <a:p>
+                      <a:pPr>
+                        <a:lnSpc>
+                          <a:spcPts val="1200"/>
+                        </a:lnSpc>
+                        <a:spcAft>
+                          <a:spcPts val="0"/>
+                        </a:spcAft>
+                      </a:pPr>
+                      <a:r>
+                        <a:rPr lang="pt-BR" sz="1000" dirty="0">
+                          <a:effectLst/>
+                        </a:rPr>
+                        <a:t>Entrega do Release final</a:t>
+                      </a:r>
+                      <a:endParaRPr lang="pt-BR" sz="1000" dirty="0">
+                        <a:effectLst/>
+                        <a:latin typeface="Times New Roman"/>
+                        <a:ea typeface="Times New Roman"/>
+                      </a:endParaRPr>
+                    </a:p>
+                  </a:txBody>
+                  <a:tcPr marL="68580" marR="68580" marT="0" marB="0"/>
+                </a:tc>
+                <a:tc>
+                  <a:txBody>
+                    <a:bodyPr/>
+                    <a:lstStyle/>
+                    <a:p>
+                      <a:pPr>
+                        <a:lnSpc>
+                          <a:spcPts val="1200"/>
+                        </a:lnSpc>
+                        <a:spcAft>
+                          <a:spcPts val="0"/>
+                        </a:spcAft>
+                      </a:pPr>
+                      <a:r>
+                        <a:rPr lang="pt-BR" sz="1000">
+                          <a:effectLst/>
+                        </a:rPr>
+                        <a:t>07</a:t>
+                      </a:r>
+                      <a:r>
+                        <a:rPr lang="en-US" sz="1000">
+                          <a:effectLst/>
+                        </a:rPr>
+                        <a:t>/11/2013</a:t>
+                      </a:r>
+                      <a:endParaRPr lang="pt-BR" sz="1000">
+                        <a:effectLst/>
+                        <a:latin typeface="Times New Roman"/>
+                        <a:ea typeface="Times New Roman"/>
+                      </a:endParaRPr>
+                    </a:p>
+                  </a:txBody>
+                  <a:tcPr marL="68580" marR="68580" marT="0" marB="0"/>
+                </a:tc>
+                <a:tc>
+                  <a:txBody>
+                    <a:bodyPr/>
+                    <a:lstStyle/>
+                    <a:p>
+                      <a:pPr>
+                        <a:lnSpc>
+                          <a:spcPts val="1200"/>
+                        </a:lnSpc>
+                        <a:spcAft>
+                          <a:spcPts val="0"/>
+                        </a:spcAft>
+                      </a:pPr>
+                      <a:r>
+                        <a:rPr lang="pt-BR" sz="1000" dirty="0">
+                          <a:effectLst/>
+                        </a:rPr>
+                        <a:t>21/11/2013</a:t>
+                      </a:r>
+                      <a:endParaRPr lang="pt-BR" sz="1000" dirty="0">
+                        <a:effectLst/>
+                        <a:latin typeface="Times New Roman"/>
+                        <a:ea typeface="Times New Roman"/>
+                      </a:endParaRPr>
+                    </a:p>
+                  </a:txBody>
+                  <a:tcPr marL="68580" marR="68580" marT="0" marB="0"/>
+                </a:tc>
+              </a:tr>
+            </a:tbl>
+          </a:graphicData>
+        </a:graphic>
+      </p:graphicFrame>
     </p:spTree>
     <p:extLst>
       <p:ext uri="{BB962C8B-B14F-4D97-AF65-F5344CB8AC3E}">
-        <p14:creationId xmlns:p14="http://schemas.microsoft.com/office/powerpoint/2010/main" val="4091845372"/>
+        <p14:creationId xmlns:p14="http://schemas.microsoft.com/office/powerpoint/2010/main" val="3676793758"/>
       </p:ext>
     </p:extLst>
   </p:cSld>
@@ -9420,6 +10045,13 @@
       </p:transition>
     </mc:Fallback>
   </mc:AlternateContent>
+  <p:timing>
+    <p:tnLst>
+      <p:par>
+        <p:cTn id="1" dur="indefinite" restart="never" nodeType="tmRoot"/>
+      </p:par>
+    </p:tnLst>
+  </p:timing>
 </p:sld>
 </file>
 
@@ -9469,14 +10101,14 @@
       </p:sp>
       <p:sp>
         <p:nvSpPr>
-          <p:cNvPr id="2" name="Retângulo 1"/>
+          <p:cNvPr id="8" name="Retângulo 7"/>
           <p:cNvSpPr/>
           <p:nvPr/>
         </p:nvSpPr>
         <p:spPr>
           <a:xfrm>
-            <a:off x="298598" y="2708920"/>
-            <a:ext cx="12926193" cy="1477328"/>
+            <a:off x="479376" y="3284984"/>
+            <a:ext cx="10945216" cy="1200329"/>
           </a:xfrm>
           <a:prstGeom prst="rect">
             <a:avLst/>
@@ -9490,69 +10122,33 @@
           <a:p>
             <a:r>
               <a:rPr lang="pt-BR" dirty="0"/>
-              <a:t>• </a:t>
-            </a:r>
-            <a:r>
-              <a:rPr lang="pt-BR" dirty="0" smtClean="0"/>
-              <a:t>Passos</a:t>
-            </a:r>
-            <a:endParaRPr lang="pt-BR" dirty="0"/>
-          </a:p>
-          <a:p>
-            <a:pPr marL="342900" indent="-342900">
-              <a:buAutoNum type="arabicPeriod"/>
-            </a:pPr>
-            <a:r>
-              <a:rPr lang="pt-BR" dirty="0" smtClean="0"/>
-              <a:t>Identificar </a:t>
-            </a:r>
+              <a:t>Objetivo:</a:t>
+            </a:r>
+          </a:p>
+          <a:p>
             <a:r>
               <a:rPr lang="pt-BR" dirty="0"/>
-              <a:t>e descrever casos de </a:t>
-            </a:r>
-            <a:r>
-              <a:rPr lang="pt-BR" dirty="0" smtClean="0"/>
-              <a:t>teste</a:t>
-            </a:r>
-            <a:endParaRPr lang="pt-BR" dirty="0"/>
+              <a:t>– Identificar e descrever os casos de teste para cada build, e</a:t>
+            </a:r>
           </a:p>
           <a:p>
             <a:r>
               <a:rPr lang="pt-BR" dirty="0"/>
-              <a:t>2</a:t>
-            </a:r>
-            <a:r>
-              <a:rPr lang="pt-BR" dirty="0" smtClean="0"/>
-              <a:t>.   </a:t>
-            </a:r>
+              <a:t>identificar e estruturar os procedimentos de teste, especificando</a:t>
+            </a:r>
+          </a:p>
+          <a:p>
             <a:r>
               <a:rPr lang="pt-BR" dirty="0"/>
-              <a:t>Estruturar procedimentos de teste</a:t>
-            </a:r>
-          </a:p>
-          <a:p>
-            <a:r>
-              <a:rPr lang="pt-BR" dirty="0"/>
-              <a:t>3</a:t>
-            </a:r>
-            <a:r>
-              <a:rPr lang="pt-BR" dirty="0" smtClean="0"/>
-              <a:t>.   </a:t>
-            </a:r>
-            <a:r>
-              <a:rPr lang="pt-BR" dirty="0"/>
-              <a:t>Gerar planilha de testes</a:t>
-            </a:r>
-          </a:p>
-          <a:p>
-            <a:endParaRPr lang="pt-BR" dirty="0"/>
+              <a:t>como executar os casos de teste.</a:t>
+            </a:r>
           </a:p>
         </p:txBody>
       </p:sp>
     </p:spTree>
     <p:extLst>
       <p:ext uri="{BB962C8B-B14F-4D97-AF65-F5344CB8AC3E}">
-        <p14:creationId xmlns:p14="http://schemas.microsoft.com/office/powerpoint/2010/main" val="1566485322"/>
+        <p14:creationId xmlns:p14="http://schemas.microsoft.com/office/powerpoint/2010/main" val="4091845372"/>
       </p:ext>
     </p:extLst>
   </p:cSld>
@@ -9593,7 +10189,7 @@
       </p:grpSpPr>
       <p:sp>
         <p:nvSpPr>
-          <p:cNvPr id="3" name="Título 2"/>
+          <p:cNvPr id="5" name="Título 4"/>
           <p:cNvSpPr>
             <a:spLocks noGrp="1"/>
           </p:cNvSpPr>
@@ -9601,33 +10197,33 @@
             <p:ph type="title"/>
           </p:nvPr>
         </p:nvSpPr>
-        <p:spPr>
-          <a:xfrm>
-            <a:off x="983432" y="467360"/>
-            <a:ext cx="9867448" cy="1233424"/>
-          </a:xfrm>
-        </p:spPr>
+        <p:spPr/>
         <p:txBody>
           <a:bodyPr/>
           <a:lstStyle/>
           <a:p>
             <a:r>
-              <a:rPr lang="pt-BR" dirty="0"/>
-              <a:t>Identificar e descrever casos de teste:</a:t>
-            </a:r>
+              <a:rPr lang="pt-BR" sz="3600" dirty="0">
+                <a:solidFill>
+                  <a:srgbClr val="263050"/>
+                </a:solidFill>
+              </a:rPr>
+              <a:t>Projeto de teste</a:t>
+            </a:r>
+            <a:endParaRPr lang="pt-BR" dirty="0"/>
           </a:p>
         </p:txBody>
       </p:sp>
       <p:sp>
         <p:nvSpPr>
-          <p:cNvPr id="4" name="Retângulo 3"/>
+          <p:cNvPr id="2" name="Retângulo 1"/>
           <p:cNvSpPr/>
           <p:nvPr/>
         </p:nvSpPr>
         <p:spPr>
           <a:xfrm>
-            <a:off x="1205397" y="2420888"/>
-            <a:ext cx="8016552" cy="2677656"/>
+            <a:off x="298598" y="2708920"/>
+            <a:ext cx="12926193" cy="1477328"/>
           </a:xfrm>
           <a:prstGeom prst="rect">
             <a:avLst/>
@@ -9640,46 +10236,70 @@
           <a:lstStyle/>
           <a:p>
             <a:r>
-              <a:rPr lang="pt-BR" sz="2800" dirty="0"/>
-              <a:t>Texto associado a um requisito a ser testado, que</a:t>
-            </a:r>
-          </a:p>
-          <a:p>
-            <a:r>
-              <a:rPr lang="pt-BR" sz="2800" dirty="0"/>
-              <a:t>descreve:</a:t>
-            </a:r>
-          </a:p>
-          <a:p>
-            <a:r>
-              <a:rPr lang="pt-BR" sz="2800" dirty="0"/>
-              <a:t>• Pré-condições de execução</a:t>
-            </a:r>
-          </a:p>
-          <a:p>
-            <a:r>
-              <a:rPr lang="pt-BR" sz="2800" dirty="0"/>
-              <a:t>• Entradas</a:t>
-            </a:r>
-          </a:p>
-          <a:p>
-            <a:r>
-              <a:rPr lang="pt-BR" sz="2800" dirty="0"/>
-              <a:t>• Passos específicos do teste a ser executado</a:t>
-            </a:r>
-          </a:p>
-          <a:p>
-            <a:r>
-              <a:rPr lang="pt-BR" sz="2800" dirty="0"/>
-              <a:t>• Resultados esperados</a:t>
-            </a:r>
+              <a:rPr lang="pt-BR" dirty="0"/>
+              <a:t>• </a:t>
+            </a:r>
+            <a:r>
+              <a:rPr lang="pt-BR" dirty="0" smtClean="0"/>
+              <a:t>Passos</a:t>
+            </a:r>
+            <a:endParaRPr lang="pt-BR" dirty="0"/>
+          </a:p>
+          <a:p>
+            <a:pPr marL="342900" indent="-342900">
+              <a:buAutoNum type="arabicPeriod"/>
+            </a:pPr>
+            <a:r>
+              <a:rPr lang="pt-BR" dirty="0" smtClean="0"/>
+              <a:t>Identificar </a:t>
+            </a:r>
+            <a:r>
+              <a:rPr lang="pt-BR" dirty="0"/>
+              <a:t>e descrever casos de </a:t>
+            </a:r>
+            <a:r>
+              <a:rPr lang="pt-BR" dirty="0" smtClean="0"/>
+              <a:t>teste</a:t>
+            </a:r>
+            <a:endParaRPr lang="pt-BR" dirty="0"/>
+          </a:p>
+          <a:p>
+            <a:r>
+              <a:rPr lang="pt-BR" dirty="0"/>
+              <a:t>2</a:t>
+            </a:r>
+            <a:r>
+              <a:rPr lang="pt-BR" dirty="0" smtClean="0"/>
+              <a:t>.   </a:t>
+            </a:r>
+            <a:r>
+              <a:rPr lang="pt-BR" dirty="0"/>
+              <a:t>Estruturar procedimentos de teste</a:t>
+            </a:r>
+          </a:p>
+          <a:p>
+            <a:r>
+              <a:rPr lang="pt-BR" dirty="0"/>
+              <a:t>3</a:t>
+            </a:r>
+            <a:r>
+              <a:rPr lang="pt-BR" dirty="0" smtClean="0"/>
+              <a:t>.   </a:t>
+            </a:r>
+            <a:r>
+              <a:rPr lang="pt-BR" dirty="0"/>
+              <a:t>Gerar planilha de testes</a:t>
+            </a:r>
+          </a:p>
+          <a:p>
+            <a:endParaRPr lang="pt-BR" dirty="0"/>
           </a:p>
         </p:txBody>
       </p:sp>
     </p:spTree>
     <p:extLst>
       <p:ext uri="{BB962C8B-B14F-4D97-AF65-F5344CB8AC3E}">
-        <p14:creationId xmlns:p14="http://schemas.microsoft.com/office/powerpoint/2010/main" val="3161096069"/>
+        <p14:creationId xmlns:p14="http://schemas.microsoft.com/office/powerpoint/2010/main" val="1566485322"/>
       </p:ext>
     </p:extLst>
   </p:cSld>
@@ -9720,7 +10340,7 @@
       </p:grpSpPr>
       <p:sp>
         <p:nvSpPr>
-          <p:cNvPr id="2" name="Título 1"/>
+          <p:cNvPr id="3" name="Título 2"/>
           <p:cNvSpPr>
             <a:spLocks noGrp="1"/>
           </p:cNvSpPr>
@@ -9730,8 +10350,8 @@
         </p:nvSpPr>
         <p:spPr>
           <a:xfrm>
-            <a:off x="1341120" y="467360"/>
-            <a:ext cx="9509760" cy="729392"/>
+            <a:off x="983432" y="467360"/>
+            <a:ext cx="9867448" cy="1233424"/>
           </a:xfrm>
         </p:spPr>
         <p:txBody>
@@ -9747,14 +10367,14 @@
       </p:sp>
       <p:sp>
         <p:nvSpPr>
-          <p:cNvPr id="3" name="Retângulo 2"/>
+          <p:cNvPr id="4" name="Retângulo 3"/>
           <p:cNvSpPr/>
           <p:nvPr/>
         </p:nvSpPr>
         <p:spPr>
           <a:xfrm>
-            <a:off x="346051" y="1412776"/>
-            <a:ext cx="8808640" cy="5139869"/>
+            <a:off x="1205397" y="2420888"/>
+            <a:ext cx="8016552" cy="2677656"/>
           </a:xfrm>
           <a:prstGeom prst="rect">
             <a:avLst/>
@@ -9767,135 +10387,38 @@
           <a:lstStyle/>
           <a:p>
             <a:r>
-              <a:rPr lang="pt-BR" dirty="0"/>
-              <a:t>Desenvolvido cenários do caso de uso, de acordo com a</a:t>
-            </a:r>
-          </a:p>
-          <a:p>
-            <a:r>
-              <a:rPr lang="pt-BR" dirty="0"/>
-              <a:t>Estratégia de testes</a:t>
-            </a:r>
-          </a:p>
-          <a:p>
-            <a:r>
-              <a:rPr lang="pt-BR" dirty="0"/>
-              <a:t>• Fluxo normal (dados válidos)</a:t>
-            </a:r>
-          </a:p>
-          <a:p>
-            <a:r>
-              <a:rPr lang="pt-BR" dirty="0"/>
-              <a:t>• Fluxo alternativo</a:t>
-            </a:r>
-          </a:p>
-          <a:p>
-            <a:r>
-              <a:rPr lang="pt-BR" dirty="0"/>
-              <a:t>• Fluxo de exceção (dados inválidos</a:t>
-            </a:r>
-            <a:r>
-              <a:rPr lang="pt-BR" dirty="0" smtClean="0"/>
-              <a:t>)</a:t>
-            </a:r>
-            <a:endParaRPr lang="pt-BR" dirty="0"/>
-          </a:p>
-          <a:p>
-            <a:r>
-              <a:rPr lang="pt-BR" dirty="0"/>
-              <a:t>– Definir entradas e saídas correspondentes</a:t>
-            </a:r>
-            <a:r>
-              <a:rPr lang="pt-BR" dirty="0" smtClean="0"/>
-              <a:t>.</a:t>
-            </a:r>
-          </a:p>
-          <a:p>
-            <a:r>
-              <a:rPr lang="pt-BR" dirty="0" smtClean="0"/>
-              <a:t>CASCATA</a:t>
-            </a:r>
-          </a:p>
-          <a:p>
-            <a:r>
-              <a:rPr lang="pt-BR" dirty="0" smtClean="0"/>
-              <a:t>• </a:t>
-            </a:r>
-            <a:r>
-              <a:rPr lang="pt-BR" dirty="0"/>
-              <a:t>Vantagem</a:t>
-            </a:r>
-          </a:p>
-          <a:p>
-            <a:r>
-              <a:rPr lang="pt-BR" dirty="0"/>
-              <a:t>– Os casos de testes são tipicamente pequenos e simples;</a:t>
-            </a:r>
-          </a:p>
-          <a:p>
-            <a:r>
-              <a:rPr lang="pt-BR" dirty="0"/>
-              <a:t>• Desvantagem</a:t>
-            </a:r>
-          </a:p>
-          <a:p>
-            <a:r>
-              <a:rPr lang="pt-BR" dirty="0"/>
-              <a:t>– Se um caso de teste falhar o teste subsequente pode falhar</a:t>
-            </a:r>
-            <a:r>
-              <a:rPr lang="pt-BR" dirty="0" smtClean="0"/>
-              <a:t>.</a:t>
-            </a:r>
-          </a:p>
-          <a:p>
-            <a:r>
-              <a:rPr lang="pt-BR" dirty="0" smtClean="0"/>
-              <a:t>INDEPENDENTE</a:t>
-            </a:r>
-          </a:p>
-          <a:p>
-            <a:r>
-              <a:rPr lang="pt-BR" dirty="0"/>
-              <a:t>• Vantagens</a:t>
-            </a:r>
-          </a:p>
-          <a:p>
-            <a:r>
-              <a:rPr lang="pt-BR" dirty="0"/>
-              <a:t>– Os casos de testes podem ser executados em qualquer ordem;</a:t>
-            </a:r>
-          </a:p>
-          <a:p>
-            <a:r>
-              <a:rPr lang="pt-BR" dirty="0"/>
-              <a:t>– Alto grau de </a:t>
-            </a:r>
-            <a:r>
-              <a:rPr lang="pt-BR" dirty="0" err="1"/>
-              <a:t>reusabilidade</a:t>
-            </a:r>
-            <a:r>
-              <a:rPr lang="pt-BR" dirty="0"/>
-              <a:t> dos casos de testes.</a:t>
-            </a:r>
-          </a:p>
-          <a:p>
-            <a:r>
-              <a:rPr lang="pt-BR" dirty="0"/>
-              <a:t>• Desvantagens</a:t>
-            </a:r>
-          </a:p>
-          <a:p>
-            <a:r>
-              <a:rPr lang="pt-BR" dirty="0"/>
-              <a:t>– São maiores e mais complexos;</a:t>
-            </a:r>
-          </a:p>
-          <a:p>
-            <a:r>
-              <a:rPr lang="pt-BR" dirty="0"/>
-              <a:t>– São mais difíceis de projetar, criar e manter.</a:t>
+              <a:rPr lang="pt-BR" sz="2800" dirty="0"/>
+              <a:t>Texto associado a um requisito a ser testado, que</a:t>
+            </a:r>
+          </a:p>
+          <a:p>
+            <a:r>
+              <a:rPr lang="pt-BR" sz="2800" dirty="0"/>
+              <a:t>descreve:</a:t>
+            </a:r>
+          </a:p>
+          <a:p>
+            <a:r>
+              <a:rPr lang="pt-BR" sz="2800" dirty="0"/>
+              <a:t>• Pré-condições de execução</a:t>
+            </a:r>
+          </a:p>
+          <a:p>
+            <a:r>
+              <a:rPr lang="pt-BR" sz="2800" dirty="0"/>
+              <a:t>• Entradas</a:t>
+            </a:r>
+          </a:p>
+          <a:p>
+            <a:r>
+              <a:rPr lang="pt-BR" sz="2800" dirty="0"/>
+              <a:t>• Passos específicos do teste a ser executado</a:t>
+            </a:r>
+          </a:p>
+          <a:p>
+            <a:r>
+              <a:rPr lang="pt-BR" sz="2800" dirty="0"/>
+              <a:t>• Resultados esperados</a:t>
             </a:r>
           </a:p>
         </p:txBody>
@@ -9903,7 +10426,7 @@
     </p:spTree>
     <p:extLst>
       <p:ext uri="{BB962C8B-B14F-4D97-AF65-F5344CB8AC3E}">
-        <p14:creationId xmlns:p14="http://schemas.microsoft.com/office/powerpoint/2010/main" val="1299491657"/>
+        <p14:creationId xmlns:p14="http://schemas.microsoft.com/office/powerpoint/2010/main" val="3161096069"/>
       </p:ext>
     </p:extLst>
   </p:cSld>
@@ -9954,24 +10477,18 @@
         </p:nvSpPr>
         <p:spPr>
           <a:xfrm>
-            <a:off x="1341120" y="764704"/>
-            <a:ext cx="9509760" cy="1512168"/>
+            <a:off x="1341120" y="467360"/>
+            <a:ext cx="9509760" cy="729392"/>
           </a:xfrm>
         </p:spPr>
         <p:txBody>
-          <a:bodyPr>
-            <a:normAutofit/>
-          </a:bodyPr>
+          <a:bodyPr/>
           <a:lstStyle/>
           <a:p>
             <a:r>
               <a:rPr lang="pt-BR" dirty="0"/>
-              <a:t>Estruturar procedimentos de teste</a:t>
-            </a:r>
-            <a:br>
-              <a:rPr lang="pt-BR" dirty="0"/>
-            </a:br>
-            <a:endParaRPr lang="pt-BR" dirty="0"/>
+              <a:t>Identificar e descrever casos de teste:</a:t>
+            </a:r>
           </a:p>
         </p:txBody>
       </p:sp>
@@ -9983,8 +10500,8 @@
         </p:nvSpPr>
         <p:spPr>
           <a:xfrm>
-            <a:off x="407368" y="2321004"/>
-            <a:ext cx="8736632" cy="3539430"/>
+            <a:off x="346051" y="1412776"/>
+            <a:ext cx="8808640" cy="5139869"/>
           </a:xfrm>
           <a:prstGeom prst="rect">
             <a:avLst/>
@@ -9998,13 +10515,42 @@
           <a:p>
             <a:r>
               <a:rPr lang="pt-BR" dirty="0"/>
-              <a:t>– Conjunto de passos detalhados que descrevem como o caso de</a:t>
+              <a:t>Desenvolvido cenários do caso de uso, de acordo com a</a:t>
             </a:r>
           </a:p>
           <a:p>
             <a:r>
               <a:rPr lang="pt-BR" dirty="0"/>
-              <a:t>teste será executado</a:t>
+              <a:t>Estratégia de testes</a:t>
+            </a:r>
+          </a:p>
+          <a:p>
+            <a:r>
+              <a:rPr lang="pt-BR" dirty="0"/>
+              <a:t>• Fluxo normal (dados válidos)</a:t>
+            </a:r>
+          </a:p>
+          <a:p>
+            <a:r>
+              <a:rPr lang="pt-BR" dirty="0"/>
+              <a:t>• Fluxo alternativo</a:t>
+            </a:r>
+          </a:p>
+          <a:p>
+            <a:r>
+              <a:rPr lang="pt-BR" dirty="0"/>
+              <a:t>• Fluxo de exceção (dados inválidos</a:t>
+            </a:r>
+            <a:r>
+              <a:rPr lang="pt-BR" dirty="0" smtClean="0"/>
+              <a:t>)</a:t>
+            </a:r>
+            <a:endParaRPr lang="pt-BR" dirty="0"/>
+          </a:p>
+          <a:p>
+            <a:r>
+              <a:rPr lang="pt-BR" dirty="0"/>
+              <a:t>– Definir entradas e saídas correspondentes</a:t>
             </a:r>
             <a:r>
               <a:rPr lang="pt-BR" dirty="0" smtClean="0"/>
@@ -10012,72 +10558,91 @@
             </a:r>
           </a:p>
           <a:p>
-            <a:endParaRPr lang="pt-BR" dirty="0"/>
-          </a:p>
-          <a:p>
+            <a:r>
+              <a:rPr lang="pt-BR" dirty="0" smtClean="0"/>
+              <a:t>CASCATA</a:t>
+            </a:r>
+          </a:p>
+          <a:p>
+            <a:r>
+              <a:rPr lang="pt-BR" dirty="0" smtClean="0"/>
+              <a:t>• </a:t>
+            </a:r>
             <a:r>
               <a:rPr lang="pt-BR" dirty="0"/>
-              <a:t>– Como (</a:t>
+              <a:t>Vantagem</a:t>
+            </a:r>
+          </a:p>
+          <a:p>
+            <a:r>
+              <a:rPr lang="pt-BR" dirty="0"/>
+              <a:t>– Os casos de testes são tipicamente pequenos e simples;</a:t>
+            </a:r>
+          </a:p>
+          <a:p>
+            <a:r>
+              <a:rPr lang="pt-BR" dirty="0"/>
+              <a:t>• Desvantagem</a:t>
+            </a:r>
+          </a:p>
+          <a:p>
+            <a:r>
+              <a:rPr lang="pt-BR" dirty="0"/>
+              <a:t>– Se um caso de teste falhar o teste subsequente pode falhar</a:t>
+            </a:r>
+            <a:r>
+              <a:rPr lang="pt-BR" dirty="0" smtClean="0"/>
+              <a:t>.</a:t>
+            </a:r>
+          </a:p>
+          <a:p>
+            <a:r>
+              <a:rPr lang="pt-BR" dirty="0" smtClean="0"/>
+              <a:t>INDEPENDENTE</a:t>
+            </a:r>
+          </a:p>
+          <a:p>
+            <a:r>
+              <a:rPr lang="pt-BR" dirty="0"/>
+              <a:t>• Vantagens</a:t>
+            </a:r>
+          </a:p>
+          <a:p>
+            <a:r>
+              <a:rPr lang="pt-BR" dirty="0"/>
+              <a:t>– Os casos de testes podem ser executados em qualquer ordem;</a:t>
+            </a:r>
+          </a:p>
+          <a:p>
+            <a:r>
+              <a:rPr lang="pt-BR" dirty="0"/>
+              <a:t>– Alto grau de </a:t>
             </a:r>
             <a:r>
               <a:rPr lang="pt-BR" dirty="0" err="1"/>
-              <a:t>ex</a:t>
+              <a:t>reusabilidade</a:t>
             </a:r>
             <a:r>
               <a:rPr lang="pt-BR" dirty="0"/>
-              <a:t>: através de ferramentas de automação de testes,</a:t>
+              <a:t> dos casos de testes.</a:t>
             </a:r>
           </a:p>
           <a:p>
             <a:r>
               <a:rPr lang="pt-BR" dirty="0"/>
-              <a:t>scripts, etc.) e quando fornecer os dados de entrada e obter os</a:t>
+              <a:t>• Desvantagens</a:t>
             </a:r>
           </a:p>
           <a:p>
             <a:r>
               <a:rPr lang="pt-BR" dirty="0"/>
-              <a:t>resultados da saída</a:t>
+              <a:t>– São maiores e mais complexos;</a:t>
             </a:r>
           </a:p>
           <a:p>
             <a:r>
               <a:rPr lang="pt-BR" dirty="0"/>
-              <a:t>– Passos para execução dos testes</a:t>
-            </a:r>
-          </a:p>
-          <a:p>
-            <a:r>
-              <a:rPr lang="pt-BR" dirty="0"/>
-              <a:t>– Forma de avaliação dos </a:t>
-            </a:r>
-            <a:r>
-              <a:rPr lang="pt-BR" dirty="0" smtClean="0"/>
-              <a:t>resultados</a:t>
-            </a:r>
-          </a:p>
-          <a:p>
-            <a:r>
-              <a:rPr lang="pt-BR" dirty="0"/>
-              <a:t>– Todas as condições de testes foram identificadas?</a:t>
-            </a:r>
-          </a:p>
-          <a:p>
-            <a:r>
-              <a:rPr lang="pt-BR" dirty="0"/>
-              <a:t>– Os casos de testes satisfazem as condições de teste?</a:t>
-            </a:r>
-          </a:p>
-          <a:p>
-            <a:r>
-              <a:rPr lang="pt-BR" dirty="0"/>
-              <a:t>– A massa de dados é adequada?</a:t>
-            </a:r>
-          </a:p>
-          <a:p>
-            <a:r>
-              <a:rPr lang="pt-BR" dirty="0"/>
-              <a:t>– O volume de dados é suficiente?</a:t>
+              <a:t>– São mais difíceis de projetar, criar e manter.</a:t>
             </a:r>
           </a:p>
         </p:txBody>
@@ -10085,7 +10650,7 @@
     </p:spTree>
     <p:extLst>
       <p:ext uri="{BB962C8B-B14F-4D97-AF65-F5344CB8AC3E}">
-        <p14:creationId xmlns:p14="http://schemas.microsoft.com/office/powerpoint/2010/main" val="2243007798"/>
+        <p14:creationId xmlns:p14="http://schemas.microsoft.com/office/powerpoint/2010/main" val="1299491657"/>
       </p:ext>
     </p:extLst>
   </p:cSld>
@@ -10134,22 +10699,21 @@
             <p:ph type="title"/>
           </p:nvPr>
         </p:nvSpPr>
-        <p:spPr/>
+        <p:spPr>
+          <a:xfrm>
+            <a:off x="1341120" y="764704"/>
+            <a:ext cx="9509760" cy="1512168"/>
+          </a:xfrm>
+        </p:spPr>
         <p:txBody>
-          <a:bodyPr/>
+          <a:bodyPr>
+            <a:normAutofit/>
+          </a:bodyPr>
           <a:lstStyle/>
           <a:p>
             <a:r>
               <a:rPr lang="pt-BR" dirty="0"/>
-              <a:t>Gerar planilha de </a:t>
-            </a:r>
-            <a:r>
-              <a:rPr lang="pt-BR" dirty="0" smtClean="0"/>
-              <a:t>testes</a:t>
-            </a:r>
-            <a:r>
-              <a:rPr lang="pt-BR" dirty="0"/>
-              <a:t/>
+              <a:t>Estruturar procedimentos de teste</a:t>
             </a:r>
             <a:br>
               <a:rPr lang="pt-BR" dirty="0"/>
@@ -10166,8 +10730,8 @@
         </p:nvSpPr>
         <p:spPr>
           <a:xfrm>
-            <a:off x="551384" y="2136339"/>
-            <a:ext cx="8592616" cy="2308324"/>
+            <a:off x="407368" y="2321004"/>
+            <a:ext cx="8736632" cy="3539430"/>
           </a:xfrm>
           <a:prstGeom prst="rect">
             <a:avLst/>
@@ -10181,54 +10745,86 @@
           <a:p>
             <a:r>
               <a:rPr lang="pt-BR" dirty="0"/>
-              <a:t>Gerar planilha de testes:</a:t>
+              <a:t>– Conjunto de passos detalhados que descrevem como o caso de</a:t>
             </a:r>
           </a:p>
           <a:p>
             <a:r>
               <a:rPr lang="pt-BR" dirty="0"/>
-              <a:t>– Nas planilhas devem estar contidos todos os casos de testes que</a:t>
-            </a:r>
+              <a:t>teste será executado</a:t>
+            </a:r>
+            <a:r>
+              <a:rPr lang="pt-BR" dirty="0" smtClean="0"/>
+              <a:t>.</a:t>
+            </a:r>
+          </a:p>
+          <a:p>
+            <a:endParaRPr lang="pt-BR" dirty="0"/>
           </a:p>
           <a:p>
             <a:r>
               <a:rPr lang="pt-BR" dirty="0"/>
-              <a:t>serão </a:t>
+              <a:t>– Como (</a:t>
+            </a:r>
+            <a:r>
+              <a:rPr lang="pt-BR" dirty="0" err="1"/>
+              <a:t>ex</a:t>
+            </a:r>
+            <a:r>
+              <a:rPr lang="pt-BR" dirty="0"/>
+              <a:t>: através de ferramentas de automação de testes,</a:t>
+            </a:r>
+          </a:p>
+          <a:p>
+            <a:r>
+              <a:rPr lang="pt-BR" dirty="0"/>
+              <a:t>scripts, etc.) e quando fornecer os dados de entrada e obter os</a:t>
+            </a:r>
+          </a:p>
+          <a:p>
+            <a:r>
+              <a:rPr lang="pt-BR" dirty="0"/>
+              <a:t>resultados da saída</a:t>
+            </a:r>
+          </a:p>
+          <a:p>
+            <a:r>
+              <a:rPr lang="pt-BR" dirty="0"/>
+              <a:t>– Passos para execução dos testes</a:t>
+            </a:r>
+          </a:p>
+          <a:p>
+            <a:r>
+              <a:rPr lang="pt-BR" dirty="0"/>
+              <a:t>– Forma de avaliação dos </a:t>
             </a:r>
             <a:r>
               <a:rPr lang="pt-BR" dirty="0" smtClean="0"/>
-              <a:t>executados.</a:t>
-            </a:r>
-            <a:endParaRPr lang="pt-BR" dirty="0"/>
+              <a:t>resultados</a:t>
+            </a:r>
           </a:p>
           <a:p>
             <a:r>
               <a:rPr lang="pt-BR" dirty="0"/>
-              <a:t>– Informações sobre o ciclo de teste são necessários:</a:t>
+              <a:t>– Todas as condições de testes foram identificadas?</a:t>
             </a:r>
           </a:p>
           <a:p>
             <a:r>
               <a:rPr lang="pt-BR" dirty="0"/>
-              <a:t>• Versão do Software</a:t>
+              <a:t>– Os casos de testes satisfazem as condições de teste?</a:t>
             </a:r>
           </a:p>
           <a:p>
             <a:r>
               <a:rPr lang="pt-BR" dirty="0"/>
-              <a:t>• Data Início e Fim</a:t>
+              <a:t>– A massa de dados é adequada?</a:t>
             </a:r>
           </a:p>
           <a:p>
             <a:r>
               <a:rPr lang="pt-BR" dirty="0"/>
-              <a:t>• Nome do Testador</a:t>
-            </a:r>
-          </a:p>
-          <a:p>
-            <a:r>
-              <a:rPr lang="pt-BR" dirty="0"/>
-              <a:t>• Casos de testes planejados</a:t>
+              <a:t>– O volume de dados é suficiente?</a:t>
             </a:r>
           </a:p>
         </p:txBody>
@@ -10236,7 +10832,7 @@
     </p:spTree>
     <p:extLst>
       <p:ext uri="{BB962C8B-B14F-4D97-AF65-F5344CB8AC3E}">
-        <p14:creationId xmlns:p14="http://schemas.microsoft.com/office/powerpoint/2010/main" val="1306253914"/>
+        <p14:creationId xmlns:p14="http://schemas.microsoft.com/office/powerpoint/2010/main" val="2243007798"/>
       </p:ext>
     </p:extLst>
   </p:cSld>
@@ -10291,19 +10887,19 @@
           <a:lstStyle/>
           <a:p>
             <a:r>
-              <a:rPr lang="pt-BR" dirty="0">
-                <a:solidFill>
-                  <a:srgbClr val="263050"/>
-                </a:solidFill>
-              </a:rPr>
-              <a:t>Registro de solicitação de mudanças </a:t>
+              <a:rPr lang="pt-BR" dirty="0"/>
+              <a:t>Gerar planilha de </a:t>
+            </a:r>
+            <a:r>
+              <a:rPr lang="pt-BR" dirty="0" smtClean="0"/>
+              <a:t>testes</a:t>
+            </a:r>
+            <a:r>
+              <a:rPr lang="pt-BR" dirty="0"/>
+              <a:t/>
             </a:r>
             <a:br>
-              <a:rPr lang="pt-BR" dirty="0">
-                <a:solidFill>
-                  <a:srgbClr val="263050"/>
-                </a:solidFill>
-              </a:rPr>
+              <a:rPr lang="pt-BR" dirty="0"/>
             </a:br>
             <a:endParaRPr lang="pt-BR" dirty="0"/>
           </a:p>
@@ -10311,14 +10907,14 @@
       </p:sp>
       <p:sp>
         <p:nvSpPr>
-          <p:cNvPr id="5" name="Retângulo 4"/>
+          <p:cNvPr id="3" name="Retângulo 2"/>
           <p:cNvSpPr/>
           <p:nvPr/>
         </p:nvSpPr>
         <p:spPr>
           <a:xfrm>
-            <a:off x="1199282" y="2132856"/>
-            <a:ext cx="7944544" cy="3170099"/>
+            <a:off x="551384" y="2136339"/>
+            <a:ext cx="8592616" cy="2308324"/>
           </a:xfrm>
           <a:prstGeom prst="rect">
             <a:avLst/>
@@ -10331,177 +10927,55 @@
           <a:lstStyle/>
           <a:p>
             <a:r>
-              <a:rPr lang="pt-BR" sz="2000" dirty="0" smtClean="0"/>
-              <a:t>Algumas informações</a:t>
-            </a:r>
-            <a:r>
-              <a:rPr lang="pt-BR" sz="2000" dirty="0"/>
-              <a:t> </a:t>
-            </a:r>
-            <a:r>
-              <a:rPr lang="pt-BR" sz="2000" dirty="0" smtClean="0"/>
-              <a:t>que</a:t>
-            </a:r>
-            <a:r>
-              <a:rPr lang="pt-BR" sz="2000" dirty="0"/>
-              <a:t> </a:t>
-            </a:r>
-            <a:r>
-              <a:rPr lang="pt-BR" sz="2000" dirty="0" smtClean="0"/>
-              <a:t>podem</a:t>
-            </a:r>
-            <a:r>
-              <a:rPr lang="pt-BR" sz="2000" dirty="0"/>
-              <a:t> </a:t>
-            </a:r>
-            <a:r>
-              <a:rPr lang="pt-BR" sz="2000" dirty="0" smtClean="0"/>
-              <a:t>estar</a:t>
-            </a:r>
-            <a:r>
-              <a:rPr lang="pt-BR" sz="2000" dirty="0"/>
-              <a:t> </a:t>
-            </a:r>
-            <a:r>
-              <a:rPr lang="pt-BR" sz="2000" dirty="0" smtClean="0"/>
-              <a:t>incluídas</a:t>
-            </a:r>
-            <a:r>
-              <a:rPr lang="pt-BR" sz="2000" dirty="0"/>
-              <a:t> </a:t>
-            </a:r>
-            <a:r>
-              <a:rPr lang="pt-BR" sz="2000" dirty="0" smtClean="0"/>
-              <a:t>em</a:t>
-            </a:r>
-            <a:r>
-              <a:rPr lang="pt-BR" sz="2000" dirty="0"/>
-              <a:t> </a:t>
-            </a:r>
-            <a:r>
-              <a:rPr lang="pt-BR" sz="2000" dirty="0" smtClean="0"/>
-              <a:t>uma</a:t>
-            </a:r>
-            <a:endParaRPr lang="pt-BR" sz="2000" dirty="0"/>
-          </a:p>
-          <a:p>
-            <a:r>
-              <a:rPr lang="pt-BR" sz="2000" dirty="0"/>
-              <a:t>SM:</a:t>
-            </a:r>
-          </a:p>
-          <a:p>
-            <a:r>
-              <a:rPr lang="pt-BR" sz="2000" dirty="0"/>
-              <a:t>– </a:t>
-            </a:r>
-            <a:r>
-              <a:rPr lang="pt-BR" sz="2000" dirty="0" err="1" smtClean="0"/>
-              <a:t>Identicação</a:t>
-            </a:r>
-            <a:r>
-              <a:rPr lang="pt-BR" sz="2000" dirty="0" smtClean="0"/>
-              <a:t> única</a:t>
-            </a:r>
-            <a:endParaRPr lang="pt-BR" sz="2000" dirty="0"/>
-          </a:p>
-          <a:p>
-            <a:r>
-              <a:rPr lang="pt-BR" sz="2000" dirty="0"/>
-              <a:t>– Solicitante</a:t>
-            </a:r>
-          </a:p>
-          <a:p>
-            <a:r>
-              <a:rPr lang="pt-BR" sz="2000" dirty="0"/>
-              <a:t>– </a:t>
-            </a:r>
-            <a:r>
-              <a:rPr lang="pt-BR" sz="2000" dirty="0" smtClean="0"/>
-              <a:t>Sistema/Projeto</a:t>
-            </a:r>
-          </a:p>
-          <a:p>
-            <a:r>
-              <a:rPr lang="pt-BR" sz="2000" dirty="0"/>
-              <a:t>– </a:t>
-            </a:r>
-            <a:r>
-              <a:rPr lang="pt-BR" sz="2000" dirty="0" smtClean="0"/>
-              <a:t>Item a</a:t>
-            </a:r>
-            <a:r>
-              <a:rPr lang="pt-BR" sz="2000" dirty="0"/>
-              <a:t> </a:t>
-            </a:r>
-            <a:r>
-              <a:rPr lang="pt-BR" sz="2000" dirty="0" smtClean="0"/>
-              <a:t>ser</a:t>
-            </a:r>
-            <a:r>
-              <a:rPr lang="pt-BR" sz="2000" dirty="0"/>
-              <a:t> </a:t>
-            </a:r>
-            <a:r>
-              <a:rPr lang="pt-BR" sz="2000" dirty="0" smtClean="0"/>
-              <a:t>modificado</a:t>
-            </a:r>
-            <a:endParaRPr lang="pt-BR" sz="2000" dirty="0"/>
-          </a:p>
-          <a:p>
-            <a:r>
-              <a:rPr lang="pt-BR" sz="2000" dirty="0"/>
-              <a:t>– </a:t>
-            </a:r>
-            <a:r>
-              <a:rPr lang="pt-BR" sz="2000" dirty="0" smtClean="0"/>
-              <a:t>Classificação (melhoria, correção</a:t>
-            </a:r>
-            <a:r>
-              <a:rPr lang="pt-BR" sz="2000" dirty="0"/>
-              <a:t> </a:t>
-            </a:r>
-            <a:r>
-              <a:rPr lang="pt-BR" sz="2000" dirty="0" smtClean="0"/>
-              <a:t>de</a:t>
-            </a:r>
-            <a:r>
-              <a:rPr lang="pt-BR" sz="2000" dirty="0"/>
-              <a:t> </a:t>
-            </a:r>
-            <a:r>
-              <a:rPr lang="pt-BR" sz="2000" dirty="0" smtClean="0"/>
-              <a:t>defeito, outra</a:t>
-            </a:r>
-            <a:r>
-              <a:rPr lang="pt-BR" sz="2000" dirty="0"/>
-              <a:t>)</a:t>
-            </a:r>
-          </a:p>
-          <a:p>
-            <a:r>
-              <a:rPr lang="pt-BR" sz="2000" dirty="0"/>
-              <a:t>– Prioridade</a:t>
-            </a:r>
-          </a:p>
-          <a:p>
-            <a:r>
-              <a:rPr lang="pt-BR" sz="2000" dirty="0"/>
-              <a:t>– Descrição</a:t>
-            </a:r>
-          </a:p>
-          <a:p>
-            <a:r>
-              <a:rPr lang="pt-BR" sz="2000" dirty="0"/>
-              <a:t>– </a:t>
-            </a:r>
-            <a:r>
-              <a:rPr lang="pt-BR" sz="2000" dirty="0" smtClean="0"/>
-              <a:t>Situação (nova, atribuída, finalizada, verificada, fechada</a:t>
-            </a:r>
-            <a:r>
-              <a:rPr lang="pt-BR" sz="2000" dirty="0"/>
-              <a:t>)</a:t>
+              <a:rPr lang="pt-BR" dirty="0"/>
+              <a:t>Gerar planilha de testes:</a:t>
+            </a:r>
+          </a:p>
+          <a:p>
+            <a:r>
+              <a:rPr lang="pt-BR" dirty="0"/>
+              <a:t>– Nas planilhas devem estar contidos todos os casos de testes que</a:t>
+            </a:r>
+          </a:p>
+          <a:p>
+            <a:r>
+              <a:rPr lang="pt-BR" dirty="0"/>
+              <a:t>serão </a:t>
+            </a:r>
+            <a:r>
+              <a:rPr lang="pt-BR" dirty="0" smtClean="0"/>
+              <a:t>executados.</a:t>
+            </a:r>
+            <a:endParaRPr lang="pt-BR" dirty="0"/>
+          </a:p>
+          <a:p>
+            <a:r>
+              <a:rPr lang="pt-BR" dirty="0"/>
+              <a:t>– Informações sobre o ciclo de teste são necessários:</a:t>
+            </a:r>
+          </a:p>
+          <a:p>
+            <a:r>
+              <a:rPr lang="pt-BR" dirty="0"/>
+              <a:t>• Versão do Software</a:t>
+            </a:r>
+          </a:p>
+          <a:p>
+            <a:r>
+              <a:rPr lang="pt-BR" dirty="0"/>
+              <a:t>• Data Início e Fim</a:t>
+            </a:r>
+          </a:p>
+          <a:p>
+            <a:r>
+              <a:rPr lang="pt-BR" dirty="0"/>
+              <a:t>• Nome do Testador</a:t>
+            </a:r>
+          </a:p>
+          <a:p>
+            <a:r>
+              <a:rPr lang="pt-BR" dirty="0"/>
+              <a:t>• Casos de testes planejados</a:t>
             </a:r>
           </a:p>
         </p:txBody>
@@ -10509,7 +10983,7 @@
     </p:spTree>
     <p:extLst>
       <p:ext uri="{BB962C8B-B14F-4D97-AF65-F5344CB8AC3E}">
-        <p14:creationId xmlns:p14="http://schemas.microsoft.com/office/powerpoint/2010/main" val="575927025"/>
+        <p14:creationId xmlns:p14="http://schemas.microsoft.com/office/powerpoint/2010/main" val="1306253914"/>
       </p:ext>
     </p:extLst>
   </p:cSld>
@@ -10563,6 +11037,279 @@
           <a:bodyPr/>
           <a:lstStyle/>
           <a:p>
+            <a:r>
+              <a:rPr lang="pt-BR" dirty="0">
+                <a:solidFill>
+                  <a:srgbClr val="263050"/>
+                </a:solidFill>
+              </a:rPr>
+              <a:t>Registro de solicitação de mudanças </a:t>
+            </a:r>
+            <a:br>
+              <a:rPr lang="pt-BR" dirty="0">
+                <a:solidFill>
+                  <a:srgbClr val="263050"/>
+                </a:solidFill>
+              </a:rPr>
+            </a:br>
+            <a:endParaRPr lang="pt-BR" dirty="0"/>
+          </a:p>
+        </p:txBody>
+      </p:sp>
+      <p:sp>
+        <p:nvSpPr>
+          <p:cNvPr id="5" name="Retângulo 4"/>
+          <p:cNvSpPr/>
+          <p:nvPr/>
+        </p:nvSpPr>
+        <p:spPr>
+          <a:xfrm>
+            <a:off x="1199282" y="2132856"/>
+            <a:ext cx="7944544" cy="3170099"/>
+          </a:xfrm>
+          <a:prstGeom prst="rect">
+            <a:avLst/>
+          </a:prstGeom>
+        </p:spPr>
+        <p:txBody>
+          <a:bodyPr wrap="square">
+            <a:spAutoFit/>
+          </a:bodyPr>
+          <a:lstStyle/>
+          <a:p>
+            <a:r>
+              <a:rPr lang="pt-BR" sz="2000" dirty="0" smtClean="0"/>
+              <a:t>Algumas informações</a:t>
+            </a:r>
+            <a:r>
+              <a:rPr lang="pt-BR" sz="2000" dirty="0"/>
+              <a:t> </a:t>
+            </a:r>
+            <a:r>
+              <a:rPr lang="pt-BR" sz="2000" dirty="0" smtClean="0"/>
+              <a:t>que</a:t>
+            </a:r>
+            <a:r>
+              <a:rPr lang="pt-BR" sz="2000" dirty="0"/>
+              <a:t> </a:t>
+            </a:r>
+            <a:r>
+              <a:rPr lang="pt-BR" sz="2000" dirty="0" smtClean="0"/>
+              <a:t>podem</a:t>
+            </a:r>
+            <a:r>
+              <a:rPr lang="pt-BR" sz="2000" dirty="0"/>
+              <a:t> </a:t>
+            </a:r>
+            <a:r>
+              <a:rPr lang="pt-BR" sz="2000" dirty="0" smtClean="0"/>
+              <a:t>estar</a:t>
+            </a:r>
+            <a:r>
+              <a:rPr lang="pt-BR" sz="2000" dirty="0"/>
+              <a:t> </a:t>
+            </a:r>
+            <a:r>
+              <a:rPr lang="pt-BR" sz="2000" dirty="0" smtClean="0"/>
+              <a:t>incluídas</a:t>
+            </a:r>
+            <a:r>
+              <a:rPr lang="pt-BR" sz="2000" dirty="0"/>
+              <a:t> </a:t>
+            </a:r>
+            <a:r>
+              <a:rPr lang="pt-BR" sz="2000" dirty="0" smtClean="0"/>
+              <a:t>em</a:t>
+            </a:r>
+            <a:r>
+              <a:rPr lang="pt-BR" sz="2000" dirty="0"/>
+              <a:t> </a:t>
+            </a:r>
+            <a:r>
+              <a:rPr lang="pt-BR" sz="2000" dirty="0" smtClean="0"/>
+              <a:t>uma</a:t>
+            </a:r>
+            <a:endParaRPr lang="pt-BR" sz="2000" dirty="0"/>
+          </a:p>
+          <a:p>
+            <a:r>
+              <a:rPr lang="pt-BR" sz="2000" dirty="0"/>
+              <a:t>SM:</a:t>
+            </a:r>
+          </a:p>
+          <a:p>
+            <a:r>
+              <a:rPr lang="pt-BR" sz="2000" dirty="0"/>
+              <a:t>– </a:t>
+            </a:r>
+            <a:r>
+              <a:rPr lang="pt-BR" sz="2000" dirty="0" err="1" smtClean="0"/>
+              <a:t>Identicação</a:t>
+            </a:r>
+            <a:r>
+              <a:rPr lang="pt-BR" sz="2000" dirty="0" smtClean="0"/>
+              <a:t> única</a:t>
+            </a:r>
+            <a:endParaRPr lang="pt-BR" sz="2000" dirty="0"/>
+          </a:p>
+          <a:p>
+            <a:r>
+              <a:rPr lang="pt-BR" sz="2000" dirty="0"/>
+              <a:t>– Solicitante</a:t>
+            </a:r>
+          </a:p>
+          <a:p>
+            <a:r>
+              <a:rPr lang="pt-BR" sz="2000" dirty="0"/>
+              <a:t>– </a:t>
+            </a:r>
+            <a:r>
+              <a:rPr lang="pt-BR" sz="2000" dirty="0" smtClean="0"/>
+              <a:t>Sistema/Projeto</a:t>
+            </a:r>
+          </a:p>
+          <a:p>
+            <a:r>
+              <a:rPr lang="pt-BR" sz="2000" dirty="0"/>
+              <a:t>– </a:t>
+            </a:r>
+            <a:r>
+              <a:rPr lang="pt-BR" sz="2000" dirty="0" smtClean="0"/>
+              <a:t>Item a</a:t>
+            </a:r>
+            <a:r>
+              <a:rPr lang="pt-BR" sz="2000" dirty="0"/>
+              <a:t> </a:t>
+            </a:r>
+            <a:r>
+              <a:rPr lang="pt-BR" sz="2000" dirty="0" smtClean="0"/>
+              <a:t>ser</a:t>
+            </a:r>
+            <a:r>
+              <a:rPr lang="pt-BR" sz="2000" dirty="0"/>
+              <a:t> </a:t>
+            </a:r>
+            <a:r>
+              <a:rPr lang="pt-BR" sz="2000" dirty="0" smtClean="0"/>
+              <a:t>modificado</a:t>
+            </a:r>
+            <a:endParaRPr lang="pt-BR" sz="2000" dirty="0"/>
+          </a:p>
+          <a:p>
+            <a:r>
+              <a:rPr lang="pt-BR" sz="2000" dirty="0"/>
+              <a:t>– </a:t>
+            </a:r>
+            <a:r>
+              <a:rPr lang="pt-BR" sz="2000" dirty="0" smtClean="0"/>
+              <a:t>Classificação (melhoria, correção</a:t>
+            </a:r>
+            <a:r>
+              <a:rPr lang="pt-BR" sz="2000" dirty="0"/>
+              <a:t> </a:t>
+            </a:r>
+            <a:r>
+              <a:rPr lang="pt-BR" sz="2000" dirty="0" smtClean="0"/>
+              <a:t>de</a:t>
+            </a:r>
+            <a:r>
+              <a:rPr lang="pt-BR" sz="2000" dirty="0"/>
+              <a:t> </a:t>
+            </a:r>
+            <a:r>
+              <a:rPr lang="pt-BR" sz="2000" dirty="0" smtClean="0"/>
+              <a:t>defeito, outra</a:t>
+            </a:r>
+            <a:r>
+              <a:rPr lang="pt-BR" sz="2000" dirty="0"/>
+              <a:t>)</a:t>
+            </a:r>
+          </a:p>
+          <a:p>
+            <a:r>
+              <a:rPr lang="pt-BR" sz="2000" dirty="0"/>
+              <a:t>– Prioridade</a:t>
+            </a:r>
+          </a:p>
+          <a:p>
+            <a:r>
+              <a:rPr lang="pt-BR" sz="2000" dirty="0"/>
+              <a:t>– Descrição</a:t>
+            </a:r>
+          </a:p>
+          <a:p>
+            <a:r>
+              <a:rPr lang="pt-BR" sz="2000" dirty="0"/>
+              <a:t>– </a:t>
+            </a:r>
+            <a:r>
+              <a:rPr lang="pt-BR" sz="2000" dirty="0" smtClean="0"/>
+              <a:t>Situação (nova, atribuída, finalizada, verificada, fechada</a:t>
+            </a:r>
+            <a:r>
+              <a:rPr lang="pt-BR" sz="2000" dirty="0"/>
+              <a:t>)</a:t>
+            </a:r>
+          </a:p>
+        </p:txBody>
+      </p:sp>
+    </p:spTree>
+    <p:extLst>
+      <p:ext uri="{BB962C8B-B14F-4D97-AF65-F5344CB8AC3E}">
+        <p14:creationId xmlns:p14="http://schemas.microsoft.com/office/powerpoint/2010/main" val="575927025"/>
+      </p:ext>
+    </p:extLst>
+  </p:cSld>
+  <p:clrMapOvr>
+    <a:masterClrMapping/>
+  </p:clrMapOvr>
+  <mc:AlternateContent xmlns:mc="http://schemas.openxmlformats.org/markup-compatibility/2006" xmlns:p14="http://schemas.microsoft.com/office/powerpoint/2010/main">
+    <mc:Choice Requires="p14">
+      <p:transition spd="med" p14:dur="700">
+        <p:fade/>
+      </p:transition>
+    </mc:Choice>
+    <mc:Fallback xmlns="">
+      <p:transition spd="med">
+        <p:fade/>
+      </p:transition>
+    </mc:Fallback>
+  </mc:AlternateContent>
+</p:sld>
+</file>
+
+<file path=ppt/slides/slide18.xml><?xml version="1.0" encoding="utf-8"?>
+<p:sld xmlns:a="http://schemas.openxmlformats.org/drawingml/2006/main" xmlns:r="http://schemas.openxmlformats.org/officeDocument/2006/relationships" xmlns:p="http://schemas.openxmlformats.org/presentationml/2006/main">
+  <p:cSld>
+    <p:spTree>
+      <p:nvGrpSpPr>
+        <p:cNvPr id="1" name=""/>
+        <p:cNvGrpSpPr/>
+        <p:nvPr/>
+      </p:nvGrpSpPr>
+      <p:grpSpPr>
+        <a:xfrm>
+          <a:off x="0" y="0"/>
+          <a:ext cx="0" cy="0"/>
+          <a:chOff x="0" y="0"/>
+          <a:chExt cx="0" cy="0"/>
+        </a:xfrm>
+      </p:grpSpPr>
+      <p:sp>
+        <p:nvSpPr>
+          <p:cNvPr id="2" name="Título 1"/>
+          <p:cNvSpPr>
+            <a:spLocks noGrp="1"/>
+          </p:cNvSpPr>
+          <p:nvPr>
+            <p:ph type="title"/>
+          </p:nvPr>
+        </p:nvSpPr>
+        <p:spPr/>
+        <p:txBody>
+          <a:bodyPr/>
+          <a:lstStyle/>
+          <a:p>
             <a:endParaRPr lang="pt-BR"/>
           </a:p>
         </p:txBody>
@@ -10592,7 +11339,7 @@
 </p:sld>
 </file>
 
-<file path=ppt/slides/slide18.xml><?xml version="1.0" encoding="utf-8"?>
+<file path=ppt/slides/slide19.xml><?xml version="1.0" encoding="utf-8"?>
 <p:sld xmlns:a="http://schemas.openxmlformats.org/drawingml/2006/main" xmlns:r="http://schemas.openxmlformats.org/officeDocument/2006/relationships" xmlns:p="http://schemas.openxmlformats.org/presentationml/2006/main">
   <p:cSld>
     <p:spTree>
@@ -11181,168 +11928,6 @@
 </p:sld>
 </file>
 
-<file path=ppt/slides/slide19.xml><?xml version="1.0" encoding="utf-8"?>
-<p:sld xmlns:a="http://schemas.openxmlformats.org/drawingml/2006/main" xmlns:r="http://schemas.openxmlformats.org/officeDocument/2006/relationships" xmlns:p="http://schemas.openxmlformats.org/presentationml/2006/main">
-  <p:cSld>
-    <p:spTree>
-      <p:nvGrpSpPr>
-        <p:cNvPr id="1" name=""/>
-        <p:cNvGrpSpPr/>
-        <p:nvPr/>
-      </p:nvGrpSpPr>
-      <p:grpSpPr>
-        <a:xfrm>
-          <a:off x="0" y="0"/>
-          <a:ext cx="0" cy="0"/>
-          <a:chOff x="0" y="0"/>
-          <a:chExt cx="0" cy="0"/>
-        </a:xfrm>
-      </p:grpSpPr>
-      <p:sp>
-        <p:nvSpPr>
-          <p:cNvPr id="2" name="Título 1"/>
-          <p:cNvSpPr>
-            <a:spLocks noGrp="1"/>
-          </p:cNvSpPr>
-          <p:nvPr>
-            <p:ph type="title"/>
-          </p:nvPr>
-        </p:nvSpPr>
-        <p:spPr/>
-        <p:txBody>
-          <a:bodyPr/>
-          <a:lstStyle/>
-          <a:p>
-            <a:pPr marL="0" indent="0" algn="l" defTabSz="914400">
-              <a:lnSpc>
-                <a:spcPct val="90000"/>
-              </a:lnSpc>
-              <a:spcBef>
-                <a:spcPts val="0"/>
-              </a:spcBef>
-              <a:buNone/>
-            </a:pPr>
-            <a:r>
-              <a:rPr lang="pt-BR" sz="3400" b="0" i="0" dirty="0" smtClean="0">
-                <a:solidFill>
-                  <a:srgbClr val="263050">
-                    <a:lumMod val="75000"/>
-                  </a:srgbClr>
-                </a:solidFill>
-                <a:latin typeface="Corbel"/>
-                <a:ea typeface="+mj-ea"/>
-                <a:cs typeface="+mj-cs"/>
-              </a:rPr>
-              <a:t>Apêndice</a:t>
-            </a:r>
-            <a:endParaRPr lang="pt-BR" sz="3400" b="0" i="0" dirty="0">
-              <a:solidFill>
-                <a:srgbClr val="263050">
-                  <a:lumMod val="75000"/>
-                </a:srgbClr>
-              </a:solidFill>
-              <a:latin typeface="Corbel"/>
-              <a:ea typeface="+mj-ea"/>
-              <a:cs typeface="+mj-cs"/>
-            </a:endParaRPr>
-          </a:p>
-        </p:txBody>
-      </p:sp>
-      <p:sp>
-        <p:nvSpPr>
-          <p:cNvPr id="3" name="Espaço Reservado para Conteúdo 2"/>
-          <p:cNvSpPr>
-            <a:spLocks noGrp="1"/>
-          </p:cNvSpPr>
-          <p:nvPr>
-            <p:ph sz="half" idx="1"/>
-          </p:nvPr>
-        </p:nvSpPr>
-        <p:spPr/>
-        <p:txBody>
-          <a:bodyPr/>
-          <a:lstStyle/>
-          <a:p>
-            <a:pPr marL="274320" indent="-228600" algn="l" defTabSz="914400">
-              <a:lnSpc>
-                <a:spcPct val="90000"/>
-              </a:lnSpc>
-              <a:spcBef>
-                <a:spcPts val="1800"/>
-              </a:spcBef>
-              <a:buClr>
-                <a:srgbClr val="263050"/>
-              </a:buClr>
-              <a:buSzPct val="80000"/>
-              <a:buFont typeface="Wingdings"/>
-              <a:buChar char="§"/>
-            </a:pPr>
-            <a:r>
-              <a:rPr lang="pt-BR" sz="2000" b="0" i="0" dirty="0" smtClean="0">
-                <a:solidFill>
-                  <a:srgbClr val="263050"/>
-                </a:solidFill>
-                <a:latin typeface="Corbel"/>
-                <a:ea typeface="+mn-ea"/>
-                <a:cs typeface="+mn-cs"/>
-              </a:rPr>
-              <a:t>Inclua referências a materiais e recursos suplementares</a:t>
-            </a:r>
-            <a:endParaRPr lang="pt-BR" sz="2000" b="0" i="0" dirty="0">
-              <a:solidFill>
-                <a:srgbClr val="263050"/>
-              </a:solidFill>
-              <a:latin typeface="Corbel"/>
-              <a:ea typeface="+mn-ea"/>
-              <a:cs typeface="+mn-cs"/>
-            </a:endParaRPr>
-          </a:p>
-        </p:txBody>
-      </p:sp>
-      <p:sp>
-        <p:nvSpPr>
-          <p:cNvPr id="4" name="Espaço Reservado para Conteúdo 3"/>
-          <p:cNvSpPr>
-            <a:spLocks noGrp="1"/>
-          </p:cNvSpPr>
-          <p:nvPr>
-            <p:ph sz="half" idx="2"/>
-          </p:nvPr>
-        </p:nvSpPr>
-        <p:spPr/>
-        <p:txBody>
-          <a:bodyPr/>
-          <a:lstStyle/>
-          <a:p>
-            <a:endParaRPr lang="pt-BR" dirty="0"/>
-          </a:p>
-        </p:txBody>
-      </p:sp>
-    </p:spTree>
-    <p:extLst>
-      <p:ext uri="{BB962C8B-B14F-4D97-AF65-F5344CB8AC3E}">
-        <p14:creationId xmlns:p14="http://schemas.microsoft.com/office/powerpoint/2010/main" val="3404412424"/>
-      </p:ext>
-    </p:extLst>
-  </p:cSld>
-  <p:clrMapOvr>
-    <a:masterClrMapping/>
-  </p:clrMapOvr>
-  <mc:AlternateContent xmlns:mc="http://schemas.openxmlformats.org/markup-compatibility/2006" xmlns:p14="http://schemas.microsoft.com/office/powerpoint/2010/main">
-    <mc:Choice Requires="p14">
-      <p:transition spd="med" p14:dur="700">
-        <p:fade/>
-      </p:transition>
-    </mc:Choice>
-    <mc:Fallback xmlns="">
-      <p:transition spd="med">
-        <p:fade/>
-      </p:transition>
-    </mc:Fallback>
-  </mc:AlternateContent>
-</p:sld>
-</file>
-
 <file path=ppt/slides/slide2.xml><?xml version="1.0" encoding="utf-8"?>
 <p:sld xmlns:a="http://schemas.openxmlformats.org/drawingml/2006/main" xmlns:r="http://schemas.openxmlformats.org/officeDocument/2006/relationships" xmlns:p="http://schemas.openxmlformats.org/presentationml/2006/main">
   <p:cSld>
@@ -11558,6 +12143,168 @@
       </p:par>
     </p:tnLst>
   </p:timing>
+</p:sld>
+</file>
+
+<file path=ppt/slides/slide20.xml><?xml version="1.0" encoding="utf-8"?>
+<p:sld xmlns:a="http://schemas.openxmlformats.org/drawingml/2006/main" xmlns:r="http://schemas.openxmlformats.org/officeDocument/2006/relationships" xmlns:p="http://schemas.openxmlformats.org/presentationml/2006/main">
+  <p:cSld>
+    <p:spTree>
+      <p:nvGrpSpPr>
+        <p:cNvPr id="1" name=""/>
+        <p:cNvGrpSpPr/>
+        <p:nvPr/>
+      </p:nvGrpSpPr>
+      <p:grpSpPr>
+        <a:xfrm>
+          <a:off x="0" y="0"/>
+          <a:ext cx="0" cy="0"/>
+          <a:chOff x="0" y="0"/>
+          <a:chExt cx="0" cy="0"/>
+        </a:xfrm>
+      </p:grpSpPr>
+      <p:sp>
+        <p:nvSpPr>
+          <p:cNvPr id="2" name="Título 1"/>
+          <p:cNvSpPr>
+            <a:spLocks noGrp="1"/>
+          </p:cNvSpPr>
+          <p:nvPr>
+            <p:ph type="title"/>
+          </p:nvPr>
+        </p:nvSpPr>
+        <p:spPr/>
+        <p:txBody>
+          <a:bodyPr/>
+          <a:lstStyle/>
+          <a:p>
+            <a:pPr marL="0" indent="0" algn="l" defTabSz="914400">
+              <a:lnSpc>
+                <a:spcPct val="90000"/>
+              </a:lnSpc>
+              <a:spcBef>
+                <a:spcPts val="0"/>
+              </a:spcBef>
+              <a:buNone/>
+            </a:pPr>
+            <a:r>
+              <a:rPr lang="pt-BR" sz="3400" b="0" i="0" dirty="0" smtClean="0">
+                <a:solidFill>
+                  <a:srgbClr val="263050">
+                    <a:lumMod val="75000"/>
+                  </a:srgbClr>
+                </a:solidFill>
+                <a:latin typeface="Corbel"/>
+                <a:ea typeface="+mj-ea"/>
+                <a:cs typeface="+mj-cs"/>
+              </a:rPr>
+              <a:t>Apêndice</a:t>
+            </a:r>
+            <a:endParaRPr lang="pt-BR" sz="3400" b="0" i="0" dirty="0">
+              <a:solidFill>
+                <a:srgbClr val="263050">
+                  <a:lumMod val="75000"/>
+                </a:srgbClr>
+              </a:solidFill>
+              <a:latin typeface="Corbel"/>
+              <a:ea typeface="+mj-ea"/>
+              <a:cs typeface="+mj-cs"/>
+            </a:endParaRPr>
+          </a:p>
+        </p:txBody>
+      </p:sp>
+      <p:sp>
+        <p:nvSpPr>
+          <p:cNvPr id="3" name="Espaço Reservado para Conteúdo 2"/>
+          <p:cNvSpPr>
+            <a:spLocks noGrp="1"/>
+          </p:cNvSpPr>
+          <p:nvPr>
+            <p:ph sz="half" idx="1"/>
+          </p:nvPr>
+        </p:nvSpPr>
+        <p:spPr/>
+        <p:txBody>
+          <a:bodyPr/>
+          <a:lstStyle/>
+          <a:p>
+            <a:pPr marL="274320" indent="-228600" algn="l" defTabSz="914400">
+              <a:lnSpc>
+                <a:spcPct val="90000"/>
+              </a:lnSpc>
+              <a:spcBef>
+                <a:spcPts val="1800"/>
+              </a:spcBef>
+              <a:buClr>
+                <a:srgbClr val="263050"/>
+              </a:buClr>
+              <a:buSzPct val="80000"/>
+              <a:buFont typeface="Wingdings"/>
+              <a:buChar char="§"/>
+            </a:pPr>
+            <a:r>
+              <a:rPr lang="pt-BR" sz="2000" b="0" i="0" dirty="0" smtClean="0">
+                <a:solidFill>
+                  <a:srgbClr val="263050"/>
+                </a:solidFill>
+                <a:latin typeface="Corbel"/>
+                <a:ea typeface="+mn-ea"/>
+                <a:cs typeface="+mn-cs"/>
+              </a:rPr>
+              <a:t>Inclua referências a materiais e recursos suplementares</a:t>
+            </a:r>
+            <a:endParaRPr lang="pt-BR" sz="2000" b="0" i="0" dirty="0">
+              <a:solidFill>
+                <a:srgbClr val="263050"/>
+              </a:solidFill>
+              <a:latin typeface="Corbel"/>
+              <a:ea typeface="+mn-ea"/>
+              <a:cs typeface="+mn-cs"/>
+            </a:endParaRPr>
+          </a:p>
+        </p:txBody>
+      </p:sp>
+      <p:sp>
+        <p:nvSpPr>
+          <p:cNvPr id="4" name="Espaço Reservado para Conteúdo 3"/>
+          <p:cNvSpPr>
+            <a:spLocks noGrp="1"/>
+          </p:cNvSpPr>
+          <p:nvPr>
+            <p:ph sz="half" idx="2"/>
+          </p:nvPr>
+        </p:nvSpPr>
+        <p:spPr/>
+        <p:txBody>
+          <a:bodyPr/>
+          <a:lstStyle/>
+          <a:p>
+            <a:endParaRPr lang="pt-BR" dirty="0"/>
+          </a:p>
+        </p:txBody>
+      </p:sp>
+    </p:spTree>
+    <p:extLst>
+      <p:ext uri="{BB962C8B-B14F-4D97-AF65-F5344CB8AC3E}">
+        <p14:creationId xmlns:p14="http://schemas.microsoft.com/office/powerpoint/2010/main" val="3404412424"/>
+      </p:ext>
+    </p:extLst>
+  </p:cSld>
+  <p:clrMapOvr>
+    <a:masterClrMapping/>
+  </p:clrMapOvr>
+  <mc:AlternateContent xmlns:mc="http://schemas.openxmlformats.org/markup-compatibility/2006" xmlns:p14="http://schemas.microsoft.com/office/powerpoint/2010/main">
+    <mc:Choice Requires="p14">
+      <p:transition spd="med" p14:dur="700">
+        <p:fade/>
+      </p:transition>
+    </mc:Choice>
+    <mc:Fallback xmlns="">
+      <p:transition spd="med">
+        <p:fade/>
+      </p:transition>
+    </mc:Fallback>
+  </mc:AlternateContent>
 </p:sld>
 </file>
 
@@ -11653,7 +12400,36 @@
               <a:rPr lang="pt-BR" sz="2300" dirty="0" smtClean="0">
                 <a:latin typeface="Corbel"/>
               </a:rPr>
-              <a:t>O sistema Internet Bank (SIB) é um sistema bancário acessado via internet que oferece aos clientes maior comodidade para realização de consultas, transferências, aplicações e outras operações que o cliente pode realizar sem sair de casa </a:t>
+              <a:t>O sistema Internet Bank (SIB) </a:t>
+            </a:r>
+            <a:r>
+              <a:rPr lang="pt-BR" sz="2300" dirty="0" smtClean="0">
+                <a:latin typeface="Corbel"/>
+              </a:rPr>
+              <a:t>:</a:t>
+            </a:r>
+          </a:p>
+          <a:p>
+            <a:pPr marL="0" indent="0" algn="ctr" defTabSz="914400">
+              <a:lnSpc>
+                <a:spcPct val="90000"/>
+              </a:lnSpc>
+              <a:spcBef>
+                <a:spcPts val="1800"/>
+              </a:spcBef>
+              <a:buNone/>
+            </a:pPr>
+            <a:r>
+              <a:rPr lang="pt-BR" sz="2300" b="0" i="0" baseline="0" dirty="0" smtClean="0">
+                <a:latin typeface="Corbel"/>
+              </a:rPr>
+              <a:t>O que é</a:t>
+            </a:r>
+            <a:r>
+              <a:rPr lang="pt-BR" sz="2300" b="0" i="0" dirty="0" smtClean="0">
+                <a:latin typeface="Corbel"/>
+              </a:rPr>
+              <a:t> e para que foi desenvolvido?</a:t>
             </a:r>
             <a:endParaRPr lang="pt-BR" sz="2300" b="0" i="0" baseline="0" dirty="0">
               <a:latin typeface="Corbel"/>
@@ -12147,6 +12923,119 @@
             <p:ph type="title"/>
           </p:nvPr>
         </p:nvSpPr>
+        <p:spPr/>
+        <p:txBody>
+          <a:bodyPr/>
+          <a:lstStyle/>
+          <a:p>
+            <a:pPr lvl="1" algn="l" rtl="0">
+              <a:lnSpc>
+                <a:spcPct val="90000"/>
+              </a:lnSpc>
+              <a:spcBef>
+                <a:spcPct val="0"/>
+              </a:spcBef>
+            </a:pPr>
+            <a:r>
+              <a:rPr lang="pt-BR" sz="3200" b="1" dirty="0" smtClean="0"/>
+              <a:t>Macro Visão </a:t>
+            </a:r>
+            <a:r>
+              <a:rPr lang="pt-BR" sz="3200" b="1" dirty="0"/>
+              <a:t>Funcional</a:t>
+            </a:r>
+            <a:r>
+              <a:rPr lang="pt-BR" b="1" dirty="0"/>
+              <a:t/>
+            </a:r>
+            <a:br>
+              <a:rPr lang="pt-BR" b="1" dirty="0"/>
+            </a:br>
+            <a:endParaRPr lang="pt-BR" dirty="0"/>
+          </a:p>
+        </p:txBody>
+      </p:sp>
+      <p:pic>
+        <p:nvPicPr>
+          <p:cNvPr id="4" name="Espaço Reservado para Conteúdo 3"/>
+          <p:cNvPicPr>
+            <a:picLocks noGrp="1" noChangeAspect="1"/>
+          </p:cNvPicPr>
+          <p:nvPr>
+            <p:ph idx="1"/>
+          </p:nvPr>
+        </p:nvPicPr>
+        <p:blipFill>
+          <a:blip r:embed="rId2">
+            <a:extLst>
+              <a:ext uri="{28A0092B-C50C-407E-A947-70E740481C1C}">
+                <a14:useLocalDpi xmlns:a14="http://schemas.microsoft.com/office/drawing/2010/main" val="0"/>
+              </a:ext>
+            </a:extLst>
+          </a:blip>
+          <a:stretch>
+            <a:fillRect/>
+          </a:stretch>
+        </p:blipFill>
+        <p:spPr>
+          <a:xfrm>
+            <a:off x="1710985" y="1901825"/>
+            <a:ext cx="8770031" cy="4127500"/>
+          </a:xfrm>
+        </p:spPr>
+      </p:pic>
+    </p:spTree>
+    <p:extLst>
+      <p:ext uri="{BB962C8B-B14F-4D97-AF65-F5344CB8AC3E}">
+        <p14:creationId xmlns:p14="http://schemas.microsoft.com/office/powerpoint/2010/main" val="2287135663"/>
+      </p:ext>
+    </p:extLst>
+  </p:cSld>
+  <p:clrMapOvr>
+    <a:masterClrMapping/>
+  </p:clrMapOvr>
+  <mc:AlternateContent xmlns:mc="http://schemas.openxmlformats.org/markup-compatibility/2006">
+    <mc:Choice xmlns:p14="http://schemas.microsoft.com/office/powerpoint/2010/main" Requires="p14">
+      <p:transition spd="med" p14:dur="700">
+        <p:fade/>
+      </p:transition>
+    </mc:Choice>
+    <mc:Fallback>
+      <p:transition spd="med">
+        <p:fade/>
+      </p:transition>
+    </mc:Fallback>
+  </mc:AlternateContent>
+</p:sld>
+</file>
+
+<file path=ppt/slides/slide7.xml><?xml version="1.0" encoding="utf-8"?>
+<p:sld xmlns:a="http://schemas.openxmlformats.org/drawingml/2006/main" xmlns:r="http://schemas.openxmlformats.org/officeDocument/2006/relationships" xmlns:p="http://schemas.openxmlformats.org/presentationml/2006/main">
+  <p:cSld>
+    <p:spTree>
+      <p:nvGrpSpPr>
+        <p:cNvPr id="1" name=""/>
+        <p:cNvGrpSpPr/>
+        <p:nvPr/>
+      </p:nvGrpSpPr>
+      <p:grpSpPr>
+        <a:xfrm>
+          <a:off x="0" y="0"/>
+          <a:ext cx="0" cy="0"/>
+          <a:chOff x="0" y="0"/>
+          <a:chExt cx="0" cy="0"/>
+        </a:xfrm>
+      </p:grpSpPr>
+      <p:sp>
+        <p:nvSpPr>
+          <p:cNvPr id="2" name="Título 1"/>
+          <p:cNvSpPr>
+            <a:spLocks noGrp="1"/>
+          </p:cNvSpPr>
+          <p:nvPr>
+            <p:ph type="title"/>
+          </p:nvPr>
+        </p:nvSpPr>
         <p:spPr>
           <a:xfrm>
             <a:off x="1341120" y="764704"/>
@@ -12461,7 +13350,7 @@
 </p:sld>
 </file>
 
-<file path=ppt/slides/slide7.xml><?xml version="1.0" encoding="utf-8"?>
+<file path=ppt/slides/slide8.xml><?xml version="1.0" encoding="utf-8"?>
 <p:sld xmlns:a="http://schemas.openxmlformats.org/drawingml/2006/main" xmlns:r="http://schemas.openxmlformats.org/officeDocument/2006/relationships" xmlns:p="http://schemas.openxmlformats.org/presentationml/2006/main">
   <p:cSld>
     <p:spTree>
@@ -13948,7 +14837,7 @@
 </p:sld>
 </file>
 
-<file path=ppt/slides/slide8.xml><?xml version="1.0" encoding="utf-8"?>
+<file path=ppt/slides/slide9.xml><?xml version="1.0" encoding="utf-8"?>
 <p:sld xmlns:a="http://schemas.openxmlformats.org/drawingml/2006/main" xmlns:r="http://schemas.openxmlformats.org/officeDocument/2006/relationships" xmlns:p="http://schemas.openxmlformats.org/presentationml/2006/main">
   <p:cSld>
     <p:spTree>
@@ -14062,752 +14951,6 @@
       </p:transition>
     </mc:Fallback>
   </mc:AlternateContent>
-</p:sld>
-</file>
-
-<file path=ppt/slides/slide9.xml><?xml version="1.0" encoding="utf-8"?>
-<p:sld xmlns:a="http://schemas.openxmlformats.org/drawingml/2006/main" xmlns:r="http://schemas.openxmlformats.org/officeDocument/2006/relationships" xmlns:p="http://schemas.openxmlformats.org/presentationml/2006/main">
-  <p:cSld>
-    <p:spTree>
-      <p:nvGrpSpPr>
-        <p:cNvPr id="1" name=""/>
-        <p:cNvGrpSpPr/>
-        <p:nvPr/>
-      </p:nvGrpSpPr>
-      <p:grpSpPr>
-        <a:xfrm>
-          <a:off x="0" y="0"/>
-          <a:ext cx="0" cy="0"/>
-          <a:chOff x="0" y="0"/>
-          <a:chExt cx="0" cy="0"/>
-        </a:xfrm>
-      </p:grpSpPr>
-      <p:sp>
-        <p:nvSpPr>
-          <p:cNvPr id="2" name="Título 1"/>
-          <p:cNvSpPr>
-            <a:spLocks noGrp="1"/>
-          </p:cNvSpPr>
-          <p:nvPr>
-            <p:ph type="title"/>
-          </p:nvPr>
-        </p:nvSpPr>
-        <p:spPr>
-          <a:xfrm>
-            <a:off x="1341120" y="467360"/>
-            <a:ext cx="9509760" cy="801400"/>
-          </a:xfrm>
-        </p:spPr>
-        <p:txBody>
-          <a:bodyPr>
-            <a:normAutofit/>
-          </a:bodyPr>
-          <a:lstStyle/>
-          <a:p>
-            <a:pPr marL="0" indent="0" algn="l" defTabSz="914400">
-              <a:lnSpc>
-                <a:spcPct val="90000"/>
-              </a:lnSpc>
-              <a:spcBef>
-                <a:spcPts val="0"/>
-              </a:spcBef>
-              <a:buNone/>
-            </a:pPr>
-            <a:r>
-              <a:rPr lang="pt-BR" dirty="0" smtClean="0">
-                <a:solidFill>
-                  <a:srgbClr val="263050">
-                    <a:lumMod val="75000"/>
-                  </a:srgbClr>
-                </a:solidFill>
-                <a:latin typeface="Corbel"/>
-              </a:rPr>
-              <a:t>Elaboração de Cronograma</a:t>
-            </a:r>
-            <a:endParaRPr lang="pt-BR" sz="3400" b="0" i="0" dirty="0">
-              <a:solidFill>
-                <a:srgbClr val="263050">
-                  <a:lumMod val="75000"/>
-                </a:srgbClr>
-              </a:solidFill>
-              <a:latin typeface="Corbel"/>
-              <a:ea typeface="+mj-ea"/>
-              <a:cs typeface="+mj-cs"/>
-            </a:endParaRPr>
-          </a:p>
-        </p:txBody>
-      </p:sp>
-      <p:graphicFrame>
-        <p:nvGraphicFramePr>
-          <p:cNvPr id="5" name="Espaço Reservado para Conteúdo 4"/>
-          <p:cNvGraphicFramePr>
-            <a:graphicFrameLocks noGrp="1"/>
-          </p:cNvGraphicFramePr>
-          <p:nvPr>
-            <p:ph idx="1"/>
-            <p:extLst>
-              <p:ext uri="{D42A27DB-BD31-4B8C-83A1-F6EECF244321}">
-                <p14:modId xmlns:p14="http://schemas.microsoft.com/office/powerpoint/2010/main" val="3534917820"/>
-              </p:ext>
-            </p:extLst>
-          </p:nvPr>
-        </p:nvGraphicFramePr>
-        <p:xfrm>
-          <a:off x="335360" y="1772819"/>
-          <a:ext cx="11449272" cy="4392486"/>
-        </p:xfrm>
-        <a:graphic>
-          <a:graphicData uri="http://schemas.openxmlformats.org/drawingml/2006/table">
-            <a:tbl>
-              <a:tblPr firstRow="1" firstCol="1" bandRow="1">
-                <a:tableStyleId>{B301B821-A1FF-4177-AEE7-76D212191A09}</a:tableStyleId>
-              </a:tblPr>
-              <a:tblGrid>
-                <a:gridCol w="3815620"/>
-                <a:gridCol w="3816826"/>
-                <a:gridCol w="3816826"/>
-              </a:tblGrid>
-              <a:tr h="627498">
-                <a:tc>
-                  <a:txBody>
-                    <a:bodyPr/>
-                    <a:lstStyle/>
-                    <a:p>
-                      <a:pPr>
-                        <a:lnSpc>
-                          <a:spcPts val="1200"/>
-                        </a:lnSpc>
-                        <a:spcAft>
-                          <a:spcPts val="0"/>
-                        </a:spcAft>
-                      </a:pPr>
-                      <a:r>
-                        <a:rPr lang="pt-BR" sz="1100" dirty="0" err="1">
-                          <a:effectLst/>
-                        </a:rPr>
-                        <a:t>Milestone</a:t>
-                      </a:r>
-                      <a:endParaRPr lang="pt-BR" sz="1000" dirty="0">
-                        <a:effectLst/>
-                        <a:latin typeface="Times New Roman"/>
-                        <a:ea typeface="Times New Roman"/>
-                      </a:endParaRPr>
-                    </a:p>
-                  </a:txBody>
-                  <a:tcPr marL="68580" marR="68580" marT="0" marB="0"/>
-                </a:tc>
-                <a:tc>
-                  <a:txBody>
-                    <a:bodyPr/>
-                    <a:lstStyle/>
-                    <a:p>
-                      <a:pPr>
-                        <a:lnSpc>
-                          <a:spcPts val="1200"/>
-                        </a:lnSpc>
-                        <a:spcAft>
-                          <a:spcPts val="0"/>
-                        </a:spcAft>
-                      </a:pPr>
-                      <a:r>
-                        <a:rPr lang="pt-BR" sz="1100">
-                          <a:effectLst/>
-                        </a:rPr>
-                        <a:t>Data de Início</a:t>
-                      </a:r>
-                      <a:endParaRPr lang="pt-BR" sz="1000">
-                        <a:effectLst/>
-                        <a:latin typeface="Times New Roman"/>
-                        <a:ea typeface="Times New Roman"/>
-                      </a:endParaRPr>
-                    </a:p>
-                  </a:txBody>
-                  <a:tcPr marL="68580" marR="68580" marT="0" marB="0"/>
-                </a:tc>
-                <a:tc>
-                  <a:txBody>
-                    <a:bodyPr/>
-                    <a:lstStyle/>
-                    <a:p>
-                      <a:pPr>
-                        <a:lnSpc>
-                          <a:spcPts val="1200"/>
-                        </a:lnSpc>
-                        <a:spcAft>
-                          <a:spcPts val="0"/>
-                        </a:spcAft>
-                      </a:pPr>
-                      <a:r>
-                        <a:rPr lang="pt-BR" sz="1100">
-                          <a:effectLst/>
-                        </a:rPr>
-                        <a:t>Data de Término</a:t>
-                      </a:r>
-                      <a:endParaRPr lang="pt-BR" sz="1000">
-                        <a:effectLst/>
-                        <a:latin typeface="Times New Roman"/>
-                        <a:ea typeface="Times New Roman"/>
-                      </a:endParaRPr>
-                    </a:p>
-                  </a:txBody>
-                  <a:tcPr marL="68580" marR="68580" marT="0" marB="0"/>
-                </a:tc>
-              </a:tr>
-              <a:tr h="627498">
-                <a:tc>
-                  <a:txBody>
-                    <a:bodyPr/>
-                    <a:lstStyle/>
-                    <a:p>
-                      <a:pPr>
-                        <a:lnSpc>
-                          <a:spcPts val="1200"/>
-                        </a:lnSpc>
-                        <a:spcAft>
-                          <a:spcPts val="0"/>
-                        </a:spcAft>
-                      </a:pPr>
-                      <a:r>
-                        <a:rPr lang="pt-BR" sz="1000">
-                          <a:effectLst/>
-                        </a:rPr>
-                        <a:t>Planejar Teste</a:t>
-                      </a:r>
-                      <a:endParaRPr lang="pt-BR" sz="1000">
-                        <a:effectLst/>
-                        <a:latin typeface="Times New Roman"/>
-                        <a:ea typeface="Times New Roman"/>
-                      </a:endParaRPr>
-                    </a:p>
-                  </a:txBody>
-                  <a:tcPr marL="68580" marR="68580" marT="0" marB="0"/>
-                </a:tc>
-                <a:tc>
-                  <a:txBody>
-                    <a:bodyPr/>
-                    <a:lstStyle/>
-                    <a:p>
-                      <a:pPr>
-                        <a:lnSpc>
-                          <a:spcPts val="1200"/>
-                        </a:lnSpc>
-                        <a:spcAft>
-                          <a:spcPts val="0"/>
-                        </a:spcAft>
-                      </a:pPr>
-                      <a:r>
-                        <a:rPr lang="pt-BR" sz="1000">
-                          <a:effectLst/>
-                        </a:rPr>
-                        <a:t>10/10/2013</a:t>
-                      </a:r>
-                      <a:endParaRPr lang="pt-BR" sz="1000">
-                        <a:effectLst/>
-                        <a:latin typeface="Times New Roman"/>
-                        <a:ea typeface="Times New Roman"/>
-                      </a:endParaRPr>
-                    </a:p>
-                  </a:txBody>
-                  <a:tcPr marL="68580" marR="68580" marT="0" marB="0"/>
-                </a:tc>
-                <a:tc>
-                  <a:txBody>
-                    <a:bodyPr/>
-                    <a:lstStyle/>
-                    <a:p>
-                      <a:pPr>
-                        <a:lnSpc>
-                          <a:spcPts val="1200"/>
-                        </a:lnSpc>
-                        <a:spcAft>
-                          <a:spcPts val="0"/>
-                        </a:spcAft>
-                      </a:pPr>
-                      <a:r>
-                        <a:rPr lang="pt-BR" sz="1000">
-                          <a:effectLst/>
-                        </a:rPr>
-                        <a:t>12/10/2013</a:t>
-                      </a:r>
-                      <a:endParaRPr lang="pt-BR" sz="1000">
-                        <a:effectLst/>
-                        <a:latin typeface="Times New Roman"/>
-                        <a:ea typeface="Times New Roman"/>
-                      </a:endParaRPr>
-                    </a:p>
-                  </a:txBody>
-                  <a:tcPr marL="68580" marR="68580" marT="0" marB="0"/>
-                </a:tc>
-              </a:tr>
-              <a:tr h="627498">
-                <a:tc>
-                  <a:txBody>
-                    <a:bodyPr/>
-                    <a:lstStyle/>
-                    <a:p>
-                      <a:pPr>
-                        <a:lnSpc>
-                          <a:spcPts val="1200"/>
-                        </a:lnSpc>
-                        <a:spcAft>
-                          <a:spcPts val="0"/>
-                        </a:spcAft>
-                      </a:pPr>
-                      <a:r>
-                        <a:rPr lang="pt-BR" sz="1000">
-                          <a:effectLst/>
-                        </a:rPr>
-                        <a:t>Projetar Teste</a:t>
-                      </a:r>
-                      <a:endParaRPr lang="pt-BR" sz="1000">
-                        <a:effectLst/>
-                        <a:latin typeface="Times New Roman"/>
-                        <a:ea typeface="Times New Roman"/>
-                      </a:endParaRPr>
-                    </a:p>
-                  </a:txBody>
-                  <a:tcPr marL="68580" marR="68580" marT="0" marB="0"/>
-                </a:tc>
-                <a:tc>
-                  <a:txBody>
-                    <a:bodyPr/>
-                    <a:lstStyle/>
-                    <a:p>
-                      <a:pPr>
-                        <a:lnSpc>
-                          <a:spcPts val="1200"/>
-                        </a:lnSpc>
-                        <a:spcAft>
-                          <a:spcPts val="0"/>
-                        </a:spcAft>
-                      </a:pPr>
-                      <a:r>
-                        <a:rPr lang="pt-BR" sz="1000">
-                          <a:effectLst/>
-                        </a:rPr>
-                        <a:t>12/10/2013</a:t>
-                      </a:r>
-                      <a:endParaRPr lang="pt-BR" sz="1000">
-                        <a:effectLst/>
-                        <a:latin typeface="Times New Roman"/>
-                        <a:ea typeface="Times New Roman"/>
-                      </a:endParaRPr>
-                    </a:p>
-                  </a:txBody>
-                  <a:tcPr marL="68580" marR="68580" marT="0" marB="0"/>
-                </a:tc>
-                <a:tc>
-                  <a:txBody>
-                    <a:bodyPr/>
-                    <a:lstStyle/>
-                    <a:p>
-                      <a:pPr>
-                        <a:lnSpc>
-                          <a:spcPts val="1200"/>
-                        </a:lnSpc>
-                        <a:spcAft>
-                          <a:spcPts val="0"/>
-                        </a:spcAft>
-                      </a:pPr>
-                      <a:r>
-                        <a:rPr lang="pt-BR" sz="1000">
-                          <a:effectLst/>
-                        </a:rPr>
-                        <a:t>16/10/2013</a:t>
-                      </a:r>
-                      <a:endParaRPr lang="pt-BR" sz="1000">
-                        <a:effectLst/>
-                        <a:latin typeface="Times New Roman"/>
-                        <a:ea typeface="Times New Roman"/>
-                      </a:endParaRPr>
-                    </a:p>
-                  </a:txBody>
-                  <a:tcPr marL="68580" marR="68580" marT="0" marB="0"/>
-                </a:tc>
-              </a:tr>
-              <a:tr h="627498">
-                <a:tc>
-                  <a:txBody>
-                    <a:bodyPr/>
-                    <a:lstStyle/>
-                    <a:p>
-                      <a:pPr>
-                        <a:lnSpc>
-                          <a:spcPts val="1200"/>
-                        </a:lnSpc>
-                        <a:spcAft>
-                          <a:spcPts val="0"/>
-                        </a:spcAft>
-                      </a:pPr>
-                      <a:r>
-                        <a:rPr lang="pt-BR" sz="1000">
-                          <a:effectLst/>
-                        </a:rPr>
-                        <a:t>Implementar Teste</a:t>
-                      </a:r>
-                      <a:endParaRPr lang="pt-BR" sz="1000">
-                        <a:effectLst/>
-                        <a:latin typeface="Times New Roman"/>
-                        <a:ea typeface="Times New Roman"/>
-                      </a:endParaRPr>
-                    </a:p>
-                  </a:txBody>
-                  <a:tcPr marL="68580" marR="68580" marT="0" marB="0"/>
-                </a:tc>
-                <a:tc>
-                  <a:txBody>
-                    <a:bodyPr/>
-                    <a:lstStyle/>
-                    <a:p>
-                      <a:pPr>
-                        <a:lnSpc>
-                          <a:spcPts val="1200"/>
-                        </a:lnSpc>
-                        <a:spcAft>
-                          <a:spcPts val="0"/>
-                        </a:spcAft>
-                      </a:pPr>
-                      <a:r>
-                        <a:rPr lang="pt-BR" sz="1000" dirty="0">
-                          <a:effectLst/>
-                        </a:rPr>
-                        <a:t>Não teremos</a:t>
-                      </a:r>
-                      <a:endParaRPr lang="pt-BR" sz="1000" dirty="0">
-                        <a:effectLst/>
-                        <a:latin typeface="Times New Roman"/>
-                        <a:ea typeface="Times New Roman"/>
-                      </a:endParaRPr>
-                    </a:p>
-                  </a:txBody>
-                  <a:tcPr marL="68580" marR="68580" marT="0" marB="0"/>
-                </a:tc>
-                <a:tc>
-                  <a:txBody>
-                    <a:bodyPr/>
-                    <a:lstStyle/>
-                    <a:p>
-                      <a:pPr>
-                        <a:lnSpc>
-                          <a:spcPts val="1200"/>
-                        </a:lnSpc>
-                        <a:spcAft>
-                          <a:spcPts val="0"/>
-                        </a:spcAft>
-                      </a:pPr>
-                      <a:r>
-                        <a:rPr lang="pt-BR" sz="1000">
-                          <a:effectLst/>
-                        </a:rPr>
-                        <a:t>Não teremos</a:t>
-                      </a:r>
-                      <a:endParaRPr lang="pt-BR" sz="1000">
-                        <a:effectLst/>
-                        <a:latin typeface="Times New Roman"/>
-                        <a:ea typeface="Times New Roman"/>
-                      </a:endParaRPr>
-                    </a:p>
-                  </a:txBody>
-                  <a:tcPr marL="68580" marR="68580" marT="0" marB="0"/>
-                </a:tc>
-              </a:tr>
-              <a:tr h="627498">
-                <a:tc>
-                  <a:txBody>
-                    <a:bodyPr/>
-                    <a:lstStyle/>
-                    <a:p>
-                      <a:pPr>
-                        <a:lnSpc>
-                          <a:spcPts val="1200"/>
-                        </a:lnSpc>
-                        <a:spcAft>
-                          <a:spcPts val="0"/>
-                        </a:spcAft>
-                      </a:pPr>
-                      <a:r>
-                        <a:rPr lang="pt-BR" sz="1000">
-                          <a:effectLst/>
-                        </a:rPr>
-                        <a:t>Executar Teste</a:t>
-                      </a:r>
-                      <a:endParaRPr lang="pt-BR" sz="1000">
-                        <a:effectLst/>
-                        <a:latin typeface="Times New Roman"/>
-                        <a:ea typeface="Times New Roman"/>
-                      </a:endParaRPr>
-                    </a:p>
-                  </a:txBody>
-                  <a:tcPr marL="68580" marR="68580" marT="0" marB="0"/>
-                </a:tc>
-                <a:tc>
-                  <a:txBody>
-                    <a:bodyPr/>
-                    <a:lstStyle/>
-                    <a:p>
-                      <a:pPr>
-                        <a:lnSpc>
-                          <a:spcPts val="1200"/>
-                        </a:lnSpc>
-                        <a:spcAft>
-                          <a:spcPts val="0"/>
-                        </a:spcAft>
-                      </a:pPr>
-                      <a:r>
-                        <a:rPr lang="pt-BR" sz="1000">
-                          <a:effectLst/>
-                        </a:rPr>
-                        <a:t>Não terremos</a:t>
-                      </a:r>
-                      <a:endParaRPr lang="pt-BR" sz="1000">
-                        <a:effectLst/>
-                        <a:latin typeface="Times New Roman"/>
-                        <a:ea typeface="Times New Roman"/>
-                      </a:endParaRPr>
-                    </a:p>
-                  </a:txBody>
-                  <a:tcPr marL="68580" marR="68580" marT="0" marB="0"/>
-                </a:tc>
-                <a:tc>
-                  <a:txBody>
-                    <a:bodyPr/>
-                    <a:lstStyle/>
-                    <a:p>
-                      <a:pPr>
-                        <a:lnSpc>
-                          <a:spcPts val="1200"/>
-                        </a:lnSpc>
-                        <a:spcAft>
-                          <a:spcPts val="0"/>
-                        </a:spcAft>
-                      </a:pPr>
-                      <a:r>
-                        <a:rPr lang="pt-BR" sz="1000">
-                          <a:effectLst/>
-                        </a:rPr>
-                        <a:t>Não terremos</a:t>
-                      </a:r>
-                      <a:endParaRPr lang="pt-BR" sz="1000">
-                        <a:effectLst/>
-                        <a:latin typeface="Times New Roman"/>
-                        <a:ea typeface="Times New Roman"/>
-                      </a:endParaRPr>
-                    </a:p>
-                  </a:txBody>
-                  <a:tcPr marL="68580" marR="68580" marT="0" marB="0"/>
-                </a:tc>
-              </a:tr>
-              <a:tr h="627498">
-                <a:tc>
-                  <a:txBody>
-                    <a:bodyPr/>
-                    <a:lstStyle/>
-                    <a:p>
-                      <a:pPr>
-                        <a:lnSpc>
-                          <a:spcPts val="1200"/>
-                        </a:lnSpc>
-                        <a:spcAft>
-                          <a:spcPts val="0"/>
-                        </a:spcAft>
-                      </a:pPr>
-                      <a:r>
-                        <a:rPr lang="pt-BR" sz="1000">
-                          <a:effectLst/>
-                        </a:rPr>
-                        <a:t>Avaliar Teste</a:t>
-                      </a:r>
-                      <a:endParaRPr lang="pt-BR" sz="1000">
-                        <a:effectLst/>
-                        <a:latin typeface="Times New Roman"/>
-                        <a:ea typeface="Times New Roman"/>
-                      </a:endParaRPr>
-                    </a:p>
-                  </a:txBody>
-                  <a:tcPr marL="68580" marR="68580" marT="0" marB="0"/>
-                </a:tc>
-                <a:tc>
-                  <a:txBody>
-                    <a:bodyPr/>
-                    <a:lstStyle/>
-                    <a:p>
-                      <a:pPr>
-                        <a:lnSpc>
-                          <a:spcPts val="1200"/>
-                        </a:lnSpc>
-                        <a:spcAft>
-                          <a:spcPts val="0"/>
-                        </a:spcAft>
-                      </a:pPr>
-                      <a:r>
-                        <a:rPr lang="pt-BR" sz="1000">
-                          <a:effectLst/>
-                        </a:rPr>
-                        <a:t>17/10/2013</a:t>
-                      </a:r>
-                      <a:endParaRPr lang="pt-BR" sz="1000">
-                        <a:effectLst/>
-                        <a:latin typeface="Times New Roman"/>
-                        <a:ea typeface="Times New Roman"/>
-                      </a:endParaRPr>
-                    </a:p>
-                  </a:txBody>
-                  <a:tcPr marL="68580" marR="68580" marT="0" marB="0"/>
-                </a:tc>
-                <a:tc>
-                  <a:txBody>
-                    <a:bodyPr/>
-                    <a:lstStyle/>
-                    <a:p>
-                      <a:pPr>
-                        <a:lnSpc>
-                          <a:spcPts val="1200"/>
-                        </a:lnSpc>
-                        <a:spcAft>
-                          <a:spcPts val="0"/>
-                        </a:spcAft>
-                      </a:pPr>
-                      <a:r>
-                        <a:rPr lang="pt-BR" sz="1000">
-                          <a:effectLst/>
-                        </a:rPr>
-                        <a:t>06/10/2013</a:t>
-                      </a:r>
-                      <a:endParaRPr lang="pt-BR" sz="1000">
-                        <a:effectLst/>
-                        <a:latin typeface="Times New Roman"/>
-                        <a:ea typeface="Times New Roman"/>
-                      </a:endParaRPr>
-                    </a:p>
-                  </a:txBody>
-                  <a:tcPr marL="68580" marR="68580" marT="0" marB="0"/>
-                </a:tc>
-              </a:tr>
-              <a:tr h="627498">
-                <a:tc>
-                  <a:txBody>
-                    <a:bodyPr/>
-                    <a:lstStyle/>
-                    <a:p>
-                      <a:pPr>
-                        <a:lnSpc>
-                          <a:spcPts val="1200"/>
-                        </a:lnSpc>
-                        <a:spcAft>
-                          <a:spcPts val="0"/>
-                        </a:spcAft>
-                      </a:pPr>
-                      <a:r>
-                        <a:rPr lang="pt-BR" sz="1000" dirty="0">
-                          <a:effectLst/>
-                        </a:rPr>
-                        <a:t>Entrega do Release final</a:t>
-                      </a:r>
-                      <a:endParaRPr lang="pt-BR" sz="1000" dirty="0">
-                        <a:effectLst/>
-                        <a:latin typeface="Times New Roman"/>
-                        <a:ea typeface="Times New Roman"/>
-                      </a:endParaRPr>
-                    </a:p>
-                  </a:txBody>
-                  <a:tcPr marL="68580" marR="68580" marT="0" marB="0"/>
-                </a:tc>
-                <a:tc>
-                  <a:txBody>
-                    <a:bodyPr/>
-                    <a:lstStyle/>
-                    <a:p>
-                      <a:pPr>
-                        <a:lnSpc>
-                          <a:spcPts val="1200"/>
-                        </a:lnSpc>
-                        <a:spcAft>
-                          <a:spcPts val="0"/>
-                        </a:spcAft>
-                      </a:pPr>
-                      <a:r>
-                        <a:rPr lang="pt-BR" sz="1000">
-                          <a:effectLst/>
-                        </a:rPr>
-                        <a:t>07</a:t>
-                      </a:r>
-                      <a:r>
-                        <a:rPr lang="en-US" sz="1000">
-                          <a:effectLst/>
-                        </a:rPr>
-                        <a:t>/11/2013</a:t>
-                      </a:r>
-                      <a:endParaRPr lang="pt-BR" sz="1000">
-                        <a:effectLst/>
-                        <a:latin typeface="Times New Roman"/>
-                        <a:ea typeface="Times New Roman"/>
-                      </a:endParaRPr>
-                    </a:p>
-                  </a:txBody>
-                  <a:tcPr marL="68580" marR="68580" marT="0" marB="0"/>
-                </a:tc>
-                <a:tc>
-                  <a:txBody>
-                    <a:bodyPr/>
-                    <a:lstStyle/>
-                    <a:p>
-                      <a:pPr>
-                        <a:lnSpc>
-                          <a:spcPts val="1200"/>
-                        </a:lnSpc>
-                        <a:spcAft>
-                          <a:spcPts val="0"/>
-                        </a:spcAft>
-                      </a:pPr>
-                      <a:r>
-                        <a:rPr lang="pt-BR" sz="1000" dirty="0">
-                          <a:effectLst/>
-                        </a:rPr>
-                        <a:t>21/11/2013</a:t>
-                      </a:r>
-                      <a:endParaRPr lang="pt-BR" sz="1000" dirty="0">
-                        <a:effectLst/>
-                        <a:latin typeface="Times New Roman"/>
-                        <a:ea typeface="Times New Roman"/>
-                      </a:endParaRPr>
-                    </a:p>
-                  </a:txBody>
-                  <a:tcPr marL="68580" marR="68580" marT="0" marB="0"/>
-                </a:tc>
-              </a:tr>
-            </a:tbl>
-          </a:graphicData>
-        </a:graphic>
-      </p:graphicFrame>
-    </p:spTree>
-    <p:extLst>
-      <p:ext uri="{BB962C8B-B14F-4D97-AF65-F5344CB8AC3E}">
-        <p14:creationId xmlns:p14="http://schemas.microsoft.com/office/powerpoint/2010/main" val="3676793758"/>
-      </p:ext>
-    </p:extLst>
-  </p:cSld>
-  <p:clrMapOvr>
-    <a:masterClrMapping/>
-  </p:clrMapOvr>
-  <mc:AlternateContent xmlns:mc="http://schemas.openxmlformats.org/markup-compatibility/2006" xmlns:p14="http://schemas.microsoft.com/office/powerpoint/2010/main">
-    <mc:Choice Requires="p14">
-      <p:transition spd="med" p14:dur="700">
-        <p:fade/>
-      </p:transition>
-    </mc:Choice>
-    <mc:Fallback xmlns="">
-      <p:transition spd="med">
-        <p:fade/>
-      </p:transition>
-    </mc:Fallback>
-  </mc:AlternateContent>
-  <p:timing>
-    <p:tnLst>
-      <p:par>
-        <p:cTn id="1" dur="indefinite" restart="never" nodeType="tmRoot"/>
-      </p:par>
-    </p:tnLst>
-  </p:timing>
 </p:sld>
 </file>
 

</xml_diff>

<commit_message>
atualização dos documentos do SIB 5
</commit_message>
<xml_diff>
--- a/Requisitos/Plano de Projeto 1.pptx
+++ b/Requisitos/Plano de Projeto 1.pptx
@@ -5,10 +5,10 @@
     <p:sldMasterId id="2147483648" r:id="rId2"/>
   </p:sldMasterIdLst>
   <p:notesMasterIdLst>
-    <p:notesMasterId r:id="rId24"/>
+    <p:notesMasterId r:id="rId25"/>
   </p:notesMasterIdLst>
   <p:handoutMasterIdLst>
-    <p:handoutMasterId r:id="rId25"/>
+    <p:handoutMasterId r:id="rId26"/>
   </p:handoutMasterIdLst>
   <p:sldIdLst>
     <p:sldId id="265" r:id="rId3"/>
@@ -19,19 +19,20 @@
     <p:sldId id="309" r:id="rId8"/>
     <p:sldId id="308" r:id="rId9"/>
     <p:sldId id="291" r:id="rId10"/>
-    <p:sldId id="292" r:id="rId11"/>
-    <p:sldId id="293" r:id="rId12"/>
-    <p:sldId id="294" r:id="rId13"/>
-    <p:sldId id="280" r:id="rId14"/>
-    <p:sldId id="301" r:id="rId15"/>
-    <p:sldId id="302" r:id="rId16"/>
-    <p:sldId id="303" r:id="rId17"/>
-    <p:sldId id="304" r:id="rId18"/>
-    <p:sldId id="305" r:id="rId19"/>
-    <p:sldId id="306" r:id="rId20"/>
-    <p:sldId id="307" r:id="rId21"/>
-    <p:sldId id="300" r:id="rId22"/>
-    <p:sldId id="295" r:id="rId23"/>
+    <p:sldId id="310" r:id="rId11"/>
+    <p:sldId id="292" r:id="rId12"/>
+    <p:sldId id="293" r:id="rId13"/>
+    <p:sldId id="294" r:id="rId14"/>
+    <p:sldId id="280" r:id="rId15"/>
+    <p:sldId id="301" r:id="rId16"/>
+    <p:sldId id="302" r:id="rId17"/>
+    <p:sldId id="303" r:id="rId18"/>
+    <p:sldId id="304" r:id="rId19"/>
+    <p:sldId id="305" r:id="rId20"/>
+    <p:sldId id="306" r:id="rId21"/>
+    <p:sldId id="307" r:id="rId22"/>
+    <p:sldId id="300" r:id="rId23"/>
+    <p:sldId id="295" r:id="rId24"/>
   </p:sldIdLst>
   <p:sldSz cx="12192000" cy="6858000"/>
   <p:notesSz cx="6858000" cy="9144000"/>
@@ -6603,7 +6604,7 @@
                 <a:ea typeface="+mn-ea"/>
                 <a:cs typeface="+mn-cs"/>
               </a:rPr>
-              <a:t>11</a:t>
+              <a:t>12</a:t>
             </a:fld>
             <a:endParaRPr lang="en-US" sz="1200" b="0" i="0">
               <a:latin typeface="Corbel"/>
@@ -11123,6 +11124,1273 @@
           <a:bodyPr/>
           <a:lstStyle/>
           <a:p>
+            <a:pPr>
+              <a:spcBef>
+                <a:spcPts val="0"/>
+              </a:spcBef>
+            </a:pPr>
+            <a:r>
+              <a:rPr lang="pt-BR" dirty="0" smtClean="0"/>
+              <a:t>Definição de  </a:t>
+            </a:r>
+            <a:r>
+              <a:rPr lang="pt-BR" dirty="0"/>
+              <a:t>prioridades</a:t>
+            </a:r>
+            <a:br>
+              <a:rPr lang="pt-BR" dirty="0"/>
+            </a:br>
+            <a:endParaRPr lang="pt-BR" sz="3400" b="0" i="0" dirty="0">
+              <a:solidFill>
+                <a:srgbClr val="263050">
+                  <a:lumMod val="75000"/>
+                </a:srgbClr>
+              </a:solidFill>
+              <a:latin typeface="Corbel"/>
+              <a:ea typeface="+mj-ea"/>
+              <a:cs typeface="+mj-cs"/>
+            </a:endParaRPr>
+          </a:p>
+        </p:txBody>
+      </p:sp>
+      <p:graphicFrame>
+        <p:nvGraphicFramePr>
+          <p:cNvPr id="4" name="Espaço Reservado para Conteúdo 3"/>
+          <p:cNvGraphicFramePr>
+            <a:graphicFrameLocks noGrp="1"/>
+          </p:cNvGraphicFramePr>
+          <p:nvPr>
+            <p:ph idx="1"/>
+            <p:extLst>
+              <p:ext uri="{D42A27DB-BD31-4B8C-83A1-F6EECF244321}">
+                <p14:modId xmlns:p14="http://schemas.microsoft.com/office/powerpoint/2010/main" val="2191650505"/>
+              </p:ext>
+            </p:extLst>
+          </p:nvPr>
+        </p:nvGraphicFramePr>
+        <p:xfrm>
+          <a:off x="191344" y="1700811"/>
+          <a:ext cx="11737304" cy="4608508"/>
+        </p:xfrm>
+        <a:graphic>
+          <a:graphicData uri="http://schemas.openxmlformats.org/drawingml/2006/table">
+            <a:tbl>
+              <a:tblPr>
+                <a:tableStyleId>{B301B821-A1FF-4177-AEE7-76D212191A09}</a:tableStyleId>
+              </a:tblPr>
+              <a:tblGrid>
+                <a:gridCol w="3715767"/>
+                <a:gridCol w="1020999"/>
+                <a:gridCol w="1389228"/>
+                <a:gridCol w="1640293"/>
+                <a:gridCol w="1292986"/>
+                <a:gridCol w="1489654"/>
+                <a:gridCol w="1188377"/>
+              </a:tblGrid>
+              <a:tr h="1190492">
+                <a:tc>
+                  <a:txBody>
+                    <a:bodyPr/>
+                    <a:lstStyle/>
+                    <a:p>
+                      <a:pPr algn="l" fontAlgn="ctr"/>
+                      <a:r>
+                        <a:rPr lang="pt-BR" sz="1600" b="1" i="0" u="none" strike="noStrike" dirty="0">
+                          <a:solidFill>
+                            <a:srgbClr val="000000"/>
+                          </a:solidFill>
+                          <a:effectLst/>
+                          <a:latin typeface="Calibri" panose="020F0502020204030204" pitchFamily="34" charset="0"/>
+                        </a:rPr>
+                        <a:t>requisitos</a:t>
+                      </a:r>
+                    </a:p>
+                  </a:txBody>
+                  <a:tcPr marL="0" marR="0" marT="0" marB="0" anchor="ctr"/>
+                </a:tc>
+                <a:tc>
+                  <a:txBody>
+                    <a:bodyPr/>
+                    <a:lstStyle/>
+                    <a:p>
+                      <a:pPr algn="l" fontAlgn="b"/>
+                      <a:r>
+                        <a:rPr lang="pt-BR" sz="1600" b="1" i="0" u="none" strike="noStrike">
+                          <a:solidFill>
+                            <a:srgbClr val="000000"/>
+                          </a:solidFill>
+                          <a:effectLst/>
+                          <a:latin typeface="Calibri" panose="020F0502020204030204" pitchFamily="34" charset="0"/>
+                        </a:rPr>
+                        <a:t>impacto </a:t>
+                      </a:r>
+                    </a:p>
+                  </a:txBody>
+                  <a:tcPr marL="0" marR="0" marT="0" marB="0" anchor="b"/>
+                </a:tc>
+                <a:tc>
+                  <a:txBody>
+                    <a:bodyPr/>
+                    <a:lstStyle/>
+                    <a:p>
+                      <a:pPr algn="l" fontAlgn="b"/>
+                      <a:r>
+                        <a:rPr lang="pt-BR" sz="1600" b="1" i="0" u="none" strike="noStrike">
+                          <a:solidFill>
+                            <a:srgbClr val="000000"/>
+                          </a:solidFill>
+                          <a:effectLst/>
+                          <a:latin typeface="Calibri" panose="020F0502020204030204" pitchFamily="34" charset="0"/>
+                        </a:rPr>
+                        <a:t>probabilidade</a:t>
+                      </a:r>
+                    </a:p>
+                  </a:txBody>
+                  <a:tcPr marL="0" marR="0" marT="0" marB="0" anchor="b"/>
+                </a:tc>
+                <a:tc>
+                  <a:txBody>
+                    <a:bodyPr/>
+                    <a:lstStyle/>
+                    <a:p>
+                      <a:pPr algn="l" fontAlgn="b"/>
+                      <a:r>
+                        <a:rPr lang="pt-BR" sz="1600" b="1" i="0" u="none" strike="noStrike">
+                          <a:solidFill>
+                            <a:srgbClr val="000000"/>
+                          </a:solidFill>
+                          <a:effectLst/>
+                          <a:latin typeface="Calibri" panose="020F0502020204030204" pitchFamily="34" charset="0"/>
+                        </a:rPr>
+                        <a:t>risco avaliado</a:t>
+                      </a:r>
+                    </a:p>
+                  </a:txBody>
+                  <a:tcPr marL="0" marR="0" marT="0" marB="0" anchor="b"/>
+                </a:tc>
+                <a:tc>
+                  <a:txBody>
+                    <a:bodyPr/>
+                    <a:lstStyle/>
+                    <a:p>
+                      <a:pPr algn="l" fontAlgn="b"/>
+                      <a:r>
+                        <a:rPr lang="pt-BR" sz="1600" b="1" i="0" u="none" strike="noStrike">
+                          <a:solidFill>
+                            <a:srgbClr val="000000"/>
+                          </a:solidFill>
+                          <a:effectLst/>
+                          <a:latin typeface="Calibri" panose="020F0502020204030204" pitchFamily="34" charset="0"/>
+                        </a:rPr>
+                        <a:t>frequencia</a:t>
+                      </a:r>
+                    </a:p>
+                  </a:txBody>
+                  <a:tcPr marL="0" marR="0" marT="0" marB="0" anchor="b"/>
+                </a:tc>
+                <a:tc>
+                  <a:txBody>
+                    <a:bodyPr/>
+                    <a:lstStyle/>
+                    <a:p>
+                      <a:pPr algn="l" fontAlgn="b"/>
+                      <a:r>
+                        <a:rPr lang="pt-BR" sz="1600" b="1" i="0" u="none" strike="noStrike">
+                          <a:solidFill>
+                            <a:srgbClr val="000000"/>
+                          </a:solidFill>
+                          <a:effectLst/>
+                          <a:latin typeface="Calibri" panose="020F0502020204030204" pitchFamily="34" charset="0"/>
+                        </a:rPr>
+                        <a:t>importancia</a:t>
+                      </a:r>
+                    </a:p>
+                  </a:txBody>
+                  <a:tcPr marL="0" marR="0" marT="0" marB="0" anchor="b"/>
+                </a:tc>
+                <a:tc>
+                  <a:txBody>
+                    <a:bodyPr/>
+                    <a:lstStyle/>
+                    <a:p>
+                      <a:pPr algn="l" fontAlgn="b"/>
+                      <a:r>
+                        <a:rPr lang="pt-BR" sz="1600" b="1" i="0" u="none" strike="noStrike">
+                          <a:solidFill>
+                            <a:srgbClr val="000000"/>
+                          </a:solidFill>
+                          <a:effectLst/>
+                          <a:latin typeface="Calibri" panose="020F0502020204030204" pitchFamily="34" charset="0"/>
+                        </a:rPr>
+                        <a:t>prioridade</a:t>
+                      </a:r>
+                    </a:p>
+                  </a:txBody>
+                  <a:tcPr marL="0" marR="0" marT="0" marB="0" anchor="b"/>
+                </a:tc>
+              </a:tr>
+              <a:tr h="488288">
+                <a:tc>
+                  <a:txBody>
+                    <a:bodyPr/>
+                    <a:lstStyle/>
+                    <a:p>
+                      <a:pPr algn="l" fontAlgn="b"/>
+                      <a:r>
+                        <a:rPr lang="pt-BR" sz="1200" b="1" i="0" u="none" strike="noStrike">
+                          <a:solidFill>
+                            <a:srgbClr val="000000"/>
+                          </a:solidFill>
+                          <a:effectLst/>
+                          <a:latin typeface="Calibri" panose="020F0502020204030204" pitchFamily="34" charset="0"/>
+                        </a:rPr>
+                        <a:t>UC001 - Efetuar Login</a:t>
+                      </a:r>
+                    </a:p>
+                  </a:txBody>
+                  <a:tcPr marL="0" marR="0" marT="0" marB="0" anchor="b"/>
+                </a:tc>
+                <a:tc>
+                  <a:txBody>
+                    <a:bodyPr/>
+                    <a:lstStyle/>
+                    <a:p>
+                      <a:pPr algn="r" fontAlgn="b"/>
+                      <a:r>
+                        <a:rPr lang="pt-BR" sz="1100" b="0" i="0" u="none" strike="noStrike">
+                          <a:solidFill>
+                            <a:srgbClr val="000000"/>
+                          </a:solidFill>
+                          <a:effectLst/>
+                          <a:latin typeface="Calibri" panose="020F0502020204030204" pitchFamily="34" charset="0"/>
+                        </a:rPr>
+                        <a:t>5</a:t>
+                      </a:r>
+                    </a:p>
+                  </a:txBody>
+                  <a:tcPr marL="0" marR="0" marT="0" marB="0" anchor="b"/>
+                </a:tc>
+                <a:tc>
+                  <a:txBody>
+                    <a:bodyPr/>
+                    <a:lstStyle/>
+                    <a:p>
+                      <a:pPr algn="r" fontAlgn="b"/>
+                      <a:r>
+                        <a:rPr lang="pt-BR" sz="1100" b="0" i="0" u="none" strike="noStrike">
+                          <a:solidFill>
+                            <a:srgbClr val="000000"/>
+                          </a:solidFill>
+                          <a:effectLst/>
+                          <a:latin typeface="Calibri" panose="020F0502020204030204" pitchFamily="34" charset="0"/>
+                        </a:rPr>
+                        <a:t>1</a:t>
+                      </a:r>
+                    </a:p>
+                  </a:txBody>
+                  <a:tcPr marL="0" marR="0" marT="0" marB="0" anchor="b"/>
+                </a:tc>
+                <a:tc>
+                  <a:txBody>
+                    <a:bodyPr/>
+                    <a:lstStyle/>
+                    <a:p>
+                      <a:pPr algn="r" fontAlgn="b"/>
+                      <a:r>
+                        <a:rPr lang="pt-BR" sz="1100" b="0" i="0" u="none" strike="noStrike">
+                          <a:solidFill>
+                            <a:srgbClr val="000000"/>
+                          </a:solidFill>
+                          <a:effectLst/>
+                          <a:latin typeface="Calibri" panose="020F0502020204030204" pitchFamily="34" charset="0"/>
+                        </a:rPr>
+                        <a:t>5</a:t>
+                      </a:r>
+                    </a:p>
+                  </a:txBody>
+                  <a:tcPr marL="0" marR="0" marT="0" marB="0" anchor="b"/>
+                </a:tc>
+                <a:tc>
+                  <a:txBody>
+                    <a:bodyPr/>
+                    <a:lstStyle/>
+                    <a:p>
+                      <a:pPr algn="r" fontAlgn="b"/>
+                      <a:r>
+                        <a:rPr lang="pt-BR" sz="1100" b="0" i="0" u="none" strike="noStrike">
+                          <a:solidFill>
+                            <a:srgbClr val="000000"/>
+                          </a:solidFill>
+                          <a:effectLst/>
+                          <a:latin typeface="Calibri" panose="020F0502020204030204" pitchFamily="34" charset="0"/>
+                        </a:rPr>
+                        <a:t>3</a:t>
+                      </a:r>
+                    </a:p>
+                  </a:txBody>
+                  <a:tcPr marL="0" marR="0" marT="0" marB="0" anchor="b"/>
+                </a:tc>
+                <a:tc>
+                  <a:txBody>
+                    <a:bodyPr/>
+                    <a:lstStyle/>
+                    <a:p>
+                      <a:pPr algn="r" fontAlgn="b"/>
+                      <a:r>
+                        <a:rPr lang="pt-BR" sz="1100" b="0" i="0" u="none" strike="noStrike">
+                          <a:solidFill>
+                            <a:srgbClr val="000000"/>
+                          </a:solidFill>
+                          <a:effectLst/>
+                          <a:latin typeface="Calibri" panose="020F0502020204030204" pitchFamily="34" charset="0"/>
+                        </a:rPr>
+                        <a:t>5</a:t>
+                      </a:r>
+                    </a:p>
+                  </a:txBody>
+                  <a:tcPr marL="0" marR="0" marT="0" marB="0" anchor="b"/>
+                </a:tc>
+                <a:tc>
+                  <a:txBody>
+                    <a:bodyPr/>
+                    <a:lstStyle/>
+                    <a:p>
+                      <a:pPr algn="r" fontAlgn="b"/>
+                      <a:r>
+                        <a:rPr lang="pt-BR" sz="1100" b="0" i="0" u="none" strike="noStrike">
+                          <a:solidFill>
+                            <a:srgbClr val="000000"/>
+                          </a:solidFill>
+                          <a:effectLst/>
+                          <a:latin typeface="Calibri" panose="020F0502020204030204" pitchFamily="34" charset="0"/>
+                        </a:rPr>
+                        <a:t>75</a:t>
+                      </a:r>
+                    </a:p>
+                  </a:txBody>
+                  <a:tcPr marL="0" marR="0" marT="0" marB="0" anchor="b"/>
+                </a:tc>
+              </a:tr>
+              <a:tr h="488288">
+                <a:tc>
+                  <a:txBody>
+                    <a:bodyPr/>
+                    <a:lstStyle/>
+                    <a:p>
+                      <a:pPr algn="l" fontAlgn="b"/>
+                      <a:r>
+                        <a:rPr lang="pt-BR" sz="1200" b="1" i="0" u="none" strike="noStrike">
+                          <a:solidFill>
+                            <a:srgbClr val="000000"/>
+                          </a:solidFill>
+                          <a:effectLst/>
+                          <a:latin typeface="Arial" panose="020B0604020202020204" pitchFamily="34" charset="0"/>
+                        </a:rPr>
+                        <a:t>UC002 - Efetuar pagamento SIB Card</a:t>
+                      </a:r>
+                    </a:p>
+                  </a:txBody>
+                  <a:tcPr marL="0" marR="0" marT="0" marB="0" anchor="b"/>
+                </a:tc>
+                <a:tc>
+                  <a:txBody>
+                    <a:bodyPr/>
+                    <a:lstStyle/>
+                    <a:p>
+                      <a:pPr algn="r" fontAlgn="b"/>
+                      <a:r>
+                        <a:rPr lang="pt-BR" sz="1100" b="0" i="0" u="none" strike="noStrike">
+                          <a:solidFill>
+                            <a:srgbClr val="000000"/>
+                          </a:solidFill>
+                          <a:effectLst/>
+                          <a:latin typeface="Calibri" panose="020F0502020204030204" pitchFamily="34" charset="0"/>
+                        </a:rPr>
+                        <a:t>3</a:t>
+                      </a:r>
+                    </a:p>
+                  </a:txBody>
+                  <a:tcPr marL="0" marR="0" marT="0" marB="0" anchor="b"/>
+                </a:tc>
+                <a:tc>
+                  <a:txBody>
+                    <a:bodyPr/>
+                    <a:lstStyle/>
+                    <a:p>
+                      <a:pPr algn="r" fontAlgn="b"/>
+                      <a:r>
+                        <a:rPr lang="pt-BR" sz="1100" b="0" i="0" u="none" strike="noStrike">
+                          <a:solidFill>
+                            <a:srgbClr val="000000"/>
+                          </a:solidFill>
+                          <a:effectLst/>
+                          <a:latin typeface="Calibri" panose="020F0502020204030204" pitchFamily="34" charset="0"/>
+                        </a:rPr>
+                        <a:t>4</a:t>
+                      </a:r>
+                    </a:p>
+                  </a:txBody>
+                  <a:tcPr marL="0" marR="0" marT="0" marB="0" anchor="b"/>
+                </a:tc>
+                <a:tc>
+                  <a:txBody>
+                    <a:bodyPr/>
+                    <a:lstStyle/>
+                    <a:p>
+                      <a:pPr algn="r" fontAlgn="b"/>
+                      <a:r>
+                        <a:rPr lang="pt-BR" sz="1100" b="0" i="0" u="none" strike="noStrike">
+                          <a:solidFill>
+                            <a:srgbClr val="000000"/>
+                          </a:solidFill>
+                          <a:effectLst/>
+                          <a:latin typeface="Calibri" panose="020F0502020204030204" pitchFamily="34" charset="0"/>
+                        </a:rPr>
+                        <a:t>12</a:t>
+                      </a:r>
+                    </a:p>
+                  </a:txBody>
+                  <a:tcPr marL="0" marR="0" marT="0" marB="0" anchor="b"/>
+                </a:tc>
+                <a:tc>
+                  <a:txBody>
+                    <a:bodyPr/>
+                    <a:lstStyle/>
+                    <a:p>
+                      <a:pPr algn="r" fontAlgn="b"/>
+                      <a:r>
+                        <a:rPr lang="pt-BR" sz="1100" b="0" i="0" u="none" strike="noStrike">
+                          <a:solidFill>
+                            <a:srgbClr val="000000"/>
+                          </a:solidFill>
+                          <a:effectLst/>
+                          <a:latin typeface="Calibri" panose="020F0502020204030204" pitchFamily="34" charset="0"/>
+                        </a:rPr>
+                        <a:t>4</a:t>
+                      </a:r>
+                    </a:p>
+                  </a:txBody>
+                  <a:tcPr marL="0" marR="0" marT="0" marB="0" anchor="b"/>
+                </a:tc>
+                <a:tc>
+                  <a:txBody>
+                    <a:bodyPr/>
+                    <a:lstStyle/>
+                    <a:p>
+                      <a:pPr algn="r" fontAlgn="b"/>
+                      <a:r>
+                        <a:rPr lang="pt-BR" sz="1100" b="0" i="0" u="none" strike="noStrike">
+                          <a:solidFill>
+                            <a:srgbClr val="000000"/>
+                          </a:solidFill>
+                          <a:effectLst/>
+                          <a:latin typeface="Calibri" panose="020F0502020204030204" pitchFamily="34" charset="0"/>
+                        </a:rPr>
+                        <a:t>4</a:t>
+                      </a:r>
+                    </a:p>
+                  </a:txBody>
+                  <a:tcPr marL="0" marR="0" marT="0" marB="0" anchor="b"/>
+                </a:tc>
+                <a:tc>
+                  <a:txBody>
+                    <a:bodyPr/>
+                    <a:lstStyle/>
+                    <a:p>
+                      <a:pPr algn="r" fontAlgn="b"/>
+                      <a:r>
+                        <a:rPr lang="pt-BR" sz="1100" b="0" i="0" u="none" strike="noStrike">
+                          <a:solidFill>
+                            <a:srgbClr val="000000"/>
+                          </a:solidFill>
+                          <a:effectLst/>
+                          <a:latin typeface="Calibri" panose="020F0502020204030204" pitchFamily="34" charset="0"/>
+                        </a:rPr>
+                        <a:t>192</a:t>
+                      </a:r>
+                    </a:p>
+                  </a:txBody>
+                  <a:tcPr marL="0" marR="0" marT="0" marB="0" anchor="b"/>
+                </a:tc>
+              </a:tr>
+              <a:tr h="488288">
+                <a:tc>
+                  <a:txBody>
+                    <a:bodyPr/>
+                    <a:lstStyle/>
+                    <a:p>
+                      <a:pPr algn="l" fontAlgn="b"/>
+                      <a:r>
+                        <a:rPr lang="pt-BR" sz="1200" b="1" i="0" u="none" strike="noStrike">
+                          <a:solidFill>
+                            <a:srgbClr val="000000"/>
+                          </a:solidFill>
+                          <a:effectLst/>
+                          <a:latin typeface="Arial" panose="020B0604020202020204" pitchFamily="34" charset="0"/>
+                        </a:rPr>
+                        <a:t>UC003 - Informar dados do SIB Card</a:t>
+                      </a:r>
+                    </a:p>
+                  </a:txBody>
+                  <a:tcPr marL="0" marR="0" marT="0" marB="0" anchor="b"/>
+                </a:tc>
+                <a:tc>
+                  <a:txBody>
+                    <a:bodyPr/>
+                    <a:lstStyle/>
+                    <a:p>
+                      <a:pPr algn="r" fontAlgn="b"/>
+                      <a:r>
+                        <a:rPr lang="pt-BR" sz="1100" b="0" i="0" u="none" strike="noStrike">
+                          <a:solidFill>
+                            <a:srgbClr val="000000"/>
+                          </a:solidFill>
+                          <a:effectLst/>
+                          <a:latin typeface="Calibri" panose="020F0502020204030204" pitchFamily="34" charset="0"/>
+                        </a:rPr>
+                        <a:t>3</a:t>
+                      </a:r>
+                    </a:p>
+                  </a:txBody>
+                  <a:tcPr marL="0" marR="0" marT="0" marB="0" anchor="b"/>
+                </a:tc>
+                <a:tc>
+                  <a:txBody>
+                    <a:bodyPr/>
+                    <a:lstStyle/>
+                    <a:p>
+                      <a:pPr algn="r" fontAlgn="b"/>
+                      <a:r>
+                        <a:rPr lang="pt-BR" sz="1100" b="0" i="0" u="none" strike="noStrike">
+                          <a:solidFill>
+                            <a:srgbClr val="000000"/>
+                          </a:solidFill>
+                          <a:effectLst/>
+                          <a:latin typeface="Calibri" panose="020F0502020204030204" pitchFamily="34" charset="0"/>
+                        </a:rPr>
+                        <a:t>3</a:t>
+                      </a:r>
+                    </a:p>
+                  </a:txBody>
+                  <a:tcPr marL="0" marR="0" marT="0" marB="0" anchor="b"/>
+                </a:tc>
+                <a:tc>
+                  <a:txBody>
+                    <a:bodyPr/>
+                    <a:lstStyle/>
+                    <a:p>
+                      <a:pPr algn="r" fontAlgn="b"/>
+                      <a:r>
+                        <a:rPr lang="pt-BR" sz="1100" b="0" i="0" u="none" strike="noStrike">
+                          <a:solidFill>
+                            <a:srgbClr val="000000"/>
+                          </a:solidFill>
+                          <a:effectLst/>
+                          <a:latin typeface="Calibri" panose="020F0502020204030204" pitchFamily="34" charset="0"/>
+                        </a:rPr>
+                        <a:t>9</a:t>
+                      </a:r>
+                    </a:p>
+                  </a:txBody>
+                  <a:tcPr marL="0" marR="0" marT="0" marB="0" anchor="b"/>
+                </a:tc>
+                <a:tc>
+                  <a:txBody>
+                    <a:bodyPr/>
+                    <a:lstStyle/>
+                    <a:p>
+                      <a:pPr algn="r" fontAlgn="b"/>
+                      <a:r>
+                        <a:rPr lang="pt-BR" sz="1100" b="0" i="0" u="none" strike="noStrike">
+                          <a:solidFill>
+                            <a:srgbClr val="000000"/>
+                          </a:solidFill>
+                          <a:effectLst/>
+                          <a:latin typeface="Calibri" panose="020F0502020204030204" pitchFamily="34" charset="0"/>
+                        </a:rPr>
+                        <a:t>4</a:t>
+                      </a:r>
+                    </a:p>
+                  </a:txBody>
+                  <a:tcPr marL="0" marR="0" marT="0" marB="0" anchor="b"/>
+                </a:tc>
+                <a:tc>
+                  <a:txBody>
+                    <a:bodyPr/>
+                    <a:lstStyle/>
+                    <a:p>
+                      <a:pPr algn="r" fontAlgn="b"/>
+                      <a:r>
+                        <a:rPr lang="pt-BR" sz="1100" b="0" i="0" u="none" strike="noStrike">
+                          <a:solidFill>
+                            <a:srgbClr val="000000"/>
+                          </a:solidFill>
+                          <a:effectLst/>
+                          <a:latin typeface="Calibri" panose="020F0502020204030204" pitchFamily="34" charset="0"/>
+                        </a:rPr>
+                        <a:t>3</a:t>
+                      </a:r>
+                    </a:p>
+                  </a:txBody>
+                  <a:tcPr marL="0" marR="0" marT="0" marB="0" anchor="b"/>
+                </a:tc>
+                <a:tc>
+                  <a:txBody>
+                    <a:bodyPr/>
+                    <a:lstStyle/>
+                    <a:p>
+                      <a:pPr algn="r" fontAlgn="b"/>
+                      <a:r>
+                        <a:rPr lang="pt-BR" sz="1100" b="0" i="0" u="none" strike="noStrike">
+                          <a:solidFill>
+                            <a:srgbClr val="000000"/>
+                          </a:solidFill>
+                          <a:effectLst/>
+                          <a:latin typeface="Calibri" panose="020F0502020204030204" pitchFamily="34" charset="0"/>
+                        </a:rPr>
+                        <a:t>108</a:t>
+                      </a:r>
+                    </a:p>
+                  </a:txBody>
+                  <a:tcPr marL="0" marR="0" marT="0" marB="0" anchor="b"/>
+                </a:tc>
+              </a:tr>
+              <a:tr h="488288">
+                <a:tc>
+                  <a:txBody>
+                    <a:bodyPr/>
+                    <a:lstStyle/>
+                    <a:p>
+                      <a:pPr algn="l" fontAlgn="b"/>
+                      <a:r>
+                        <a:rPr lang="pt-BR" sz="1200" b="1" i="0" u="none" strike="noStrike">
+                          <a:solidFill>
+                            <a:srgbClr val="000000"/>
+                          </a:solidFill>
+                          <a:effectLst/>
+                          <a:latin typeface="Arial" panose="020B0604020202020204" pitchFamily="34" charset="0"/>
+                        </a:rPr>
+                        <a:t>UC004 - Mostrar dados da consulta</a:t>
+                      </a:r>
+                    </a:p>
+                  </a:txBody>
+                  <a:tcPr marL="0" marR="0" marT="0" marB="0" anchor="b"/>
+                </a:tc>
+                <a:tc>
+                  <a:txBody>
+                    <a:bodyPr/>
+                    <a:lstStyle/>
+                    <a:p>
+                      <a:pPr algn="r" fontAlgn="b"/>
+                      <a:r>
+                        <a:rPr lang="pt-BR" sz="1100" b="0" i="0" u="none" strike="noStrike">
+                          <a:solidFill>
+                            <a:srgbClr val="000000"/>
+                          </a:solidFill>
+                          <a:effectLst/>
+                          <a:latin typeface="Calibri" panose="020F0502020204030204" pitchFamily="34" charset="0"/>
+                        </a:rPr>
+                        <a:t>3</a:t>
+                      </a:r>
+                    </a:p>
+                  </a:txBody>
+                  <a:tcPr marL="0" marR="0" marT="0" marB="0" anchor="b"/>
+                </a:tc>
+                <a:tc>
+                  <a:txBody>
+                    <a:bodyPr/>
+                    <a:lstStyle/>
+                    <a:p>
+                      <a:pPr algn="r" fontAlgn="b"/>
+                      <a:r>
+                        <a:rPr lang="pt-BR" sz="1100" b="0" i="0" u="none" strike="noStrike">
+                          <a:solidFill>
+                            <a:srgbClr val="000000"/>
+                          </a:solidFill>
+                          <a:effectLst/>
+                          <a:latin typeface="Calibri" panose="020F0502020204030204" pitchFamily="34" charset="0"/>
+                        </a:rPr>
+                        <a:t>1</a:t>
+                      </a:r>
+                    </a:p>
+                  </a:txBody>
+                  <a:tcPr marL="0" marR="0" marT="0" marB="0" anchor="b"/>
+                </a:tc>
+                <a:tc>
+                  <a:txBody>
+                    <a:bodyPr/>
+                    <a:lstStyle/>
+                    <a:p>
+                      <a:pPr algn="r" fontAlgn="b"/>
+                      <a:r>
+                        <a:rPr lang="pt-BR" sz="1100" b="0" i="0" u="none" strike="noStrike">
+                          <a:solidFill>
+                            <a:srgbClr val="000000"/>
+                          </a:solidFill>
+                          <a:effectLst/>
+                          <a:latin typeface="Calibri" panose="020F0502020204030204" pitchFamily="34" charset="0"/>
+                        </a:rPr>
+                        <a:t>3</a:t>
+                      </a:r>
+                    </a:p>
+                  </a:txBody>
+                  <a:tcPr marL="0" marR="0" marT="0" marB="0" anchor="b"/>
+                </a:tc>
+                <a:tc>
+                  <a:txBody>
+                    <a:bodyPr/>
+                    <a:lstStyle/>
+                    <a:p>
+                      <a:pPr algn="r" fontAlgn="b"/>
+                      <a:r>
+                        <a:rPr lang="pt-BR" sz="1100" b="0" i="0" u="none" strike="noStrike">
+                          <a:solidFill>
+                            <a:srgbClr val="000000"/>
+                          </a:solidFill>
+                          <a:effectLst/>
+                          <a:latin typeface="Calibri" panose="020F0502020204030204" pitchFamily="34" charset="0"/>
+                        </a:rPr>
+                        <a:t>4</a:t>
+                      </a:r>
+                    </a:p>
+                  </a:txBody>
+                  <a:tcPr marL="0" marR="0" marT="0" marB="0" anchor="b"/>
+                </a:tc>
+                <a:tc>
+                  <a:txBody>
+                    <a:bodyPr/>
+                    <a:lstStyle/>
+                    <a:p>
+                      <a:pPr algn="r" fontAlgn="b"/>
+                      <a:r>
+                        <a:rPr lang="pt-BR" sz="1100" b="0" i="0" u="none" strike="noStrike">
+                          <a:solidFill>
+                            <a:srgbClr val="000000"/>
+                          </a:solidFill>
+                          <a:effectLst/>
+                          <a:latin typeface="Calibri" panose="020F0502020204030204" pitchFamily="34" charset="0"/>
+                        </a:rPr>
+                        <a:t>4</a:t>
+                      </a:r>
+                    </a:p>
+                  </a:txBody>
+                  <a:tcPr marL="0" marR="0" marT="0" marB="0" anchor="b"/>
+                </a:tc>
+                <a:tc>
+                  <a:txBody>
+                    <a:bodyPr/>
+                    <a:lstStyle/>
+                    <a:p>
+                      <a:pPr algn="r" fontAlgn="b"/>
+                      <a:r>
+                        <a:rPr lang="pt-BR" sz="1100" b="0" i="0" u="none" strike="noStrike">
+                          <a:solidFill>
+                            <a:srgbClr val="000000"/>
+                          </a:solidFill>
+                          <a:effectLst/>
+                          <a:latin typeface="Calibri" panose="020F0502020204030204" pitchFamily="34" charset="0"/>
+                        </a:rPr>
+                        <a:t>48</a:t>
+                      </a:r>
+                    </a:p>
+                  </a:txBody>
+                  <a:tcPr marL="0" marR="0" marT="0" marB="0" anchor="b"/>
+                </a:tc>
+              </a:tr>
+              <a:tr h="488288">
+                <a:tc>
+                  <a:txBody>
+                    <a:bodyPr/>
+                    <a:lstStyle/>
+                    <a:p>
+                      <a:pPr algn="l" fontAlgn="b"/>
+                      <a:r>
+                        <a:rPr lang="pt-BR" sz="1200" b="1" i="0" u="none" strike="noStrike">
+                          <a:solidFill>
+                            <a:srgbClr val="000000"/>
+                          </a:solidFill>
+                          <a:effectLst/>
+                          <a:latin typeface="Arial" panose="020B0604020202020204" pitchFamily="34" charset="0"/>
+                        </a:rPr>
+                        <a:t>UC005 - Atualizar Cotações</a:t>
+                      </a:r>
+                    </a:p>
+                  </a:txBody>
+                  <a:tcPr marL="0" marR="0" marT="0" marB="0" anchor="b"/>
+                </a:tc>
+                <a:tc>
+                  <a:txBody>
+                    <a:bodyPr/>
+                    <a:lstStyle/>
+                    <a:p>
+                      <a:pPr algn="r" fontAlgn="b"/>
+                      <a:r>
+                        <a:rPr lang="pt-BR" sz="1100" b="0" i="0" u="none" strike="noStrike">
+                          <a:solidFill>
+                            <a:srgbClr val="000000"/>
+                          </a:solidFill>
+                          <a:effectLst/>
+                          <a:latin typeface="Calibri" panose="020F0502020204030204" pitchFamily="34" charset="0"/>
+                        </a:rPr>
+                        <a:t>2</a:t>
+                      </a:r>
+                    </a:p>
+                  </a:txBody>
+                  <a:tcPr marL="0" marR="0" marT="0" marB="0" anchor="b"/>
+                </a:tc>
+                <a:tc>
+                  <a:txBody>
+                    <a:bodyPr/>
+                    <a:lstStyle/>
+                    <a:p>
+                      <a:pPr algn="r" fontAlgn="b"/>
+                      <a:r>
+                        <a:rPr lang="pt-BR" sz="1100" b="0" i="0" u="none" strike="noStrike">
+                          <a:solidFill>
+                            <a:srgbClr val="000000"/>
+                          </a:solidFill>
+                          <a:effectLst/>
+                          <a:latin typeface="Calibri" panose="020F0502020204030204" pitchFamily="34" charset="0"/>
+                        </a:rPr>
+                        <a:t>5</a:t>
+                      </a:r>
+                    </a:p>
+                  </a:txBody>
+                  <a:tcPr marL="0" marR="0" marT="0" marB="0" anchor="b"/>
+                </a:tc>
+                <a:tc>
+                  <a:txBody>
+                    <a:bodyPr/>
+                    <a:lstStyle/>
+                    <a:p>
+                      <a:pPr algn="r" fontAlgn="b"/>
+                      <a:r>
+                        <a:rPr lang="pt-BR" sz="1100" b="0" i="0" u="none" strike="noStrike">
+                          <a:solidFill>
+                            <a:srgbClr val="000000"/>
+                          </a:solidFill>
+                          <a:effectLst/>
+                          <a:latin typeface="Calibri" panose="020F0502020204030204" pitchFamily="34" charset="0"/>
+                        </a:rPr>
+                        <a:t>10</a:t>
+                      </a:r>
+                    </a:p>
+                  </a:txBody>
+                  <a:tcPr marL="0" marR="0" marT="0" marB="0" anchor="b"/>
+                </a:tc>
+                <a:tc>
+                  <a:txBody>
+                    <a:bodyPr/>
+                    <a:lstStyle/>
+                    <a:p>
+                      <a:pPr algn="r" fontAlgn="b"/>
+                      <a:r>
+                        <a:rPr lang="pt-BR" sz="1100" b="0" i="0" u="none" strike="noStrike">
+                          <a:solidFill>
+                            <a:srgbClr val="000000"/>
+                          </a:solidFill>
+                          <a:effectLst/>
+                          <a:latin typeface="Calibri" panose="020F0502020204030204" pitchFamily="34" charset="0"/>
+                        </a:rPr>
+                        <a:t>2</a:t>
+                      </a:r>
+                    </a:p>
+                  </a:txBody>
+                  <a:tcPr marL="0" marR="0" marT="0" marB="0" anchor="b"/>
+                </a:tc>
+                <a:tc>
+                  <a:txBody>
+                    <a:bodyPr/>
+                    <a:lstStyle/>
+                    <a:p>
+                      <a:pPr algn="r" fontAlgn="b"/>
+                      <a:r>
+                        <a:rPr lang="pt-BR" sz="1100" b="0" i="0" u="none" strike="noStrike">
+                          <a:solidFill>
+                            <a:srgbClr val="000000"/>
+                          </a:solidFill>
+                          <a:effectLst/>
+                          <a:latin typeface="Calibri" panose="020F0502020204030204" pitchFamily="34" charset="0"/>
+                        </a:rPr>
+                        <a:t>4</a:t>
+                      </a:r>
+                    </a:p>
+                  </a:txBody>
+                  <a:tcPr marL="0" marR="0" marT="0" marB="0" anchor="b"/>
+                </a:tc>
+                <a:tc>
+                  <a:txBody>
+                    <a:bodyPr/>
+                    <a:lstStyle/>
+                    <a:p>
+                      <a:pPr algn="r" fontAlgn="b"/>
+                      <a:r>
+                        <a:rPr lang="pt-BR" sz="1100" b="0" i="0" u="none" strike="noStrike">
+                          <a:solidFill>
+                            <a:srgbClr val="000000"/>
+                          </a:solidFill>
+                          <a:effectLst/>
+                          <a:latin typeface="Calibri" panose="020F0502020204030204" pitchFamily="34" charset="0"/>
+                        </a:rPr>
+                        <a:t>80</a:t>
+                      </a:r>
+                    </a:p>
+                  </a:txBody>
+                  <a:tcPr marL="0" marR="0" marT="0" marB="0" anchor="b"/>
+                </a:tc>
+              </a:tr>
+              <a:tr h="488288">
+                <a:tc>
+                  <a:txBody>
+                    <a:bodyPr/>
+                    <a:lstStyle/>
+                    <a:p>
+                      <a:pPr algn="l" fontAlgn="b"/>
+                      <a:r>
+                        <a:rPr lang="pt-BR" sz="1200" b="1" i="0" u="none" strike="noStrike">
+                          <a:solidFill>
+                            <a:srgbClr val="000000"/>
+                          </a:solidFill>
+                          <a:effectLst/>
+                          <a:latin typeface="Arial" panose="020B0604020202020204" pitchFamily="34" charset="0"/>
+                        </a:rPr>
+                        <a:t>UC006 - Comprar Ações</a:t>
+                      </a:r>
+                    </a:p>
+                  </a:txBody>
+                  <a:tcPr marL="0" marR="0" marT="0" marB="0" anchor="b"/>
+                </a:tc>
+                <a:tc>
+                  <a:txBody>
+                    <a:bodyPr/>
+                    <a:lstStyle/>
+                    <a:p>
+                      <a:pPr algn="r" fontAlgn="b"/>
+                      <a:r>
+                        <a:rPr lang="pt-BR" sz="1100" b="0" i="0" u="none" strike="noStrike">
+                          <a:solidFill>
+                            <a:srgbClr val="000000"/>
+                          </a:solidFill>
+                          <a:effectLst/>
+                          <a:latin typeface="Calibri" panose="020F0502020204030204" pitchFamily="34" charset="0"/>
+                        </a:rPr>
+                        <a:t>2</a:t>
+                      </a:r>
+                    </a:p>
+                  </a:txBody>
+                  <a:tcPr marL="0" marR="0" marT="0" marB="0" anchor="b"/>
+                </a:tc>
+                <a:tc>
+                  <a:txBody>
+                    <a:bodyPr/>
+                    <a:lstStyle/>
+                    <a:p>
+                      <a:pPr algn="r" fontAlgn="b"/>
+                      <a:r>
+                        <a:rPr lang="pt-BR" sz="1100" b="0" i="0" u="none" strike="noStrike">
+                          <a:solidFill>
+                            <a:srgbClr val="000000"/>
+                          </a:solidFill>
+                          <a:effectLst/>
+                          <a:latin typeface="Calibri" panose="020F0502020204030204" pitchFamily="34" charset="0"/>
+                        </a:rPr>
+                        <a:t>5</a:t>
+                      </a:r>
+                    </a:p>
+                  </a:txBody>
+                  <a:tcPr marL="0" marR="0" marT="0" marB="0" anchor="b"/>
+                </a:tc>
+                <a:tc>
+                  <a:txBody>
+                    <a:bodyPr/>
+                    <a:lstStyle/>
+                    <a:p>
+                      <a:pPr algn="r" fontAlgn="b"/>
+                      <a:r>
+                        <a:rPr lang="pt-BR" sz="1100" b="0" i="0" u="none" strike="noStrike">
+                          <a:solidFill>
+                            <a:srgbClr val="000000"/>
+                          </a:solidFill>
+                          <a:effectLst/>
+                          <a:latin typeface="Calibri" panose="020F0502020204030204" pitchFamily="34" charset="0"/>
+                        </a:rPr>
+                        <a:t>10</a:t>
+                      </a:r>
+                    </a:p>
+                  </a:txBody>
+                  <a:tcPr marL="0" marR="0" marT="0" marB="0" anchor="b"/>
+                </a:tc>
+                <a:tc>
+                  <a:txBody>
+                    <a:bodyPr/>
+                    <a:lstStyle/>
+                    <a:p>
+                      <a:pPr algn="r" fontAlgn="b"/>
+                      <a:r>
+                        <a:rPr lang="pt-BR" sz="1100" b="0" i="0" u="none" strike="noStrike">
+                          <a:solidFill>
+                            <a:srgbClr val="000000"/>
+                          </a:solidFill>
+                          <a:effectLst/>
+                          <a:latin typeface="Calibri" panose="020F0502020204030204" pitchFamily="34" charset="0"/>
+                        </a:rPr>
+                        <a:t>1</a:t>
+                      </a:r>
+                    </a:p>
+                  </a:txBody>
+                  <a:tcPr marL="0" marR="0" marT="0" marB="0" anchor="b"/>
+                </a:tc>
+                <a:tc>
+                  <a:txBody>
+                    <a:bodyPr/>
+                    <a:lstStyle/>
+                    <a:p>
+                      <a:pPr algn="r" fontAlgn="b"/>
+                      <a:r>
+                        <a:rPr lang="pt-BR" sz="1100" b="0" i="0" u="none" strike="noStrike">
+                          <a:solidFill>
+                            <a:srgbClr val="000000"/>
+                          </a:solidFill>
+                          <a:effectLst/>
+                          <a:latin typeface="Calibri" panose="020F0502020204030204" pitchFamily="34" charset="0"/>
+                        </a:rPr>
+                        <a:t>5</a:t>
+                      </a:r>
+                    </a:p>
+                  </a:txBody>
+                  <a:tcPr marL="0" marR="0" marT="0" marB="0" anchor="b"/>
+                </a:tc>
+                <a:tc>
+                  <a:txBody>
+                    <a:bodyPr/>
+                    <a:lstStyle/>
+                    <a:p>
+                      <a:pPr algn="r" fontAlgn="b"/>
+                      <a:r>
+                        <a:rPr lang="pt-BR" sz="1100" b="0" i="0" u="none" strike="noStrike">
+                          <a:solidFill>
+                            <a:srgbClr val="000000"/>
+                          </a:solidFill>
+                          <a:effectLst/>
+                          <a:latin typeface="Calibri" panose="020F0502020204030204" pitchFamily="34" charset="0"/>
+                        </a:rPr>
+                        <a:t>50</a:t>
+                      </a:r>
+                    </a:p>
+                  </a:txBody>
+                  <a:tcPr marL="0" marR="0" marT="0" marB="0" anchor="b"/>
+                </a:tc>
+              </a:tr>
+              <a:tr h="488288">
+                <a:tc>
+                  <a:txBody>
+                    <a:bodyPr/>
+                    <a:lstStyle/>
+                    <a:p>
+                      <a:pPr algn="l" fontAlgn="b"/>
+                      <a:r>
+                        <a:rPr lang="pt-BR" sz="1200" b="1" i="0" u="none" strike="noStrike">
+                          <a:solidFill>
+                            <a:srgbClr val="000000"/>
+                          </a:solidFill>
+                          <a:effectLst/>
+                          <a:latin typeface="Arial" panose="020B0604020202020204" pitchFamily="34" charset="0"/>
+                        </a:rPr>
+                        <a:t>UC007 - Realizar DOC</a:t>
+                      </a:r>
+                    </a:p>
+                  </a:txBody>
+                  <a:tcPr marL="0" marR="0" marT="0" marB="0" anchor="b"/>
+                </a:tc>
+                <a:tc>
+                  <a:txBody>
+                    <a:bodyPr/>
+                    <a:lstStyle/>
+                    <a:p>
+                      <a:pPr algn="r" fontAlgn="b"/>
+                      <a:r>
+                        <a:rPr lang="pt-BR" sz="1100" b="0" i="0" u="none" strike="noStrike">
+                          <a:solidFill>
+                            <a:srgbClr val="000000"/>
+                          </a:solidFill>
+                          <a:effectLst/>
+                          <a:latin typeface="Calibri" panose="020F0502020204030204" pitchFamily="34" charset="0"/>
+                        </a:rPr>
+                        <a:t>2</a:t>
+                      </a:r>
+                    </a:p>
+                  </a:txBody>
+                  <a:tcPr marL="0" marR="0" marT="0" marB="0" anchor="b"/>
+                </a:tc>
+                <a:tc>
+                  <a:txBody>
+                    <a:bodyPr/>
+                    <a:lstStyle/>
+                    <a:p>
+                      <a:pPr algn="r" fontAlgn="b"/>
+                      <a:r>
+                        <a:rPr lang="pt-BR" sz="1100" b="0" i="0" u="none" strike="noStrike">
+                          <a:solidFill>
+                            <a:srgbClr val="000000"/>
+                          </a:solidFill>
+                          <a:effectLst/>
+                          <a:latin typeface="Calibri" panose="020F0502020204030204" pitchFamily="34" charset="0"/>
+                        </a:rPr>
+                        <a:t>5</a:t>
+                      </a:r>
+                    </a:p>
+                  </a:txBody>
+                  <a:tcPr marL="0" marR="0" marT="0" marB="0" anchor="b"/>
+                </a:tc>
+                <a:tc>
+                  <a:txBody>
+                    <a:bodyPr/>
+                    <a:lstStyle/>
+                    <a:p>
+                      <a:pPr algn="r" fontAlgn="b"/>
+                      <a:r>
+                        <a:rPr lang="pt-BR" sz="1100" b="0" i="0" u="none" strike="noStrike">
+                          <a:solidFill>
+                            <a:srgbClr val="000000"/>
+                          </a:solidFill>
+                          <a:effectLst/>
+                          <a:latin typeface="Calibri" panose="020F0502020204030204" pitchFamily="34" charset="0"/>
+                        </a:rPr>
+                        <a:t>10</a:t>
+                      </a:r>
+                    </a:p>
+                  </a:txBody>
+                  <a:tcPr marL="0" marR="0" marT="0" marB="0" anchor="b"/>
+                </a:tc>
+                <a:tc>
+                  <a:txBody>
+                    <a:bodyPr/>
+                    <a:lstStyle/>
+                    <a:p>
+                      <a:pPr algn="r" fontAlgn="b"/>
+                      <a:r>
+                        <a:rPr lang="pt-BR" sz="1100" b="0" i="0" u="none" strike="noStrike">
+                          <a:solidFill>
+                            <a:srgbClr val="000000"/>
+                          </a:solidFill>
+                          <a:effectLst/>
+                          <a:latin typeface="Calibri" panose="020F0502020204030204" pitchFamily="34" charset="0"/>
+                        </a:rPr>
+                        <a:t>3</a:t>
+                      </a:r>
+                    </a:p>
+                  </a:txBody>
+                  <a:tcPr marL="0" marR="0" marT="0" marB="0" anchor="b"/>
+                </a:tc>
+                <a:tc>
+                  <a:txBody>
+                    <a:bodyPr/>
+                    <a:lstStyle/>
+                    <a:p>
+                      <a:pPr algn="r" fontAlgn="b"/>
+                      <a:r>
+                        <a:rPr lang="pt-BR" sz="1100" b="0" i="0" u="none" strike="noStrike">
+                          <a:solidFill>
+                            <a:srgbClr val="000000"/>
+                          </a:solidFill>
+                          <a:effectLst/>
+                          <a:latin typeface="Calibri" panose="020F0502020204030204" pitchFamily="34" charset="0"/>
+                        </a:rPr>
+                        <a:t>4</a:t>
+                      </a:r>
+                    </a:p>
+                  </a:txBody>
+                  <a:tcPr marL="0" marR="0" marT="0" marB="0" anchor="b"/>
+                </a:tc>
+                <a:tc>
+                  <a:txBody>
+                    <a:bodyPr/>
+                    <a:lstStyle/>
+                    <a:p>
+                      <a:pPr algn="r" fontAlgn="b"/>
+                      <a:r>
+                        <a:rPr lang="pt-BR" sz="1100" b="0" i="0" u="none" strike="noStrike" dirty="0">
+                          <a:solidFill>
+                            <a:srgbClr val="000000"/>
+                          </a:solidFill>
+                          <a:effectLst/>
+                          <a:latin typeface="Calibri" panose="020F0502020204030204" pitchFamily="34" charset="0"/>
+                        </a:rPr>
+                        <a:t>120</a:t>
+                      </a:r>
+                    </a:p>
+                  </a:txBody>
+                  <a:tcPr marL="0" marR="0" marT="0" marB="0" anchor="b"/>
+                </a:tc>
+              </a:tr>
+            </a:tbl>
+          </a:graphicData>
+        </a:graphic>
+      </p:graphicFrame>
+    </p:spTree>
+    <p:extLst>
+      <p:ext uri="{BB962C8B-B14F-4D97-AF65-F5344CB8AC3E}">
+        <p14:creationId xmlns:p14="http://schemas.microsoft.com/office/powerpoint/2010/main" val="1511145347"/>
+      </p:ext>
+    </p:extLst>
+  </p:cSld>
+  <p:clrMapOvr>
+    <a:masterClrMapping/>
+  </p:clrMapOvr>
+  <mc:AlternateContent xmlns:mc="http://schemas.openxmlformats.org/markup-compatibility/2006" xmlns:p14="http://schemas.microsoft.com/office/powerpoint/2010/main">
+    <mc:Choice Requires="p14">
+      <p:transition spd="med" p14:dur="700">
+        <p:fade/>
+      </p:transition>
+    </mc:Choice>
+    <mc:Fallback xmlns="">
+      <p:transition spd="med">
+        <p:fade/>
+      </p:transition>
+    </mc:Fallback>
+  </mc:AlternateContent>
+  <p:timing>
+    <p:tnLst>
+      <p:par>
+        <p:cTn id="1" dur="indefinite" restart="never" nodeType="tmRoot"/>
+      </p:par>
+    </p:tnLst>
+  </p:timing>
+</p:sld>
+</file>
+
+<file path=ppt/slides/slide11.xml><?xml version="1.0" encoding="utf-8"?>
+<p:sld xmlns:a="http://schemas.openxmlformats.org/drawingml/2006/main" xmlns:r="http://schemas.openxmlformats.org/officeDocument/2006/relationships" xmlns:p="http://schemas.openxmlformats.org/presentationml/2006/main">
+  <p:cSld>
+    <p:spTree>
+      <p:nvGrpSpPr>
+        <p:cNvPr id="1" name=""/>
+        <p:cNvGrpSpPr/>
+        <p:nvPr/>
+      </p:nvGrpSpPr>
+      <p:grpSpPr>
+        <a:xfrm>
+          <a:off x="0" y="0"/>
+          <a:ext cx="0" cy="0"/>
+          <a:chOff x="0" y="0"/>
+          <a:chExt cx="0" cy="0"/>
+        </a:xfrm>
+      </p:grpSpPr>
+      <p:sp>
+        <p:nvSpPr>
+          <p:cNvPr id="2" name="Título 1"/>
+          <p:cNvSpPr>
+            <a:spLocks noGrp="1"/>
+          </p:cNvSpPr>
+          <p:nvPr>
+            <p:ph type="title"/>
+          </p:nvPr>
+        </p:nvSpPr>
+        <p:spPr/>
+        <p:txBody>
+          <a:bodyPr/>
+          <a:lstStyle/>
+          <a:p>
             <a:pPr marL="0" indent="0" algn="l" defTabSz="914400">
               <a:lnSpc>
                 <a:spcPct val="90000"/>
@@ -11215,7 +12483,7 @@
 </p:sld>
 </file>
 
-<file path=ppt/slides/slide11.xml><?xml version="1.0" encoding="utf-8"?>
+<file path=ppt/slides/slide12.xml><?xml version="1.0" encoding="utf-8"?>
 <p:sld xmlns:a="http://schemas.openxmlformats.org/drawingml/2006/main" xmlns:r="http://schemas.openxmlformats.org/officeDocument/2006/relationships" xmlns:p="http://schemas.openxmlformats.org/presentationml/2006/main">
   <p:cSld>
     <p:spTree>
@@ -11961,149 +13229,6 @@
 </p:sld>
 </file>
 
-<file path=ppt/slides/slide12.xml><?xml version="1.0" encoding="utf-8"?>
-<p:sld xmlns:a="http://schemas.openxmlformats.org/drawingml/2006/main" xmlns:r="http://schemas.openxmlformats.org/officeDocument/2006/relationships" xmlns:p="http://schemas.openxmlformats.org/presentationml/2006/main">
-  <p:cSld>
-    <p:spTree>
-      <p:nvGrpSpPr>
-        <p:cNvPr id="1" name=""/>
-        <p:cNvGrpSpPr/>
-        <p:nvPr/>
-      </p:nvGrpSpPr>
-      <p:grpSpPr>
-        <a:xfrm>
-          <a:off x="0" y="0"/>
-          <a:ext cx="0" cy="0"/>
-          <a:chOff x="0" y="0"/>
-          <a:chExt cx="0" cy="0"/>
-        </a:xfrm>
-      </p:grpSpPr>
-      <p:sp>
-        <p:nvSpPr>
-          <p:cNvPr id="5" name="Título 4"/>
-          <p:cNvSpPr>
-            <a:spLocks noGrp="1"/>
-          </p:cNvSpPr>
-          <p:nvPr>
-            <p:ph type="title"/>
-          </p:nvPr>
-        </p:nvSpPr>
-        <p:spPr/>
-        <p:txBody>
-          <a:bodyPr/>
-          <a:lstStyle/>
-          <a:p>
-            <a:r>
-              <a:rPr lang="pt-BR" sz="3600" dirty="0">
-                <a:solidFill>
-                  <a:srgbClr val="263050"/>
-                </a:solidFill>
-              </a:rPr>
-              <a:t>Projeto de teste</a:t>
-            </a:r>
-            <a:endParaRPr lang="pt-BR" dirty="0"/>
-          </a:p>
-        </p:txBody>
-      </p:sp>
-      <p:sp>
-        <p:nvSpPr>
-          <p:cNvPr id="8" name="Retângulo 7"/>
-          <p:cNvSpPr/>
-          <p:nvPr/>
-        </p:nvSpPr>
-        <p:spPr>
-          <a:xfrm>
-            <a:off x="623392" y="2060848"/>
-            <a:ext cx="10801200" cy="1200329"/>
-          </a:xfrm>
-          <a:prstGeom prst="rect">
-            <a:avLst/>
-          </a:prstGeom>
-        </p:spPr>
-        <p:txBody>
-          <a:bodyPr wrap="square">
-            <a:spAutoFit/>
-          </a:bodyPr>
-          <a:lstStyle/>
-          <a:p>
-            <a:r>
-              <a:rPr lang="pt-BR" dirty="0"/>
-              <a:t>Objetivo:</a:t>
-            </a:r>
-          </a:p>
-          <a:p>
-            <a:pPr marL="285750" indent="-285750">
-              <a:buFont typeface="Arial" panose="020B0604020202020204" pitchFamily="34" charset="0"/>
-              <a:buChar char="•"/>
-            </a:pPr>
-            <a:r>
-              <a:rPr lang="pt-BR" dirty="0" smtClean="0"/>
-              <a:t> </a:t>
-            </a:r>
-            <a:r>
-              <a:rPr lang="pt-BR" dirty="0"/>
-              <a:t>Identificar e descrever os casos de teste para cada </a:t>
-            </a:r>
-            <a:r>
-              <a:rPr lang="pt-BR" dirty="0" smtClean="0"/>
-              <a:t>build do projeto </a:t>
-            </a:r>
-            <a:endParaRPr lang="pt-BR" dirty="0"/>
-          </a:p>
-          <a:p>
-            <a:pPr marL="285750" indent="-285750">
-              <a:buFont typeface="Arial" panose="020B0604020202020204" pitchFamily="34" charset="0"/>
-              <a:buChar char="•"/>
-            </a:pPr>
-            <a:r>
-              <a:rPr lang="pt-BR" dirty="0" smtClean="0"/>
-              <a:t>identificar </a:t>
-            </a:r>
-            <a:r>
-              <a:rPr lang="pt-BR" dirty="0"/>
-              <a:t>e estruturar os procedimentos de teste, especificando</a:t>
-            </a:r>
-          </a:p>
-          <a:p>
-            <a:r>
-              <a:rPr lang="pt-BR" dirty="0"/>
-              <a:t>como executar os casos de teste.</a:t>
-            </a:r>
-          </a:p>
-        </p:txBody>
-      </p:sp>
-    </p:spTree>
-    <p:extLst>
-      <p:ext uri="{BB962C8B-B14F-4D97-AF65-F5344CB8AC3E}">
-        <p14:creationId xmlns:p14="http://schemas.microsoft.com/office/powerpoint/2010/main" val="4091845372"/>
-      </p:ext>
-    </p:extLst>
-  </p:cSld>
-  <p:clrMapOvr>
-    <a:masterClrMapping/>
-  </p:clrMapOvr>
-  <mc:AlternateContent xmlns:mc="http://schemas.openxmlformats.org/markup-compatibility/2006" xmlns:p14="http://schemas.microsoft.com/office/powerpoint/2010/main">
-    <mc:Choice Requires="p14">
-      <p:transition spd="med" p14:dur="700">
-        <p:fade/>
-      </p:transition>
-    </mc:Choice>
-    <mc:Fallback xmlns="">
-      <p:transition spd="med">
-        <p:fade/>
-      </p:transition>
-    </mc:Fallback>
-  </mc:AlternateContent>
-  <p:timing>
-    <p:tnLst>
-      <p:par>
-        <p:cTn id="1" dur="indefinite" restart="never" nodeType="tmRoot"/>
-      </p:par>
-    </p:tnLst>
-  </p:timing>
-</p:sld>
-</file>
-
 <file path=ppt/slides/slide13.xml><?xml version="1.0" encoding="utf-8"?>
 <p:sld xmlns:a="http://schemas.openxmlformats.org/drawingml/2006/main" xmlns:r="http://schemas.openxmlformats.org/officeDocument/2006/relationships" xmlns:p="http://schemas.openxmlformats.org/presentationml/2006/main">
   <p:cSld>
@@ -12150,14 +13275,14 @@
       </p:sp>
       <p:sp>
         <p:nvSpPr>
-          <p:cNvPr id="2" name="Retângulo 1"/>
+          <p:cNvPr id="8" name="Retângulo 7"/>
           <p:cNvSpPr/>
           <p:nvPr/>
         </p:nvSpPr>
         <p:spPr>
           <a:xfrm>
-            <a:off x="298598" y="2708920"/>
-            <a:ext cx="12926193" cy="1477328"/>
+            <a:off x="623392" y="2060848"/>
+            <a:ext cx="10801200" cy="1200329"/>
           </a:xfrm>
           <a:prstGeom prst="rect">
             <a:avLst/>
@@ -12171,69 +13296,54 @@
           <a:p>
             <a:r>
               <a:rPr lang="pt-BR" dirty="0"/>
-              <a:t>• </a:t>
-            </a:r>
+              <a:t>Objetivo:</a:t>
+            </a:r>
+          </a:p>
+          <a:p>
+            <a:pPr marL="285750" indent="-285750">
+              <a:buFont typeface="Arial" panose="020B0604020202020204" pitchFamily="34" charset="0"/>
+              <a:buChar char="•"/>
+            </a:pPr>
             <a:r>
               <a:rPr lang="pt-BR" dirty="0" smtClean="0"/>
-              <a:t>Passos</a:t>
+              <a:t> </a:t>
+            </a:r>
+            <a:r>
+              <a:rPr lang="pt-BR" dirty="0"/>
+              <a:t>Identificar e descrever os casos de teste para cada </a:t>
+            </a:r>
+            <a:r>
+              <a:rPr lang="pt-BR" dirty="0" smtClean="0"/>
+              <a:t>build do projeto </a:t>
             </a:r>
             <a:endParaRPr lang="pt-BR" dirty="0"/>
           </a:p>
           <a:p>
-            <a:pPr marL="342900" indent="-342900">
-              <a:buAutoNum type="arabicPeriod"/>
+            <a:pPr marL="285750" indent="-285750">
+              <a:buFont typeface="Arial" panose="020B0604020202020204" pitchFamily="34" charset="0"/>
+              <a:buChar char="•"/>
             </a:pPr>
             <a:r>
               <a:rPr lang="pt-BR" dirty="0" smtClean="0"/>
-              <a:t>Identificar </a:t>
+              <a:t>identificar </a:t>
             </a:r>
             <a:r>
               <a:rPr lang="pt-BR" dirty="0"/>
-              <a:t>e descrever casos de </a:t>
-            </a:r>
-            <a:r>
-              <a:rPr lang="pt-BR" dirty="0" smtClean="0"/>
-              <a:t>teste</a:t>
-            </a:r>
-            <a:endParaRPr lang="pt-BR" dirty="0"/>
+              <a:t>e estruturar os procedimentos de teste, especificando</a:t>
+            </a:r>
           </a:p>
           <a:p>
             <a:r>
               <a:rPr lang="pt-BR" dirty="0"/>
-              <a:t>2</a:t>
-            </a:r>
-            <a:r>
-              <a:rPr lang="pt-BR" dirty="0" smtClean="0"/>
-              <a:t>.   </a:t>
-            </a:r>
-            <a:r>
-              <a:rPr lang="pt-BR" dirty="0"/>
-              <a:t>Estruturar procedimentos de teste</a:t>
-            </a:r>
-          </a:p>
-          <a:p>
-            <a:r>
-              <a:rPr lang="pt-BR" dirty="0"/>
-              <a:t>3</a:t>
-            </a:r>
-            <a:r>
-              <a:rPr lang="pt-BR" dirty="0" smtClean="0"/>
-              <a:t>.   </a:t>
-            </a:r>
-            <a:r>
-              <a:rPr lang="pt-BR" dirty="0"/>
-              <a:t>Gerar planilha de testes</a:t>
-            </a:r>
-          </a:p>
-          <a:p>
-            <a:endParaRPr lang="pt-BR" dirty="0"/>
+              <a:t>como executar os casos de teste.</a:t>
+            </a:r>
           </a:p>
         </p:txBody>
       </p:sp>
     </p:spTree>
     <p:extLst>
       <p:ext uri="{BB962C8B-B14F-4D97-AF65-F5344CB8AC3E}">
-        <p14:creationId xmlns:p14="http://schemas.microsoft.com/office/powerpoint/2010/main" val="1566485322"/>
+        <p14:creationId xmlns:p14="http://schemas.microsoft.com/office/powerpoint/2010/main" val="4091845372"/>
       </p:ext>
     </p:extLst>
   </p:cSld>
@@ -12281,7 +13391,7 @@
       </p:grpSpPr>
       <p:sp>
         <p:nvSpPr>
-          <p:cNvPr id="3" name="Título 2"/>
+          <p:cNvPr id="5" name="Título 4"/>
           <p:cNvSpPr>
             <a:spLocks noGrp="1"/>
           </p:cNvSpPr>
@@ -12289,33 +13399,33 @@
             <p:ph type="title"/>
           </p:nvPr>
         </p:nvSpPr>
-        <p:spPr>
-          <a:xfrm>
-            <a:off x="983432" y="467360"/>
-            <a:ext cx="9867448" cy="1233424"/>
-          </a:xfrm>
-        </p:spPr>
+        <p:spPr/>
         <p:txBody>
           <a:bodyPr/>
           <a:lstStyle/>
           <a:p>
             <a:r>
-              <a:rPr lang="pt-BR" dirty="0"/>
-              <a:t>Identificar e descrever casos de teste:</a:t>
-            </a:r>
+              <a:rPr lang="pt-BR" sz="3600" dirty="0">
+                <a:solidFill>
+                  <a:srgbClr val="263050"/>
+                </a:solidFill>
+              </a:rPr>
+              <a:t>Projeto de teste</a:t>
+            </a:r>
+            <a:endParaRPr lang="pt-BR" dirty="0"/>
           </a:p>
         </p:txBody>
       </p:sp>
       <p:sp>
         <p:nvSpPr>
-          <p:cNvPr id="4" name="Retângulo 3"/>
+          <p:cNvPr id="2" name="Retângulo 1"/>
           <p:cNvSpPr/>
           <p:nvPr/>
         </p:nvSpPr>
         <p:spPr>
           <a:xfrm>
-            <a:off x="1205397" y="2420888"/>
-            <a:ext cx="8016552" cy="2677656"/>
+            <a:off x="298598" y="2708920"/>
+            <a:ext cx="12926193" cy="1477328"/>
           </a:xfrm>
           <a:prstGeom prst="rect">
             <a:avLst/>
@@ -12328,46 +13438,70 @@
           <a:lstStyle/>
           <a:p>
             <a:r>
-              <a:rPr lang="pt-BR" sz="2800" dirty="0"/>
-              <a:t>Texto associado a um requisito a ser testado, que</a:t>
-            </a:r>
-          </a:p>
-          <a:p>
-            <a:r>
-              <a:rPr lang="pt-BR" sz="2800" dirty="0"/>
-              <a:t>descreve:</a:t>
-            </a:r>
-          </a:p>
-          <a:p>
-            <a:r>
-              <a:rPr lang="pt-BR" sz="2800" dirty="0"/>
-              <a:t>• Pré-condições de execução</a:t>
-            </a:r>
-          </a:p>
-          <a:p>
-            <a:r>
-              <a:rPr lang="pt-BR" sz="2800" dirty="0"/>
-              <a:t>• Entradas</a:t>
-            </a:r>
-          </a:p>
-          <a:p>
-            <a:r>
-              <a:rPr lang="pt-BR" sz="2800" dirty="0"/>
-              <a:t>• Passos específicos do teste a ser executado</a:t>
-            </a:r>
-          </a:p>
-          <a:p>
-            <a:r>
-              <a:rPr lang="pt-BR" sz="2800" dirty="0"/>
-              <a:t>• Resultados esperados</a:t>
-            </a:r>
+              <a:rPr lang="pt-BR" dirty="0"/>
+              <a:t>• </a:t>
+            </a:r>
+            <a:r>
+              <a:rPr lang="pt-BR" dirty="0" smtClean="0"/>
+              <a:t>Passos</a:t>
+            </a:r>
+            <a:endParaRPr lang="pt-BR" dirty="0"/>
+          </a:p>
+          <a:p>
+            <a:pPr marL="342900" indent="-342900">
+              <a:buAutoNum type="arabicPeriod"/>
+            </a:pPr>
+            <a:r>
+              <a:rPr lang="pt-BR" dirty="0" smtClean="0"/>
+              <a:t>Identificar </a:t>
+            </a:r>
+            <a:r>
+              <a:rPr lang="pt-BR" dirty="0"/>
+              <a:t>e descrever casos de </a:t>
+            </a:r>
+            <a:r>
+              <a:rPr lang="pt-BR" dirty="0" smtClean="0"/>
+              <a:t>teste</a:t>
+            </a:r>
+            <a:endParaRPr lang="pt-BR" dirty="0"/>
+          </a:p>
+          <a:p>
+            <a:r>
+              <a:rPr lang="pt-BR" dirty="0"/>
+              <a:t>2</a:t>
+            </a:r>
+            <a:r>
+              <a:rPr lang="pt-BR" dirty="0" smtClean="0"/>
+              <a:t>.   </a:t>
+            </a:r>
+            <a:r>
+              <a:rPr lang="pt-BR" dirty="0"/>
+              <a:t>Estruturar procedimentos de teste</a:t>
+            </a:r>
+          </a:p>
+          <a:p>
+            <a:r>
+              <a:rPr lang="pt-BR" dirty="0"/>
+              <a:t>3</a:t>
+            </a:r>
+            <a:r>
+              <a:rPr lang="pt-BR" dirty="0" smtClean="0"/>
+              <a:t>.   </a:t>
+            </a:r>
+            <a:r>
+              <a:rPr lang="pt-BR" dirty="0"/>
+              <a:t>Gerar planilha de testes</a:t>
+            </a:r>
+          </a:p>
+          <a:p>
+            <a:endParaRPr lang="pt-BR" dirty="0"/>
           </a:p>
         </p:txBody>
       </p:sp>
     </p:spTree>
     <p:extLst>
       <p:ext uri="{BB962C8B-B14F-4D97-AF65-F5344CB8AC3E}">
-        <p14:creationId xmlns:p14="http://schemas.microsoft.com/office/powerpoint/2010/main" val="3161096069"/>
+        <p14:creationId xmlns:p14="http://schemas.microsoft.com/office/powerpoint/2010/main" val="1566485322"/>
       </p:ext>
     </p:extLst>
   </p:cSld>
@@ -12415,7 +13549,7 @@
       </p:grpSpPr>
       <p:sp>
         <p:nvSpPr>
-          <p:cNvPr id="2" name="Título 1"/>
+          <p:cNvPr id="3" name="Título 2"/>
           <p:cNvSpPr>
             <a:spLocks noGrp="1"/>
           </p:cNvSpPr>
@@ -12425,8 +13559,8 @@
         </p:nvSpPr>
         <p:spPr>
           <a:xfrm>
-            <a:off x="1341120" y="467360"/>
-            <a:ext cx="9509760" cy="729392"/>
+            <a:off x="983432" y="467360"/>
+            <a:ext cx="9867448" cy="1233424"/>
           </a:xfrm>
         </p:spPr>
         <p:txBody>
@@ -12442,14 +13576,14 @@
       </p:sp>
       <p:sp>
         <p:nvSpPr>
-          <p:cNvPr id="3" name="Retângulo 2"/>
+          <p:cNvPr id="4" name="Retângulo 3"/>
           <p:cNvSpPr/>
           <p:nvPr/>
         </p:nvSpPr>
         <p:spPr>
           <a:xfrm>
-            <a:off x="346051" y="1412776"/>
-            <a:ext cx="8808640" cy="5139869"/>
+            <a:off x="1205397" y="2420888"/>
+            <a:ext cx="8016552" cy="2677656"/>
           </a:xfrm>
           <a:prstGeom prst="rect">
             <a:avLst/>
@@ -12462,135 +13596,38 @@
           <a:lstStyle/>
           <a:p>
             <a:r>
-              <a:rPr lang="pt-BR" dirty="0"/>
-              <a:t>Desenvolvido cenários do caso de uso, de acordo com a</a:t>
-            </a:r>
-          </a:p>
-          <a:p>
-            <a:r>
-              <a:rPr lang="pt-BR" dirty="0"/>
-              <a:t>Estratégia de testes</a:t>
-            </a:r>
-          </a:p>
-          <a:p>
-            <a:r>
-              <a:rPr lang="pt-BR" dirty="0"/>
-              <a:t>• Fluxo normal (dados válidos)</a:t>
-            </a:r>
-          </a:p>
-          <a:p>
-            <a:r>
-              <a:rPr lang="pt-BR" dirty="0"/>
-              <a:t>• Fluxo alternativo</a:t>
-            </a:r>
-          </a:p>
-          <a:p>
-            <a:r>
-              <a:rPr lang="pt-BR" dirty="0"/>
-              <a:t>• Fluxo de exceção (dados inválidos</a:t>
-            </a:r>
-            <a:r>
-              <a:rPr lang="pt-BR" dirty="0" smtClean="0"/>
-              <a:t>)</a:t>
-            </a:r>
-            <a:endParaRPr lang="pt-BR" dirty="0"/>
-          </a:p>
-          <a:p>
-            <a:r>
-              <a:rPr lang="pt-BR" dirty="0"/>
-              <a:t>– Definir entradas e saídas correspondentes</a:t>
-            </a:r>
-            <a:r>
-              <a:rPr lang="pt-BR" dirty="0" smtClean="0"/>
-              <a:t>.</a:t>
-            </a:r>
-          </a:p>
-          <a:p>
-            <a:r>
-              <a:rPr lang="pt-BR" dirty="0" smtClean="0"/>
-              <a:t>CASCATA</a:t>
-            </a:r>
-          </a:p>
-          <a:p>
-            <a:r>
-              <a:rPr lang="pt-BR" dirty="0" smtClean="0"/>
-              <a:t>• </a:t>
-            </a:r>
-            <a:r>
-              <a:rPr lang="pt-BR" dirty="0"/>
-              <a:t>Vantagem</a:t>
-            </a:r>
-          </a:p>
-          <a:p>
-            <a:r>
-              <a:rPr lang="pt-BR" dirty="0"/>
-              <a:t>– Os casos de testes são tipicamente pequenos e simples;</a:t>
-            </a:r>
-          </a:p>
-          <a:p>
-            <a:r>
-              <a:rPr lang="pt-BR" dirty="0"/>
-              <a:t>• Desvantagem</a:t>
-            </a:r>
-          </a:p>
-          <a:p>
-            <a:r>
-              <a:rPr lang="pt-BR" dirty="0"/>
-              <a:t>– Se um caso de teste falhar o teste subsequente pode falhar</a:t>
-            </a:r>
-            <a:r>
-              <a:rPr lang="pt-BR" dirty="0" smtClean="0"/>
-              <a:t>.</a:t>
-            </a:r>
-          </a:p>
-          <a:p>
-            <a:r>
-              <a:rPr lang="pt-BR" dirty="0" smtClean="0"/>
-              <a:t>INDEPENDENTE</a:t>
-            </a:r>
-          </a:p>
-          <a:p>
-            <a:r>
-              <a:rPr lang="pt-BR" dirty="0"/>
-              <a:t>• Vantagens</a:t>
-            </a:r>
-          </a:p>
-          <a:p>
-            <a:r>
-              <a:rPr lang="pt-BR" dirty="0"/>
-              <a:t>– Os casos de testes podem ser executados em qualquer ordem;</a:t>
-            </a:r>
-          </a:p>
-          <a:p>
-            <a:r>
-              <a:rPr lang="pt-BR" dirty="0"/>
-              <a:t>– Alto grau de </a:t>
-            </a:r>
-            <a:r>
-              <a:rPr lang="pt-BR" dirty="0" err="1"/>
-              <a:t>reusabilidade</a:t>
-            </a:r>
-            <a:r>
-              <a:rPr lang="pt-BR" dirty="0"/>
-              <a:t> dos casos de testes.</a:t>
-            </a:r>
-          </a:p>
-          <a:p>
-            <a:r>
-              <a:rPr lang="pt-BR" dirty="0"/>
-              <a:t>• Desvantagens</a:t>
-            </a:r>
-          </a:p>
-          <a:p>
-            <a:r>
-              <a:rPr lang="pt-BR" dirty="0"/>
-              <a:t>– São maiores e mais complexos;</a:t>
-            </a:r>
-          </a:p>
-          <a:p>
-            <a:r>
-              <a:rPr lang="pt-BR" dirty="0"/>
-              <a:t>– São mais difíceis de projetar, criar e manter.</a:t>
+              <a:rPr lang="pt-BR" sz="2800" dirty="0"/>
+              <a:t>Texto associado a um requisito a ser testado, que</a:t>
+            </a:r>
+          </a:p>
+          <a:p>
+            <a:r>
+              <a:rPr lang="pt-BR" sz="2800" dirty="0"/>
+              <a:t>descreve:</a:t>
+            </a:r>
+          </a:p>
+          <a:p>
+            <a:r>
+              <a:rPr lang="pt-BR" sz="2800" dirty="0"/>
+              <a:t>• Pré-condições de execução</a:t>
+            </a:r>
+          </a:p>
+          <a:p>
+            <a:r>
+              <a:rPr lang="pt-BR" sz="2800" dirty="0"/>
+              <a:t>• Entradas</a:t>
+            </a:r>
+          </a:p>
+          <a:p>
+            <a:r>
+              <a:rPr lang="pt-BR" sz="2800" dirty="0"/>
+              <a:t>• Passos específicos do teste a ser executado</a:t>
+            </a:r>
+          </a:p>
+          <a:p>
+            <a:r>
+              <a:rPr lang="pt-BR" sz="2800" dirty="0"/>
+              <a:t>• Resultados esperados</a:t>
             </a:r>
           </a:p>
         </p:txBody>
@@ -12598,7 +13635,7 @@
     </p:spTree>
     <p:extLst>
       <p:ext uri="{BB962C8B-B14F-4D97-AF65-F5344CB8AC3E}">
-        <p14:creationId xmlns:p14="http://schemas.microsoft.com/office/powerpoint/2010/main" val="1299491657"/>
+        <p14:creationId xmlns:p14="http://schemas.microsoft.com/office/powerpoint/2010/main" val="3161096069"/>
       </p:ext>
     </p:extLst>
   </p:cSld>
@@ -12656,24 +13693,18 @@
         </p:nvSpPr>
         <p:spPr>
           <a:xfrm>
-            <a:off x="1341120" y="764704"/>
-            <a:ext cx="9509760" cy="1512168"/>
+            <a:off x="1341120" y="467360"/>
+            <a:ext cx="9509760" cy="729392"/>
           </a:xfrm>
         </p:spPr>
         <p:txBody>
-          <a:bodyPr>
-            <a:normAutofit/>
-          </a:bodyPr>
+          <a:bodyPr/>
           <a:lstStyle/>
           <a:p>
             <a:r>
               <a:rPr lang="pt-BR" dirty="0"/>
-              <a:t>Estruturar procedimentos de teste</a:t>
-            </a:r>
-            <a:br>
-              <a:rPr lang="pt-BR" dirty="0"/>
-            </a:br>
-            <a:endParaRPr lang="pt-BR" dirty="0"/>
+              <a:t>Identificar e descrever casos de teste:</a:t>
+            </a:r>
           </a:p>
         </p:txBody>
       </p:sp>
@@ -12685,8 +13716,8 @@
         </p:nvSpPr>
         <p:spPr>
           <a:xfrm>
-            <a:off x="407368" y="2321004"/>
-            <a:ext cx="8736632" cy="3539430"/>
+            <a:off x="346051" y="1412776"/>
+            <a:ext cx="8808640" cy="5139869"/>
           </a:xfrm>
           <a:prstGeom prst="rect">
             <a:avLst/>
@@ -12700,13 +13731,42 @@
           <a:p>
             <a:r>
               <a:rPr lang="pt-BR" dirty="0"/>
-              <a:t>– Conjunto de passos detalhados que descrevem como o caso de</a:t>
+              <a:t>Desenvolvido cenários do caso de uso, de acordo com a</a:t>
             </a:r>
           </a:p>
           <a:p>
             <a:r>
               <a:rPr lang="pt-BR" dirty="0"/>
-              <a:t>teste será executado</a:t>
+              <a:t>Estratégia de testes</a:t>
+            </a:r>
+          </a:p>
+          <a:p>
+            <a:r>
+              <a:rPr lang="pt-BR" dirty="0"/>
+              <a:t>• Fluxo normal (dados válidos)</a:t>
+            </a:r>
+          </a:p>
+          <a:p>
+            <a:r>
+              <a:rPr lang="pt-BR" dirty="0"/>
+              <a:t>• Fluxo alternativo</a:t>
+            </a:r>
+          </a:p>
+          <a:p>
+            <a:r>
+              <a:rPr lang="pt-BR" dirty="0"/>
+              <a:t>• Fluxo de exceção (dados inválidos</a:t>
+            </a:r>
+            <a:r>
+              <a:rPr lang="pt-BR" dirty="0" smtClean="0"/>
+              <a:t>)</a:t>
+            </a:r>
+            <a:endParaRPr lang="pt-BR" dirty="0"/>
+          </a:p>
+          <a:p>
+            <a:r>
+              <a:rPr lang="pt-BR" dirty="0"/>
+              <a:t>– Definir entradas e saídas correspondentes</a:t>
             </a:r>
             <a:r>
               <a:rPr lang="pt-BR" dirty="0" smtClean="0"/>
@@ -12714,72 +13774,91 @@
             </a:r>
           </a:p>
           <a:p>
-            <a:endParaRPr lang="pt-BR" dirty="0"/>
-          </a:p>
-          <a:p>
+            <a:r>
+              <a:rPr lang="pt-BR" dirty="0" smtClean="0"/>
+              <a:t>CASCATA</a:t>
+            </a:r>
+          </a:p>
+          <a:p>
+            <a:r>
+              <a:rPr lang="pt-BR" dirty="0" smtClean="0"/>
+              <a:t>• </a:t>
+            </a:r>
             <a:r>
               <a:rPr lang="pt-BR" dirty="0"/>
-              <a:t>– Como (</a:t>
+              <a:t>Vantagem</a:t>
+            </a:r>
+          </a:p>
+          <a:p>
+            <a:r>
+              <a:rPr lang="pt-BR" dirty="0"/>
+              <a:t>– Os casos de testes são tipicamente pequenos e simples;</a:t>
+            </a:r>
+          </a:p>
+          <a:p>
+            <a:r>
+              <a:rPr lang="pt-BR" dirty="0"/>
+              <a:t>• Desvantagem</a:t>
+            </a:r>
+          </a:p>
+          <a:p>
+            <a:r>
+              <a:rPr lang="pt-BR" dirty="0"/>
+              <a:t>– Se um caso de teste falhar o teste subsequente pode falhar</a:t>
+            </a:r>
+            <a:r>
+              <a:rPr lang="pt-BR" dirty="0" smtClean="0"/>
+              <a:t>.</a:t>
+            </a:r>
+          </a:p>
+          <a:p>
+            <a:r>
+              <a:rPr lang="pt-BR" dirty="0" smtClean="0"/>
+              <a:t>INDEPENDENTE</a:t>
+            </a:r>
+          </a:p>
+          <a:p>
+            <a:r>
+              <a:rPr lang="pt-BR" dirty="0"/>
+              <a:t>• Vantagens</a:t>
+            </a:r>
+          </a:p>
+          <a:p>
+            <a:r>
+              <a:rPr lang="pt-BR" dirty="0"/>
+              <a:t>– Os casos de testes podem ser executados em qualquer ordem;</a:t>
+            </a:r>
+          </a:p>
+          <a:p>
+            <a:r>
+              <a:rPr lang="pt-BR" dirty="0"/>
+              <a:t>– Alto grau de </a:t>
             </a:r>
             <a:r>
               <a:rPr lang="pt-BR" dirty="0" err="1"/>
-              <a:t>ex</a:t>
+              <a:t>reusabilidade</a:t>
             </a:r>
             <a:r>
               <a:rPr lang="pt-BR" dirty="0"/>
-              <a:t>: através de ferramentas de automação de testes,</a:t>
+              <a:t> dos casos de testes.</a:t>
             </a:r>
           </a:p>
           <a:p>
             <a:r>
               <a:rPr lang="pt-BR" dirty="0"/>
-              <a:t>scripts, etc.) e quando fornecer os dados de entrada e obter os</a:t>
+              <a:t>• Desvantagens</a:t>
             </a:r>
           </a:p>
           <a:p>
             <a:r>
               <a:rPr lang="pt-BR" dirty="0"/>
-              <a:t>resultados da saída</a:t>
+              <a:t>– São maiores e mais complexos;</a:t>
             </a:r>
           </a:p>
           <a:p>
             <a:r>
               <a:rPr lang="pt-BR" dirty="0"/>
-              <a:t>– Passos para execução dos testes</a:t>
-            </a:r>
-          </a:p>
-          <a:p>
-            <a:r>
-              <a:rPr lang="pt-BR" dirty="0"/>
-              <a:t>– Forma de avaliação dos </a:t>
-            </a:r>
-            <a:r>
-              <a:rPr lang="pt-BR" dirty="0" smtClean="0"/>
-              <a:t>resultados</a:t>
-            </a:r>
-          </a:p>
-          <a:p>
-            <a:r>
-              <a:rPr lang="pt-BR" dirty="0"/>
-              <a:t>– Todas as condições de testes foram identificadas?</a:t>
-            </a:r>
-          </a:p>
-          <a:p>
-            <a:r>
-              <a:rPr lang="pt-BR" dirty="0"/>
-              <a:t>– Os casos de testes satisfazem as condições de teste?</a:t>
-            </a:r>
-          </a:p>
-          <a:p>
-            <a:r>
-              <a:rPr lang="pt-BR" dirty="0"/>
-              <a:t>– A massa de dados é adequada?</a:t>
-            </a:r>
-          </a:p>
-          <a:p>
-            <a:r>
-              <a:rPr lang="pt-BR" dirty="0"/>
-              <a:t>– O volume de dados é suficiente?</a:t>
+              <a:t>– São mais difíceis de projetar, criar e manter.</a:t>
             </a:r>
           </a:p>
         </p:txBody>
@@ -12787,7 +13866,7 @@
     </p:spTree>
     <p:extLst>
       <p:ext uri="{BB962C8B-B14F-4D97-AF65-F5344CB8AC3E}">
-        <p14:creationId xmlns:p14="http://schemas.microsoft.com/office/powerpoint/2010/main" val="2243007798"/>
+        <p14:creationId xmlns:p14="http://schemas.microsoft.com/office/powerpoint/2010/main" val="1299491657"/>
       </p:ext>
     </p:extLst>
   </p:cSld>
@@ -12843,22 +13922,21 @@
             <p:ph type="title"/>
           </p:nvPr>
         </p:nvSpPr>
-        <p:spPr/>
+        <p:spPr>
+          <a:xfrm>
+            <a:off x="1341120" y="764704"/>
+            <a:ext cx="9509760" cy="1512168"/>
+          </a:xfrm>
+        </p:spPr>
         <p:txBody>
-          <a:bodyPr/>
+          <a:bodyPr>
+            <a:normAutofit/>
+          </a:bodyPr>
           <a:lstStyle/>
           <a:p>
             <a:r>
               <a:rPr lang="pt-BR" dirty="0"/>
-              <a:t>Gerar planilha de </a:t>
-            </a:r>
-            <a:r>
-              <a:rPr lang="pt-BR" dirty="0" smtClean="0"/>
-              <a:t>testes</a:t>
-            </a:r>
-            <a:r>
-              <a:rPr lang="pt-BR" dirty="0"/>
-              <a:t/>
+              <a:t>Estruturar procedimentos de teste</a:t>
             </a:r>
             <a:br>
               <a:rPr lang="pt-BR" dirty="0"/>
@@ -12875,8 +13953,8 @@
         </p:nvSpPr>
         <p:spPr>
           <a:xfrm>
-            <a:off x="551384" y="2136339"/>
-            <a:ext cx="8592616" cy="2308324"/>
+            <a:off x="407368" y="2321004"/>
+            <a:ext cx="8736632" cy="3539430"/>
           </a:xfrm>
           <a:prstGeom prst="rect">
             <a:avLst/>
@@ -12890,54 +13968,86 @@
           <a:p>
             <a:r>
               <a:rPr lang="pt-BR" dirty="0"/>
-              <a:t>Gerar planilha de testes:</a:t>
+              <a:t>– Conjunto de passos detalhados que descrevem como o caso de</a:t>
             </a:r>
           </a:p>
           <a:p>
             <a:r>
               <a:rPr lang="pt-BR" dirty="0"/>
-              <a:t>– Nas planilhas devem estar contidos todos os casos de testes que</a:t>
-            </a:r>
+              <a:t>teste será executado</a:t>
+            </a:r>
+            <a:r>
+              <a:rPr lang="pt-BR" dirty="0" smtClean="0"/>
+              <a:t>.</a:t>
+            </a:r>
+          </a:p>
+          <a:p>
+            <a:endParaRPr lang="pt-BR" dirty="0"/>
           </a:p>
           <a:p>
             <a:r>
               <a:rPr lang="pt-BR" dirty="0"/>
-              <a:t>serão </a:t>
+              <a:t>– Como (</a:t>
+            </a:r>
+            <a:r>
+              <a:rPr lang="pt-BR" dirty="0" err="1"/>
+              <a:t>ex</a:t>
+            </a:r>
+            <a:r>
+              <a:rPr lang="pt-BR" dirty="0"/>
+              <a:t>: através de ferramentas de automação de testes,</a:t>
+            </a:r>
+          </a:p>
+          <a:p>
+            <a:r>
+              <a:rPr lang="pt-BR" dirty="0"/>
+              <a:t>scripts, etc.) e quando fornecer os dados de entrada e obter os</a:t>
+            </a:r>
+          </a:p>
+          <a:p>
+            <a:r>
+              <a:rPr lang="pt-BR" dirty="0"/>
+              <a:t>resultados da saída</a:t>
+            </a:r>
+          </a:p>
+          <a:p>
+            <a:r>
+              <a:rPr lang="pt-BR" dirty="0"/>
+              <a:t>– Passos para execução dos testes</a:t>
+            </a:r>
+          </a:p>
+          <a:p>
+            <a:r>
+              <a:rPr lang="pt-BR" dirty="0"/>
+              <a:t>– Forma de avaliação dos </a:t>
             </a:r>
             <a:r>
               <a:rPr lang="pt-BR" dirty="0" smtClean="0"/>
-              <a:t>executados.</a:t>
-            </a:r>
-            <a:endParaRPr lang="pt-BR" dirty="0"/>
+              <a:t>resultados</a:t>
+            </a:r>
           </a:p>
           <a:p>
             <a:r>
               <a:rPr lang="pt-BR" dirty="0"/>
-              <a:t>– Informações sobre o ciclo de teste são necessários:</a:t>
+              <a:t>– Todas as condições de testes foram identificadas?</a:t>
             </a:r>
           </a:p>
           <a:p>
             <a:r>
               <a:rPr lang="pt-BR" dirty="0"/>
-              <a:t>• Versão do Software</a:t>
+              <a:t>– Os casos de testes satisfazem as condições de teste?</a:t>
             </a:r>
           </a:p>
           <a:p>
             <a:r>
               <a:rPr lang="pt-BR" dirty="0"/>
-              <a:t>• Data Início e Fim</a:t>
+              <a:t>– A massa de dados é adequada?</a:t>
             </a:r>
           </a:p>
           <a:p>
             <a:r>
               <a:rPr lang="pt-BR" dirty="0"/>
-              <a:t>• Nome do Testador</a:t>
-            </a:r>
-          </a:p>
-          <a:p>
-            <a:r>
-              <a:rPr lang="pt-BR" dirty="0"/>
-              <a:t>• Casos de testes planejados</a:t>
+              <a:t>– O volume de dados é suficiente?</a:t>
             </a:r>
           </a:p>
         </p:txBody>
@@ -12945,7 +14055,7 @@
     </p:spTree>
     <p:extLst>
       <p:ext uri="{BB962C8B-B14F-4D97-AF65-F5344CB8AC3E}">
-        <p14:creationId xmlns:p14="http://schemas.microsoft.com/office/powerpoint/2010/main" val="1306253914"/>
+        <p14:creationId xmlns:p14="http://schemas.microsoft.com/office/powerpoint/2010/main" val="2243007798"/>
       </p:ext>
     </p:extLst>
   </p:cSld>
@@ -13007,19 +14117,19 @@
           <a:lstStyle/>
           <a:p>
             <a:r>
-              <a:rPr lang="pt-BR" dirty="0">
-                <a:solidFill>
-                  <a:srgbClr val="263050"/>
-                </a:solidFill>
-              </a:rPr>
-              <a:t>Registro de solicitação de mudanças </a:t>
+              <a:rPr lang="pt-BR" dirty="0"/>
+              <a:t>Gerar planilha de </a:t>
+            </a:r>
+            <a:r>
+              <a:rPr lang="pt-BR" dirty="0" smtClean="0"/>
+              <a:t>testes</a:t>
+            </a:r>
+            <a:r>
+              <a:rPr lang="pt-BR" dirty="0"/>
+              <a:t/>
             </a:r>
             <a:br>
-              <a:rPr lang="pt-BR" dirty="0">
-                <a:solidFill>
-                  <a:srgbClr val="263050"/>
-                </a:solidFill>
-              </a:rPr>
+              <a:rPr lang="pt-BR" dirty="0"/>
             </a:br>
             <a:endParaRPr lang="pt-BR" dirty="0"/>
           </a:p>
@@ -13027,14 +14137,14 @@
       </p:sp>
       <p:sp>
         <p:nvSpPr>
-          <p:cNvPr id="5" name="Retângulo 4"/>
+          <p:cNvPr id="3" name="Retângulo 2"/>
           <p:cNvSpPr/>
           <p:nvPr/>
         </p:nvSpPr>
         <p:spPr>
           <a:xfrm>
-            <a:off x="1199282" y="2132856"/>
-            <a:ext cx="7944544" cy="3170099"/>
+            <a:off x="551384" y="2136339"/>
+            <a:ext cx="8592616" cy="2308324"/>
           </a:xfrm>
           <a:prstGeom prst="rect">
             <a:avLst/>
@@ -13047,177 +14157,55 @@
           <a:lstStyle/>
           <a:p>
             <a:r>
-              <a:rPr lang="pt-BR" sz="2000" dirty="0" smtClean="0"/>
-              <a:t>Algumas informações</a:t>
-            </a:r>
-            <a:r>
-              <a:rPr lang="pt-BR" sz="2000" dirty="0"/>
-              <a:t> </a:t>
-            </a:r>
-            <a:r>
-              <a:rPr lang="pt-BR" sz="2000" dirty="0" smtClean="0"/>
-              <a:t>que</a:t>
-            </a:r>
-            <a:r>
-              <a:rPr lang="pt-BR" sz="2000" dirty="0"/>
-              <a:t> </a:t>
-            </a:r>
-            <a:r>
-              <a:rPr lang="pt-BR" sz="2000" dirty="0" smtClean="0"/>
-              <a:t>podem</a:t>
-            </a:r>
-            <a:r>
-              <a:rPr lang="pt-BR" sz="2000" dirty="0"/>
-              <a:t> </a:t>
-            </a:r>
-            <a:r>
-              <a:rPr lang="pt-BR" sz="2000" dirty="0" smtClean="0"/>
-              <a:t>estar</a:t>
-            </a:r>
-            <a:r>
-              <a:rPr lang="pt-BR" sz="2000" dirty="0"/>
-              <a:t> </a:t>
-            </a:r>
-            <a:r>
-              <a:rPr lang="pt-BR" sz="2000" dirty="0" smtClean="0"/>
-              <a:t>incluídas</a:t>
-            </a:r>
-            <a:r>
-              <a:rPr lang="pt-BR" sz="2000" dirty="0"/>
-              <a:t> </a:t>
-            </a:r>
-            <a:r>
-              <a:rPr lang="pt-BR" sz="2000" dirty="0" smtClean="0"/>
-              <a:t>em</a:t>
-            </a:r>
-            <a:r>
-              <a:rPr lang="pt-BR" sz="2000" dirty="0"/>
-              <a:t> </a:t>
-            </a:r>
-            <a:r>
-              <a:rPr lang="pt-BR" sz="2000" dirty="0" smtClean="0"/>
-              <a:t>uma</a:t>
-            </a:r>
-            <a:endParaRPr lang="pt-BR" sz="2000" dirty="0"/>
-          </a:p>
-          <a:p>
-            <a:r>
-              <a:rPr lang="pt-BR" sz="2000" dirty="0"/>
-              <a:t>SM:</a:t>
-            </a:r>
-          </a:p>
-          <a:p>
-            <a:r>
-              <a:rPr lang="pt-BR" sz="2000" dirty="0"/>
-              <a:t>– </a:t>
-            </a:r>
-            <a:r>
-              <a:rPr lang="pt-BR" sz="2000" dirty="0" err="1" smtClean="0"/>
-              <a:t>Identicação</a:t>
-            </a:r>
-            <a:r>
-              <a:rPr lang="pt-BR" sz="2000" dirty="0" smtClean="0"/>
-              <a:t> única</a:t>
-            </a:r>
-            <a:endParaRPr lang="pt-BR" sz="2000" dirty="0"/>
-          </a:p>
-          <a:p>
-            <a:r>
-              <a:rPr lang="pt-BR" sz="2000" dirty="0"/>
-              <a:t>– Solicitante</a:t>
-            </a:r>
-          </a:p>
-          <a:p>
-            <a:r>
-              <a:rPr lang="pt-BR" sz="2000" dirty="0"/>
-              <a:t>– </a:t>
-            </a:r>
-            <a:r>
-              <a:rPr lang="pt-BR" sz="2000" dirty="0" smtClean="0"/>
-              <a:t>Sistema/Projeto</a:t>
-            </a:r>
-          </a:p>
-          <a:p>
-            <a:r>
-              <a:rPr lang="pt-BR" sz="2000" dirty="0"/>
-              <a:t>– </a:t>
-            </a:r>
-            <a:r>
-              <a:rPr lang="pt-BR" sz="2000" dirty="0" smtClean="0"/>
-              <a:t>Item a</a:t>
-            </a:r>
-            <a:r>
-              <a:rPr lang="pt-BR" sz="2000" dirty="0"/>
-              <a:t> </a:t>
-            </a:r>
-            <a:r>
-              <a:rPr lang="pt-BR" sz="2000" dirty="0" smtClean="0"/>
-              <a:t>ser</a:t>
-            </a:r>
-            <a:r>
-              <a:rPr lang="pt-BR" sz="2000" dirty="0"/>
-              <a:t> </a:t>
-            </a:r>
-            <a:r>
-              <a:rPr lang="pt-BR" sz="2000" dirty="0" smtClean="0"/>
-              <a:t>modificado</a:t>
-            </a:r>
-            <a:endParaRPr lang="pt-BR" sz="2000" dirty="0"/>
-          </a:p>
-          <a:p>
-            <a:r>
-              <a:rPr lang="pt-BR" sz="2000" dirty="0"/>
-              <a:t>– </a:t>
-            </a:r>
-            <a:r>
-              <a:rPr lang="pt-BR" sz="2000" dirty="0" smtClean="0"/>
-              <a:t>Classificação (melhoria, correção</a:t>
-            </a:r>
-            <a:r>
-              <a:rPr lang="pt-BR" sz="2000" dirty="0"/>
-              <a:t> </a:t>
-            </a:r>
-            <a:r>
-              <a:rPr lang="pt-BR" sz="2000" dirty="0" smtClean="0"/>
-              <a:t>de</a:t>
-            </a:r>
-            <a:r>
-              <a:rPr lang="pt-BR" sz="2000" dirty="0"/>
-              <a:t> </a:t>
-            </a:r>
-            <a:r>
-              <a:rPr lang="pt-BR" sz="2000" dirty="0" smtClean="0"/>
-              <a:t>defeito, outra</a:t>
-            </a:r>
-            <a:r>
-              <a:rPr lang="pt-BR" sz="2000" dirty="0"/>
-              <a:t>)</a:t>
-            </a:r>
-          </a:p>
-          <a:p>
-            <a:r>
-              <a:rPr lang="pt-BR" sz="2000" dirty="0"/>
-              <a:t>– Prioridade</a:t>
-            </a:r>
-          </a:p>
-          <a:p>
-            <a:r>
-              <a:rPr lang="pt-BR" sz="2000" dirty="0"/>
-              <a:t>– Descrição</a:t>
-            </a:r>
-          </a:p>
-          <a:p>
-            <a:r>
-              <a:rPr lang="pt-BR" sz="2000" dirty="0"/>
-              <a:t>– </a:t>
-            </a:r>
-            <a:r>
-              <a:rPr lang="pt-BR" sz="2000" dirty="0" smtClean="0"/>
-              <a:t>Situação (nova, atribuída, finalizada, verificada, fechada</a:t>
-            </a:r>
-            <a:r>
-              <a:rPr lang="pt-BR" sz="2000" dirty="0"/>
-              <a:t>)</a:t>
+              <a:rPr lang="pt-BR" dirty="0"/>
+              <a:t>Gerar planilha de testes:</a:t>
+            </a:r>
+          </a:p>
+          <a:p>
+            <a:r>
+              <a:rPr lang="pt-BR" dirty="0"/>
+              <a:t>– Nas planilhas devem estar contidos todos os casos de testes que</a:t>
+            </a:r>
+          </a:p>
+          <a:p>
+            <a:r>
+              <a:rPr lang="pt-BR" dirty="0"/>
+              <a:t>serão </a:t>
+            </a:r>
+            <a:r>
+              <a:rPr lang="pt-BR" dirty="0" smtClean="0"/>
+              <a:t>executados.</a:t>
+            </a:r>
+            <a:endParaRPr lang="pt-BR" dirty="0"/>
+          </a:p>
+          <a:p>
+            <a:r>
+              <a:rPr lang="pt-BR" dirty="0"/>
+              <a:t>– Informações sobre o ciclo de teste são necessários:</a:t>
+            </a:r>
+          </a:p>
+          <a:p>
+            <a:r>
+              <a:rPr lang="pt-BR" dirty="0"/>
+              <a:t>• Versão do Software</a:t>
+            </a:r>
+          </a:p>
+          <a:p>
+            <a:r>
+              <a:rPr lang="pt-BR" dirty="0"/>
+              <a:t>• Data Início e Fim</a:t>
+            </a:r>
+          </a:p>
+          <a:p>
+            <a:r>
+              <a:rPr lang="pt-BR" dirty="0"/>
+              <a:t>• Nome do Testador</a:t>
+            </a:r>
+          </a:p>
+          <a:p>
+            <a:r>
+              <a:rPr lang="pt-BR" dirty="0"/>
+              <a:t>• Casos de testes planejados</a:t>
             </a:r>
           </a:p>
         </p:txBody>
@@ -13225,7 +14213,7 @@
     </p:spTree>
     <p:extLst>
       <p:ext uri="{BB962C8B-B14F-4D97-AF65-F5344CB8AC3E}">
-        <p14:creationId xmlns:p14="http://schemas.microsoft.com/office/powerpoint/2010/main" val="575927025"/>
+        <p14:creationId xmlns:p14="http://schemas.microsoft.com/office/powerpoint/2010/main" val="1306253914"/>
       </p:ext>
     </p:extLst>
   </p:cSld>
@@ -13286,14 +14274,226 @@
           <a:bodyPr/>
           <a:lstStyle/>
           <a:p>
-            <a:endParaRPr lang="pt-BR"/>
+            <a:r>
+              <a:rPr lang="pt-BR" dirty="0">
+                <a:solidFill>
+                  <a:srgbClr val="263050"/>
+                </a:solidFill>
+              </a:rPr>
+              <a:t>Registro de solicitação de mudanças </a:t>
+            </a:r>
+            <a:br>
+              <a:rPr lang="pt-BR" dirty="0">
+                <a:solidFill>
+                  <a:srgbClr val="263050"/>
+                </a:solidFill>
+              </a:rPr>
+            </a:br>
+            <a:endParaRPr lang="pt-BR" dirty="0"/>
+          </a:p>
+        </p:txBody>
+      </p:sp>
+      <p:sp>
+        <p:nvSpPr>
+          <p:cNvPr id="5" name="Retângulo 4"/>
+          <p:cNvSpPr/>
+          <p:nvPr/>
+        </p:nvSpPr>
+        <p:spPr>
+          <a:xfrm>
+            <a:off x="1199282" y="2132856"/>
+            <a:ext cx="7944544" cy="3170099"/>
+          </a:xfrm>
+          <a:prstGeom prst="rect">
+            <a:avLst/>
+          </a:prstGeom>
+        </p:spPr>
+        <p:txBody>
+          <a:bodyPr wrap="square">
+            <a:spAutoFit/>
+          </a:bodyPr>
+          <a:lstStyle/>
+          <a:p>
+            <a:r>
+              <a:rPr lang="pt-BR" sz="2000" dirty="0" smtClean="0"/>
+              <a:t>Algumas informações</a:t>
+            </a:r>
+            <a:r>
+              <a:rPr lang="pt-BR" sz="2000" dirty="0"/>
+              <a:t> </a:t>
+            </a:r>
+            <a:r>
+              <a:rPr lang="pt-BR" sz="2000" dirty="0" smtClean="0"/>
+              <a:t>que</a:t>
+            </a:r>
+            <a:r>
+              <a:rPr lang="pt-BR" sz="2000" dirty="0"/>
+              <a:t> </a:t>
+            </a:r>
+            <a:r>
+              <a:rPr lang="pt-BR" sz="2000" dirty="0" smtClean="0"/>
+              <a:t>podem</a:t>
+            </a:r>
+            <a:r>
+              <a:rPr lang="pt-BR" sz="2000" dirty="0"/>
+              <a:t> </a:t>
+            </a:r>
+            <a:r>
+              <a:rPr lang="pt-BR" sz="2000" dirty="0" smtClean="0"/>
+              <a:t>estar</a:t>
+            </a:r>
+            <a:r>
+              <a:rPr lang="pt-BR" sz="2000" dirty="0"/>
+              <a:t> </a:t>
+            </a:r>
+            <a:r>
+              <a:rPr lang="pt-BR" sz="2000" dirty="0" smtClean="0"/>
+              <a:t>incluídas</a:t>
+            </a:r>
+            <a:r>
+              <a:rPr lang="pt-BR" sz="2000" dirty="0"/>
+              <a:t> </a:t>
+            </a:r>
+            <a:r>
+              <a:rPr lang="pt-BR" sz="2000" dirty="0" smtClean="0"/>
+              <a:t>em</a:t>
+            </a:r>
+            <a:r>
+              <a:rPr lang="pt-BR" sz="2000" dirty="0"/>
+              <a:t> </a:t>
+            </a:r>
+            <a:r>
+              <a:rPr lang="pt-BR" sz="2000" dirty="0" smtClean="0"/>
+              <a:t>uma</a:t>
+            </a:r>
+            <a:endParaRPr lang="pt-BR" sz="2000" dirty="0"/>
+          </a:p>
+          <a:p>
+            <a:r>
+              <a:rPr lang="pt-BR" sz="2000" dirty="0"/>
+              <a:t>SM:</a:t>
+            </a:r>
+          </a:p>
+          <a:p>
+            <a:r>
+              <a:rPr lang="pt-BR" sz="2000" dirty="0"/>
+              <a:t>– </a:t>
+            </a:r>
+            <a:r>
+              <a:rPr lang="pt-BR" sz="2000" dirty="0" err="1" smtClean="0"/>
+              <a:t>Identicação</a:t>
+            </a:r>
+            <a:r>
+              <a:rPr lang="pt-BR" sz="2000" dirty="0" smtClean="0"/>
+              <a:t> única</a:t>
+            </a:r>
+            <a:endParaRPr lang="pt-BR" sz="2000" dirty="0"/>
+          </a:p>
+          <a:p>
+            <a:r>
+              <a:rPr lang="pt-BR" sz="2000" dirty="0"/>
+              <a:t>– Solicitante</a:t>
+            </a:r>
+          </a:p>
+          <a:p>
+            <a:r>
+              <a:rPr lang="pt-BR" sz="2000" dirty="0"/>
+              <a:t>– </a:t>
+            </a:r>
+            <a:r>
+              <a:rPr lang="pt-BR" sz="2000" dirty="0" smtClean="0"/>
+              <a:t>Sistema/Projeto</a:t>
+            </a:r>
+          </a:p>
+          <a:p>
+            <a:r>
+              <a:rPr lang="pt-BR" sz="2000" dirty="0"/>
+              <a:t>– </a:t>
+            </a:r>
+            <a:r>
+              <a:rPr lang="pt-BR" sz="2000" dirty="0" smtClean="0"/>
+              <a:t>Item a</a:t>
+            </a:r>
+            <a:r>
+              <a:rPr lang="pt-BR" sz="2000" dirty="0"/>
+              <a:t> </a:t>
+            </a:r>
+            <a:r>
+              <a:rPr lang="pt-BR" sz="2000" dirty="0" smtClean="0"/>
+              <a:t>ser</a:t>
+            </a:r>
+            <a:r>
+              <a:rPr lang="pt-BR" sz="2000" dirty="0"/>
+              <a:t> </a:t>
+            </a:r>
+            <a:r>
+              <a:rPr lang="pt-BR" sz="2000" dirty="0" smtClean="0"/>
+              <a:t>modificado</a:t>
+            </a:r>
+            <a:endParaRPr lang="pt-BR" sz="2000" dirty="0"/>
+          </a:p>
+          <a:p>
+            <a:r>
+              <a:rPr lang="pt-BR" sz="2000" dirty="0"/>
+              <a:t>– </a:t>
+            </a:r>
+            <a:r>
+              <a:rPr lang="pt-BR" sz="2000" dirty="0" smtClean="0"/>
+              <a:t>Classificação (melhoria, correção</a:t>
+            </a:r>
+            <a:r>
+              <a:rPr lang="pt-BR" sz="2000" dirty="0"/>
+              <a:t> </a:t>
+            </a:r>
+            <a:r>
+              <a:rPr lang="pt-BR" sz="2000" dirty="0" smtClean="0"/>
+              <a:t>de</a:t>
+            </a:r>
+            <a:r>
+              <a:rPr lang="pt-BR" sz="2000" dirty="0"/>
+              <a:t> </a:t>
+            </a:r>
+            <a:r>
+              <a:rPr lang="pt-BR" sz="2000" dirty="0" smtClean="0"/>
+              <a:t>defeito, outra</a:t>
+            </a:r>
+            <a:r>
+              <a:rPr lang="pt-BR" sz="2000" dirty="0"/>
+              <a:t>)</a:t>
+            </a:r>
+          </a:p>
+          <a:p>
+            <a:r>
+              <a:rPr lang="pt-BR" sz="2000" dirty="0"/>
+              <a:t>– Prioridade</a:t>
+            </a:r>
+          </a:p>
+          <a:p>
+            <a:r>
+              <a:rPr lang="pt-BR" sz="2000" dirty="0"/>
+              <a:t>– Descrição</a:t>
+            </a:r>
+          </a:p>
+          <a:p>
+            <a:r>
+              <a:rPr lang="pt-BR" sz="2000" dirty="0"/>
+              <a:t>– </a:t>
+            </a:r>
+            <a:r>
+              <a:rPr lang="pt-BR" sz="2000" dirty="0" smtClean="0"/>
+              <a:t>Situação (nova, atribuída, finalizada, verificada, fechada</a:t>
+            </a:r>
+            <a:r>
+              <a:rPr lang="pt-BR" sz="2000" dirty="0"/>
+              <a:t>)</a:t>
+            </a:r>
           </a:p>
         </p:txBody>
       </p:sp>
     </p:spTree>
     <p:extLst>
       <p:ext uri="{BB962C8B-B14F-4D97-AF65-F5344CB8AC3E}">
-        <p14:creationId xmlns:p14="http://schemas.microsoft.com/office/powerpoint/2010/main" val="2390380856"/>
+        <p14:creationId xmlns:p14="http://schemas.microsoft.com/office/powerpoint/2010/main" val="575927025"/>
       </p:ext>
     </p:extLst>
   </p:cSld>
@@ -13541,6 +14741,74 @@
 </file>
 
 <file path=ppt/slides/slide20.xml><?xml version="1.0" encoding="utf-8"?>
+<p:sld xmlns:a="http://schemas.openxmlformats.org/drawingml/2006/main" xmlns:r="http://schemas.openxmlformats.org/officeDocument/2006/relationships" xmlns:p="http://schemas.openxmlformats.org/presentationml/2006/main">
+  <p:cSld>
+    <p:spTree>
+      <p:nvGrpSpPr>
+        <p:cNvPr id="1" name=""/>
+        <p:cNvGrpSpPr/>
+        <p:nvPr/>
+      </p:nvGrpSpPr>
+      <p:grpSpPr>
+        <a:xfrm>
+          <a:off x="0" y="0"/>
+          <a:ext cx="0" cy="0"/>
+          <a:chOff x="0" y="0"/>
+          <a:chExt cx="0" cy="0"/>
+        </a:xfrm>
+      </p:grpSpPr>
+      <p:sp>
+        <p:nvSpPr>
+          <p:cNvPr id="2" name="Título 1"/>
+          <p:cNvSpPr>
+            <a:spLocks noGrp="1"/>
+          </p:cNvSpPr>
+          <p:nvPr>
+            <p:ph type="title"/>
+          </p:nvPr>
+        </p:nvSpPr>
+        <p:spPr/>
+        <p:txBody>
+          <a:bodyPr/>
+          <a:lstStyle/>
+          <a:p>
+            <a:endParaRPr lang="pt-BR"/>
+          </a:p>
+        </p:txBody>
+      </p:sp>
+    </p:spTree>
+    <p:extLst>
+      <p:ext uri="{BB962C8B-B14F-4D97-AF65-F5344CB8AC3E}">
+        <p14:creationId xmlns:p14="http://schemas.microsoft.com/office/powerpoint/2010/main" val="2390380856"/>
+      </p:ext>
+    </p:extLst>
+  </p:cSld>
+  <p:clrMapOvr>
+    <a:masterClrMapping/>
+  </p:clrMapOvr>
+  <mc:AlternateContent xmlns:mc="http://schemas.openxmlformats.org/markup-compatibility/2006" xmlns:p14="http://schemas.microsoft.com/office/powerpoint/2010/main">
+    <mc:Choice Requires="p14">
+      <p:transition spd="med" p14:dur="700">
+        <p:fade/>
+      </p:transition>
+    </mc:Choice>
+    <mc:Fallback xmlns="">
+      <p:transition spd="med">
+        <p:fade/>
+      </p:transition>
+    </mc:Fallback>
+  </mc:AlternateContent>
+  <p:timing>
+    <p:tnLst>
+      <p:par>
+        <p:cTn id="1" dur="indefinite" restart="never" nodeType="tmRoot"/>
+      </p:par>
+    </p:tnLst>
+  </p:timing>
+</p:sld>
+</file>
+
+<file path=ppt/slides/slide21.xml><?xml version="1.0" encoding="utf-8"?>
 <p:sld xmlns:a="http://schemas.openxmlformats.org/drawingml/2006/main" xmlns:r="http://schemas.openxmlformats.org/officeDocument/2006/relationships" xmlns:p="http://schemas.openxmlformats.org/presentationml/2006/main">
   <p:cSld>
     <p:spTree>
@@ -14136,7 +15404,7 @@
 </p:sld>
 </file>
 
-<file path=ppt/slides/slide21.xml><?xml version="1.0" encoding="utf-8"?>
+<file path=ppt/slides/slide22.xml><?xml version="1.0" encoding="utf-8"?>
 <p:sld xmlns:a="http://schemas.openxmlformats.org/drawingml/2006/main" xmlns:r="http://schemas.openxmlformats.org/officeDocument/2006/relationships" xmlns:p="http://schemas.openxmlformats.org/presentationml/2006/main">
   <p:cSld>
     <p:spTree>
@@ -15542,1458 +16810,118 @@
           <a:bodyPr/>
           <a:lstStyle/>
           <a:p>
-            <a:pPr>
-              <a:spcBef>
-                <a:spcPts val="0"/>
-              </a:spcBef>
-            </a:pPr>
             <a:r>
               <a:rPr lang="pt-BR" dirty="0" smtClean="0"/>
-              <a:t>Definição de  </a:t>
-            </a:r>
-            <a:r>
-              <a:rPr lang="pt-BR" dirty="0"/>
-              <a:t>prioridades</a:t>
-            </a:r>
-            <a:br>
-              <a:rPr lang="pt-BR" dirty="0"/>
-            </a:br>
-            <a:endParaRPr lang="pt-BR" sz="3400" b="0" i="0" dirty="0">
-              <a:solidFill>
-                <a:srgbClr val="263050">
-                  <a:lumMod val="75000"/>
-                </a:srgbClr>
-              </a:solidFill>
-              <a:latin typeface="Corbel"/>
-              <a:ea typeface="+mj-ea"/>
-              <a:cs typeface="+mj-cs"/>
-            </a:endParaRPr>
+              <a:t>Definir Prioridades</a:t>
+            </a:r>
+            <a:endParaRPr lang="pt-BR" dirty="0"/>
           </a:p>
         </p:txBody>
       </p:sp>
-      <p:graphicFrame>
-        <p:nvGraphicFramePr>
-          <p:cNvPr id="4" name="Espaço Reservado para Conteúdo 3"/>
-          <p:cNvGraphicFramePr>
-            <a:graphicFrameLocks noGrp="1"/>
-          </p:cNvGraphicFramePr>
+      <p:sp>
+        <p:nvSpPr>
+          <p:cNvPr id="3" name="Espaço Reservado para Conteúdo 2"/>
+          <p:cNvSpPr>
+            <a:spLocks noGrp="1"/>
+          </p:cNvSpPr>
           <p:nvPr>
             <p:ph idx="1"/>
-            <p:extLst>
-              <p:ext uri="{D42A27DB-BD31-4B8C-83A1-F6EECF244321}">
-                <p14:modId xmlns:p14="http://schemas.microsoft.com/office/powerpoint/2010/main" val="2191650505"/>
-              </p:ext>
-            </p:extLst>
           </p:nvPr>
-        </p:nvGraphicFramePr>
-        <p:xfrm>
-          <a:off x="191344" y="1700811"/>
-          <a:ext cx="11737304" cy="4637216"/>
-        </p:xfrm>
-        <a:graphic>
-          <a:graphicData uri="http://schemas.openxmlformats.org/drawingml/2006/table">
-            <a:tbl>
-              <a:tblPr>
-                <a:tableStyleId>{B301B821-A1FF-4177-AEE7-76D212191A09}</a:tableStyleId>
-              </a:tblPr>
-              <a:tblGrid>
-                <a:gridCol w="3715767"/>
-                <a:gridCol w="1020999"/>
-                <a:gridCol w="1389228"/>
-                <a:gridCol w="1640293"/>
-                <a:gridCol w="1292986"/>
-                <a:gridCol w="1489654"/>
-                <a:gridCol w="1188377"/>
-              </a:tblGrid>
-              <a:tr h="1190492">
-                <a:tc>
-                  <a:txBody>
-                    <a:bodyPr/>
-                    <a:lstStyle/>
-                    <a:p>
-                      <a:pPr algn="l" fontAlgn="ctr"/>
-                      <a:endParaRPr lang="pt-BR" sz="1600" u="none" strike="noStrike" dirty="0" smtClean="0">
-                        <a:effectLst/>
-                      </a:endParaRPr>
-                    </a:p>
-                    <a:p>
-                      <a:pPr algn="l" fontAlgn="ctr"/>
-                      <a:endParaRPr lang="pt-BR" sz="1600" b="1" i="0" u="none" strike="noStrike" dirty="0" smtClean="0">
-                        <a:solidFill>
-                          <a:srgbClr val="000000"/>
-                        </a:solidFill>
-                        <a:effectLst/>
-                        <a:latin typeface="Calibri"/>
-                      </a:endParaRPr>
-                    </a:p>
-                    <a:p>
-                      <a:pPr algn="l" fontAlgn="ctr"/>
-                      <a:endParaRPr lang="pt-BR" sz="1600" b="1" i="0" u="none" strike="noStrike" dirty="0" smtClean="0">
-                        <a:solidFill>
-                          <a:srgbClr val="000000"/>
-                        </a:solidFill>
-                        <a:effectLst/>
-                        <a:latin typeface="Calibri"/>
-                      </a:endParaRPr>
-                    </a:p>
-                    <a:p>
-                      <a:pPr algn="l" fontAlgn="ctr"/>
-                      <a:endParaRPr lang="pt-BR" sz="1600" b="1" i="0" u="none" strike="noStrike" dirty="0" smtClean="0">
-                        <a:solidFill>
-                          <a:srgbClr val="000000"/>
-                        </a:solidFill>
-                        <a:effectLst/>
-                        <a:latin typeface="Calibri"/>
-                      </a:endParaRPr>
-                    </a:p>
-                    <a:p>
-                      <a:pPr marL="0" marR="0" indent="0" algn="l" defTabSz="914400" rtl="0" eaLnBrk="1" fontAlgn="ctr" latinLnBrk="0" hangingPunct="1">
-                        <a:lnSpc>
-                          <a:spcPct val="100000"/>
-                        </a:lnSpc>
-                        <a:spcBef>
-                          <a:spcPts val="0"/>
-                        </a:spcBef>
-                        <a:spcAft>
-                          <a:spcPts val="0"/>
-                        </a:spcAft>
-                        <a:buClrTx/>
-                        <a:buSzTx/>
-                        <a:buFontTx/>
-                        <a:buNone/>
-                        <a:tabLst/>
-                        <a:defRPr/>
-                      </a:pPr>
-                      <a:r>
-                        <a:rPr lang="pt-BR" sz="1600" u="none" strike="noStrike" dirty="0" smtClean="0">
-                          <a:effectLst/>
-                        </a:rPr>
-                        <a:t>requisitos</a:t>
-                      </a:r>
-                      <a:endParaRPr lang="pt-BR" sz="1600" b="1" i="0" u="none" strike="noStrike" dirty="0" smtClean="0">
-                        <a:solidFill>
-                          <a:srgbClr val="000000"/>
-                        </a:solidFill>
-                        <a:effectLst/>
-                        <a:latin typeface="Calibri"/>
-                      </a:endParaRPr>
-                    </a:p>
-                  </a:txBody>
-                  <a:tcPr marL="0" marR="0" marT="0" marB="0" anchor="ctr"/>
-                </a:tc>
-                <a:tc>
-                  <a:txBody>
-                    <a:bodyPr/>
-                    <a:lstStyle/>
-                    <a:p>
-                      <a:pPr algn="l" fontAlgn="b"/>
-                      <a:r>
-                        <a:rPr lang="pt-BR" sz="1600" u="none" strike="noStrike">
-                          <a:effectLst/>
-                        </a:rPr>
-                        <a:t>impacto </a:t>
-                      </a:r>
-                      <a:endParaRPr lang="pt-BR" sz="1600" b="1" i="0" u="none" strike="noStrike">
-                        <a:solidFill>
-                          <a:srgbClr val="000000"/>
-                        </a:solidFill>
-                        <a:effectLst/>
-                        <a:latin typeface="Calibri"/>
-                      </a:endParaRPr>
-                    </a:p>
-                  </a:txBody>
-                  <a:tcPr marL="0" marR="0" marT="0" marB="0" anchor="b"/>
-                </a:tc>
-                <a:tc>
-                  <a:txBody>
-                    <a:bodyPr/>
-                    <a:lstStyle/>
-                    <a:p>
-                      <a:pPr algn="l" fontAlgn="b"/>
-                      <a:r>
-                        <a:rPr lang="pt-BR" sz="1600" u="none" strike="noStrike">
-                          <a:effectLst/>
-                        </a:rPr>
-                        <a:t>probabilidade</a:t>
-                      </a:r>
-                      <a:endParaRPr lang="pt-BR" sz="1600" b="1" i="0" u="none" strike="noStrike">
-                        <a:solidFill>
-                          <a:srgbClr val="000000"/>
-                        </a:solidFill>
-                        <a:effectLst/>
-                        <a:latin typeface="Calibri"/>
-                      </a:endParaRPr>
-                    </a:p>
-                  </a:txBody>
-                  <a:tcPr marL="0" marR="0" marT="0" marB="0" anchor="b"/>
-                </a:tc>
-                <a:tc>
-                  <a:txBody>
-                    <a:bodyPr/>
-                    <a:lstStyle/>
-                    <a:p>
-                      <a:pPr algn="l" fontAlgn="b"/>
-                      <a:r>
-                        <a:rPr lang="pt-BR" sz="1600" u="none" strike="noStrike">
-                          <a:effectLst/>
-                        </a:rPr>
-                        <a:t>risco avaliado</a:t>
-                      </a:r>
-                      <a:endParaRPr lang="pt-BR" sz="1600" b="1" i="0" u="none" strike="noStrike">
-                        <a:solidFill>
-                          <a:srgbClr val="000000"/>
-                        </a:solidFill>
-                        <a:effectLst/>
-                        <a:latin typeface="Calibri"/>
-                      </a:endParaRPr>
-                    </a:p>
-                  </a:txBody>
-                  <a:tcPr marL="0" marR="0" marT="0" marB="0" anchor="b"/>
-                </a:tc>
-                <a:tc>
-                  <a:txBody>
-                    <a:bodyPr/>
-                    <a:lstStyle/>
-                    <a:p>
-                      <a:pPr algn="l" fontAlgn="b"/>
-                      <a:r>
-                        <a:rPr lang="pt-BR" sz="1600" u="none" strike="noStrike">
-                          <a:effectLst/>
-                        </a:rPr>
-                        <a:t>frequencia</a:t>
-                      </a:r>
-                      <a:endParaRPr lang="pt-BR" sz="1600" b="1" i="0" u="none" strike="noStrike">
-                        <a:solidFill>
-                          <a:srgbClr val="000000"/>
-                        </a:solidFill>
-                        <a:effectLst/>
-                        <a:latin typeface="Calibri"/>
-                      </a:endParaRPr>
-                    </a:p>
-                  </a:txBody>
-                  <a:tcPr marL="0" marR="0" marT="0" marB="0" anchor="b"/>
-                </a:tc>
-                <a:tc>
-                  <a:txBody>
-                    <a:bodyPr/>
-                    <a:lstStyle/>
-                    <a:p>
-                      <a:pPr algn="l" fontAlgn="b"/>
-                      <a:r>
-                        <a:rPr lang="pt-BR" sz="1600" u="none" strike="noStrike">
-                          <a:effectLst/>
-                        </a:rPr>
-                        <a:t>importancia</a:t>
-                      </a:r>
-                      <a:endParaRPr lang="pt-BR" sz="1600" b="1" i="0" u="none" strike="noStrike">
-                        <a:solidFill>
-                          <a:srgbClr val="000000"/>
-                        </a:solidFill>
-                        <a:effectLst/>
-                        <a:latin typeface="Calibri"/>
-                      </a:endParaRPr>
-                    </a:p>
-                  </a:txBody>
-                  <a:tcPr marL="0" marR="0" marT="0" marB="0" anchor="b"/>
-                </a:tc>
-                <a:tc>
-                  <a:txBody>
-                    <a:bodyPr/>
-                    <a:lstStyle/>
-                    <a:p>
-                      <a:pPr algn="l" fontAlgn="b"/>
-                      <a:r>
-                        <a:rPr lang="pt-BR" sz="1600" u="none" strike="noStrike">
-                          <a:effectLst/>
-                        </a:rPr>
-                        <a:t>prioridade</a:t>
-                      </a:r>
-                      <a:endParaRPr lang="pt-BR" sz="1600" b="1" i="0" u="none" strike="noStrike">
-                        <a:solidFill>
-                          <a:srgbClr val="000000"/>
-                        </a:solidFill>
-                        <a:effectLst/>
-                        <a:latin typeface="Calibri"/>
-                      </a:endParaRPr>
-                    </a:p>
-                  </a:txBody>
-                  <a:tcPr marL="0" marR="0" marT="0" marB="0" anchor="b"/>
-                </a:tc>
-              </a:tr>
-              <a:tr h="488288">
-                <a:tc>
-                  <a:txBody>
-                    <a:bodyPr/>
-                    <a:lstStyle/>
-                    <a:p>
-                      <a:pPr algn="l" fontAlgn="b"/>
-                      <a:r>
-                        <a:rPr lang="pt-BR" sz="1200" u="none" strike="noStrike">
-                          <a:effectLst/>
-                        </a:rPr>
-                        <a:t>UC001 - Efetuar Login</a:t>
-                      </a:r>
-                      <a:endParaRPr lang="pt-BR" sz="1200" b="1" i="0" u="none" strike="noStrike">
-                        <a:solidFill>
-                          <a:srgbClr val="000000"/>
-                        </a:solidFill>
-                        <a:effectLst/>
-                        <a:latin typeface="Calibri"/>
-                      </a:endParaRPr>
-                    </a:p>
-                  </a:txBody>
-                  <a:tcPr marL="0" marR="0" marT="0" marB="0" anchor="b"/>
-                </a:tc>
-                <a:tc>
-                  <a:txBody>
-                    <a:bodyPr/>
-                    <a:lstStyle/>
-                    <a:p>
-                      <a:pPr algn="r" fontAlgn="b"/>
-                      <a:r>
-                        <a:rPr lang="pt-BR" sz="1100" u="none" strike="noStrike">
-                          <a:effectLst/>
-                        </a:rPr>
-                        <a:t>5</a:t>
-                      </a:r>
-                      <a:endParaRPr lang="pt-BR" sz="1100" b="0" i="0" u="none" strike="noStrike">
-                        <a:solidFill>
-                          <a:srgbClr val="000000"/>
-                        </a:solidFill>
-                        <a:effectLst/>
-                        <a:latin typeface="Calibri"/>
-                      </a:endParaRPr>
-                    </a:p>
-                  </a:txBody>
-                  <a:tcPr marL="0" marR="0" marT="0" marB="0" anchor="b"/>
-                </a:tc>
-                <a:tc>
-                  <a:txBody>
-                    <a:bodyPr/>
-                    <a:lstStyle/>
-                    <a:p>
-                      <a:pPr algn="r" fontAlgn="b"/>
-                      <a:r>
-                        <a:rPr lang="pt-BR" sz="1100" u="none" strike="noStrike">
-                          <a:effectLst/>
-                        </a:rPr>
-                        <a:t>1</a:t>
-                      </a:r>
-                      <a:endParaRPr lang="pt-BR" sz="1100" b="0" i="0" u="none" strike="noStrike">
-                        <a:solidFill>
-                          <a:srgbClr val="000000"/>
-                        </a:solidFill>
-                        <a:effectLst/>
-                        <a:latin typeface="Calibri"/>
-                      </a:endParaRPr>
-                    </a:p>
-                  </a:txBody>
-                  <a:tcPr marL="0" marR="0" marT="0" marB="0" anchor="b"/>
-                </a:tc>
-                <a:tc>
-                  <a:txBody>
-                    <a:bodyPr/>
-                    <a:lstStyle/>
-                    <a:p>
-                      <a:pPr algn="r" fontAlgn="b"/>
-                      <a:r>
-                        <a:rPr lang="pt-BR" sz="1100" u="none" strike="noStrike">
-                          <a:effectLst/>
-                        </a:rPr>
-                        <a:t>5</a:t>
-                      </a:r>
-                      <a:endParaRPr lang="pt-BR" sz="1100" b="0" i="0" u="none" strike="noStrike">
-                        <a:solidFill>
-                          <a:srgbClr val="000000"/>
-                        </a:solidFill>
-                        <a:effectLst/>
-                        <a:latin typeface="Calibri"/>
-                      </a:endParaRPr>
-                    </a:p>
-                  </a:txBody>
-                  <a:tcPr marL="0" marR="0" marT="0" marB="0" anchor="b"/>
-                </a:tc>
-                <a:tc>
-                  <a:txBody>
-                    <a:bodyPr/>
-                    <a:lstStyle/>
-                    <a:p>
-                      <a:pPr algn="r" fontAlgn="b"/>
-                      <a:r>
-                        <a:rPr lang="pt-BR" sz="1100" u="none" strike="noStrike">
-                          <a:effectLst/>
-                        </a:rPr>
-                        <a:t>3</a:t>
-                      </a:r>
-                      <a:endParaRPr lang="pt-BR" sz="1100" b="0" i="0" u="none" strike="noStrike">
-                        <a:solidFill>
-                          <a:srgbClr val="000000"/>
-                        </a:solidFill>
-                        <a:effectLst/>
-                        <a:latin typeface="Calibri"/>
-                      </a:endParaRPr>
-                    </a:p>
-                  </a:txBody>
-                  <a:tcPr marL="0" marR="0" marT="0" marB="0" anchor="b"/>
-                </a:tc>
-                <a:tc>
-                  <a:txBody>
-                    <a:bodyPr/>
-                    <a:lstStyle/>
-                    <a:p>
-                      <a:pPr algn="r" fontAlgn="b"/>
-                      <a:r>
-                        <a:rPr lang="pt-BR" sz="1100" u="none" strike="noStrike">
-                          <a:effectLst/>
-                        </a:rPr>
-                        <a:t>5</a:t>
-                      </a:r>
-                      <a:endParaRPr lang="pt-BR" sz="1100" b="0" i="0" u="none" strike="noStrike">
-                        <a:solidFill>
-                          <a:srgbClr val="000000"/>
-                        </a:solidFill>
-                        <a:effectLst/>
-                        <a:latin typeface="Calibri"/>
-                      </a:endParaRPr>
-                    </a:p>
-                  </a:txBody>
-                  <a:tcPr marL="0" marR="0" marT="0" marB="0" anchor="b"/>
-                </a:tc>
-                <a:tc>
-                  <a:txBody>
-                    <a:bodyPr/>
-                    <a:lstStyle/>
-                    <a:p>
-                      <a:pPr algn="r" fontAlgn="b"/>
-                      <a:r>
-                        <a:rPr lang="pt-BR" sz="1100" u="none" strike="noStrike">
-                          <a:effectLst/>
-                        </a:rPr>
-                        <a:t>75</a:t>
-                      </a:r>
-                      <a:endParaRPr lang="pt-BR" sz="1100" b="0" i="0" u="none" strike="noStrike">
-                        <a:solidFill>
-                          <a:srgbClr val="000000"/>
-                        </a:solidFill>
-                        <a:effectLst/>
-                        <a:latin typeface="Calibri"/>
-                      </a:endParaRPr>
-                    </a:p>
-                  </a:txBody>
-                  <a:tcPr marL="0" marR="0" marT="0" marB="0" anchor="b"/>
-                </a:tc>
-              </a:tr>
-              <a:tr h="488288">
-                <a:tc>
-                  <a:txBody>
-                    <a:bodyPr/>
-                    <a:lstStyle/>
-                    <a:p>
-                      <a:pPr algn="l" fontAlgn="b"/>
-                      <a:r>
-                        <a:rPr lang="pt-BR" sz="1200" u="none" strike="noStrike">
-                          <a:effectLst/>
-                        </a:rPr>
-                        <a:t>UC002 - Efetuar pagamento SIB Card</a:t>
-                      </a:r>
-                      <a:endParaRPr lang="pt-BR" sz="1200" b="1" i="0" u="none" strike="noStrike">
-                        <a:solidFill>
-                          <a:srgbClr val="000000"/>
-                        </a:solidFill>
-                        <a:effectLst/>
-                        <a:latin typeface="Arial"/>
-                      </a:endParaRPr>
-                    </a:p>
-                  </a:txBody>
-                  <a:tcPr marL="0" marR="0" marT="0" marB="0" anchor="b"/>
-                </a:tc>
-                <a:tc>
-                  <a:txBody>
-                    <a:bodyPr/>
-                    <a:lstStyle/>
-                    <a:p>
-                      <a:pPr algn="r" fontAlgn="b"/>
-                      <a:r>
-                        <a:rPr lang="pt-BR" sz="1100" u="none" strike="noStrike">
-                          <a:effectLst/>
-                        </a:rPr>
-                        <a:t>3</a:t>
-                      </a:r>
-                      <a:endParaRPr lang="pt-BR" sz="1100" b="0" i="0" u="none" strike="noStrike">
-                        <a:solidFill>
-                          <a:srgbClr val="000000"/>
-                        </a:solidFill>
-                        <a:effectLst/>
-                        <a:latin typeface="Calibri"/>
-                      </a:endParaRPr>
-                    </a:p>
-                  </a:txBody>
-                  <a:tcPr marL="0" marR="0" marT="0" marB="0" anchor="b"/>
-                </a:tc>
-                <a:tc>
-                  <a:txBody>
-                    <a:bodyPr/>
-                    <a:lstStyle/>
-                    <a:p>
-                      <a:pPr algn="r" fontAlgn="b"/>
-                      <a:r>
-                        <a:rPr lang="pt-BR" sz="1100" u="none" strike="noStrike">
-                          <a:effectLst/>
-                        </a:rPr>
-                        <a:t>4</a:t>
-                      </a:r>
-                      <a:endParaRPr lang="pt-BR" sz="1100" b="0" i="0" u="none" strike="noStrike">
-                        <a:solidFill>
-                          <a:srgbClr val="000000"/>
-                        </a:solidFill>
-                        <a:effectLst/>
-                        <a:latin typeface="Calibri"/>
-                      </a:endParaRPr>
-                    </a:p>
-                  </a:txBody>
-                  <a:tcPr marL="0" marR="0" marT="0" marB="0" anchor="b"/>
-                </a:tc>
-                <a:tc>
-                  <a:txBody>
-                    <a:bodyPr/>
-                    <a:lstStyle/>
-                    <a:p>
-                      <a:pPr algn="r" fontAlgn="b"/>
-                      <a:r>
-                        <a:rPr lang="pt-BR" sz="1100" u="none" strike="noStrike">
-                          <a:effectLst/>
-                        </a:rPr>
-                        <a:t>12</a:t>
-                      </a:r>
-                      <a:endParaRPr lang="pt-BR" sz="1100" b="0" i="0" u="none" strike="noStrike">
-                        <a:solidFill>
-                          <a:srgbClr val="000000"/>
-                        </a:solidFill>
-                        <a:effectLst/>
-                        <a:latin typeface="Calibri"/>
-                      </a:endParaRPr>
-                    </a:p>
-                  </a:txBody>
-                  <a:tcPr marL="0" marR="0" marT="0" marB="0" anchor="b"/>
-                </a:tc>
-                <a:tc>
-                  <a:txBody>
-                    <a:bodyPr/>
-                    <a:lstStyle/>
-                    <a:p>
-                      <a:pPr algn="r" fontAlgn="b"/>
-                      <a:r>
-                        <a:rPr lang="pt-BR" sz="1100" u="none" strike="noStrike">
-                          <a:effectLst/>
-                        </a:rPr>
-                        <a:t>4</a:t>
-                      </a:r>
-                      <a:endParaRPr lang="pt-BR" sz="1100" b="0" i="0" u="none" strike="noStrike">
-                        <a:solidFill>
-                          <a:srgbClr val="000000"/>
-                        </a:solidFill>
-                        <a:effectLst/>
-                        <a:latin typeface="Calibri"/>
-                      </a:endParaRPr>
-                    </a:p>
-                  </a:txBody>
-                  <a:tcPr marL="0" marR="0" marT="0" marB="0" anchor="b"/>
-                </a:tc>
-                <a:tc>
-                  <a:txBody>
-                    <a:bodyPr/>
-                    <a:lstStyle/>
-                    <a:p>
-                      <a:pPr algn="r" fontAlgn="b"/>
-                      <a:r>
-                        <a:rPr lang="pt-BR" sz="1100" u="none" strike="noStrike">
-                          <a:effectLst/>
-                        </a:rPr>
-                        <a:t>4</a:t>
-                      </a:r>
-                      <a:endParaRPr lang="pt-BR" sz="1100" b="0" i="0" u="none" strike="noStrike">
-                        <a:solidFill>
-                          <a:srgbClr val="000000"/>
-                        </a:solidFill>
-                        <a:effectLst/>
-                        <a:latin typeface="Calibri"/>
-                      </a:endParaRPr>
-                    </a:p>
-                  </a:txBody>
-                  <a:tcPr marL="0" marR="0" marT="0" marB="0" anchor="b"/>
-                </a:tc>
-                <a:tc>
-                  <a:txBody>
-                    <a:bodyPr/>
-                    <a:lstStyle/>
-                    <a:p>
-                      <a:pPr algn="r" fontAlgn="b"/>
-                      <a:r>
-                        <a:rPr lang="pt-BR" sz="1100" u="none" strike="noStrike">
-                          <a:effectLst/>
-                        </a:rPr>
-                        <a:t>192</a:t>
-                      </a:r>
-                      <a:endParaRPr lang="pt-BR" sz="1100" b="0" i="0" u="none" strike="noStrike">
-                        <a:solidFill>
-                          <a:srgbClr val="000000"/>
-                        </a:solidFill>
-                        <a:effectLst/>
-                        <a:latin typeface="Calibri"/>
-                      </a:endParaRPr>
-                    </a:p>
-                  </a:txBody>
-                  <a:tcPr marL="0" marR="0" marT="0" marB="0" anchor="b"/>
-                </a:tc>
-              </a:tr>
-              <a:tr h="488288">
-                <a:tc>
-                  <a:txBody>
-                    <a:bodyPr/>
-                    <a:lstStyle/>
-                    <a:p>
-                      <a:pPr algn="l" fontAlgn="b"/>
-                      <a:r>
-                        <a:rPr lang="pt-BR" sz="1200" u="none" strike="noStrike">
-                          <a:effectLst/>
-                        </a:rPr>
-                        <a:t>UC003 - Informar dados do SIB Card</a:t>
-                      </a:r>
-                      <a:endParaRPr lang="pt-BR" sz="1200" b="1" i="0" u="none" strike="noStrike">
-                        <a:solidFill>
-                          <a:srgbClr val="000000"/>
-                        </a:solidFill>
-                        <a:effectLst/>
-                        <a:latin typeface="Arial"/>
-                      </a:endParaRPr>
-                    </a:p>
-                  </a:txBody>
-                  <a:tcPr marL="0" marR="0" marT="0" marB="0" anchor="b"/>
-                </a:tc>
-                <a:tc>
-                  <a:txBody>
-                    <a:bodyPr/>
-                    <a:lstStyle/>
-                    <a:p>
-                      <a:pPr algn="r" fontAlgn="b"/>
-                      <a:r>
-                        <a:rPr lang="pt-BR" sz="1100" u="none" strike="noStrike">
-                          <a:effectLst/>
-                        </a:rPr>
-                        <a:t>3</a:t>
-                      </a:r>
-                      <a:endParaRPr lang="pt-BR" sz="1100" b="0" i="0" u="none" strike="noStrike">
-                        <a:solidFill>
-                          <a:srgbClr val="000000"/>
-                        </a:solidFill>
-                        <a:effectLst/>
-                        <a:latin typeface="Calibri"/>
-                      </a:endParaRPr>
-                    </a:p>
-                  </a:txBody>
-                  <a:tcPr marL="0" marR="0" marT="0" marB="0" anchor="b"/>
-                </a:tc>
-                <a:tc>
-                  <a:txBody>
-                    <a:bodyPr/>
-                    <a:lstStyle/>
-                    <a:p>
-                      <a:pPr algn="r" fontAlgn="b"/>
-                      <a:r>
-                        <a:rPr lang="pt-BR" sz="1100" u="none" strike="noStrike">
-                          <a:effectLst/>
-                        </a:rPr>
-                        <a:t>3</a:t>
-                      </a:r>
-                      <a:endParaRPr lang="pt-BR" sz="1100" b="0" i="0" u="none" strike="noStrike">
-                        <a:solidFill>
-                          <a:srgbClr val="000000"/>
-                        </a:solidFill>
-                        <a:effectLst/>
-                        <a:latin typeface="Calibri"/>
-                      </a:endParaRPr>
-                    </a:p>
-                  </a:txBody>
-                  <a:tcPr marL="0" marR="0" marT="0" marB="0" anchor="b"/>
-                </a:tc>
-                <a:tc>
-                  <a:txBody>
-                    <a:bodyPr/>
-                    <a:lstStyle/>
-                    <a:p>
-                      <a:pPr algn="r" fontAlgn="b"/>
-                      <a:r>
-                        <a:rPr lang="pt-BR" sz="1100" u="none" strike="noStrike">
-                          <a:effectLst/>
-                        </a:rPr>
-                        <a:t>6</a:t>
-                      </a:r>
-                      <a:endParaRPr lang="pt-BR" sz="1100" b="0" i="0" u="none" strike="noStrike">
-                        <a:solidFill>
-                          <a:srgbClr val="000000"/>
-                        </a:solidFill>
-                        <a:effectLst/>
-                        <a:latin typeface="Calibri"/>
-                      </a:endParaRPr>
-                    </a:p>
-                  </a:txBody>
-                  <a:tcPr marL="0" marR="0" marT="0" marB="0" anchor="b"/>
-                </a:tc>
-                <a:tc>
-                  <a:txBody>
-                    <a:bodyPr/>
-                    <a:lstStyle/>
-                    <a:p>
-                      <a:pPr algn="r" fontAlgn="b"/>
-                      <a:r>
-                        <a:rPr lang="pt-BR" sz="1100" u="none" strike="noStrike">
-                          <a:effectLst/>
-                        </a:rPr>
-                        <a:t>4</a:t>
-                      </a:r>
-                      <a:endParaRPr lang="pt-BR" sz="1100" b="0" i="0" u="none" strike="noStrike">
-                        <a:solidFill>
-                          <a:srgbClr val="000000"/>
-                        </a:solidFill>
-                        <a:effectLst/>
-                        <a:latin typeface="Calibri"/>
-                      </a:endParaRPr>
-                    </a:p>
-                  </a:txBody>
-                  <a:tcPr marL="0" marR="0" marT="0" marB="0" anchor="b"/>
-                </a:tc>
-                <a:tc>
-                  <a:txBody>
-                    <a:bodyPr/>
-                    <a:lstStyle/>
-                    <a:p>
-                      <a:pPr algn="r" fontAlgn="b"/>
-                      <a:r>
-                        <a:rPr lang="pt-BR" sz="1100" u="none" strike="noStrike">
-                          <a:effectLst/>
-                        </a:rPr>
-                        <a:t>3</a:t>
-                      </a:r>
-                      <a:endParaRPr lang="pt-BR" sz="1100" b="0" i="0" u="none" strike="noStrike">
-                        <a:solidFill>
-                          <a:srgbClr val="000000"/>
-                        </a:solidFill>
-                        <a:effectLst/>
-                        <a:latin typeface="Calibri"/>
-                      </a:endParaRPr>
-                    </a:p>
-                  </a:txBody>
-                  <a:tcPr marL="0" marR="0" marT="0" marB="0" anchor="b"/>
-                </a:tc>
-                <a:tc>
-                  <a:txBody>
-                    <a:bodyPr/>
-                    <a:lstStyle/>
-                    <a:p>
-                      <a:pPr algn="r" fontAlgn="b"/>
-                      <a:r>
-                        <a:rPr lang="pt-BR" sz="1100" u="none" strike="noStrike">
-                          <a:effectLst/>
-                        </a:rPr>
-                        <a:t>72</a:t>
-                      </a:r>
-                      <a:endParaRPr lang="pt-BR" sz="1100" b="0" i="0" u="none" strike="noStrike">
-                        <a:solidFill>
-                          <a:srgbClr val="000000"/>
-                        </a:solidFill>
-                        <a:effectLst/>
-                        <a:latin typeface="Calibri"/>
-                      </a:endParaRPr>
-                    </a:p>
-                  </a:txBody>
-                  <a:tcPr marL="0" marR="0" marT="0" marB="0" anchor="b"/>
-                </a:tc>
-              </a:tr>
-              <a:tr h="488288">
-                <a:tc>
-                  <a:txBody>
-                    <a:bodyPr/>
-                    <a:lstStyle/>
-                    <a:p>
-                      <a:pPr algn="l" fontAlgn="b"/>
-                      <a:r>
-                        <a:rPr lang="pt-BR" sz="1200" u="none" strike="noStrike">
-                          <a:effectLst/>
-                        </a:rPr>
-                        <a:t>UC004 - Mostrar dados da consulta</a:t>
-                      </a:r>
-                      <a:endParaRPr lang="pt-BR" sz="1200" b="1" i="0" u="none" strike="noStrike">
-                        <a:solidFill>
-                          <a:srgbClr val="000000"/>
-                        </a:solidFill>
-                        <a:effectLst/>
-                        <a:latin typeface="Arial"/>
-                      </a:endParaRPr>
-                    </a:p>
-                  </a:txBody>
-                  <a:tcPr marL="0" marR="0" marT="0" marB="0" anchor="b"/>
-                </a:tc>
-                <a:tc>
-                  <a:txBody>
-                    <a:bodyPr/>
-                    <a:lstStyle/>
-                    <a:p>
-                      <a:pPr algn="r" fontAlgn="b"/>
-                      <a:r>
-                        <a:rPr lang="pt-BR" sz="1100" u="none" strike="noStrike">
-                          <a:effectLst/>
-                        </a:rPr>
-                        <a:t>3</a:t>
-                      </a:r>
-                      <a:endParaRPr lang="pt-BR" sz="1100" b="0" i="0" u="none" strike="noStrike">
-                        <a:solidFill>
-                          <a:srgbClr val="000000"/>
-                        </a:solidFill>
-                        <a:effectLst/>
-                        <a:latin typeface="Calibri"/>
-                      </a:endParaRPr>
-                    </a:p>
-                  </a:txBody>
-                  <a:tcPr marL="0" marR="0" marT="0" marB="0" anchor="b"/>
-                </a:tc>
-                <a:tc>
-                  <a:txBody>
-                    <a:bodyPr/>
-                    <a:lstStyle/>
-                    <a:p>
-                      <a:pPr algn="r" fontAlgn="b"/>
-                      <a:r>
-                        <a:rPr lang="pt-BR" sz="1100" u="none" strike="noStrike">
-                          <a:effectLst/>
-                        </a:rPr>
-                        <a:t>1</a:t>
-                      </a:r>
-                      <a:endParaRPr lang="pt-BR" sz="1100" b="0" i="0" u="none" strike="noStrike">
-                        <a:solidFill>
-                          <a:srgbClr val="000000"/>
-                        </a:solidFill>
-                        <a:effectLst/>
-                        <a:latin typeface="Calibri"/>
-                      </a:endParaRPr>
-                    </a:p>
-                  </a:txBody>
-                  <a:tcPr marL="0" marR="0" marT="0" marB="0" anchor="b"/>
-                </a:tc>
-                <a:tc>
-                  <a:txBody>
-                    <a:bodyPr/>
-                    <a:lstStyle/>
-                    <a:p>
-                      <a:pPr algn="r" fontAlgn="b"/>
-                      <a:r>
-                        <a:rPr lang="pt-BR" sz="1100" u="none" strike="noStrike">
-                          <a:effectLst/>
-                        </a:rPr>
-                        <a:t>3</a:t>
-                      </a:r>
-                      <a:endParaRPr lang="pt-BR" sz="1100" b="0" i="0" u="none" strike="noStrike">
-                        <a:solidFill>
-                          <a:srgbClr val="000000"/>
-                        </a:solidFill>
-                        <a:effectLst/>
-                        <a:latin typeface="Calibri"/>
-                      </a:endParaRPr>
-                    </a:p>
-                  </a:txBody>
-                  <a:tcPr marL="0" marR="0" marT="0" marB="0" anchor="b"/>
-                </a:tc>
-                <a:tc>
-                  <a:txBody>
-                    <a:bodyPr/>
-                    <a:lstStyle/>
-                    <a:p>
-                      <a:pPr algn="r" fontAlgn="b"/>
-                      <a:r>
-                        <a:rPr lang="pt-BR" sz="1100" u="none" strike="noStrike">
-                          <a:effectLst/>
-                        </a:rPr>
-                        <a:t>4</a:t>
-                      </a:r>
-                      <a:endParaRPr lang="pt-BR" sz="1100" b="0" i="0" u="none" strike="noStrike">
-                        <a:solidFill>
-                          <a:srgbClr val="000000"/>
-                        </a:solidFill>
-                        <a:effectLst/>
-                        <a:latin typeface="Calibri"/>
-                      </a:endParaRPr>
-                    </a:p>
-                  </a:txBody>
-                  <a:tcPr marL="0" marR="0" marT="0" marB="0" anchor="b"/>
-                </a:tc>
-                <a:tc>
-                  <a:txBody>
-                    <a:bodyPr/>
-                    <a:lstStyle/>
-                    <a:p>
-                      <a:pPr algn="r" fontAlgn="b"/>
-                      <a:r>
-                        <a:rPr lang="pt-BR" sz="1100" u="none" strike="noStrike">
-                          <a:effectLst/>
-                        </a:rPr>
-                        <a:t>4</a:t>
-                      </a:r>
-                      <a:endParaRPr lang="pt-BR" sz="1100" b="0" i="0" u="none" strike="noStrike">
-                        <a:solidFill>
-                          <a:srgbClr val="000000"/>
-                        </a:solidFill>
-                        <a:effectLst/>
-                        <a:latin typeface="Calibri"/>
-                      </a:endParaRPr>
-                    </a:p>
-                  </a:txBody>
-                  <a:tcPr marL="0" marR="0" marT="0" marB="0" anchor="b"/>
-                </a:tc>
-                <a:tc>
-                  <a:txBody>
-                    <a:bodyPr/>
-                    <a:lstStyle/>
-                    <a:p>
-                      <a:pPr algn="r" fontAlgn="b"/>
-                      <a:r>
-                        <a:rPr lang="pt-BR" sz="1100" u="none" strike="noStrike">
-                          <a:effectLst/>
-                        </a:rPr>
-                        <a:t>48</a:t>
-                      </a:r>
-                      <a:endParaRPr lang="pt-BR" sz="1100" b="0" i="0" u="none" strike="noStrike">
-                        <a:solidFill>
-                          <a:srgbClr val="000000"/>
-                        </a:solidFill>
-                        <a:effectLst/>
-                        <a:latin typeface="Calibri"/>
-                      </a:endParaRPr>
-                    </a:p>
-                  </a:txBody>
-                  <a:tcPr marL="0" marR="0" marT="0" marB="0" anchor="b"/>
-                </a:tc>
-              </a:tr>
-              <a:tr h="488288">
-                <a:tc>
-                  <a:txBody>
-                    <a:bodyPr/>
-                    <a:lstStyle/>
-                    <a:p>
-                      <a:pPr algn="l" fontAlgn="b"/>
-                      <a:r>
-                        <a:rPr lang="pt-BR" sz="1200" u="none" strike="noStrike">
-                          <a:effectLst/>
-                        </a:rPr>
-                        <a:t>UC005 - Atualizar Cotações</a:t>
-                      </a:r>
-                      <a:endParaRPr lang="pt-BR" sz="1200" b="1" i="0" u="none" strike="noStrike">
-                        <a:solidFill>
-                          <a:srgbClr val="000000"/>
-                        </a:solidFill>
-                        <a:effectLst/>
-                        <a:latin typeface="Arial"/>
-                      </a:endParaRPr>
-                    </a:p>
-                  </a:txBody>
-                  <a:tcPr marL="0" marR="0" marT="0" marB="0" anchor="b"/>
-                </a:tc>
-                <a:tc>
-                  <a:txBody>
-                    <a:bodyPr/>
-                    <a:lstStyle/>
-                    <a:p>
-                      <a:pPr algn="r" fontAlgn="b"/>
-                      <a:r>
-                        <a:rPr lang="pt-BR" sz="1100" u="none" strike="noStrike">
-                          <a:effectLst/>
-                        </a:rPr>
-                        <a:t>2</a:t>
-                      </a:r>
-                      <a:endParaRPr lang="pt-BR" sz="1100" b="0" i="0" u="none" strike="noStrike">
-                        <a:solidFill>
-                          <a:srgbClr val="000000"/>
-                        </a:solidFill>
-                        <a:effectLst/>
-                        <a:latin typeface="Calibri"/>
-                      </a:endParaRPr>
-                    </a:p>
-                  </a:txBody>
-                  <a:tcPr marL="0" marR="0" marT="0" marB="0" anchor="b"/>
-                </a:tc>
-                <a:tc>
-                  <a:txBody>
-                    <a:bodyPr/>
-                    <a:lstStyle/>
-                    <a:p>
-                      <a:pPr algn="r" fontAlgn="b"/>
-                      <a:r>
-                        <a:rPr lang="pt-BR" sz="1100" u="none" strike="noStrike">
-                          <a:effectLst/>
-                        </a:rPr>
-                        <a:t>5</a:t>
-                      </a:r>
-                      <a:endParaRPr lang="pt-BR" sz="1100" b="0" i="0" u="none" strike="noStrike">
-                        <a:solidFill>
-                          <a:srgbClr val="000000"/>
-                        </a:solidFill>
-                        <a:effectLst/>
-                        <a:latin typeface="Calibri"/>
-                      </a:endParaRPr>
-                    </a:p>
-                  </a:txBody>
-                  <a:tcPr marL="0" marR="0" marT="0" marB="0" anchor="b"/>
-                </a:tc>
-                <a:tc>
-                  <a:txBody>
-                    <a:bodyPr/>
-                    <a:lstStyle/>
-                    <a:p>
-                      <a:pPr algn="r" fontAlgn="b"/>
-                      <a:r>
-                        <a:rPr lang="pt-BR" sz="1100" u="none" strike="noStrike">
-                          <a:effectLst/>
-                        </a:rPr>
-                        <a:t>10</a:t>
-                      </a:r>
-                      <a:endParaRPr lang="pt-BR" sz="1100" b="0" i="0" u="none" strike="noStrike">
-                        <a:solidFill>
-                          <a:srgbClr val="000000"/>
-                        </a:solidFill>
-                        <a:effectLst/>
-                        <a:latin typeface="Calibri"/>
-                      </a:endParaRPr>
-                    </a:p>
-                  </a:txBody>
-                  <a:tcPr marL="0" marR="0" marT="0" marB="0" anchor="b"/>
-                </a:tc>
-                <a:tc>
-                  <a:txBody>
-                    <a:bodyPr/>
-                    <a:lstStyle/>
-                    <a:p>
-                      <a:pPr algn="r" fontAlgn="b"/>
-                      <a:r>
-                        <a:rPr lang="pt-BR" sz="1100" u="none" strike="noStrike">
-                          <a:effectLst/>
-                        </a:rPr>
-                        <a:t>2</a:t>
-                      </a:r>
-                      <a:endParaRPr lang="pt-BR" sz="1100" b="0" i="0" u="none" strike="noStrike">
-                        <a:solidFill>
-                          <a:srgbClr val="000000"/>
-                        </a:solidFill>
-                        <a:effectLst/>
-                        <a:latin typeface="Calibri"/>
-                      </a:endParaRPr>
-                    </a:p>
-                  </a:txBody>
-                  <a:tcPr marL="0" marR="0" marT="0" marB="0" anchor="b"/>
-                </a:tc>
-                <a:tc>
-                  <a:txBody>
-                    <a:bodyPr/>
-                    <a:lstStyle/>
-                    <a:p>
-                      <a:pPr algn="r" fontAlgn="b"/>
-                      <a:r>
-                        <a:rPr lang="pt-BR" sz="1100" u="none" strike="noStrike">
-                          <a:effectLst/>
-                        </a:rPr>
-                        <a:t>4</a:t>
-                      </a:r>
-                      <a:endParaRPr lang="pt-BR" sz="1100" b="0" i="0" u="none" strike="noStrike">
-                        <a:solidFill>
-                          <a:srgbClr val="000000"/>
-                        </a:solidFill>
-                        <a:effectLst/>
-                        <a:latin typeface="Calibri"/>
-                      </a:endParaRPr>
-                    </a:p>
-                  </a:txBody>
-                  <a:tcPr marL="0" marR="0" marT="0" marB="0" anchor="b"/>
-                </a:tc>
-                <a:tc>
-                  <a:txBody>
-                    <a:bodyPr/>
-                    <a:lstStyle/>
-                    <a:p>
-                      <a:pPr algn="r" fontAlgn="b"/>
-                      <a:r>
-                        <a:rPr lang="pt-BR" sz="1100" u="none" strike="noStrike">
-                          <a:effectLst/>
-                        </a:rPr>
-                        <a:t>80</a:t>
-                      </a:r>
-                      <a:endParaRPr lang="pt-BR" sz="1100" b="0" i="0" u="none" strike="noStrike">
-                        <a:solidFill>
-                          <a:srgbClr val="000000"/>
-                        </a:solidFill>
-                        <a:effectLst/>
-                        <a:latin typeface="Calibri"/>
-                      </a:endParaRPr>
-                    </a:p>
-                  </a:txBody>
-                  <a:tcPr marL="0" marR="0" marT="0" marB="0" anchor="b"/>
-                </a:tc>
-              </a:tr>
-              <a:tr h="488288">
-                <a:tc>
-                  <a:txBody>
-                    <a:bodyPr/>
-                    <a:lstStyle/>
-                    <a:p>
-                      <a:pPr algn="l" fontAlgn="b"/>
-                      <a:r>
-                        <a:rPr lang="pt-BR" sz="1200" u="none" strike="noStrike">
-                          <a:effectLst/>
-                        </a:rPr>
-                        <a:t>UC006 - Comprar Ações</a:t>
-                      </a:r>
-                      <a:endParaRPr lang="pt-BR" sz="1200" b="1" i="0" u="none" strike="noStrike">
-                        <a:solidFill>
-                          <a:srgbClr val="000000"/>
-                        </a:solidFill>
-                        <a:effectLst/>
-                        <a:latin typeface="Arial"/>
-                      </a:endParaRPr>
-                    </a:p>
-                  </a:txBody>
-                  <a:tcPr marL="0" marR="0" marT="0" marB="0" anchor="b"/>
-                </a:tc>
-                <a:tc>
-                  <a:txBody>
-                    <a:bodyPr/>
-                    <a:lstStyle/>
-                    <a:p>
-                      <a:pPr algn="r" fontAlgn="b"/>
-                      <a:r>
-                        <a:rPr lang="pt-BR" sz="1100" u="none" strike="noStrike">
-                          <a:effectLst/>
-                        </a:rPr>
-                        <a:t>2</a:t>
-                      </a:r>
-                      <a:endParaRPr lang="pt-BR" sz="1100" b="0" i="0" u="none" strike="noStrike">
-                        <a:solidFill>
-                          <a:srgbClr val="000000"/>
-                        </a:solidFill>
-                        <a:effectLst/>
-                        <a:latin typeface="Calibri"/>
-                      </a:endParaRPr>
-                    </a:p>
-                  </a:txBody>
-                  <a:tcPr marL="0" marR="0" marT="0" marB="0" anchor="b"/>
-                </a:tc>
-                <a:tc>
-                  <a:txBody>
-                    <a:bodyPr/>
-                    <a:lstStyle/>
-                    <a:p>
-                      <a:pPr algn="r" fontAlgn="b"/>
-                      <a:r>
-                        <a:rPr lang="pt-BR" sz="1100" u="none" strike="noStrike">
-                          <a:effectLst/>
-                        </a:rPr>
-                        <a:t>5</a:t>
-                      </a:r>
-                      <a:endParaRPr lang="pt-BR" sz="1100" b="0" i="0" u="none" strike="noStrike">
-                        <a:solidFill>
-                          <a:srgbClr val="000000"/>
-                        </a:solidFill>
-                        <a:effectLst/>
-                        <a:latin typeface="Calibri"/>
-                      </a:endParaRPr>
-                    </a:p>
-                  </a:txBody>
-                  <a:tcPr marL="0" marR="0" marT="0" marB="0" anchor="b"/>
-                </a:tc>
-                <a:tc>
-                  <a:txBody>
-                    <a:bodyPr/>
-                    <a:lstStyle/>
-                    <a:p>
-                      <a:pPr algn="r" fontAlgn="b"/>
-                      <a:r>
-                        <a:rPr lang="pt-BR" sz="1100" u="none" strike="noStrike">
-                          <a:effectLst/>
-                        </a:rPr>
-                        <a:t>10</a:t>
-                      </a:r>
-                      <a:endParaRPr lang="pt-BR" sz="1100" b="0" i="0" u="none" strike="noStrike">
-                        <a:solidFill>
-                          <a:srgbClr val="000000"/>
-                        </a:solidFill>
-                        <a:effectLst/>
-                        <a:latin typeface="Calibri"/>
-                      </a:endParaRPr>
-                    </a:p>
-                  </a:txBody>
-                  <a:tcPr marL="0" marR="0" marT="0" marB="0" anchor="b"/>
-                </a:tc>
-                <a:tc>
-                  <a:txBody>
-                    <a:bodyPr/>
-                    <a:lstStyle/>
-                    <a:p>
-                      <a:pPr algn="r" fontAlgn="b"/>
-                      <a:r>
-                        <a:rPr lang="pt-BR" sz="1100" u="none" strike="noStrike">
-                          <a:effectLst/>
-                        </a:rPr>
-                        <a:t>1</a:t>
-                      </a:r>
-                      <a:endParaRPr lang="pt-BR" sz="1100" b="0" i="0" u="none" strike="noStrike">
-                        <a:solidFill>
-                          <a:srgbClr val="000000"/>
-                        </a:solidFill>
-                        <a:effectLst/>
-                        <a:latin typeface="Calibri"/>
-                      </a:endParaRPr>
-                    </a:p>
-                  </a:txBody>
-                  <a:tcPr marL="0" marR="0" marT="0" marB="0" anchor="b"/>
-                </a:tc>
-                <a:tc>
-                  <a:txBody>
-                    <a:bodyPr/>
-                    <a:lstStyle/>
-                    <a:p>
-                      <a:pPr algn="r" fontAlgn="b"/>
-                      <a:r>
-                        <a:rPr lang="pt-BR" sz="1100" u="none" strike="noStrike">
-                          <a:effectLst/>
-                        </a:rPr>
-                        <a:t>5</a:t>
-                      </a:r>
-                      <a:endParaRPr lang="pt-BR" sz="1100" b="0" i="0" u="none" strike="noStrike">
-                        <a:solidFill>
-                          <a:srgbClr val="000000"/>
-                        </a:solidFill>
-                        <a:effectLst/>
-                        <a:latin typeface="Calibri"/>
-                      </a:endParaRPr>
-                    </a:p>
-                  </a:txBody>
-                  <a:tcPr marL="0" marR="0" marT="0" marB="0" anchor="b"/>
-                </a:tc>
-                <a:tc>
-                  <a:txBody>
-                    <a:bodyPr/>
-                    <a:lstStyle/>
-                    <a:p>
-                      <a:pPr algn="r" fontAlgn="b"/>
-                      <a:r>
-                        <a:rPr lang="pt-BR" sz="1100" u="none" strike="noStrike">
-                          <a:effectLst/>
-                        </a:rPr>
-                        <a:t>50</a:t>
-                      </a:r>
-                      <a:endParaRPr lang="pt-BR" sz="1100" b="0" i="0" u="none" strike="noStrike">
-                        <a:solidFill>
-                          <a:srgbClr val="000000"/>
-                        </a:solidFill>
-                        <a:effectLst/>
-                        <a:latin typeface="Calibri"/>
-                      </a:endParaRPr>
-                    </a:p>
-                  </a:txBody>
-                  <a:tcPr marL="0" marR="0" marT="0" marB="0" anchor="b"/>
-                </a:tc>
-              </a:tr>
-              <a:tr h="488288">
-                <a:tc>
-                  <a:txBody>
-                    <a:bodyPr/>
-                    <a:lstStyle/>
-                    <a:p>
-                      <a:pPr algn="l" fontAlgn="b"/>
-                      <a:r>
-                        <a:rPr lang="pt-BR" sz="1200" u="none" strike="noStrike">
-                          <a:effectLst/>
-                        </a:rPr>
-                        <a:t>UC007 - Realizar DOC</a:t>
-                      </a:r>
-                      <a:endParaRPr lang="pt-BR" sz="1200" b="1" i="0" u="none" strike="noStrike">
-                        <a:solidFill>
-                          <a:srgbClr val="000000"/>
-                        </a:solidFill>
-                        <a:effectLst/>
-                        <a:latin typeface="Arial"/>
-                      </a:endParaRPr>
-                    </a:p>
-                  </a:txBody>
-                  <a:tcPr marL="0" marR="0" marT="0" marB="0" anchor="b"/>
-                </a:tc>
-                <a:tc>
-                  <a:txBody>
-                    <a:bodyPr/>
-                    <a:lstStyle/>
-                    <a:p>
-                      <a:pPr algn="r" fontAlgn="b"/>
-                      <a:r>
-                        <a:rPr lang="pt-BR" sz="1100" u="none" strike="noStrike">
-                          <a:effectLst/>
-                        </a:rPr>
-                        <a:t>2</a:t>
-                      </a:r>
-                      <a:endParaRPr lang="pt-BR" sz="1100" b="0" i="0" u="none" strike="noStrike">
-                        <a:solidFill>
-                          <a:srgbClr val="000000"/>
-                        </a:solidFill>
-                        <a:effectLst/>
-                        <a:latin typeface="Calibri"/>
-                      </a:endParaRPr>
-                    </a:p>
-                  </a:txBody>
-                  <a:tcPr marL="0" marR="0" marT="0" marB="0" anchor="b"/>
-                </a:tc>
-                <a:tc>
-                  <a:txBody>
-                    <a:bodyPr/>
-                    <a:lstStyle/>
-                    <a:p>
-                      <a:pPr algn="r" fontAlgn="b"/>
-                      <a:r>
-                        <a:rPr lang="pt-BR" sz="1100" u="none" strike="noStrike">
-                          <a:effectLst/>
-                        </a:rPr>
-                        <a:t>5</a:t>
-                      </a:r>
-                      <a:endParaRPr lang="pt-BR" sz="1100" b="0" i="0" u="none" strike="noStrike">
-                        <a:solidFill>
-                          <a:srgbClr val="000000"/>
-                        </a:solidFill>
-                        <a:effectLst/>
-                        <a:latin typeface="Calibri"/>
-                      </a:endParaRPr>
-                    </a:p>
-                  </a:txBody>
-                  <a:tcPr marL="0" marR="0" marT="0" marB="0" anchor="b"/>
-                </a:tc>
-                <a:tc>
-                  <a:txBody>
-                    <a:bodyPr/>
-                    <a:lstStyle/>
-                    <a:p>
-                      <a:pPr algn="r" fontAlgn="b"/>
-                      <a:r>
-                        <a:rPr lang="pt-BR" sz="1100" u="none" strike="noStrike">
-                          <a:effectLst/>
-                        </a:rPr>
-                        <a:t>10</a:t>
-                      </a:r>
-                      <a:endParaRPr lang="pt-BR" sz="1100" b="0" i="0" u="none" strike="noStrike">
-                        <a:solidFill>
-                          <a:srgbClr val="000000"/>
-                        </a:solidFill>
-                        <a:effectLst/>
-                        <a:latin typeface="Calibri"/>
-                      </a:endParaRPr>
-                    </a:p>
-                  </a:txBody>
-                  <a:tcPr marL="0" marR="0" marT="0" marB="0" anchor="b"/>
-                </a:tc>
-                <a:tc>
-                  <a:txBody>
-                    <a:bodyPr/>
-                    <a:lstStyle/>
-                    <a:p>
-                      <a:pPr algn="r" fontAlgn="b"/>
-                      <a:r>
-                        <a:rPr lang="pt-BR" sz="1100" u="none" strike="noStrike">
-                          <a:effectLst/>
-                        </a:rPr>
-                        <a:t>3</a:t>
-                      </a:r>
-                      <a:endParaRPr lang="pt-BR" sz="1100" b="0" i="0" u="none" strike="noStrike">
-                        <a:solidFill>
-                          <a:srgbClr val="000000"/>
-                        </a:solidFill>
-                        <a:effectLst/>
-                        <a:latin typeface="Calibri"/>
-                      </a:endParaRPr>
-                    </a:p>
-                  </a:txBody>
-                  <a:tcPr marL="0" marR="0" marT="0" marB="0" anchor="b"/>
-                </a:tc>
-                <a:tc>
-                  <a:txBody>
-                    <a:bodyPr/>
-                    <a:lstStyle/>
-                    <a:p>
-                      <a:pPr algn="r" fontAlgn="b"/>
-                      <a:r>
-                        <a:rPr lang="pt-BR" sz="1100" u="none" strike="noStrike">
-                          <a:effectLst/>
-                        </a:rPr>
-                        <a:t>4</a:t>
-                      </a:r>
-                      <a:endParaRPr lang="pt-BR" sz="1100" b="0" i="0" u="none" strike="noStrike">
-                        <a:solidFill>
-                          <a:srgbClr val="000000"/>
-                        </a:solidFill>
-                        <a:effectLst/>
-                        <a:latin typeface="Calibri"/>
-                      </a:endParaRPr>
-                    </a:p>
-                  </a:txBody>
-                  <a:tcPr marL="0" marR="0" marT="0" marB="0" anchor="b"/>
-                </a:tc>
-                <a:tc>
-                  <a:txBody>
-                    <a:bodyPr/>
-                    <a:lstStyle/>
-                    <a:p>
-                      <a:pPr algn="r" fontAlgn="b"/>
-                      <a:r>
-                        <a:rPr lang="pt-BR" sz="1100" u="none" strike="noStrike" dirty="0">
-                          <a:effectLst/>
-                        </a:rPr>
-                        <a:t>120</a:t>
-                      </a:r>
-                      <a:endParaRPr lang="pt-BR" sz="1100" b="0" i="0" u="none" strike="noStrike" dirty="0">
-                        <a:solidFill>
-                          <a:srgbClr val="000000"/>
-                        </a:solidFill>
-                        <a:effectLst/>
-                        <a:latin typeface="Calibri"/>
-                      </a:endParaRPr>
-                    </a:p>
-                  </a:txBody>
-                  <a:tcPr marL="0" marR="0" marT="0" marB="0" anchor="b"/>
-                </a:tc>
-              </a:tr>
-            </a:tbl>
-          </a:graphicData>
-        </a:graphic>
-      </p:graphicFrame>
+        </p:nvSpPr>
+        <p:spPr/>
+        <p:txBody>
+          <a:bodyPr/>
+          <a:lstStyle/>
+          <a:p>
+            <a:r>
+              <a:rPr lang="pt-BR" dirty="0" smtClean="0"/>
+              <a:t>Avaliação sobre diversas perspectivas:</a:t>
+            </a:r>
+          </a:p>
+          <a:p>
+            <a:pPr marL="502920" indent="-457200">
+              <a:buFont typeface="+mj-lt"/>
+              <a:buAutoNum type="arabicPeriod"/>
+            </a:pPr>
+            <a:r>
+              <a:rPr lang="pt-BR" dirty="0" smtClean="0"/>
+              <a:t>Impacto.</a:t>
+            </a:r>
+          </a:p>
+          <a:p>
+            <a:pPr marL="502920" indent="-457200">
+              <a:buFont typeface="+mj-lt"/>
+              <a:buAutoNum type="arabicPeriod"/>
+            </a:pPr>
+            <a:r>
+              <a:rPr lang="pt-BR" dirty="0" smtClean="0"/>
+              <a:t>Probabilidade.</a:t>
+            </a:r>
+          </a:p>
+          <a:p>
+            <a:pPr marL="502920" indent="-457200">
+              <a:buFont typeface="+mj-lt"/>
+              <a:buAutoNum type="arabicPeriod"/>
+            </a:pPr>
+            <a:r>
+              <a:rPr lang="pt-BR" dirty="0" smtClean="0"/>
+              <a:t>Risco avaliado.</a:t>
+            </a:r>
+          </a:p>
+          <a:p>
+            <a:pPr marL="502920" indent="-457200">
+              <a:buFont typeface="+mj-lt"/>
+              <a:buAutoNum type="arabicPeriod"/>
+            </a:pPr>
+            <a:r>
+              <a:rPr lang="pt-BR" dirty="0" smtClean="0"/>
+              <a:t>Frequência.</a:t>
+            </a:r>
+          </a:p>
+          <a:p>
+            <a:pPr marL="502920" indent="-457200">
+              <a:buFont typeface="+mj-lt"/>
+              <a:buAutoNum type="arabicPeriod"/>
+            </a:pPr>
+            <a:r>
+              <a:rPr lang="pt-BR" dirty="0" smtClean="0"/>
+              <a:t>Importância.</a:t>
+            </a:r>
+          </a:p>
+          <a:p>
+            <a:pPr marL="502920" indent="-457200">
+              <a:buFont typeface="+mj-lt"/>
+              <a:buAutoNum type="arabicPeriod"/>
+            </a:pPr>
+            <a:endParaRPr lang="pt-BR" dirty="0" smtClean="0"/>
+          </a:p>
+          <a:p>
+            <a:endParaRPr lang="pt-BR" dirty="0"/>
+          </a:p>
+        </p:txBody>
+      </p:sp>
     </p:spTree>
     <p:extLst>
       <p:ext uri="{BB962C8B-B14F-4D97-AF65-F5344CB8AC3E}">
-        <p14:creationId xmlns:p14="http://schemas.microsoft.com/office/powerpoint/2010/main" val="1511145347"/>
+        <p14:creationId xmlns:p14="http://schemas.microsoft.com/office/powerpoint/2010/main" val="3222259095"/>
       </p:ext>
     </p:extLst>
   </p:cSld>
   <p:clrMapOvr>
     <a:masterClrMapping/>
   </p:clrMapOvr>
-  <mc:AlternateContent xmlns:mc="http://schemas.openxmlformats.org/markup-compatibility/2006" xmlns:p14="http://schemas.microsoft.com/office/powerpoint/2010/main">
-    <mc:Choice Requires="p14">
+  <mc:AlternateContent xmlns:mc="http://schemas.openxmlformats.org/markup-compatibility/2006">
+    <mc:Choice xmlns:p14="http://schemas.microsoft.com/office/powerpoint/2010/main" Requires="p14">
       <p:transition spd="med" p14:dur="700">
         <p:fade/>
       </p:transition>
     </mc:Choice>
-    <mc:Fallback xmlns="">
+    <mc:Fallback>
       <p:transition spd="med">
         <p:fade/>
       </p:transition>
     </mc:Fallback>
   </mc:AlternateContent>
-  <p:timing>
-    <p:tnLst>
-      <p:par>
-        <p:cTn id="1" dur="indefinite" restart="never" nodeType="tmRoot"/>
-      </p:par>
-    </p:tnLst>
-  </p:timing>
 </p:sld>
 </file>
 

</xml_diff>

<commit_message>
atualização do slides 10
</commit_message>
<xml_diff>
--- a/Requisitos/Plano de Projeto 1.pptx
+++ b/Requisitos/Plano de Projeto 1.pptx
@@ -132,7 +132,7 @@
   </p:defaultTextStyle>
   <p:extLst>
     <p:ext uri="{EFAFB233-063F-42B5-8137-9DF3F51BA10A}">
-      <p15:sldGuideLst xmlns:p15="http://schemas.microsoft.com/office/powerpoint/2012/main" xmlns="">
+      <p15:sldGuideLst xmlns="" xmlns:p15="http://schemas.microsoft.com/office/powerpoint/2012/main">
         <p15:guide id="1" pos="3840" userDrawn="1">
           <p15:clr>
             <a:srgbClr val="A4A3A4"/>
@@ -156,7 +156,7 @@
       </p15:sldGuideLst>
     </p:ext>
     <p:ext uri="{2D200454-40CA-4A62-9FC3-DE9A4176ACB9}">
-      <p15:notesGuideLst xmlns:p15="http://schemas.microsoft.com/office/powerpoint/2012/main" xmlns=""/>
+      <p15:notesGuideLst xmlns="" xmlns:p15="http://schemas.microsoft.com/office/powerpoint/2012/main"/>
     </p:ext>
   </p:extLst>
 </p:presentation>
@@ -1836,6 +1836,13 @@
         </dgm:presLayoutVars>
       </dgm:prSet>
       <dgm:spPr/>
+      <dgm:t>
+        <a:bodyPr/>
+        <a:lstStyle/>
+        <a:p>
+          <a:endParaRPr lang="pt-BR"/>
+        </a:p>
+      </dgm:t>
     </dgm:pt>
     <dgm:pt modelId="{27D8DB77-FF1C-413B-8A8B-6CD183D7B6BB}" type="pres">
       <dgm:prSet presAssocID="{AD569CF3-5D42-4B67-AEA1-8CBE56980F3F}" presName="hierRoot1" presStyleCnt="0">
@@ -1867,6 +1874,13 @@
     <dgm:pt modelId="{B7C9DDA8-97E8-421E-9078-F7F9C7075D65}" type="pres">
       <dgm:prSet presAssocID="{AD569CF3-5D42-4B67-AEA1-8CBE56980F3F}" presName="rootConnector1" presStyleLbl="node1" presStyleIdx="0" presStyleCnt="0"/>
       <dgm:spPr/>
+      <dgm:t>
+        <a:bodyPr/>
+        <a:lstStyle/>
+        <a:p>
+          <a:endParaRPr lang="pt-BR"/>
+        </a:p>
+      </dgm:t>
     </dgm:pt>
     <dgm:pt modelId="{01C04216-808C-475E-A642-0B27697A7C26}" type="pres">
       <dgm:prSet presAssocID="{AD569CF3-5D42-4B67-AEA1-8CBE56980F3F}" presName="hierChild2" presStyleCnt="0"/>
@@ -1875,6 +1889,13 @@
     <dgm:pt modelId="{A4D3D2D0-D16E-421A-9EE2-7C0DFAEE0E74}" type="pres">
       <dgm:prSet presAssocID="{D9C4EDFA-538C-4B69-BE44-972491B0B302}" presName="Name37" presStyleLbl="parChTrans1D2" presStyleIdx="0" presStyleCnt="3"/>
       <dgm:spPr/>
+      <dgm:t>
+        <a:bodyPr/>
+        <a:lstStyle/>
+        <a:p>
+          <a:endParaRPr lang="pt-BR"/>
+        </a:p>
+      </dgm:t>
     </dgm:pt>
     <dgm:pt modelId="{CF78AC8A-E4E9-471E-9CA1-52503C6FD83C}" type="pres">
       <dgm:prSet presAssocID="{EBF9CF10-D805-424C-AD6C-9D6E77E23E70}" presName="hierRoot2" presStyleCnt="0">
@@ -1895,10 +1916,24 @@
         </dgm:presLayoutVars>
       </dgm:prSet>
       <dgm:spPr/>
+      <dgm:t>
+        <a:bodyPr/>
+        <a:lstStyle/>
+        <a:p>
+          <a:endParaRPr lang="pt-BR"/>
+        </a:p>
+      </dgm:t>
     </dgm:pt>
     <dgm:pt modelId="{EB6B53AB-9F0C-4339-B96B-6B0B27F118C6}" type="pres">
       <dgm:prSet presAssocID="{EBF9CF10-D805-424C-AD6C-9D6E77E23E70}" presName="rootConnector" presStyleLbl="node2" presStyleIdx="0" presStyleCnt="3"/>
       <dgm:spPr/>
+      <dgm:t>
+        <a:bodyPr/>
+        <a:lstStyle/>
+        <a:p>
+          <a:endParaRPr lang="pt-BR"/>
+        </a:p>
+      </dgm:t>
     </dgm:pt>
     <dgm:pt modelId="{2404AFDD-388D-46CA-8BE0-A30384894727}" type="pres">
       <dgm:prSet presAssocID="{EBF9CF10-D805-424C-AD6C-9D6E77E23E70}" presName="hierChild4" presStyleCnt="0"/>
@@ -1911,6 +1946,13 @@
     <dgm:pt modelId="{C9B068A5-9141-4275-9947-5C7396E47D9C}" type="pres">
       <dgm:prSet presAssocID="{7DEE6A50-160F-491E-96DB-7D7F806F17B8}" presName="Name37" presStyleLbl="parChTrans1D2" presStyleIdx="1" presStyleCnt="3"/>
       <dgm:spPr/>
+      <dgm:t>
+        <a:bodyPr/>
+        <a:lstStyle/>
+        <a:p>
+          <a:endParaRPr lang="pt-BR"/>
+        </a:p>
+      </dgm:t>
     </dgm:pt>
     <dgm:pt modelId="{2FC82163-B899-4B43-BBFF-D5F294C8B99D}" type="pres">
       <dgm:prSet presAssocID="{049C924B-E243-42FE-96F6-3BB0A8423257}" presName="hierRoot2" presStyleCnt="0">
@@ -1931,10 +1973,24 @@
         </dgm:presLayoutVars>
       </dgm:prSet>
       <dgm:spPr/>
+      <dgm:t>
+        <a:bodyPr/>
+        <a:lstStyle/>
+        <a:p>
+          <a:endParaRPr lang="pt-BR"/>
+        </a:p>
+      </dgm:t>
     </dgm:pt>
     <dgm:pt modelId="{659567BB-66AE-4178-9C2C-1DDBB8B82114}" type="pres">
       <dgm:prSet presAssocID="{049C924B-E243-42FE-96F6-3BB0A8423257}" presName="rootConnector" presStyleLbl="node2" presStyleIdx="1" presStyleCnt="3"/>
       <dgm:spPr/>
+      <dgm:t>
+        <a:bodyPr/>
+        <a:lstStyle/>
+        <a:p>
+          <a:endParaRPr lang="pt-BR"/>
+        </a:p>
+      </dgm:t>
     </dgm:pt>
     <dgm:pt modelId="{2B09A13F-4220-4C52-8067-C877CBA4EB8C}" type="pres">
       <dgm:prSet presAssocID="{049C924B-E243-42FE-96F6-3BB0A8423257}" presName="hierChild4" presStyleCnt="0"/>
@@ -1947,6 +2003,13 @@
     <dgm:pt modelId="{03C39EF9-4FCB-4D65-A749-FE3CB0755B87}" type="pres">
       <dgm:prSet presAssocID="{A75285FE-7E2D-4EB4-98AD-E695AF3F91DD}" presName="Name37" presStyleLbl="parChTrans1D2" presStyleIdx="2" presStyleCnt="3"/>
       <dgm:spPr/>
+      <dgm:t>
+        <a:bodyPr/>
+        <a:lstStyle/>
+        <a:p>
+          <a:endParaRPr lang="pt-BR"/>
+        </a:p>
+      </dgm:t>
     </dgm:pt>
     <dgm:pt modelId="{6EC007FC-4485-41CC-B827-1F251D34EF7A}" type="pres">
       <dgm:prSet presAssocID="{3494E69D-B5FA-4233-8694-67059A5B79CE}" presName="hierRoot2" presStyleCnt="0">
@@ -1967,10 +2030,24 @@
         </dgm:presLayoutVars>
       </dgm:prSet>
       <dgm:spPr/>
+      <dgm:t>
+        <a:bodyPr/>
+        <a:lstStyle/>
+        <a:p>
+          <a:endParaRPr lang="pt-BR"/>
+        </a:p>
+      </dgm:t>
     </dgm:pt>
     <dgm:pt modelId="{E016C4F5-878F-4175-804C-C4F2285C040F}" type="pres">
       <dgm:prSet presAssocID="{3494E69D-B5FA-4233-8694-67059A5B79CE}" presName="rootConnector" presStyleLbl="node2" presStyleIdx="2" presStyleCnt="3"/>
       <dgm:spPr/>
+      <dgm:t>
+        <a:bodyPr/>
+        <a:lstStyle/>
+        <a:p>
+          <a:endParaRPr lang="pt-BR"/>
+        </a:p>
+      </dgm:t>
     </dgm:pt>
     <dgm:pt modelId="{EF96EAEF-0E10-4DA3-BCB2-AAA68AD4572B}" type="pres">
       <dgm:prSet presAssocID="{3494E69D-B5FA-4233-8694-67059A5B79CE}" presName="hierChild4" presStyleCnt="0"/>
@@ -1986,22 +2063,22 @@
     </dgm:pt>
   </dgm:ptLst>
   <dgm:cxnLst>
+    <dgm:cxn modelId="{E2AF0D69-37C8-46CB-B10C-72D8A8F1042E}" type="presOf" srcId="{D9C4EDFA-538C-4B69-BE44-972491B0B302}" destId="{A4D3D2D0-D16E-421A-9EE2-7C0DFAEE0E74}" srcOrd="0" destOrd="0" presId="urn:microsoft.com/office/officeart/2005/8/layout/orgChart1"/>
+    <dgm:cxn modelId="{4AAC60B3-5B2E-4912-B39F-8E7175090017}" srcId="{AD569CF3-5D42-4B67-AEA1-8CBE56980F3F}" destId="{EBF9CF10-D805-424C-AD6C-9D6E77E23E70}" srcOrd="0" destOrd="0" parTransId="{D9C4EDFA-538C-4B69-BE44-972491B0B302}" sibTransId="{F9E74727-C084-4451-9ADC-73817852608D}"/>
+    <dgm:cxn modelId="{08858B74-9AE6-4FC0-9B66-E290E9ED8E5D}" type="presOf" srcId="{7DEE6A50-160F-491E-96DB-7D7F806F17B8}" destId="{C9B068A5-9141-4275-9947-5C7396E47D9C}" srcOrd="0" destOrd="0" presId="urn:microsoft.com/office/officeart/2005/8/layout/orgChart1"/>
+    <dgm:cxn modelId="{90DFE98A-4482-41E7-BA8E-38D775EBD442}" type="presOf" srcId="{049C924B-E243-42FE-96F6-3BB0A8423257}" destId="{659567BB-66AE-4178-9C2C-1DDBB8B82114}" srcOrd="1" destOrd="0" presId="urn:microsoft.com/office/officeart/2005/8/layout/orgChart1"/>
+    <dgm:cxn modelId="{931E1BDB-E86A-4C16-9E7A-5F341CBC047C}" type="presOf" srcId="{C431F521-54F6-4730-B188-6C177D95BF56}" destId="{8720D95E-BD6C-45BF-BF21-62AF619B551F}" srcOrd="0" destOrd="0" presId="urn:microsoft.com/office/officeart/2005/8/layout/orgChart1"/>
+    <dgm:cxn modelId="{781F09DF-D4EE-4AB6-82CD-22F64ECD64A9}" srcId="{AD569CF3-5D42-4B67-AEA1-8CBE56980F3F}" destId="{3494E69D-B5FA-4233-8694-67059A5B79CE}" srcOrd="2" destOrd="0" parTransId="{A75285FE-7E2D-4EB4-98AD-E695AF3F91DD}" sibTransId="{D19A7BC5-3C9B-4092-A08E-070B4DB81BD3}"/>
+    <dgm:cxn modelId="{E1219044-6E48-4842-BFDE-727740306009}" type="presOf" srcId="{3494E69D-B5FA-4233-8694-67059A5B79CE}" destId="{9A445E9E-D17C-4F11-AC06-22A6227CD0F6}" srcOrd="0" destOrd="0" presId="urn:microsoft.com/office/officeart/2005/8/layout/orgChart1"/>
+    <dgm:cxn modelId="{23A0E033-8CBF-49CF-AC68-3A23EB699D0E}" type="presOf" srcId="{AD569CF3-5D42-4B67-AEA1-8CBE56980F3F}" destId="{AA536D3E-6CC0-403A-A99C-50DB5A34A0FC}" srcOrd="0" destOrd="0" presId="urn:microsoft.com/office/officeart/2005/8/layout/orgChart1"/>
+    <dgm:cxn modelId="{DE20EBFC-1A69-480C-8653-E5BD9703E2D4}" type="presOf" srcId="{EBF9CF10-D805-424C-AD6C-9D6E77E23E70}" destId="{10B6504C-1BB4-4180-BBA5-33AC419621AB}" srcOrd="0" destOrd="0" presId="urn:microsoft.com/office/officeart/2005/8/layout/orgChart1"/>
+    <dgm:cxn modelId="{4C685DC4-656E-4D3C-806F-082D70F3C357}" type="presOf" srcId="{EBF9CF10-D805-424C-AD6C-9D6E77E23E70}" destId="{EB6B53AB-9F0C-4339-B96B-6B0B27F118C6}" srcOrd="1" destOrd="0" presId="urn:microsoft.com/office/officeart/2005/8/layout/orgChart1"/>
+    <dgm:cxn modelId="{DD32E167-82EE-44C7-9AFF-5A6C478A65D6}" type="presOf" srcId="{AD569CF3-5D42-4B67-AEA1-8CBE56980F3F}" destId="{B7C9DDA8-97E8-421E-9078-F7F9C7075D65}" srcOrd="1" destOrd="0" presId="urn:microsoft.com/office/officeart/2005/8/layout/orgChart1"/>
+    <dgm:cxn modelId="{CA6D3000-83AF-41E3-A69F-03A12A705928}" type="presOf" srcId="{3494E69D-B5FA-4233-8694-67059A5B79CE}" destId="{E016C4F5-878F-4175-804C-C4F2285C040F}" srcOrd="1" destOrd="0" presId="urn:microsoft.com/office/officeart/2005/8/layout/orgChart1"/>
     <dgm:cxn modelId="{A3328D1B-6AE7-48A9-87BC-6443C1C98AE5}" srcId="{C431F521-54F6-4730-B188-6C177D95BF56}" destId="{AD569CF3-5D42-4B67-AEA1-8CBE56980F3F}" srcOrd="0" destOrd="0" parTransId="{407EFE59-5491-4514-A224-8A02DF931288}" sibTransId="{3D5624D2-B6AD-414B-A221-F475C8E16B94}"/>
-    <dgm:cxn modelId="{90DFE98A-4482-41E7-BA8E-38D775EBD442}" type="presOf" srcId="{049C924B-E243-42FE-96F6-3BB0A8423257}" destId="{659567BB-66AE-4178-9C2C-1DDBB8B82114}" srcOrd="1" destOrd="0" presId="urn:microsoft.com/office/officeart/2005/8/layout/orgChart1"/>
+    <dgm:cxn modelId="{B79DC2B1-E545-48AF-A65C-C69321C8BCDE}" srcId="{AD569CF3-5D42-4B67-AEA1-8CBE56980F3F}" destId="{049C924B-E243-42FE-96F6-3BB0A8423257}" srcOrd="1" destOrd="0" parTransId="{7DEE6A50-160F-491E-96DB-7D7F806F17B8}" sibTransId="{F4AA1B32-26EF-4502-9C64-3790EB27AEFC}"/>
+    <dgm:cxn modelId="{DCB5D1CB-51C7-4727-BB84-96E679B67020}" type="presOf" srcId="{A75285FE-7E2D-4EB4-98AD-E695AF3F91DD}" destId="{03C39EF9-4FCB-4D65-A749-FE3CB0755B87}" srcOrd="0" destOrd="0" presId="urn:microsoft.com/office/officeart/2005/8/layout/orgChart1"/>
     <dgm:cxn modelId="{12E757D2-7E36-4175-9A11-95E83BD4A5DE}" type="presOf" srcId="{049C924B-E243-42FE-96F6-3BB0A8423257}" destId="{DC6162D4-47F6-41F7-8888-BD85E334D4E5}" srcOrd="0" destOrd="0" presId="urn:microsoft.com/office/officeart/2005/8/layout/orgChart1"/>
-    <dgm:cxn modelId="{B79DC2B1-E545-48AF-A65C-C69321C8BCDE}" srcId="{AD569CF3-5D42-4B67-AEA1-8CBE56980F3F}" destId="{049C924B-E243-42FE-96F6-3BB0A8423257}" srcOrd="1" destOrd="0" parTransId="{7DEE6A50-160F-491E-96DB-7D7F806F17B8}" sibTransId="{F4AA1B32-26EF-4502-9C64-3790EB27AEFC}"/>
-    <dgm:cxn modelId="{E2AF0D69-37C8-46CB-B10C-72D8A8F1042E}" type="presOf" srcId="{D9C4EDFA-538C-4B69-BE44-972491B0B302}" destId="{A4D3D2D0-D16E-421A-9EE2-7C0DFAEE0E74}" srcOrd="0" destOrd="0" presId="urn:microsoft.com/office/officeart/2005/8/layout/orgChart1"/>
-    <dgm:cxn modelId="{DD32E167-82EE-44C7-9AFF-5A6C478A65D6}" type="presOf" srcId="{AD569CF3-5D42-4B67-AEA1-8CBE56980F3F}" destId="{B7C9DDA8-97E8-421E-9078-F7F9C7075D65}" srcOrd="1" destOrd="0" presId="urn:microsoft.com/office/officeart/2005/8/layout/orgChart1"/>
-    <dgm:cxn modelId="{E1219044-6E48-4842-BFDE-727740306009}" type="presOf" srcId="{3494E69D-B5FA-4233-8694-67059A5B79CE}" destId="{9A445E9E-D17C-4F11-AC06-22A6227CD0F6}" srcOrd="0" destOrd="0" presId="urn:microsoft.com/office/officeart/2005/8/layout/orgChart1"/>
-    <dgm:cxn modelId="{4AAC60B3-5B2E-4912-B39F-8E7175090017}" srcId="{AD569CF3-5D42-4B67-AEA1-8CBE56980F3F}" destId="{EBF9CF10-D805-424C-AD6C-9D6E77E23E70}" srcOrd="0" destOrd="0" parTransId="{D9C4EDFA-538C-4B69-BE44-972491B0B302}" sibTransId="{F9E74727-C084-4451-9ADC-73817852608D}"/>
-    <dgm:cxn modelId="{4C685DC4-656E-4D3C-806F-082D70F3C357}" type="presOf" srcId="{EBF9CF10-D805-424C-AD6C-9D6E77E23E70}" destId="{EB6B53AB-9F0C-4339-B96B-6B0B27F118C6}" srcOrd="1" destOrd="0" presId="urn:microsoft.com/office/officeart/2005/8/layout/orgChart1"/>
-    <dgm:cxn modelId="{DE20EBFC-1A69-480C-8653-E5BD9703E2D4}" type="presOf" srcId="{EBF9CF10-D805-424C-AD6C-9D6E77E23E70}" destId="{10B6504C-1BB4-4180-BBA5-33AC419621AB}" srcOrd="0" destOrd="0" presId="urn:microsoft.com/office/officeart/2005/8/layout/orgChart1"/>
-    <dgm:cxn modelId="{CA6D3000-83AF-41E3-A69F-03A12A705928}" type="presOf" srcId="{3494E69D-B5FA-4233-8694-67059A5B79CE}" destId="{E016C4F5-878F-4175-804C-C4F2285C040F}" srcOrd="1" destOrd="0" presId="urn:microsoft.com/office/officeart/2005/8/layout/orgChart1"/>
-    <dgm:cxn modelId="{23A0E033-8CBF-49CF-AC68-3A23EB699D0E}" type="presOf" srcId="{AD569CF3-5D42-4B67-AEA1-8CBE56980F3F}" destId="{AA536D3E-6CC0-403A-A99C-50DB5A34A0FC}" srcOrd="0" destOrd="0" presId="urn:microsoft.com/office/officeart/2005/8/layout/orgChart1"/>
-    <dgm:cxn modelId="{931E1BDB-E86A-4C16-9E7A-5F341CBC047C}" type="presOf" srcId="{C431F521-54F6-4730-B188-6C177D95BF56}" destId="{8720D95E-BD6C-45BF-BF21-62AF619B551F}" srcOrd="0" destOrd="0" presId="urn:microsoft.com/office/officeart/2005/8/layout/orgChart1"/>
-    <dgm:cxn modelId="{DCB5D1CB-51C7-4727-BB84-96E679B67020}" type="presOf" srcId="{A75285FE-7E2D-4EB4-98AD-E695AF3F91DD}" destId="{03C39EF9-4FCB-4D65-A749-FE3CB0755B87}" srcOrd="0" destOrd="0" presId="urn:microsoft.com/office/officeart/2005/8/layout/orgChart1"/>
-    <dgm:cxn modelId="{781F09DF-D4EE-4AB6-82CD-22F64ECD64A9}" srcId="{AD569CF3-5D42-4B67-AEA1-8CBE56980F3F}" destId="{3494E69D-B5FA-4233-8694-67059A5B79CE}" srcOrd="2" destOrd="0" parTransId="{A75285FE-7E2D-4EB4-98AD-E695AF3F91DD}" sibTransId="{D19A7BC5-3C9B-4092-A08E-070B4DB81BD3}"/>
-    <dgm:cxn modelId="{08858B74-9AE6-4FC0-9B66-E290E9ED8E5D}" type="presOf" srcId="{7DEE6A50-160F-491E-96DB-7D7F806F17B8}" destId="{C9B068A5-9141-4275-9947-5C7396E47D9C}" srcOrd="0" destOrd="0" presId="urn:microsoft.com/office/officeart/2005/8/layout/orgChart1"/>
     <dgm:cxn modelId="{2B603539-2CED-432B-8F42-B2090441DD40}" type="presParOf" srcId="{8720D95E-BD6C-45BF-BF21-62AF619B551F}" destId="{27D8DB77-FF1C-413B-8A8B-6CD183D7B6BB}" srcOrd="0" destOrd="0" presId="urn:microsoft.com/office/officeart/2005/8/layout/orgChart1"/>
     <dgm:cxn modelId="{9C3A8778-8E25-4517-9CE0-01D18F3D5A1B}" type="presParOf" srcId="{27D8DB77-FF1C-413B-8A8B-6CD183D7B6BB}" destId="{64692C1B-A53D-4F81-BE9D-D786F6166C08}" srcOrd="0" destOrd="0" presId="urn:microsoft.com/office/officeart/2005/8/layout/orgChart1"/>
     <dgm:cxn modelId="{F2EB8275-F046-4EB5-BF6B-6BFF6A623B18}" type="presParOf" srcId="{64692C1B-A53D-4F81-BE9D-D786F6166C08}" destId="{AA536D3E-6CC0-403A-A99C-50DB5A34A0FC}" srcOrd="0" destOrd="0" presId="urn:microsoft.com/office/officeart/2005/8/layout/orgChart1"/>
@@ -3666,35 +3743,35 @@
     </dgm:pt>
   </dgm:ptLst>
   <dgm:cxnLst>
+    <dgm:cxn modelId="{918FC998-3E81-4E2A-A8E0-FB3EB04E2705}" srcId="{0F9F144E-5A69-4079-9CFE-833FB141B5B7}" destId="{A766E2ED-C2E8-4E07-AF18-7EC57476A5C8}" srcOrd="1" destOrd="0" parTransId="{A1530F03-6C5E-45D7-8222-AD175A7090BD}" sibTransId="{05B31AC5-A983-4FEC-B0BE-EB0462CF6128}"/>
+    <dgm:cxn modelId="{41BAC73D-C909-4828-81D3-F16502305163}" type="presOf" srcId="{8665C39E-B30E-4258-BEA9-83E0F7084606}" destId="{85B657F5-5C9C-42F8-A245-10BA7A824404}" srcOrd="0" destOrd="0" presId="urn:microsoft.com/office/officeart/2005/8/layout/lProcess2"/>
+    <dgm:cxn modelId="{8D6B5497-475C-46A9-805D-510F815F9B98}" srcId="{7592B694-086D-4180-B053-CE7AD13C9858}" destId="{8665C39E-B30E-4258-BEA9-83E0F7084606}" srcOrd="0" destOrd="0" parTransId="{8211EBE3-1C93-4CFB-BBEE-7A708996ED07}" sibTransId="{6779ED75-3327-4C98-9C89-1343058D49BC}"/>
+    <dgm:cxn modelId="{BA343F65-7063-4A06-9692-19E81201F0CA}" type="presOf" srcId="{7DCD12F6-9D96-4CEE-B77D-0059BD9F172C}" destId="{60B6E648-ADB0-4695-B9EA-290DF28C1E3A}" srcOrd="0" destOrd="0" presId="urn:microsoft.com/office/officeart/2005/8/layout/lProcess2"/>
+    <dgm:cxn modelId="{696FC290-58F8-4B0A-B325-8A4CDCEFC93C}" srcId="{DF4857E7-5C40-4E4D-8F9E-0F40BE240B2F}" destId="{0F9F144E-5A69-4079-9CFE-833FB141B5B7}" srcOrd="0" destOrd="0" parTransId="{5295059C-89BD-48FC-9FB0-63BD38C2AF52}" sibTransId="{FAB8FA54-A1F3-488D-B823-07CCB71E4D44}"/>
+    <dgm:cxn modelId="{8AD144FB-65EB-4E0A-BBFB-81923B833C5B}" type="presOf" srcId="{F5E45C32-85BB-467F-80E6-A808871E72F3}" destId="{E7B9CF75-AF6A-4290-854A-077BB9A2D77C}" srcOrd="0" destOrd="0" presId="urn:microsoft.com/office/officeart/2005/8/layout/lProcess2"/>
+    <dgm:cxn modelId="{337C532E-FA4C-4DE5-902B-AF62654DE2CD}" type="presOf" srcId="{0F9F144E-5A69-4079-9CFE-833FB141B5B7}" destId="{F032D9DC-6E96-4533-82F7-966FA94900AA}" srcOrd="1" destOrd="0" presId="urn:microsoft.com/office/officeart/2005/8/layout/lProcess2"/>
+    <dgm:cxn modelId="{EAD02916-CE0D-4F3F-A82E-33F10B159D8E}" type="presOf" srcId="{512A4932-71C2-4AF1-A35F-4F4632F17C02}" destId="{51239DC3-E9A2-43DA-8F69-23A0808C5F7B}" srcOrd="0" destOrd="0" presId="urn:microsoft.com/office/officeart/2005/8/layout/lProcess2"/>
+    <dgm:cxn modelId="{42032CCC-41F9-4B3F-A503-E38701F4AC02}" srcId="{7592B694-086D-4180-B053-CE7AD13C9858}" destId="{512A4932-71C2-4AF1-A35F-4F4632F17C02}" srcOrd="1" destOrd="0" parTransId="{47E31259-60CB-40FB-B391-CCAEC2189164}" sibTransId="{4C7C1C5B-4033-4A4C-87E1-4A3C60B720B7}"/>
+    <dgm:cxn modelId="{4F69C728-D27E-4664-B39F-E552BD0B15C4}" type="presOf" srcId="{68DE1B8C-EBBC-4ACF-AD69-E108E4A8C85C}" destId="{A9276CF6-D6BB-4D87-85EE-C74A56417B50}" srcOrd="1" destOrd="0" presId="urn:microsoft.com/office/officeart/2005/8/layout/lProcess2"/>
+    <dgm:cxn modelId="{3BB736BE-339A-4657-B981-F9F1F8D52FDC}" type="presOf" srcId="{A766E2ED-C2E8-4E07-AF18-7EC57476A5C8}" destId="{D88EF221-1E19-407F-A109-45D126E6B0AD}" srcOrd="0" destOrd="0" presId="urn:microsoft.com/office/officeart/2005/8/layout/lProcess2"/>
+    <dgm:cxn modelId="{ECB29E32-DF3F-494F-B7BB-9C8BD137B048}" type="presOf" srcId="{FA9C7340-018E-4F73-A402-B7FF8C34CDC0}" destId="{BD436606-D1DD-4535-A521-C5E4F9743128}" srcOrd="0" destOrd="0" presId="urn:microsoft.com/office/officeart/2005/8/layout/lProcess2"/>
+    <dgm:cxn modelId="{8BF652A8-B747-4011-8997-2C8E587087B9}" srcId="{68DE1B8C-EBBC-4ACF-AD69-E108E4A8C85C}" destId="{7DCD12F6-9D96-4CEE-B77D-0059BD9F172C}" srcOrd="1" destOrd="0" parTransId="{05220267-9773-4777-8E6B-2437F9979F0B}" sibTransId="{89843E98-8750-44A8-9562-C70EE7FD83F4}"/>
+    <dgm:cxn modelId="{E3AEEE63-0D70-4A65-B4AD-DC3DBA17985A}" type="presOf" srcId="{7592B694-086D-4180-B053-CE7AD13C9858}" destId="{B6E9B2AA-8010-4FAB-90D2-72717C05AE96}" srcOrd="1" destOrd="0" presId="urn:microsoft.com/office/officeart/2005/8/layout/lProcess2"/>
+    <dgm:cxn modelId="{82ECE00E-C99F-43DA-83F9-38CFC3F7A2FA}" type="presOf" srcId="{DF4857E7-5C40-4E4D-8F9E-0F40BE240B2F}" destId="{4514D2E9-87FF-454C-A554-FD761A8568C7}" srcOrd="0" destOrd="0" presId="urn:microsoft.com/office/officeart/2005/8/layout/lProcess2"/>
+    <dgm:cxn modelId="{58D7B72C-6638-4F5D-945E-9420F8FE7097}" type="presOf" srcId="{7592B694-086D-4180-B053-CE7AD13C9858}" destId="{6E5A89BC-14D8-4DAA-BBC1-B070DD5BD626}" srcOrd="0" destOrd="0" presId="urn:microsoft.com/office/officeart/2005/8/layout/lProcess2"/>
+    <dgm:cxn modelId="{583CC615-DAE7-4276-AD9F-C578D26FEDFC}" srcId="{DF4857E7-5C40-4E4D-8F9E-0F40BE240B2F}" destId="{7592B694-086D-4180-B053-CE7AD13C9858}" srcOrd="2" destOrd="0" parTransId="{C8FADD59-ED12-44D1-A076-7A13B0AC344E}" sibTransId="{34A6F1FD-1787-4988-A7E6-472B7C66BD09}"/>
+    <dgm:cxn modelId="{C3F684FE-A0E7-411B-A303-2C8155B38D48}" srcId="{DF4857E7-5C40-4E4D-8F9E-0F40BE240B2F}" destId="{F5E45C32-85BB-467F-80E6-A808871E72F3}" srcOrd="1" destOrd="0" parTransId="{FAB096C4-43F1-4FB0-A740-B5A33490B558}" sibTransId="{F29CEF7E-7A2A-457D-9BE3-75C08A423C81}"/>
+    <dgm:cxn modelId="{7C9C3A38-6D50-4AFF-AA73-365DE43285E1}" type="presOf" srcId="{32074760-1CE6-4EA9-A667-33C7E19C2D94}" destId="{A8FD0D76-AFC6-4802-9090-E980FDBECC91}" srcOrd="0" destOrd="0" presId="urn:microsoft.com/office/officeart/2005/8/layout/lProcess2"/>
+    <dgm:cxn modelId="{6F5081CF-24CF-4E2C-8683-D130E3B3E5C7}" type="presOf" srcId="{F5E45C32-85BB-467F-80E6-A808871E72F3}" destId="{2487EB6F-DE81-4509-80D3-3047844600F3}" srcOrd="1" destOrd="0" presId="urn:microsoft.com/office/officeart/2005/8/layout/lProcess2"/>
+    <dgm:cxn modelId="{C664844B-280E-4BFE-9C14-BBB1B2BC2C91}" type="presOf" srcId="{6193ECAA-3925-487F-ADF8-CE1362754FFF}" destId="{5CE69C38-1462-4F71-A252-F397C9008295}" srcOrd="0" destOrd="0" presId="urn:microsoft.com/office/officeart/2005/8/layout/lProcess2"/>
+    <dgm:cxn modelId="{DEF1C201-34B1-4882-8DBF-B07106CA401E}" type="presOf" srcId="{8C9EF0B8-B348-4F26-938D-6A3D8F1D01C9}" destId="{EF50A355-5315-401C-A8B8-05A2B4F30FE3}" srcOrd="0" destOrd="0" presId="urn:microsoft.com/office/officeart/2005/8/layout/lProcess2"/>
+    <dgm:cxn modelId="{FA16C23C-5596-42A1-981A-487742CF3BBD}" srcId="{F5E45C32-85BB-467F-80E6-A808871E72F3}" destId="{6193ECAA-3925-487F-ADF8-CE1362754FFF}" srcOrd="0" destOrd="0" parTransId="{CA95F830-F096-4B8A-8E76-097EF46A4F44}" sibTransId="{4C2F44CE-5AB4-4FFE-B037-FFB0E3B4A7EB}"/>
+    <dgm:cxn modelId="{792FB76A-389C-45B7-8308-227DADB5CF70}" srcId="{0F9F144E-5A69-4079-9CFE-833FB141B5B7}" destId="{32074760-1CE6-4EA9-A667-33C7E19C2D94}" srcOrd="0" destOrd="0" parTransId="{41FFA3F1-CAF6-4B0C-90FB-AAF097D8C840}" sibTransId="{66E711EC-17A3-40E0-B60B-5A2F466C9D11}"/>
+    <dgm:cxn modelId="{7A675828-0E86-4177-A02F-94B30E827A0C}" type="presOf" srcId="{0F9F144E-5A69-4079-9CFE-833FB141B5B7}" destId="{9046789A-6150-4534-817A-88A1F11F0BDA}" srcOrd="0" destOrd="0" presId="urn:microsoft.com/office/officeart/2005/8/layout/lProcess2"/>
+    <dgm:cxn modelId="{92E0E4AC-AA4F-4221-B4F5-BC44ADD50226}" srcId="{F5E45C32-85BB-467F-80E6-A808871E72F3}" destId="{FA9C7340-018E-4F73-A402-B7FF8C34CDC0}" srcOrd="1" destOrd="0" parTransId="{1805A85A-B92E-48E0-886D-23F094607276}" sibTransId="{44F9A519-DD68-4648-B8E0-DFC7EF2120B7}"/>
+    <dgm:cxn modelId="{F53C5B60-EE78-46AA-90FC-BDF2F3396876}" srcId="{DF4857E7-5C40-4E4D-8F9E-0F40BE240B2F}" destId="{68DE1B8C-EBBC-4ACF-AD69-E108E4A8C85C}" srcOrd="3" destOrd="0" parTransId="{94D73433-720A-40B7-8E81-899280B4DD52}" sibTransId="{10D11475-433C-4D63-8B5E-9E928E6DD9A1}"/>
     <dgm:cxn modelId="{E3FD7D9B-7A36-4D12-B188-0A0D1AF9C129}" type="presOf" srcId="{68DE1B8C-EBBC-4ACF-AD69-E108E4A8C85C}" destId="{DFC8EC82-A76D-41CD-A597-E02C5F5CBEEE}" srcOrd="0" destOrd="0" presId="urn:microsoft.com/office/officeart/2005/8/layout/lProcess2"/>
-    <dgm:cxn modelId="{82ECE00E-C99F-43DA-83F9-38CFC3F7A2FA}" type="presOf" srcId="{DF4857E7-5C40-4E4D-8F9E-0F40BE240B2F}" destId="{4514D2E9-87FF-454C-A554-FD761A8568C7}" srcOrd="0" destOrd="0" presId="urn:microsoft.com/office/officeart/2005/8/layout/lProcess2"/>
-    <dgm:cxn modelId="{DEF1C201-34B1-4882-8DBF-B07106CA401E}" type="presOf" srcId="{8C9EF0B8-B348-4F26-938D-6A3D8F1D01C9}" destId="{EF50A355-5315-401C-A8B8-05A2B4F30FE3}" srcOrd="0" destOrd="0" presId="urn:microsoft.com/office/officeart/2005/8/layout/lProcess2"/>
-    <dgm:cxn modelId="{4F69C728-D27E-4664-B39F-E552BD0B15C4}" type="presOf" srcId="{68DE1B8C-EBBC-4ACF-AD69-E108E4A8C85C}" destId="{A9276CF6-D6BB-4D87-85EE-C74A56417B50}" srcOrd="1" destOrd="0" presId="urn:microsoft.com/office/officeart/2005/8/layout/lProcess2"/>
-    <dgm:cxn modelId="{EAD02916-CE0D-4F3F-A82E-33F10B159D8E}" type="presOf" srcId="{512A4932-71C2-4AF1-A35F-4F4632F17C02}" destId="{51239DC3-E9A2-43DA-8F69-23A0808C5F7B}" srcOrd="0" destOrd="0" presId="urn:microsoft.com/office/officeart/2005/8/layout/lProcess2"/>
-    <dgm:cxn modelId="{6F5081CF-24CF-4E2C-8683-D130E3B3E5C7}" type="presOf" srcId="{F5E45C32-85BB-467F-80E6-A808871E72F3}" destId="{2487EB6F-DE81-4509-80D3-3047844600F3}" srcOrd="1" destOrd="0" presId="urn:microsoft.com/office/officeart/2005/8/layout/lProcess2"/>
-    <dgm:cxn modelId="{F53C5B60-EE78-46AA-90FC-BDF2F3396876}" srcId="{DF4857E7-5C40-4E4D-8F9E-0F40BE240B2F}" destId="{68DE1B8C-EBBC-4ACF-AD69-E108E4A8C85C}" srcOrd="3" destOrd="0" parTransId="{94D73433-720A-40B7-8E81-899280B4DD52}" sibTransId="{10D11475-433C-4D63-8B5E-9E928E6DD9A1}"/>
-    <dgm:cxn modelId="{792FB76A-389C-45B7-8308-227DADB5CF70}" srcId="{0F9F144E-5A69-4079-9CFE-833FB141B5B7}" destId="{32074760-1CE6-4EA9-A667-33C7E19C2D94}" srcOrd="0" destOrd="0" parTransId="{41FFA3F1-CAF6-4B0C-90FB-AAF097D8C840}" sibTransId="{66E711EC-17A3-40E0-B60B-5A2F466C9D11}"/>
-    <dgm:cxn modelId="{C3F684FE-A0E7-411B-A303-2C8155B38D48}" srcId="{DF4857E7-5C40-4E4D-8F9E-0F40BE240B2F}" destId="{F5E45C32-85BB-467F-80E6-A808871E72F3}" srcOrd="1" destOrd="0" parTransId="{FAB096C4-43F1-4FB0-A740-B5A33490B558}" sibTransId="{F29CEF7E-7A2A-457D-9BE3-75C08A423C81}"/>
-    <dgm:cxn modelId="{92E0E4AC-AA4F-4221-B4F5-BC44ADD50226}" srcId="{F5E45C32-85BB-467F-80E6-A808871E72F3}" destId="{FA9C7340-018E-4F73-A402-B7FF8C34CDC0}" srcOrd="1" destOrd="0" parTransId="{1805A85A-B92E-48E0-886D-23F094607276}" sibTransId="{44F9A519-DD68-4648-B8E0-DFC7EF2120B7}"/>
-    <dgm:cxn modelId="{8AD144FB-65EB-4E0A-BBFB-81923B833C5B}" type="presOf" srcId="{F5E45C32-85BB-467F-80E6-A808871E72F3}" destId="{E7B9CF75-AF6A-4290-854A-077BB9A2D77C}" srcOrd="0" destOrd="0" presId="urn:microsoft.com/office/officeart/2005/8/layout/lProcess2"/>
-    <dgm:cxn modelId="{3BB736BE-339A-4657-B981-F9F1F8D52FDC}" type="presOf" srcId="{A766E2ED-C2E8-4E07-AF18-7EC57476A5C8}" destId="{D88EF221-1E19-407F-A109-45D126E6B0AD}" srcOrd="0" destOrd="0" presId="urn:microsoft.com/office/officeart/2005/8/layout/lProcess2"/>
-    <dgm:cxn modelId="{E3AEEE63-0D70-4A65-B4AD-DC3DBA17985A}" type="presOf" srcId="{7592B694-086D-4180-B053-CE7AD13C9858}" destId="{B6E9B2AA-8010-4FAB-90D2-72717C05AE96}" srcOrd="1" destOrd="0" presId="urn:microsoft.com/office/officeart/2005/8/layout/lProcess2"/>
-    <dgm:cxn modelId="{41BAC73D-C909-4828-81D3-F16502305163}" type="presOf" srcId="{8665C39E-B30E-4258-BEA9-83E0F7084606}" destId="{85B657F5-5C9C-42F8-A245-10BA7A824404}" srcOrd="0" destOrd="0" presId="urn:microsoft.com/office/officeart/2005/8/layout/lProcess2"/>
-    <dgm:cxn modelId="{918FC998-3E81-4E2A-A8E0-FB3EB04E2705}" srcId="{0F9F144E-5A69-4079-9CFE-833FB141B5B7}" destId="{A766E2ED-C2E8-4E07-AF18-7EC57476A5C8}" srcOrd="1" destOrd="0" parTransId="{A1530F03-6C5E-45D7-8222-AD175A7090BD}" sibTransId="{05B31AC5-A983-4FEC-B0BE-EB0462CF6128}"/>
-    <dgm:cxn modelId="{58D7B72C-6638-4F5D-945E-9420F8FE7097}" type="presOf" srcId="{7592B694-086D-4180-B053-CE7AD13C9858}" destId="{6E5A89BC-14D8-4DAA-BBC1-B070DD5BD626}" srcOrd="0" destOrd="0" presId="urn:microsoft.com/office/officeart/2005/8/layout/lProcess2"/>
-    <dgm:cxn modelId="{FA16C23C-5596-42A1-981A-487742CF3BBD}" srcId="{F5E45C32-85BB-467F-80E6-A808871E72F3}" destId="{6193ECAA-3925-487F-ADF8-CE1362754FFF}" srcOrd="0" destOrd="0" parTransId="{CA95F830-F096-4B8A-8E76-097EF46A4F44}" sibTransId="{4C2F44CE-5AB4-4FFE-B037-FFB0E3B4A7EB}"/>
-    <dgm:cxn modelId="{42032CCC-41F9-4B3F-A503-E38701F4AC02}" srcId="{7592B694-086D-4180-B053-CE7AD13C9858}" destId="{512A4932-71C2-4AF1-A35F-4F4632F17C02}" srcOrd="1" destOrd="0" parTransId="{47E31259-60CB-40FB-B391-CCAEC2189164}" sibTransId="{4C7C1C5B-4033-4A4C-87E1-4A3C60B720B7}"/>
-    <dgm:cxn modelId="{583CC615-DAE7-4276-AD9F-C578D26FEDFC}" srcId="{DF4857E7-5C40-4E4D-8F9E-0F40BE240B2F}" destId="{7592B694-086D-4180-B053-CE7AD13C9858}" srcOrd="2" destOrd="0" parTransId="{C8FADD59-ED12-44D1-A076-7A13B0AC344E}" sibTransId="{34A6F1FD-1787-4988-A7E6-472B7C66BD09}"/>
-    <dgm:cxn modelId="{8D6B5497-475C-46A9-805D-510F815F9B98}" srcId="{7592B694-086D-4180-B053-CE7AD13C9858}" destId="{8665C39E-B30E-4258-BEA9-83E0F7084606}" srcOrd="0" destOrd="0" parTransId="{8211EBE3-1C93-4CFB-BBEE-7A708996ED07}" sibTransId="{6779ED75-3327-4C98-9C89-1343058D49BC}"/>
-    <dgm:cxn modelId="{ECB29E32-DF3F-494F-B7BB-9C8BD137B048}" type="presOf" srcId="{FA9C7340-018E-4F73-A402-B7FF8C34CDC0}" destId="{BD436606-D1DD-4535-A521-C5E4F9743128}" srcOrd="0" destOrd="0" presId="urn:microsoft.com/office/officeart/2005/8/layout/lProcess2"/>
-    <dgm:cxn modelId="{BA343F65-7063-4A06-9692-19E81201F0CA}" type="presOf" srcId="{7DCD12F6-9D96-4CEE-B77D-0059BD9F172C}" destId="{60B6E648-ADB0-4695-B9EA-290DF28C1E3A}" srcOrd="0" destOrd="0" presId="urn:microsoft.com/office/officeart/2005/8/layout/lProcess2"/>
-    <dgm:cxn modelId="{7C9C3A38-6D50-4AFF-AA73-365DE43285E1}" type="presOf" srcId="{32074760-1CE6-4EA9-A667-33C7E19C2D94}" destId="{A8FD0D76-AFC6-4802-9090-E980FDBECC91}" srcOrd="0" destOrd="0" presId="urn:microsoft.com/office/officeart/2005/8/layout/lProcess2"/>
-    <dgm:cxn modelId="{337C532E-FA4C-4DE5-902B-AF62654DE2CD}" type="presOf" srcId="{0F9F144E-5A69-4079-9CFE-833FB141B5B7}" destId="{F032D9DC-6E96-4533-82F7-966FA94900AA}" srcOrd="1" destOrd="0" presId="urn:microsoft.com/office/officeart/2005/8/layout/lProcess2"/>
     <dgm:cxn modelId="{B4186457-1219-426F-922C-5AECDCC53AC0}" srcId="{68DE1B8C-EBBC-4ACF-AD69-E108E4A8C85C}" destId="{8C9EF0B8-B348-4F26-938D-6A3D8F1D01C9}" srcOrd="0" destOrd="0" parTransId="{317FEE05-7414-4035-9841-8DABE546206E}" sibTransId="{5DAD05BE-4905-4E9C-9DE0-125B4DBFBE33}"/>
-    <dgm:cxn modelId="{7A675828-0E86-4177-A02F-94B30E827A0C}" type="presOf" srcId="{0F9F144E-5A69-4079-9CFE-833FB141B5B7}" destId="{9046789A-6150-4534-817A-88A1F11F0BDA}" srcOrd="0" destOrd="0" presId="urn:microsoft.com/office/officeart/2005/8/layout/lProcess2"/>
-    <dgm:cxn modelId="{C664844B-280E-4BFE-9C14-BBB1B2BC2C91}" type="presOf" srcId="{6193ECAA-3925-487F-ADF8-CE1362754FFF}" destId="{5CE69C38-1462-4F71-A252-F397C9008295}" srcOrd="0" destOrd="0" presId="urn:microsoft.com/office/officeart/2005/8/layout/lProcess2"/>
-    <dgm:cxn modelId="{8BF652A8-B747-4011-8997-2C8E587087B9}" srcId="{68DE1B8C-EBBC-4ACF-AD69-E108E4A8C85C}" destId="{7DCD12F6-9D96-4CEE-B77D-0059BD9F172C}" srcOrd="1" destOrd="0" parTransId="{05220267-9773-4777-8E6B-2437F9979F0B}" sibTransId="{89843E98-8750-44A8-9562-C70EE7FD83F4}"/>
-    <dgm:cxn modelId="{696FC290-58F8-4B0A-B325-8A4CDCEFC93C}" srcId="{DF4857E7-5C40-4E4D-8F9E-0F40BE240B2F}" destId="{0F9F144E-5A69-4079-9CFE-833FB141B5B7}" srcOrd="0" destOrd="0" parTransId="{5295059C-89BD-48FC-9FB0-63BD38C2AF52}" sibTransId="{FAB8FA54-A1F3-488D-B823-07CCB71E4D44}"/>
     <dgm:cxn modelId="{E45813B2-B87D-4638-B83F-E35E092B0951}" type="presParOf" srcId="{4514D2E9-87FF-454C-A554-FD761A8568C7}" destId="{D7F4306A-6D29-4C14-BF5D-EE8CBCC47C9B}" srcOrd="0" destOrd="0" presId="urn:microsoft.com/office/officeart/2005/8/layout/lProcess2"/>
     <dgm:cxn modelId="{B70D7543-B290-431E-8E27-81EE23763ABD}" type="presParOf" srcId="{D7F4306A-6D29-4C14-BF5D-EE8CBCC47C9B}" destId="{9046789A-6150-4534-817A-88A1F11F0BDA}" srcOrd="0" destOrd="0" presId="urn:microsoft.com/office/officeart/2005/8/layout/lProcess2"/>
     <dgm:cxn modelId="{EBC5D71A-D089-4FA3-8176-B37E02AAD50D}" type="presParOf" srcId="{D7F4306A-6D29-4C14-BF5D-EE8CBCC47C9B}" destId="{F032D9DC-6E96-4533-82F7-966FA94900AA}" srcOrd="1" destOrd="0" presId="urn:microsoft.com/office/officeart/2005/8/layout/lProcess2"/>
@@ -14734,7 +14811,7 @@
   </p:txStyles>
   <p:extLst mod="1">
     <p:ext uri="{27BBF7A9-308A-43DC-89C8-2F10F3537804}">
-      <p15:sldGuideLst xmlns:p15="http://schemas.microsoft.com/office/powerpoint/2012/main" xmlns="">
+      <p15:sldGuideLst xmlns="" xmlns:p15="http://schemas.microsoft.com/office/powerpoint/2012/main">
         <p15:guide id="1" orient="horz" pos="2360">
           <p15:clr>
             <a:srgbClr val="F26B43"/>
@@ -17753,8 +17830,17 @@
             </a:pPr>
             <a:r>
               <a:rPr lang="pt-BR" dirty="0" smtClean="0"/>
-              <a:t>Surgiram dos Fluxos Principal, Alternativo e Exceção.</a:t>
-            </a:r>
+              <a:t>Surgiram dos Fluxos Principal, Alternativo </a:t>
+            </a:r>
+            <a:r>
+              <a:rPr lang="pt-BR" smtClean="0"/>
+              <a:t>e </a:t>
+            </a:r>
+            <a:r>
+              <a:rPr lang="pt-BR" smtClean="0"/>
+              <a:t>Exceção(Secundário).</a:t>
+            </a:r>
+            <a:endParaRPr lang="pt-BR" dirty="0" smtClean="0"/>
           </a:p>
           <a:p>
             <a:pPr marL="342900" indent="-342900">
@@ -20366,11 +20452,7 @@
             </a:pPr>
             <a:r>
               <a:rPr lang="pt-BR" dirty="0" smtClean="0"/>
-              <a:t>Conciliar vários projetos</a:t>
-            </a:r>
-            <a:r>
-              <a:rPr lang="pt-BR" dirty="0" smtClean="0"/>
-              <a:t>.</a:t>
+              <a:t>Conciliar vários projetos.</a:t>
             </a:r>
             <a:endParaRPr lang="pt-BR" dirty="0"/>
           </a:p>
@@ -20383,7 +20465,6 @@
               <a:rPr lang="pt-BR" dirty="0" smtClean="0"/>
               <a:t>Tempo.</a:t>
             </a:r>
-            <a:endParaRPr lang="pt-BR" dirty="0" smtClean="0"/>
           </a:p>
         </p:txBody>
       </p:sp>
@@ -20786,7 +20867,7 @@
   <a:extraClrSchemeLst/>
   <a:extLst>
     <a:ext uri="{05A4C25C-085E-4340-85A3-A5531E510DB2}">
-      <thm15:themeFamily xmlns:thm15="http://schemas.microsoft.com/office/thememl/2012/main" xmlns="" name="BusinessProjectPlan_TP103417270.potx" id="{1770548D-EDF1-4703-9217-6F75A83FD301}" vid="{47CC73D5-D979-407C-BDE1-1377C0466D55}"/>
+      <thm15:themeFamily xmlns="" xmlns:thm15="http://schemas.microsoft.com/office/thememl/2012/main" name="BusinessProjectPlan_TP103417270.potx" id="{1770548D-EDF1-4703-9217-6F75A83FD301}" vid="{47CC73D5-D979-407C-BDE1-1377C0466D55}"/>
     </a:ext>
   </a:extLst>
 </a:theme>

</xml_diff>